<commit_message>
Made a bunch of standard classes
</commit_message>
<xml_diff>
--- a/documentation/include/ER-Diagram.pptx
+++ b/documentation/include/ER-Diagram.pptx
@@ -353,7 +353,7 @@
             <a:pPr indent="0" algn="r">
               <a:buNone/>
             </a:pPr>
-            <a:fld id="{47611DC5-7CA1-477A-AF28-833B491274A0}" type="slidenum">
+            <a:fld id="{8F310CC0-B354-441A-9DCC-DFD5844DF2D9}" type="slidenum">
               <a:rPr b="0" lang="en-US" sz="1400" spc="-1" strike="noStrike">
                 <a:solidFill>
                   <a:srgbClr val="000000"/>
@@ -512,7 +512,7 @@
                 <a:tab algn="l" pos="0"/>
               </a:tabLst>
             </a:pPr>
-            <a:fld id="{64FEC907-115E-4212-B1CB-1584C82435BA}" type="slidenum">
+            <a:fld id="{72016113-BCB7-4B4D-AF5C-6755C25C3E84}" type="slidenum">
               <a:rPr b="0" lang="en-US" sz="1200" spc="-1" strike="noStrike">
                 <a:solidFill>
                   <a:schemeClr val="dk1"/>
@@ -671,7 +671,7 @@
                 <a:tab algn="l" pos="0"/>
               </a:tabLst>
             </a:pPr>
-            <a:fld id="{B4D5AB21-599D-45A8-B26D-DE03BCABEBB8}" type="slidenum">
+            <a:fld id="{A0EB2D84-0797-4BCF-9651-EF2D1E3EF0CF}" type="slidenum">
               <a:rPr b="0" lang="en-US" sz="1200" spc="-1" strike="noStrike">
                 <a:solidFill>
                   <a:schemeClr val="dk1"/>
@@ -830,7 +830,7 @@
                 <a:tab algn="l" pos="0"/>
               </a:tabLst>
             </a:pPr>
-            <a:fld id="{64F3003A-DF6F-470E-BA6A-01E2962080D2}" type="slidenum">
+            <a:fld id="{B3B743C2-B1CF-49BF-9697-05DFB5F3F673}" type="slidenum">
               <a:rPr b="0" lang="en-US" sz="1200" spc="-1" strike="noStrike">
                 <a:solidFill>
                   <a:schemeClr val="dk1"/>
@@ -989,7 +989,7 @@
                 <a:tab algn="l" pos="0"/>
               </a:tabLst>
             </a:pPr>
-            <a:fld id="{0FA57583-DC7F-45AE-9124-0C1D8B90EFF6}" type="slidenum">
+            <a:fld id="{A58DDD10-FBB7-4A52-826B-789DAD7BAF26}" type="slidenum">
               <a:rPr b="0" lang="en-US" sz="1200" spc="-1" strike="noStrike">
                 <a:solidFill>
                   <a:schemeClr val="dk1"/>
@@ -1233,7 +1233,7 @@
         <p:txBody>
           <a:bodyPr/>
           <a:p>
-            <a:fld id="{746A8ACE-8635-438F-8A5F-EB24C21C778D}" type="slidenum">
+            <a:fld id="{362251D9-F257-496A-B60F-E53BDFE8306F}" type="slidenum">
               <a:t>&lt;#&gt;</a:t>
             </a:fld>
           </a:p>
@@ -1442,7 +1442,7 @@
         <p:txBody>
           <a:bodyPr/>
           <a:p>
-            <a:fld id="{23AE1388-59DD-458C-8CD0-8796D5F1FEEB}" type="slidenum">
+            <a:fld id="{E647D393-F3EE-4065-86C9-462B1AB270F5}" type="slidenum">
               <a:t>&lt;#&gt;</a:t>
             </a:fld>
           </a:p>
@@ -1565,7 +1565,7 @@
         <p:txBody>
           <a:bodyPr/>
           <a:p>
-            <a:fld id="{4C585285-041B-4EA4-8AB5-6F39AF7FAB18}" type="slidenum">
+            <a:fld id="{C89AB441-1048-414A-BF6A-4363445BB36A}" type="slidenum">
               <a:t>&lt;#&gt;</a:t>
             </a:fld>
           </a:p>
@@ -1648,7 +1648,7 @@
         <p:txBody>
           <a:bodyPr/>
           <a:p>
-            <a:fld id="{C210E828-03FF-42BF-A1B5-3665C6604721}" type="slidenum">
+            <a:fld id="{07B1BB21-D12E-4A0A-B068-0B27A6DAB45E}" type="slidenum">
               <a:t>&lt;#&gt;</a:t>
             </a:fld>
           </a:p>
@@ -1900,7 +1900,7 @@
         <p:txBody>
           <a:bodyPr/>
           <a:p>
-            <a:fld id="{D672DDAF-9937-4B9C-8750-D68A1CB1ED9B}" type="slidenum">
+            <a:fld id="{C7043080-2081-4E96-8BC4-CBF14EC8A7E3}" type="slidenum">
               <a:t>&lt;#&gt;</a:t>
             </a:fld>
           </a:p>
@@ -2152,7 +2152,7 @@
         <p:txBody>
           <a:bodyPr/>
           <a:p>
-            <a:fld id="{D3D4CCB1-4340-4119-AB28-1212058DDB11}" type="slidenum">
+            <a:fld id="{A932D1EA-F5CA-4234-9D6C-E6989FF69783}" type="slidenum">
               <a:t>&lt;#&gt;</a:t>
             </a:fld>
           </a:p>
@@ -2361,7 +2361,7 @@
         <p:txBody>
           <a:bodyPr/>
           <a:p>
-            <a:fld id="{757D77BF-E26F-4E52-9D27-65F823CFD36A}" type="slidenum">
+            <a:fld id="{4077D448-8FEE-467D-A4C4-13106FBA55EE}" type="slidenum">
               <a:t>&lt;#&gt;</a:t>
             </a:fld>
           </a:p>
@@ -2656,7 +2656,7 @@
         <p:txBody>
           <a:bodyPr/>
           <a:p>
-            <a:fld id="{EE7AE4EE-0FDD-4086-B20E-745FA18CC3D6}" type="slidenum">
+            <a:fld id="{D1B70EDE-BDC6-469E-A701-CC07E6BEF36A}" type="slidenum">
               <a:t>&lt;#&gt;</a:t>
             </a:fld>
           </a:p>
@@ -2739,7 +2739,7 @@
         <p:txBody>
           <a:bodyPr/>
           <a:p>
-            <a:fld id="{31A915E2-CA3E-4F17-AEE5-19493F3DBAF4}" type="slidenum">
+            <a:fld id="{CA1E3AE6-F930-4CD8-A4F4-162A3282A148}" type="slidenum">
               <a:t>&lt;#&gt;</a:t>
             </a:fld>
           </a:p>
@@ -2822,7 +2822,7 @@
         <p:txBody>
           <a:bodyPr/>
           <a:p>
-            <a:fld id="{46903691-DFDB-42C9-AD73-73A2A21A6F8D}" type="slidenum">
+            <a:fld id="{1A4347BC-BDB7-4170-9309-FE3B031D9924}" type="slidenum">
               <a:t>&lt;#&gt;</a:t>
             </a:fld>
           </a:p>
@@ -2988,7 +2988,7 @@
         <p:txBody>
           <a:bodyPr/>
           <a:p>
-            <a:fld id="{A38E3123-3FC7-4629-8F2A-AD13045045D3}" type="slidenum">
+            <a:fld id="{444E2B9B-3EEF-4A10-BB4C-9CFCD042E1C6}" type="slidenum">
               <a:t>&lt;#&gt;</a:t>
             </a:fld>
           </a:p>
@@ -3154,7 +3154,7 @@
         <p:txBody>
           <a:bodyPr/>
           <a:p>
-            <a:fld id="{31243C25-2947-4997-BFC9-E4A09F15FC6F}" type="slidenum">
+            <a:fld id="{8B3826E8-75B6-4D4D-A589-968516E8EBA2}" type="slidenum">
               <a:t>&lt;#&gt;</a:t>
             </a:fld>
           </a:p>
@@ -3309,7 +3309,52 @@
                 </a:solidFill>
                 <a:latin typeface="Arial"/>
               </a:rPr>
-              <a:t>Click to edit the title text format</a:t>
+              <a:t>Click </a:t>
+            </a:r>
+            <a:r>
+              <a:rPr b="0" lang="en-US" sz="1800" spc="-1" strike="noStrike">
+                <a:solidFill>
+                  <a:srgbClr val="000000"/>
+                </a:solidFill>
+                <a:latin typeface="Arial"/>
+              </a:rPr>
+              <a:t>to edit </a:t>
+            </a:r>
+            <a:r>
+              <a:rPr b="0" lang="en-US" sz="1800" spc="-1" strike="noStrike">
+                <a:solidFill>
+                  <a:srgbClr val="000000"/>
+                </a:solidFill>
+                <a:latin typeface="Arial"/>
+              </a:rPr>
+              <a:t>the </a:t>
+            </a:r>
+            <a:r>
+              <a:rPr b="0" lang="en-US" sz="1800" spc="-1" strike="noStrike">
+                <a:solidFill>
+                  <a:srgbClr val="000000"/>
+                </a:solidFill>
+                <a:latin typeface="Arial"/>
+              </a:rPr>
+              <a:t>title </a:t>
+            </a:r>
+            <a:r>
+              <a:rPr b="0" lang="en-US" sz="1800" spc="-1" strike="noStrike">
+                <a:solidFill>
+                  <a:srgbClr val="000000"/>
+                </a:solidFill>
+                <a:latin typeface="Arial"/>
+              </a:rPr>
+              <a:t>text </a:t>
+            </a:r>
+            <a:r>
+              <a:rPr b="0" lang="en-US" sz="1800" spc="-1" strike="noStrike">
+                <a:solidFill>
+                  <a:srgbClr val="000000"/>
+                </a:solidFill>
+                <a:latin typeface="Arial"/>
+              </a:rPr>
+              <a:t>format</a:t>
             </a:r>
             <a:endParaRPr b="0" lang="en-US" sz="1800" spc="-1" strike="noStrike">
               <a:solidFill>
@@ -4123,7 +4168,7 @@
                 <a:tab algn="l" pos="0"/>
               </a:tabLst>
             </a:pPr>
-            <a:fld id="{5E0EBE4F-3898-4E70-B0CB-375D9B6CA38E}" type="slidenum">
+            <a:fld id="{1D4BE657-0902-4F85-B734-9E916EA7C32B}" type="slidenum">
               <a:rPr b="0" lang="en-US" sz="1200" spc="-1" strike="noStrike">
                 <a:solidFill>
                   <a:schemeClr val="dk1">
@@ -4924,7 +4969,7 @@
                 <a:tab algn="l" pos="0"/>
               </a:tabLst>
             </a:pPr>
-            <a:fld id="{564FD735-27FC-4FC1-8028-AB0B838FDF92}" type="slidenum">
+            <a:fld id="{799AC9E6-BAC0-4EDD-9F15-57E784E18383}" type="slidenum">
               <a:rPr b="0" lang="en-US" sz="1200" spc="-1" strike="noStrike">
                 <a:solidFill>
                   <a:schemeClr val="dk1">
@@ -5275,7 +5320,7 @@
                 <a:tab algn="l" pos="0"/>
               </a:tabLst>
             </a:pPr>
-            <a:fld id="{60C3AFFD-E7F5-475E-AE27-2C69455FAB27}" type="slidenum">
+            <a:fld id="{930BC752-89F7-4976-9CAF-89B4CD916F25}" type="slidenum">
               <a:rPr b="0" lang="en-US" sz="1200" spc="-1" strike="noStrike">
                 <a:solidFill>
                   <a:schemeClr val="dk1">
@@ -5577,7 +5622,7 @@
                 <a:tab algn="l" pos="0"/>
               </a:tabLst>
             </a:pPr>
-            <a:fld id="{061F0D67-8C44-419E-BE4D-3C84040AB2DA}" type="slidenum">
+            <a:fld id="{0DB7282A-A6C4-4721-B87F-4BF026D80572}" type="slidenum">
               <a:rPr b="0" lang="en-US" sz="1200" spc="-1" strike="noStrike">
                 <a:solidFill>
                   <a:schemeClr val="dk1">
@@ -6603,7 +6648,7 @@
                 <a:tab algn="l" pos="0"/>
               </a:tabLst>
             </a:pPr>
-            <a:fld id="{DDB2A87A-E094-40DE-B5B8-FE695774D7EE}" type="slidenum">
+            <a:fld id="{A4716803-93F9-458B-9C03-0C9FECFFB764}" type="slidenum">
               <a:rPr b="0" lang="en-US" sz="1200" spc="-1" strike="noStrike">
                 <a:solidFill>
                   <a:schemeClr val="dk1">
@@ -7629,7 +7674,7 @@
                 <a:tab algn="l" pos="0"/>
               </a:tabLst>
             </a:pPr>
-            <a:fld id="{3DEA8C8B-FC2F-4DC4-93ED-BC826527CA30}" type="slidenum">
+            <a:fld id="{F1D86995-F491-42C4-BBEF-713BC1E062DA}" type="slidenum">
               <a:rPr b="0" lang="en-US" sz="1200" spc="-1" strike="noStrike">
                 <a:solidFill>
                   <a:schemeClr val="dk1">
@@ -8430,7 +8475,7 @@
                 <a:tab algn="l" pos="0"/>
               </a:tabLst>
             </a:pPr>
-            <a:fld id="{DA066C82-9816-4AC9-8847-DD1A0C985C6F}" type="slidenum">
+            <a:fld id="{6A8C9784-B67D-4B94-AFD1-5BFA3D32D476}" type="slidenum">
               <a:rPr b="0" lang="en-US" sz="1200" spc="-1" strike="noStrike">
                 <a:solidFill>
                   <a:schemeClr val="dk1">
@@ -9681,7 +9726,7 @@
                 <a:tab algn="l" pos="0"/>
               </a:tabLst>
             </a:pPr>
-            <a:fld id="{25E85247-0E7A-477E-875D-B3871EC3FB8E}" type="slidenum">
+            <a:fld id="{98F174EB-2C17-4D49-B8CC-6FAE08A91FCC}" type="slidenum">
               <a:rPr b="0" lang="en-US" sz="1200" spc="-1" strike="noStrike">
                 <a:solidFill>
                   <a:schemeClr val="dk1">
@@ -9983,7 +10028,7 @@
                 <a:tab algn="l" pos="0"/>
               </a:tabLst>
             </a:pPr>
-            <a:fld id="{12CE0552-B599-4EFD-8BB0-CF2F0C54DA76}" type="slidenum">
+            <a:fld id="{115DE327-5D2D-4B91-8822-068597DE1099}" type="slidenum">
               <a:rPr b="0" lang="en-US" sz="1200" spc="-1" strike="noStrike">
                 <a:solidFill>
                   <a:schemeClr val="dk1">
@@ -10285,7 +10330,7 @@
                 <a:tab algn="l" pos="0"/>
               </a:tabLst>
             </a:pPr>
-            <a:fld id="{1C80751D-BFFA-425A-843B-06BE1A07C31D}" type="slidenum">
+            <a:fld id="{35F1D043-156E-433B-B53D-6226F6E8C7B9}" type="slidenum">
               <a:rPr b="0" lang="en-US" sz="1200" spc="-1" strike="noStrike">
                 <a:solidFill>
                   <a:schemeClr val="dk1">
@@ -11135,7 +11180,7 @@
                 <a:tab algn="l" pos="0"/>
               </a:tabLst>
             </a:pPr>
-            <a:fld id="{5C93E52F-D29A-4DE2-AE82-C1C21EEBA0C1}" type="slidenum">
+            <a:fld id="{C0891383-6F97-40ED-BBE3-8E7DAB67BE85}" type="slidenum">
               <a:rPr b="0" lang="en-US" sz="1200" spc="-1" strike="noStrike">
                 <a:solidFill>
                   <a:schemeClr val="dk1">
@@ -11711,7 +11756,7 @@
                 <a:tab algn="l" pos="0"/>
               </a:tabLst>
             </a:pPr>
-            <a:fld id="{3D37EE00-051B-43B4-A2B3-6206802A1460}" type="slidenum">
+            <a:fld id="{403C025B-5E39-4F4F-90DF-D5BD1CDC576D}" type="slidenum">
               <a:rPr b="0" lang="en-US" sz="1200" spc="-1" strike="noStrike">
                 <a:solidFill>
                   <a:schemeClr val="dk1">
@@ -12376,7 +12421,7 @@
                 </a:solidFill>
                 <a:latin typeface="Calibri"/>
               </a:rPr>
-              <a:t>User</a:t>
+              <a:t>Player</a:t>
             </a:r>
             <a:endParaRPr b="0" lang="en-US" sz="1400" spc="-1" strike="noStrike">
               <a:solidFill>
@@ -16914,7 +16959,7 @@
                 </a:solidFill>
                 <a:latin typeface="Calibri"/>
               </a:rPr>
-              <a:t>User</a:t>
+              <a:t>Player</a:t>
             </a:r>
             <a:endParaRPr b="0" lang="en-US" sz="1400" spc="-1" strike="noStrike">
               <a:solidFill>
@@ -17102,7 +17147,7 @@
                   </a:solidFill>
                   <a:latin typeface="Calibri"/>
                 </a:rPr>
-                <a:t>Guild</a:t>
+                <a:t>Clan</a:t>
               </a:r>
               <a:endParaRPr b="0" lang="en-US" sz="1400" spc="-1" strike="noStrike">
                 <a:solidFill>
@@ -17727,7 +17772,7 @@
                   </a:solidFill>
                   <a:latin typeface="Calibri"/>
                 </a:rPr>
-                <a:t>DateTime</a:t>
+                <a:t>Moment</a:t>
               </a:r>
               <a:endParaRPr b="0" lang="en-US" sz="1400" spc="-1" strike="noStrike">
                 <a:solidFill>
@@ -21045,7 +21090,7 @@
                   </a:solidFill>
                   <a:latin typeface="Calibri"/>
                 </a:rPr>
-                <a:t>Base Speed</a:t>
+                <a:t>Speed</a:t>
               </a:r>
               <a:endParaRPr b="0" lang="en-US" sz="1400" spc="-1" strike="noStrike">
                 <a:solidFill>

</xml_diff>

<commit_message>
Added more Request Specialisations
</commit_message>
<xml_diff>
--- a/documentation/include/ER-Diagram.pptx
+++ b/documentation/include/ER-Diagram.pptx
@@ -353,7 +353,7 @@
             <a:pPr indent="0" algn="r">
               <a:buNone/>
             </a:pPr>
-            <a:fld id="{8F310CC0-B354-441A-9DCC-DFD5844DF2D9}" type="slidenum">
+            <a:fld id="{C016BF43-2EEE-48E5-99AB-B483D340BFD1}" type="slidenum">
               <a:rPr b="0" lang="en-US" sz="1400" spc="-1" strike="noStrike">
                 <a:solidFill>
                   <a:srgbClr val="000000"/>
@@ -407,7 +407,7 @@
         <p:spPr>
           <a:xfrm>
             <a:off x="685800" y="1143000"/>
-            <a:ext cx="5481720" cy="3081600"/>
+            <a:ext cx="5481360" cy="3081240"/>
           </a:xfrm>
           <a:prstGeom prst="rect">
             <a:avLst/>
@@ -430,7 +430,7 @@
         <p:spPr>
           <a:xfrm>
             <a:off x="685800" y="4400640"/>
-            <a:ext cx="5481720" cy="3595680"/>
+            <a:ext cx="5481360" cy="3595320"/>
           </a:xfrm>
           <a:prstGeom prst="rect">
             <a:avLst/>
@@ -470,7 +470,7 @@
         <p:spPr>
           <a:xfrm>
             <a:off x="3884760" y="8685360"/>
-            <a:ext cx="2967120" cy="453960"/>
+            <a:ext cx="2966760" cy="453600"/>
           </a:xfrm>
           <a:prstGeom prst="rect">
             <a:avLst/>
@@ -512,7 +512,7 @@
                 <a:tab algn="l" pos="0"/>
               </a:tabLst>
             </a:pPr>
-            <a:fld id="{72016113-BCB7-4B4D-AF5C-6755C25C3E84}" type="slidenum">
+            <a:fld id="{5C4AE3F0-D07F-4910-9492-D5B4073CCB6A}" type="slidenum">
               <a:rPr b="0" lang="en-US" sz="1200" spc="-1" strike="noStrike">
                 <a:solidFill>
                   <a:schemeClr val="dk1"/>
@@ -566,7 +566,7 @@
         <p:spPr>
           <a:xfrm>
             <a:off x="685800" y="1143000"/>
-            <a:ext cx="5481720" cy="3081600"/>
+            <a:ext cx="5481360" cy="3081240"/>
           </a:xfrm>
           <a:prstGeom prst="rect">
             <a:avLst/>
@@ -589,7 +589,7 @@
         <p:spPr>
           <a:xfrm>
             <a:off x="685800" y="4400640"/>
-            <a:ext cx="5481720" cy="3595680"/>
+            <a:ext cx="5481360" cy="3595320"/>
           </a:xfrm>
           <a:prstGeom prst="rect">
             <a:avLst/>
@@ -629,7 +629,7 @@
         <p:spPr>
           <a:xfrm>
             <a:off x="3884760" y="8685360"/>
-            <a:ext cx="2967120" cy="453960"/>
+            <a:ext cx="2966760" cy="453600"/>
           </a:xfrm>
           <a:prstGeom prst="rect">
             <a:avLst/>
@@ -671,7 +671,7 @@
                 <a:tab algn="l" pos="0"/>
               </a:tabLst>
             </a:pPr>
-            <a:fld id="{A0EB2D84-0797-4BCF-9651-EF2D1E3EF0CF}" type="slidenum">
+            <a:fld id="{EFCEC852-A440-4866-B644-B8F174F5A7D8}" type="slidenum">
               <a:rPr b="0" lang="en-US" sz="1200" spc="-1" strike="noStrike">
                 <a:solidFill>
                   <a:schemeClr val="dk1"/>
@@ -725,7 +725,7 @@
         <p:spPr>
           <a:xfrm>
             <a:off x="685800" y="1143000"/>
-            <a:ext cx="5481720" cy="3081600"/>
+            <a:ext cx="5481360" cy="3081240"/>
           </a:xfrm>
           <a:prstGeom prst="rect">
             <a:avLst/>
@@ -748,7 +748,7 @@
         <p:spPr>
           <a:xfrm>
             <a:off x="685800" y="4400640"/>
-            <a:ext cx="5481720" cy="3595680"/>
+            <a:ext cx="5481360" cy="3595320"/>
           </a:xfrm>
           <a:prstGeom prst="rect">
             <a:avLst/>
@@ -788,7 +788,7 @@
         <p:spPr>
           <a:xfrm>
             <a:off x="3884760" y="8685360"/>
-            <a:ext cx="2967120" cy="453960"/>
+            <a:ext cx="2966760" cy="453600"/>
           </a:xfrm>
           <a:prstGeom prst="rect">
             <a:avLst/>
@@ -830,7 +830,7 @@
                 <a:tab algn="l" pos="0"/>
               </a:tabLst>
             </a:pPr>
-            <a:fld id="{B3B743C2-B1CF-49BF-9697-05DFB5F3F673}" type="slidenum">
+            <a:fld id="{54CCA559-2012-41B0-B2B1-6B8C04DFC51A}" type="slidenum">
               <a:rPr b="0" lang="en-US" sz="1200" spc="-1" strike="noStrike">
                 <a:solidFill>
                   <a:schemeClr val="dk1"/>
@@ -884,7 +884,7 @@
         <p:spPr>
           <a:xfrm>
             <a:off x="685800" y="1143000"/>
-            <a:ext cx="5481720" cy="3081600"/>
+            <a:ext cx="5481360" cy="3081240"/>
           </a:xfrm>
           <a:prstGeom prst="rect">
             <a:avLst/>
@@ -907,7 +907,7 @@
         <p:spPr>
           <a:xfrm>
             <a:off x="685800" y="4400640"/>
-            <a:ext cx="5481720" cy="3595680"/>
+            <a:ext cx="5481360" cy="3595320"/>
           </a:xfrm>
           <a:prstGeom prst="rect">
             <a:avLst/>
@@ -947,7 +947,7 @@
         <p:spPr>
           <a:xfrm>
             <a:off x="3884760" y="8685360"/>
-            <a:ext cx="2967120" cy="453960"/>
+            <a:ext cx="2966760" cy="453600"/>
           </a:xfrm>
           <a:prstGeom prst="rect">
             <a:avLst/>
@@ -989,7 +989,7 @@
                 <a:tab algn="l" pos="0"/>
               </a:tabLst>
             </a:pPr>
-            <a:fld id="{A58DDD10-FBB7-4A52-826B-789DAD7BAF26}" type="slidenum">
+            <a:fld id="{87F5B150-51C2-4FB8-B9AD-050A5F88C71F}" type="slidenum">
               <a:rPr b="0" lang="en-US" sz="1200" spc="-1" strike="noStrike">
                 <a:solidFill>
                   <a:schemeClr val="dk1"/>
@@ -1233,7 +1233,7 @@
         <p:txBody>
           <a:bodyPr/>
           <a:p>
-            <a:fld id="{362251D9-F257-496A-B60F-E53BDFE8306F}" type="slidenum">
+            <a:fld id="{20484E30-610B-4FD5-8375-A97B6D87C0A6}" type="slidenum">
               <a:t>&lt;#&gt;</a:t>
             </a:fld>
           </a:p>
@@ -1442,7 +1442,7 @@
         <p:txBody>
           <a:bodyPr/>
           <a:p>
-            <a:fld id="{E647D393-F3EE-4065-86C9-462B1AB270F5}" type="slidenum">
+            <a:fld id="{D62AEF25-0164-4D7E-8953-F2EC33A3A2D5}" type="slidenum">
               <a:t>&lt;#&gt;</a:t>
             </a:fld>
           </a:p>
@@ -1565,7 +1565,7 @@
         <p:txBody>
           <a:bodyPr/>
           <a:p>
-            <a:fld id="{C89AB441-1048-414A-BF6A-4363445BB36A}" type="slidenum">
+            <a:fld id="{D0D69AE3-3544-46B8-B407-292A977102B6}" type="slidenum">
               <a:t>&lt;#&gt;</a:t>
             </a:fld>
           </a:p>
@@ -1648,7 +1648,7 @@
         <p:txBody>
           <a:bodyPr/>
           <a:p>
-            <a:fld id="{07B1BB21-D12E-4A0A-B068-0B27A6DAB45E}" type="slidenum">
+            <a:fld id="{5C381B4A-3521-4286-860F-666E2CDE2782}" type="slidenum">
               <a:t>&lt;#&gt;</a:t>
             </a:fld>
           </a:p>
@@ -1900,7 +1900,7 @@
         <p:txBody>
           <a:bodyPr/>
           <a:p>
-            <a:fld id="{C7043080-2081-4E96-8BC4-CBF14EC8A7E3}" type="slidenum">
+            <a:fld id="{E5F8F3B7-758B-4B9A-AB51-3B169DC412C3}" type="slidenum">
               <a:t>&lt;#&gt;</a:t>
             </a:fld>
           </a:p>
@@ -2152,7 +2152,7 @@
         <p:txBody>
           <a:bodyPr/>
           <a:p>
-            <a:fld id="{A932D1EA-F5CA-4234-9D6C-E6989FF69783}" type="slidenum">
+            <a:fld id="{3C5F612F-3166-4A4F-9C92-F557F2C9BE61}" type="slidenum">
               <a:t>&lt;#&gt;</a:t>
             </a:fld>
           </a:p>
@@ -2361,7 +2361,7 @@
         <p:txBody>
           <a:bodyPr/>
           <a:p>
-            <a:fld id="{4077D448-8FEE-467D-A4C4-13106FBA55EE}" type="slidenum">
+            <a:fld id="{7C7F39F2-455D-40D5-B205-FC82C8E456EC}" type="slidenum">
               <a:t>&lt;#&gt;</a:t>
             </a:fld>
           </a:p>
@@ -2656,7 +2656,7 @@
         <p:txBody>
           <a:bodyPr/>
           <a:p>
-            <a:fld id="{D1B70EDE-BDC6-469E-A701-CC07E6BEF36A}" type="slidenum">
+            <a:fld id="{DECF932A-AF85-4B45-9B0F-4C39C3C0BBCF}" type="slidenum">
               <a:t>&lt;#&gt;</a:t>
             </a:fld>
           </a:p>
@@ -2739,7 +2739,7 @@
         <p:txBody>
           <a:bodyPr/>
           <a:p>
-            <a:fld id="{CA1E3AE6-F930-4CD8-A4F4-162A3282A148}" type="slidenum">
+            <a:fld id="{3A545312-9637-4971-9356-A8C191D6D94B}" type="slidenum">
               <a:t>&lt;#&gt;</a:t>
             </a:fld>
           </a:p>
@@ -2822,7 +2822,7 @@
         <p:txBody>
           <a:bodyPr/>
           <a:p>
-            <a:fld id="{1A4347BC-BDB7-4170-9309-FE3B031D9924}" type="slidenum">
+            <a:fld id="{DCBECA37-205E-46FF-BE86-028311677942}" type="slidenum">
               <a:t>&lt;#&gt;</a:t>
             </a:fld>
           </a:p>
@@ -2988,7 +2988,7 @@
         <p:txBody>
           <a:bodyPr/>
           <a:p>
-            <a:fld id="{444E2B9B-3EEF-4A10-BB4C-9CFCD042E1C6}" type="slidenum">
+            <a:fld id="{8FAC318E-E5B9-4A96-9750-7A7505D6C153}" type="slidenum">
               <a:t>&lt;#&gt;</a:t>
             </a:fld>
           </a:p>
@@ -3154,7 +3154,7 @@
         <p:txBody>
           <a:bodyPr/>
           <a:p>
-            <a:fld id="{8B3826E8-75B6-4D4D-A589-968516E8EBA2}" type="slidenum">
+            <a:fld id="{64319F50-F8E0-4BB3-B48F-0A7A4B1F6AEB}" type="slidenum">
               <a:t>&lt;#&gt;</a:t>
             </a:fld>
           </a:p>
@@ -3219,9 +3219,9 @@
         <p:grpSpPr>
           <a:xfrm>
             <a:off x="6199200" y="6162840"/>
-            <a:ext cx="5988240" cy="690480"/>
+            <a:ext cx="5987880" cy="690120"/>
             <a:chOff x="6199200" y="6162840"/>
-            <a:chExt cx="5988240" cy="690480"/>
+            <a:chExt cx="5987880" cy="690120"/>
           </a:xfrm>
         </p:grpSpPr>
         <p:pic>
@@ -3237,7 +3237,7 @@
           <p:spPr>
             <a:xfrm>
               <a:off x="6199200" y="6162840"/>
-              <a:ext cx="4051800" cy="690480"/>
+              <a:ext cx="4051440" cy="690120"/>
             </a:xfrm>
             <a:prstGeom prst="rect">
               <a:avLst/>
@@ -3260,7 +3260,7 @@
           <p:spPr>
             <a:xfrm>
               <a:off x="10270080" y="6162840"/>
-              <a:ext cx="1917360" cy="606960"/>
+              <a:ext cx="1917000" cy="606600"/>
             </a:xfrm>
             <a:prstGeom prst="rect">
               <a:avLst/>
@@ -3309,7 +3309,7 @@
                 </a:solidFill>
                 <a:latin typeface="Arial"/>
               </a:rPr>
-              <a:t>Click </a:t>
+              <a:t>Click to edit </a:t>
             </a:r>
             <a:r>
               <a:rPr b="0" lang="en-US" sz="1800" spc="-1" strike="noStrike">
@@ -3318,34 +3318,7 @@
                 </a:solidFill>
                 <a:latin typeface="Arial"/>
               </a:rPr>
-              <a:t>to edit </a:t>
-            </a:r>
-            <a:r>
-              <a:rPr b="0" lang="en-US" sz="1800" spc="-1" strike="noStrike">
-                <a:solidFill>
-                  <a:srgbClr val="000000"/>
-                </a:solidFill>
-                <a:latin typeface="Arial"/>
-              </a:rPr>
-              <a:t>the </a:t>
-            </a:r>
-            <a:r>
-              <a:rPr b="0" lang="en-US" sz="1800" spc="-1" strike="noStrike">
-                <a:solidFill>
-                  <a:srgbClr val="000000"/>
-                </a:solidFill>
-                <a:latin typeface="Arial"/>
-              </a:rPr>
-              <a:t>title </a:t>
-            </a:r>
-            <a:r>
-              <a:rPr b="0" lang="en-US" sz="1800" spc="-1" strike="noStrike">
-                <a:solidFill>
-                  <a:srgbClr val="000000"/>
-                </a:solidFill>
-                <a:latin typeface="Arial"/>
-              </a:rPr>
-              <a:t>text </a:t>
+              <a:t>the title text </a:t>
             </a:r>
             <a:r>
               <a:rPr b="0" lang="en-US" sz="1800" spc="-1" strike="noStrike">
@@ -4053,7 +4026,7 @@
         <p:spPr>
           <a:xfrm>
             <a:off x="4038480" y="6356520"/>
-            <a:ext cx="4110120" cy="360360"/>
+            <a:ext cx="4109760" cy="360000"/>
           </a:xfrm>
           <a:prstGeom prst="rect">
             <a:avLst/>
@@ -4125,7 +4098,7 @@
         <p:spPr>
           <a:xfrm>
             <a:off x="8610480" y="6356520"/>
-            <a:ext cx="2738520" cy="360360"/>
+            <a:ext cx="2738160" cy="360000"/>
           </a:xfrm>
           <a:prstGeom prst="rect">
             <a:avLst/>
@@ -4168,7 +4141,7 @@
                 <a:tab algn="l" pos="0"/>
               </a:tabLst>
             </a:pPr>
-            <a:fld id="{1D4BE657-0902-4F85-B734-9E916EA7C32B}" type="slidenum">
+            <a:fld id="{CEEAF0C3-9F3E-49B2-9120-3C8945CC0535}" type="slidenum">
               <a:rPr b="0" lang="en-US" sz="1200" spc="-1" strike="noStrike">
                 <a:solidFill>
                   <a:schemeClr val="dk1">
@@ -4201,7 +4174,7 @@
         <p:spPr>
           <a:xfrm>
             <a:off x="838080" y="6356520"/>
-            <a:ext cx="2738520" cy="360360"/>
+            <a:ext cx="2738160" cy="360000"/>
           </a:xfrm>
           <a:prstGeom prst="rect">
             <a:avLst/>
@@ -4290,9 +4263,9 @@
         <p:grpSpPr>
           <a:xfrm>
             <a:off x="6199200" y="6162840"/>
-            <a:ext cx="5988240" cy="690480"/>
+            <a:ext cx="5987880" cy="690120"/>
             <a:chOff x="6199200" y="6162840"/>
-            <a:chExt cx="5988240" cy="690480"/>
+            <a:chExt cx="5987880" cy="690120"/>
           </a:xfrm>
         </p:grpSpPr>
         <p:pic>
@@ -4308,7 +4281,7 @@
           <p:spPr>
             <a:xfrm>
               <a:off x="6199200" y="6162840"/>
-              <a:ext cx="4051800" cy="690480"/>
+              <a:ext cx="4051440" cy="690120"/>
             </a:xfrm>
             <a:prstGeom prst="rect">
               <a:avLst/>
@@ -4331,7 +4304,7 @@
           <p:spPr>
             <a:xfrm>
               <a:off x="10270080" y="6162840"/>
-              <a:ext cx="1917360" cy="606960"/>
+              <a:ext cx="1917000" cy="606600"/>
             </a:xfrm>
             <a:prstGeom prst="rect">
               <a:avLst/>
@@ -4854,7 +4827,7 @@
         <p:spPr>
           <a:xfrm>
             <a:off x="4038480" y="6356520"/>
-            <a:ext cx="4110120" cy="360360"/>
+            <a:ext cx="4109760" cy="360000"/>
           </a:xfrm>
           <a:prstGeom prst="rect">
             <a:avLst/>
@@ -4926,7 +4899,7 @@
         <p:spPr>
           <a:xfrm>
             <a:off x="8610480" y="6356520"/>
-            <a:ext cx="2738520" cy="360360"/>
+            <a:ext cx="2738160" cy="360000"/>
           </a:xfrm>
           <a:prstGeom prst="rect">
             <a:avLst/>
@@ -4969,7 +4942,7 @@
                 <a:tab algn="l" pos="0"/>
               </a:tabLst>
             </a:pPr>
-            <a:fld id="{799AC9E6-BAC0-4EDD-9F15-57E784E18383}" type="slidenum">
+            <a:fld id="{56ED309F-6399-4D2A-87C3-E2E646EFA8E2}" type="slidenum">
               <a:rPr b="0" lang="en-US" sz="1200" spc="-1" strike="noStrike">
                 <a:solidFill>
                   <a:schemeClr val="dk1">
@@ -5002,7 +4975,7 @@
         <p:spPr>
           <a:xfrm>
             <a:off x="838080" y="6356520"/>
-            <a:ext cx="2738520" cy="360360"/>
+            <a:ext cx="2738160" cy="360000"/>
           </a:xfrm>
           <a:prstGeom prst="rect">
             <a:avLst/>
@@ -5091,9 +5064,9 @@
         <p:grpSpPr>
           <a:xfrm>
             <a:off x="6199200" y="6162840"/>
-            <a:ext cx="5988240" cy="690480"/>
+            <a:ext cx="5987880" cy="690120"/>
             <a:chOff x="6199200" y="6162840"/>
-            <a:chExt cx="5988240" cy="690480"/>
+            <a:chExt cx="5987880" cy="690120"/>
           </a:xfrm>
         </p:grpSpPr>
         <p:pic>
@@ -5109,7 +5082,7 @@
           <p:spPr>
             <a:xfrm>
               <a:off x="6199200" y="6162840"/>
-              <a:ext cx="4051800" cy="690480"/>
+              <a:ext cx="4051440" cy="690120"/>
             </a:xfrm>
             <a:prstGeom prst="rect">
               <a:avLst/>
@@ -5132,7 +5105,7 @@
           <p:spPr>
             <a:xfrm>
               <a:off x="10270080" y="6162840"/>
-              <a:ext cx="1917360" cy="606960"/>
+              <a:ext cx="1917000" cy="606600"/>
             </a:xfrm>
             <a:prstGeom prst="rect">
               <a:avLst/>
@@ -5205,7 +5178,7 @@
         <p:spPr>
           <a:xfrm>
             <a:off x="4038480" y="6356520"/>
-            <a:ext cx="4110120" cy="360360"/>
+            <a:ext cx="4109760" cy="360000"/>
           </a:xfrm>
           <a:prstGeom prst="rect">
             <a:avLst/>
@@ -5277,7 +5250,7 @@
         <p:spPr>
           <a:xfrm>
             <a:off x="8610480" y="6356520"/>
-            <a:ext cx="2738520" cy="360360"/>
+            <a:ext cx="2738160" cy="360000"/>
           </a:xfrm>
           <a:prstGeom prst="rect">
             <a:avLst/>
@@ -5320,7 +5293,7 @@
                 <a:tab algn="l" pos="0"/>
               </a:tabLst>
             </a:pPr>
-            <a:fld id="{930BC752-89F7-4976-9CAF-89B4CD916F25}" type="slidenum">
+            <a:fld id="{15E77AF7-D088-4A06-BD8E-247495D20BA3}" type="slidenum">
               <a:rPr b="0" lang="en-US" sz="1200" spc="-1" strike="noStrike">
                 <a:solidFill>
                   <a:schemeClr val="dk1">
@@ -5353,7 +5326,7 @@
         <p:spPr>
           <a:xfrm>
             <a:off x="838080" y="6356520"/>
-            <a:ext cx="2738520" cy="360360"/>
+            <a:ext cx="2738160" cy="360000"/>
           </a:xfrm>
           <a:prstGeom prst="rect">
             <a:avLst/>
@@ -5442,9 +5415,9 @@
         <p:grpSpPr>
           <a:xfrm>
             <a:off x="6199200" y="6162840"/>
-            <a:ext cx="5988240" cy="690480"/>
+            <a:ext cx="5987880" cy="690120"/>
             <a:chOff x="6199200" y="6162840"/>
-            <a:chExt cx="5988240" cy="690480"/>
+            <a:chExt cx="5987880" cy="690120"/>
           </a:xfrm>
         </p:grpSpPr>
         <p:pic>
@@ -5460,7 +5433,7 @@
           <p:spPr>
             <a:xfrm>
               <a:off x="6199200" y="6162840"/>
-              <a:ext cx="4051800" cy="690480"/>
+              <a:ext cx="4051440" cy="690120"/>
             </a:xfrm>
             <a:prstGeom prst="rect">
               <a:avLst/>
@@ -5483,7 +5456,7 @@
           <p:spPr>
             <a:xfrm>
               <a:off x="10270080" y="6162840"/>
-              <a:ext cx="1917360" cy="606960"/>
+              <a:ext cx="1917000" cy="606600"/>
             </a:xfrm>
             <a:prstGeom prst="rect">
               <a:avLst/>
@@ -5507,7 +5480,7 @@
         <p:spPr>
           <a:xfrm>
             <a:off x="4038480" y="6356520"/>
-            <a:ext cx="4110120" cy="360360"/>
+            <a:ext cx="4109760" cy="360000"/>
           </a:xfrm>
           <a:prstGeom prst="rect">
             <a:avLst/>
@@ -5579,7 +5552,7 @@
         <p:spPr>
           <a:xfrm>
             <a:off x="8610480" y="6356520"/>
-            <a:ext cx="2738520" cy="360360"/>
+            <a:ext cx="2738160" cy="360000"/>
           </a:xfrm>
           <a:prstGeom prst="rect">
             <a:avLst/>
@@ -5622,7 +5595,7 @@
                 <a:tab algn="l" pos="0"/>
               </a:tabLst>
             </a:pPr>
-            <a:fld id="{0DB7282A-A6C4-4721-B87F-4BF026D80572}" type="slidenum">
+            <a:fld id="{AD5F9B68-65B0-4838-979C-FFB6F66EBB07}" type="slidenum">
               <a:rPr b="0" lang="en-US" sz="1200" spc="-1" strike="noStrike">
                 <a:solidFill>
                   <a:schemeClr val="dk1">
@@ -5655,7 +5628,7 @@
         <p:spPr>
           <a:xfrm>
             <a:off x="838080" y="6356520"/>
-            <a:ext cx="2738520" cy="360360"/>
+            <a:ext cx="2738160" cy="360000"/>
           </a:xfrm>
           <a:prstGeom prst="rect">
             <a:avLst/>
@@ -5744,9 +5717,9 @@
         <p:grpSpPr>
           <a:xfrm>
             <a:off x="6199200" y="6162840"/>
-            <a:ext cx="5988240" cy="690480"/>
+            <a:ext cx="5987880" cy="690120"/>
             <a:chOff x="6199200" y="6162840"/>
-            <a:chExt cx="5988240" cy="690480"/>
+            <a:chExt cx="5987880" cy="690120"/>
           </a:xfrm>
         </p:grpSpPr>
         <p:pic>
@@ -5762,7 +5735,7 @@
           <p:spPr>
             <a:xfrm>
               <a:off x="6199200" y="6162840"/>
-              <a:ext cx="4051800" cy="690480"/>
+              <a:ext cx="4051440" cy="690120"/>
             </a:xfrm>
             <a:prstGeom prst="rect">
               <a:avLst/>
@@ -5785,7 +5758,7 @@
           <p:spPr>
             <a:xfrm>
               <a:off x="10270080" y="6162840"/>
-              <a:ext cx="1917360" cy="606960"/>
+              <a:ext cx="1917000" cy="606600"/>
             </a:xfrm>
             <a:prstGeom prst="rect">
               <a:avLst/>
@@ -6533,7 +6506,7 @@
         <p:spPr>
           <a:xfrm>
             <a:off x="4038480" y="6356520"/>
-            <a:ext cx="4110120" cy="360360"/>
+            <a:ext cx="4109760" cy="360000"/>
           </a:xfrm>
           <a:prstGeom prst="rect">
             <a:avLst/>
@@ -6605,7 +6578,7 @@
         <p:spPr>
           <a:xfrm>
             <a:off x="8610480" y="6356520"/>
-            <a:ext cx="2738520" cy="360360"/>
+            <a:ext cx="2738160" cy="360000"/>
           </a:xfrm>
           <a:prstGeom prst="rect">
             <a:avLst/>
@@ -6648,7 +6621,7 @@
                 <a:tab algn="l" pos="0"/>
               </a:tabLst>
             </a:pPr>
-            <a:fld id="{A4716803-93F9-458B-9C03-0C9FECFFB764}" type="slidenum">
+            <a:fld id="{B4169288-DD86-499C-8C0F-89E5B4D21E64}" type="slidenum">
               <a:rPr b="0" lang="en-US" sz="1200" spc="-1" strike="noStrike">
                 <a:solidFill>
                   <a:schemeClr val="dk1">
@@ -6681,7 +6654,7 @@
         <p:spPr>
           <a:xfrm>
             <a:off x="838080" y="6356520"/>
-            <a:ext cx="2738520" cy="360360"/>
+            <a:ext cx="2738160" cy="360000"/>
           </a:xfrm>
           <a:prstGeom prst="rect">
             <a:avLst/>
@@ -6770,9 +6743,9 @@
         <p:grpSpPr>
           <a:xfrm>
             <a:off x="6199200" y="6162840"/>
-            <a:ext cx="5988240" cy="690480"/>
+            <a:ext cx="5987880" cy="690120"/>
             <a:chOff x="6199200" y="6162840"/>
-            <a:chExt cx="5988240" cy="690480"/>
+            <a:chExt cx="5987880" cy="690120"/>
           </a:xfrm>
         </p:grpSpPr>
         <p:pic>
@@ -6788,7 +6761,7 @@
           <p:spPr>
             <a:xfrm>
               <a:off x="6199200" y="6162840"/>
-              <a:ext cx="4051800" cy="690480"/>
+              <a:ext cx="4051440" cy="690120"/>
             </a:xfrm>
             <a:prstGeom prst="rect">
               <a:avLst/>
@@ -6811,7 +6784,7 @@
           <p:spPr>
             <a:xfrm>
               <a:off x="10270080" y="6162840"/>
-              <a:ext cx="1917360" cy="606960"/>
+              <a:ext cx="1917000" cy="606600"/>
             </a:xfrm>
             <a:prstGeom prst="rect">
               <a:avLst/>
@@ -7559,7 +7532,7 @@
         <p:spPr>
           <a:xfrm>
             <a:off x="4038480" y="6356520"/>
-            <a:ext cx="4110120" cy="360360"/>
+            <a:ext cx="4109760" cy="360000"/>
           </a:xfrm>
           <a:prstGeom prst="rect">
             <a:avLst/>
@@ -7631,7 +7604,7 @@
         <p:spPr>
           <a:xfrm>
             <a:off x="8610480" y="6356520"/>
-            <a:ext cx="2738520" cy="360360"/>
+            <a:ext cx="2738160" cy="360000"/>
           </a:xfrm>
           <a:prstGeom prst="rect">
             <a:avLst/>
@@ -7674,7 +7647,7 @@
                 <a:tab algn="l" pos="0"/>
               </a:tabLst>
             </a:pPr>
-            <a:fld id="{F1D86995-F491-42C4-BBEF-713BC1E062DA}" type="slidenum">
+            <a:fld id="{46D8A70A-6F77-4A92-865C-B1A56C52D949}" type="slidenum">
               <a:rPr b="0" lang="en-US" sz="1200" spc="-1" strike="noStrike">
                 <a:solidFill>
                   <a:schemeClr val="dk1">
@@ -7707,7 +7680,7 @@
         <p:spPr>
           <a:xfrm>
             <a:off x="838080" y="6356520"/>
-            <a:ext cx="2738520" cy="360360"/>
+            <a:ext cx="2738160" cy="360000"/>
           </a:xfrm>
           <a:prstGeom prst="rect">
             <a:avLst/>
@@ -7796,9 +7769,9 @@
         <p:grpSpPr>
           <a:xfrm>
             <a:off x="6199200" y="6162840"/>
-            <a:ext cx="5988240" cy="690480"/>
+            <a:ext cx="5987880" cy="690120"/>
             <a:chOff x="6199200" y="6162840"/>
-            <a:chExt cx="5988240" cy="690480"/>
+            <a:chExt cx="5987880" cy="690120"/>
           </a:xfrm>
         </p:grpSpPr>
         <p:pic>
@@ -7814,7 +7787,7 @@
           <p:spPr>
             <a:xfrm>
               <a:off x="6199200" y="6162840"/>
-              <a:ext cx="4051800" cy="690480"/>
+              <a:ext cx="4051440" cy="690120"/>
             </a:xfrm>
             <a:prstGeom prst="rect">
               <a:avLst/>
@@ -7837,7 +7810,7 @@
           <p:spPr>
             <a:xfrm>
               <a:off x="10270080" y="6162840"/>
-              <a:ext cx="1917360" cy="606960"/>
+              <a:ext cx="1917000" cy="606600"/>
             </a:xfrm>
             <a:prstGeom prst="rect">
               <a:avLst/>
@@ -8360,7 +8333,7 @@
         <p:spPr>
           <a:xfrm>
             <a:off x="4038480" y="6356520"/>
-            <a:ext cx="4110120" cy="360360"/>
+            <a:ext cx="4109760" cy="360000"/>
           </a:xfrm>
           <a:prstGeom prst="rect">
             <a:avLst/>
@@ -8432,7 +8405,7 @@
         <p:spPr>
           <a:xfrm>
             <a:off x="8610480" y="6356520"/>
-            <a:ext cx="2738520" cy="360360"/>
+            <a:ext cx="2738160" cy="360000"/>
           </a:xfrm>
           <a:prstGeom prst="rect">
             <a:avLst/>
@@ -8475,7 +8448,7 @@
                 <a:tab algn="l" pos="0"/>
               </a:tabLst>
             </a:pPr>
-            <a:fld id="{6A8C9784-B67D-4B94-AFD1-5BFA3D32D476}" type="slidenum">
+            <a:fld id="{C014EB7F-BC8D-4E4E-8441-9FFEEDFFBCFD}" type="slidenum">
               <a:rPr b="0" lang="en-US" sz="1200" spc="-1" strike="noStrike">
                 <a:solidFill>
                   <a:schemeClr val="dk1">
@@ -8508,7 +8481,7 @@
         <p:spPr>
           <a:xfrm>
             <a:off x="838080" y="6356520"/>
-            <a:ext cx="2738520" cy="360360"/>
+            <a:ext cx="2738160" cy="360000"/>
           </a:xfrm>
           <a:prstGeom prst="rect">
             <a:avLst/>
@@ -8597,9 +8570,9 @@
         <p:grpSpPr>
           <a:xfrm>
             <a:off x="6199200" y="6162840"/>
-            <a:ext cx="5988240" cy="690480"/>
+            <a:ext cx="5987880" cy="690120"/>
             <a:chOff x="6199200" y="6162840"/>
-            <a:chExt cx="5988240" cy="690480"/>
+            <a:chExt cx="5987880" cy="690120"/>
           </a:xfrm>
         </p:grpSpPr>
         <p:pic>
@@ -8615,7 +8588,7 @@
           <p:spPr>
             <a:xfrm>
               <a:off x="6199200" y="6162840"/>
-              <a:ext cx="4051800" cy="690480"/>
+              <a:ext cx="4051440" cy="690120"/>
             </a:xfrm>
             <a:prstGeom prst="rect">
               <a:avLst/>
@@ -8638,7 +8611,7 @@
           <p:spPr>
             <a:xfrm>
               <a:off x="10270080" y="6162840"/>
-              <a:ext cx="1917360" cy="606960"/>
+              <a:ext cx="1917000" cy="606600"/>
             </a:xfrm>
             <a:prstGeom prst="rect">
               <a:avLst/>
@@ -9611,7 +9584,7 @@
         <p:spPr>
           <a:xfrm>
             <a:off x="4038480" y="6356520"/>
-            <a:ext cx="4110120" cy="360360"/>
+            <a:ext cx="4109760" cy="360000"/>
           </a:xfrm>
           <a:prstGeom prst="rect">
             <a:avLst/>
@@ -9683,7 +9656,7 @@
         <p:spPr>
           <a:xfrm>
             <a:off x="8610480" y="6356520"/>
-            <a:ext cx="2738520" cy="360360"/>
+            <a:ext cx="2738160" cy="360000"/>
           </a:xfrm>
           <a:prstGeom prst="rect">
             <a:avLst/>
@@ -9726,7 +9699,7 @@
                 <a:tab algn="l" pos="0"/>
               </a:tabLst>
             </a:pPr>
-            <a:fld id="{98F174EB-2C17-4D49-B8CC-6FAE08A91FCC}" type="slidenum">
+            <a:fld id="{C605A10B-FAEC-4234-B046-5991DDEA99DA}" type="slidenum">
               <a:rPr b="0" lang="en-US" sz="1200" spc="-1" strike="noStrike">
                 <a:solidFill>
                   <a:schemeClr val="dk1">
@@ -9759,7 +9732,7 @@
         <p:spPr>
           <a:xfrm>
             <a:off x="838080" y="6356520"/>
-            <a:ext cx="2738520" cy="360360"/>
+            <a:ext cx="2738160" cy="360000"/>
           </a:xfrm>
           <a:prstGeom prst="rect">
             <a:avLst/>
@@ -9848,9 +9821,9 @@
         <p:grpSpPr>
           <a:xfrm>
             <a:off x="6199200" y="6162840"/>
-            <a:ext cx="5988240" cy="690480"/>
+            <a:ext cx="5987880" cy="690120"/>
             <a:chOff x="6199200" y="6162840"/>
-            <a:chExt cx="5988240" cy="690480"/>
+            <a:chExt cx="5987880" cy="690120"/>
           </a:xfrm>
         </p:grpSpPr>
         <p:pic>
@@ -9866,7 +9839,7 @@
           <p:spPr>
             <a:xfrm>
               <a:off x="6199200" y="6162840"/>
-              <a:ext cx="4051800" cy="690480"/>
+              <a:ext cx="4051440" cy="690120"/>
             </a:xfrm>
             <a:prstGeom prst="rect">
               <a:avLst/>
@@ -9889,7 +9862,7 @@
           <p:spPr>
             <a:xfrm>
               <a:off x="10270080" y="6162840"/>
-              <a:ext cx="1917360" cy="606960"/>
+              <a:ext cx="1917000" cy="606600"/>
             </a:xfrm>
             <a:prstGeom prst="rect">
               <a:avLst/>
@@ -9913,7 +9886,7 @@
         <p:spPr>
           <a:xfrm>
             <a:off x="4038480" y="6356520"/>
-            <a:ext cx="4110120" cy="360360"/>
+            <a:ext cx="4109760" cy="360000"/>
           </a:xfrm>
           <a:prstGeom prst="rect">
             <a:avLst/>
@@ -9985,7 +9958,7 @@
         <p:spPr>
           <a:xfrm>
             <a:off x="8610480" y="6356520"/>
-            <a:ext cx="2738520" cy="360360"/>
+            <a:ext cx="2738160" cy="360000"/>
           </a:xfrm>
           <a:prstGeom prst="rect">
             <a:avLst/>
@@ -10028,7 +10001,7 @@
                 <a:tab algn="l" pos="0"/>
               </a:tabLst>
             </a:pPr>
-            <a:fld id="{115DE327-5D2D-4B91-8822-068597DE1099}" type="slidenum">
+            <a:fld id="{58C549DF-5409-418E-979B-7B9C22AA4F34}" type="slidenum">
               <a:rPr b="0" lang="en-US" sz="1200" spc="-1" strike="noStrike">
                 <a:solidFill>
                   <a:schemeClr val="dk1">
@@ -10061,7 +10034,7 @@
         <p:spPr>
           <a:xfrm>
             <a:off x="838080" y="6356520"/>
-            <a:ext cx="2738520" cy="360360"/>
+            <a:ext cx="2738160" cy="360000"/>
           </a:xfrm>
           <a:prstGeom prst="rect">
             <a:avLst/>
@@ -10150,9 +10123,9 @@
         <p:grpSpPr>
           <a:xfrm>
             <a:off x="6199200" y="6162840"/>
-            <a:ext cx="5988240" cy="690480"/>
+            <a:ext cx="5987880" cy="690120"/>
             <a:chOff x="6199200" y="6162840"/>
-            <a:chExt cx="5988240" cy="690480"/>
+            <a:chExt cx="5987880" cy="690120"/>
           </a:xfrm>
         </p:grpSpPr>
         <p:pic>
@@ -10168,7 +10141,7 @@
           <p:spPr>
             <a:xfrm>
               <a:off x="6199200" y="6162840"/>
-              <a:ext cx="4051800" cy="690480"/>
+              <a:ext cx="4051440" cy="690120"/>
             </a:xfrm>
             <a:prstGeom prst="rect">
               <a:avLst/>
@@ -10191,7 +10164,7 @@
           <p:spPr>
             <a:xfrm>
               <a:off x="10270080" y="6162840"/>
-              <a:ext cx="1917360" cy="606960"/>
+              <a:ext cx="1917000" cy="606600"/>
             </a:xfrm>
             <a:prstGeom prst="rect">
               <a:avLst/>
@@ -10215,7 +10188,7 @@
         <p:spPr>
           <a:xfrm>
             <a:off x="4038480" y="6356520"/>
-            <a:ext cx="4110120" cy="360360"/>
+            <a:ext cx="4109760" cy="360000"/>
           </a:xfrm>
           <a:prstGeom prst="rect">
             <a:avLst/>
@@ -10287,7 +10260,7 @@
         <p:spPr>
           <a:xfrm>
             <a:off x="8610480" y="6356520"/>
-            <a:ext cx="2738520" cy="360360"/>
+            <a:ext cx="2738160" cy="360000"/>
           </a:xfrm>
           <a:prstGeom prst="rect">
             <a:avLst/>
@@ -10330,7 +10303,7 @@
                 <a:tab algn="l" pos="0"/>
               </a:tabLst>
             </a:pPr>
-            <a:fld id="{35F1D043-156E-433B-B53D-6226F6E8C7B9}" type="slidenum">
+            <a:fld id="{6A0884A0-819F-41F5-9951-5CEFD3DA65ED}" type="slidenum">
               <a:rPr b="0" lang="en-US" sz="1200" spc="-1" strike="noStrike">
                 <a:solidFill>
                   <a:schemeClr val="dk1">
@@ -10363,7 +10336,7 @@
         <p:spPr>
           <a:xfrm>
             <a:off x="838080" y="6356520"/>
-            <a:ext cx="2738520" cy="360360"/>
+            <a:ext cx="2738160" cy="360000"/>
           </a:xfrm>
           <a:prstGeom prst="rect">
             <a:avLst/>
@@ -10726,9 +10699,9 @@
         <p:grpSpPr>
           <a:xfrm>
             <a:off x="6199200" y="6162840"/>
-            <a:ext cx="5988240" cy="690480"/>
+            <a:ext cx="5987880" cy="690120"/>
             <a:chOff x="6199200" y="6162840"/>
-            <a:chExt cx="5988240" cy="690480"/>
+            <a:chExt cx="5987880" cy="690120"/>
           </a:xfrm>
         </p:grpSpPr>
         <p:pic>
@@ -10744,7 +10717,7 @@
           <p:spPr>
             <a:xfrm>
               <a:off x="6199200" y="6162840"/>
-              <a:ext cx="4051800" cy="690480"/>
+              <a:ext cx="4051440" cy="690120"/>
             </a:xfrm>
             <a:prstGeom prst="rect">
               <a:avLst/>
@@ -10767,7 +10740,7 @@
           <p:spPr>
             <a:xfrm>
               <a:off x="10270080" y="6162840"/>
-              <a:ext cx="1917360" cy="606960"/>
+              <a:ext cx="1917000" cy="606600"/>
             </a:xfrm>
             <a:prstGeom prst="rect">
               <a:avLst/>
@@ -11065,7 +11038,7 @@
         <p:spPr>
           <a:xfrm>
             <a:off x="4038480" y="6356520"/>
-            <a:ext cx="4110120" cy="360360"/>
+            <a:ext cx="4109760" cy="360000"/>
           </a:xfrm>
           <a:prstGeom prst="rect">
             <a:avLst/>
@@ -11137,7 +11110,7 @@
         <p:spPr>
           <a:xfrm>
             <a:off x="8610480" y="6356520"/>
-            <a:ext cx="2738520" cy="360360"/>
+            <a:ext cx="2738160" cy="360000"/>
           </a:xfrm>
           <a:prstGeom prst="rect">
             <a:avLst/>
@@ -11180,7 +11153,7 @@
                 <a:tab algn="l" pos="0"/>
               </a:tabLst>
             </a:pPr>
-            <a:fld id="{C0891383-6F97-40ED-BBE3-8E7DAB67BE85}" type="slidenum">
+            <a:fld id="{F414653B-7ADE-45D0-B996-E1104EAC93E3}" type="slidenum">
               <a:rPr b="0" lang="en-US" sz="1200" spc="-1" strike="noStrike">
                 <a:solidFill>
                   <a:schemeClr val="dk1">
@@ -11213,7 +11186,7 @@
         <p:spPr>
           <a:xfrm>
             <a:off x="838080" y="6356520"/>
-            <a:ext cx="2738520" cy="360360"/>
+            <a:ext cx="2738160" cy="360000"/>
           </a:xfrm>
           <a:prstGeom prst="rect">
             <a:avLst/>
@@ -11302,9 +11275,9 @@
         <p:grpSpPr>
           <a:xfrm>
             <a:off x="6199200" y="6162840"/>
-            <a:ext cx="5988240" cy="690480"/>
+            <a:ext cx="5987880" cy="690120"/>
             <a:chOff x="6199200" y="6162840"/>
-            <a:chExt cx="5988240" cy="690480"/>
+            <a:chExt cx="5987880" cy="690120"/>
           </a:xfrm>
         </p:grpSpPr>
         <p:pic>
@@ -11320,7 +11293,7 @@
           <p:spPr>
             <a:xfrm>
               <a:off x="6199200" y="6162840"/>
-              <a:ext cx="4051800" cy="690480"/>
+              <a:ext cx="4051440" cy="690120"/>
             </a:xfrm>
             <a:prstGeom prst="rect">
               <a:avLst/>
@@ -11343,7 +11316,7 @@
           <p:spPr>
             <a:xfrm>
               <a:off x="10270080" y="6162840"/>
-              <a:ext cx="1917360" cy="606960"/>
+              <a:ext cx="1917000" cy="606600"/>
             </a:xfrm>
             <a:prstGeom prst="rect">
               <a:avLst/>
@@ -11641,7 +11614,7 @@
         <p:spPr>
           <a:xfrm>
             <a:off x="4038480" y="6356520"/>
-            <a:ext cx="4110120" cy="360360"/>
+            <a:ext cx="4109760" cy="360000"/>
           </a:xfrm>
           <a:prstGeom prst="rect">
             <a:avLst/>
@@ -11713,7 +11686,7 @@
         <p:spPr>
           <a:xfrm>
             <a:off x="8610480" y="6356520"/>
-            <a:ext cx="2738520" cy="360360"/>
+            <a:ext cx="2738160" cy="360000"/>
           </a:xfrm>
           <a:prstGeom prst="rect">
             <a:avLst/>
@@ -11756,7 +11729,7 @@
                 <a:tab algn="l" pos="0"/>
               </a:tabLst>
             </a:pPr>
-            <a:fld id="{403C025B-5E39-4F4F-90DF-D5BD1CDC576D}" type="slidenum">
+            <a:fld id="{F0078DBE-E2DE-4268-B73C-1C4A80BAAC30}" type="slidenum">
               <a:rPr b="0" lang="en-US" sz="1200" spc="-1" strike="noStrike">
                 <a:solidFill>
                   <a:schemeClr val="dk1">
@@ -11789,7 +11762,7 @@
         <p:spPr>
           <a:xfrm>
             <a:off x="838080" y="6356520"/>
-            <a:ext cx="2738520" cy="360360"/>
+            <a:ext cx="2738160" cy="360000"/>
           </a:xfrm>
           <a:prstGeom prst="rect">
             <a:avLst/>
@@ -11871,7 +11844,7 @@
         <p:spPr>
           <a:xfrm flipH="1">
             <a:off x="0" y="3073320"/>
-            <a:ext cx="1833480" cy="4680"/>
+            <a:ext cx="1833840" cy="5040"/>
           </a:xfrm>
           <a:prstGeom prst="straightConnector1">
             <a:avLst/>
@@ -11894,7 +11867,7 @@
         <p:spPr>
           <a:xfrm>
             <a:off x="0" y="2489400"/>
-            <a:ext cx="1833480" cy="4680"/>
+            <a:ext cx="1833840" cy="5040"/>
           </a:xfrm>
           <a:prstGeom prst="straightConnector1">
             <a:avLst/>
@@ -11917,7 +11890,7 @@
         <p:spPr>
           <a:xfrm>
             <a:off x="0" y="2781360"/>
-            <a:ext cx="1833480" cy="4680"/>
+            <a:ext cx="1833840" cy="5040"/>
           </a:xfrm>
           <a:prstGeom prst="straightConnector1">
             <a:avLst/>
@@ -11940,7 +11913,7 @@
         <p:spPr>
           <a:xfrm flipH="1">
             <a:off x="0" y="3657600"/>
-            <a:ext cx="1833480" cy="4680"/>
+            <a:ext cx="1833840" cy="5040"/>
           </a:xfrm>
           <a:prstGeom prst="straightConnector1">
             <a:avLst/>
@@ -11962,7 +11935,7 @@
         <p:spPr>
           <a:xfrm>
             <a:off x="128520" y="6134040"/>
-            <a:ext cx="1567080" cy="383040"/>
+            <a:ext cx="1566720" cy="382680"/>
           </a:xfrm>
           <a:prstGeom prst="diamond">
             <a:avLst/>
@@ -12027,7 +12000,7 @@
         <p:spPr>
           <a:xfrm>
             <a:off x="302760" y="5454000"/>
-            <a:ext cx="1218600" cy="383040"/>
+            <a:ext cx="1218240" cy="382680"/>
           </a:xfrm>
           <a:prstGeom prst="ellipse">
             <a:avLst/>
@@ -12090,7 +12063,7 @@
         <p:spPr>
           <a:xfrm>
             <a:off x="101160" y="336240"/>
-            <a:ext cx="1621800" cy="303120"/>
+            <a:ext cx="1621440" cy="303120"/>
           </a:xfrm>
           <a:prstGeom prst="rect">
             <a:avLst/>
@@ -12147,7 +12120,7 @@
         <p:spPr>
           <a:xfrm>
             <a:off x="101160" y="597600"/>
-            <a:ext cx="1621800" cy="516600"/>
+            <a:ext cx="1621440" cy="516600"/>
           </a:xfrm>
           <a:prstGeom prst="rect">
             <a:avLst/>
@@ -12237,7 +12210,7 @@
         <p:spPr>
           <a:xfrm>
             <a:off x="101160" y="336240"/>
-            <a:ext cx="1621800" cy="303120"/>
+            <a:ext cx="1621440" cy="303120"/>
           </a:xfrm>
           <a:prstGeom prst="rect">
             <a:avLst/>
@@ -12294,7 +12267,7 @@
         <p:spPr>
           <a:xfrm>
             <a:off x="101160" y="597600"/>
-            <a:ext cx="1621800" cy="516600"/>
+            <a:ext cx="1621440" cy="516600"/>
           </a:xfrm>
           <a:prstGeom prst="rect">
             <a:avLst/>
@@ -12384,7 +12357,7 @@
         <p:spPr>
           <a:xfrm>
             <a:off x="2541600" y="228600"/>
-            <a:ext cx="1621800" cy="303120"/>
+            <a:ext cx="1621440" cy="303120"/>
           </a:xfrm>
           <a:prstGeom prst="rect">
             <a:avLst/>
@@ -12441,7 +12414,7 @@
         <p:spPr>
           <a:xfrm>
             <a:off x="2541600" y="489960"/>
-            <a:ext cx="1621800" cy="1584000"/>
+            <a:ext cx="1621440" cy="1584000"/>
           </a:xfrm>
           <a:prstGeom prst="rect">
             <a:avLst/>
@@ -12666,7 +12639,7 @@
         <p:spPr>
           <a:xfrm>
             <a:off x="6656400" y="228600"/>
-            <a:ext cx="1621800" cy="303120"/>
+            <a:ext cx="1621440" cy="303120"/>
           </a:xfrm>
           <a:prstGeom prst="rect">
             <a:avLst/>
@@ -12723,7 +12696,7 @@
         <p:spPr>
           <a:xfrm>
             <a:off x="6656400" y="489960"/>
-            <a:ext cx="1621800" cy="516600"/>
+            <a:ext cx="1621440" cy="516600"/>
           </a:xfrm>
           <a:prstGeom prst="rect">
             <a:avLst/>
@@ -12813,7 +12786,7 @@
         <p:spPr>
           <a:xfrm>
             <a:off x="6656400" y="228600"/>
-            <a:ext cx="1621800" cy="303120"/>
+            <a:ext cx="1621440" cy="303120"/>
           </a:xfrm>
           <a:prstGeom prst="rect">
             <a:avLst/>
@@ -12870,7 +12843,7 @@
         <p:spPr>
           <a:xfrm>
             <a:off x="6656400" y="489960"/>
-            <a:ext cx="1621800" cy="730080"/>
+            <a:ext cx="1621440" cy="730080"/>
           </a:xfrm>
           <a:prstGeom prst="rect">
             <a:avLst/>
@@ -12987,7 +12960,7 @@
         <p:spPr>
           <a:xfrm>
             <a:off x="128520" y="4629600"/>
-            <a:ext cx="1567080" cy="527760"/>
+            <a:ext cx="1566720" cy="527400"/>
           </a:xfrm>
           <a:prstGeom prst="diamond">
             <a:avLst/>
@@ -13075,7 +13048,7 @@
         <p:spPr>
           <a:xfrm>
             <a:off x="0" y="3365640"/>
-            <a:ext cx="1833480" cy="4680"/>
+            <a:ext cx="1833840" cy="5040"/>
           </a:xfrm>
           <a:prstGeom prst="straightConnector1">
             <a:avLst/>
@@ -13097,7 +13070,7 @@
         <p:spPr>
           <a:xfrm>
             <a:off x="673200" y="3949920"/>
-            <a:ext cx="478080" cy="383040"/>
+            <a:ext cx="477720" cy="382680"/>
           </a:xfrm>
           <a:prstGeom prst="triangle">
             <a:avLst>
@@ -13164,9 +13137,9 @@
         <p:grpSpPr>
           <a:xfrm>
             <a:off x="101160" y="1413000"/>
-            <a:ext cx="1621800" cy="777960"/>
+            <a:ext cx="1621440" cy="777960"/>
             <a:chOff x="101160" y="1413000"/>
-            <a:chExt cx="1621800" cy="777960"/>
+            <a:chExt cx="1621440" cy="777960"/>
           </a:xfrm>
         </p:grpSpPr>
         <p:sp>
@@ -13178,7 +13151,7 @@
           <p:spPr>
             <a:xfrm>
               <a:off x="101160" y="1413000"/>
-              <a:ext cx="1621800" cy="303120"/>
+              <a:ext cx="1621440" cy="303120"/>
             </a:xfrm>
             <a:prstGeom prst="rect">
               <a:avLst/>
@@ -13236,7 +13209,7 @@
           <p:spPr>
             <a:xfrm>
               <a:off x="101160" y="1674360"/>
-              <a:ext cx="1621800" cy="516600"/>
+              <a:ext cx="1621440" cy="516600"/>
             </a:xfrm>
             <a:prstGeom prst="rect">
               <a:avLst/>
@@ -13328,7 +13301,7 @@
         <p:spPr>
           <a:xfrm>
             <a:off x="4426920" y="914400"/>
-            <a:ext cx="1567080" cy="383040"/>
+            <a:ext cx="1566720" cy="382680"/>
           </a:xfrm>
           <a:prstGeom prst="diamond">
             <a:avLst/>
@@ -13395,8 +13368,8 @@
         </p:nvCxnSpPr>
         <p:spPr>
           <a:xfrm flipH="1">
-            <a:off x="5994000" y="855000"/>
-            <a:ext cx="662760" cy="251280"/>
+            <a:off x="5993640" y="855000"/>
+            <a:ext cx="663120" cy="251280"/>
           </a:xfrm>
           <a:prstGeom prst="straightConnector1">
             <a:avLst/>
@@ -13419,7 +13392,7 @@
         <p:spPr>
           <a:xfrm>
             <a:off x="6255720" y="1828800"/>
-            <a:ext cx="1795680" cy="383040"/>
+            <a:ext cx="1795320" cy="382680"/>
           </a:xfrm>
           <a:prstGeom prst="diamond">
             <a:avLst/>
@@ -13510,8 +13483,8 @@
         </p:nvCxnSpPr>
         <p:spPr>
           <a:xfrm flipH="1" flipV="1">
-            <a:off x="7153560" y="2211840"/>
-            <a:ext cx="457200" cy="533880"/>
+            <a:off x="7153560" y="2211480"/>
+            <a:ext cx="457560" cy="534600"/>
           </a:xfrm>
           <a:prstGeom prst="straightConnector1">
             <a:avLst/>
@@ -13534,7 +13507,7 @@
         <p:spPr>
           <a:xfrm>
             <a:off x="128520" y="6134400"/>
-            <a:ext cx="1567080" cy="383040"/>
+            <a:ext cx="1566720" cy="382680"/>
           </a:xfrm>
           <a:prstGeom prst="diamond">
             <a:avLst/>
@@ -13599,9 +13572,9 @@
         <p:grpSpPr>
           <a:xfrm>
             <a:off x="6681960" y="2743200"/>
-            <a:ext cx="1850400" cy="1216440"/>
+            <a:ext cx="1850040" cy="1216440"/>
             <a:chOff x="6681960" y="2743200"/>
-            <a:chExt cx="1850400" cy="1216440"/>
+            <a:chExt cx="1850040" cy="1216440"/>
           </a:xfrm>
         </p:grpSpPr>
         <p:sp>
@@ -13613,7 +13586,7 @@
           <p:spPr>
             <a:xfrm>
               <a:off x="6681960" y="2743200"/>
-              <a:ext cx="1850400" cy="303120"/>
+              <a:ext cx="1850040" cy="303120"/>
             </a:xfrm>
             <a:prstGeom prst="rect">
               <a:avLst/>
@@ -13670,7 +13643,7 @@
           <p:spPr>
             <a:xfrm>
               <a:off x="6681960" y="3016080"/>
-              <a:ext cx="1850400" cy="943560"/>
+              <a:ext cx="1850040" cy="943560"/>
             </a:xfrm>
             <a:prstGeom prst="rect">
               <a:avLst/>
@@ -13817,7 +13790,7 @@
         <p:spPr>
           <a:xfrm>
             <a:off x="9173520" y="3501000"/>
-            <a:ext cx="478080" cy="383040"/>
+            <a:ext cx="477720" cy="382680"/>
           </a:xfrm>
           <a:prstGeom prst="triangle">
             <a:avLst>
@@ -13884,7 +13857,7 @@
         <p:spPr>
           <a:xfrm>
             <a:off x="10569600" y="3126240"/>
-            <a:ext cx="1621800" cy="303120"/>
+            <a:ext cx="1621440" cy="303120"/>
           </a:xfrm>
           <a:prstGeom prst="rect">
             <a:avLst/>
@@ -13941,7 +13914,7 @@
         <p:spPr>
           <a:xfrm>
             <a:off x="10569600" y="3429360"/>
-            <a:ext cx="1621800" cy="1370520"/>
+            <a:ext cx="1621440" cy="1370520"/>
           </a:xfrm>
           <a:prstGeom prst="rect">
             <a:avLst/>
@@ -14124,8 +14097,8 @@
         </p:nvCxnSpPr>
         <p:spPr>
           <a:xfrm flipH="1" flipV="1">
-            <a:off x="8532360" y="3351240"/>
-            <a:ext cx="761040" cy="341640"/>
+            <a:off x="8532000" y="3351240"/>
+            <a:ext cx="761400" cy="341640"/>
           </a:xfrm>
           <a:prstGeom prst="straightConnector1">
             <a:avLst/>
@@ -14147,7 +14120,7 @@
         <p:spPr>
           <a:xfrm>
             <a:off x="2086200" y="3336840"/>
-            <a:ext cx="1621800" cy="303120"/>
+            <a:ext cx="1621440" cy="303120"/>
           </a:xfrm>
           <a:prstGeom prst="rect">
             <a:avLst/>
@@ -14204,7 +14177,7 @@
         <p:spPr>
           <a:xfrm>
             <a:off x="2086200" y="3598200"/>
-            <a:ext cx="1621800" cy="516600"/>
+            <a:ext cx="1621440" cy="516600"/>
           </a:xfrm>
           <a:prstGeom prst="rect">
             <a:avLst/>
@@ -14294,7 +14267,7 @@
         <p:spPr>
           <a:xfrm>
             <a:off x="2086200" y="3336840"/>
-            <a:ext cx="1621800" cy="303120"/>
+            <a:ext cx="1621440" cy="303120"/>
           </a:xfrm>
           <a:prstGeom prst="rect">
             <a:avLst/>
@@ -14351,7 +14324,7 @@
         <p:spPr>
           <a:xfrm>
             <a:off x="2086200" y="3598200"/>
-            <a:ext cx="1621800" cy="516600"/>
+            <a:ext cx="1621440" cy="516600"/>
           </a:xfrm>
           <a:prstGeom prst="rect">
             <a:avLst/>
@@ -14441,7 +14414,7 @@
         <p:spPr>
           <a:xfrm>
             <a:off x="1883160" y="2514600"/>
-            <a:ext cx="1824840" cy="383040"/>
+            <a:ext cx="1824480" cy="382680"/>
           </a:xfrm>
           <a:prstGeom prst="diamond">
             <a:avLst/>
@@ -14506,7 +14479,7 @@
         <p:spPr>
           <a:xfrm>
             <a:off x="3481560" y="2899800"/>
-            <a:ext cx="1596240" cy="383040"/>
+            <a:ext cx="1595880" cy="382680"/>
           </a:xfrm>
           <a:prstGeom prst="ellipse">
             <a:avLst/>
@@ -14571,8 +14544,8 @@
         </p:nvCxnSpPr>
         <p:spPr>
           <a:xfrm>
-            <a:off x="3708000" y="2706120"/>
-            <a:ext cx="572040" cy="194040"/>
+            <a:off x="3707640" y="2706120"/>
+            <a:ext cx="572400" cy="194040"/>
           </a:xfrm>
           <a:prstGeom prst="straightConnector1">
             <a:avLst/>
@@ -14596,8 +14569,8 @@
         </p:nvCxnSpPr>
         <p:spPr>
           <a:xfrm flipH="1" flipV="1">
-            <a:off x="2795760" y="2897640"/>
-            <a:ext cx="101520" cy="439560"/>
+            <a:off x="2795400" y="2897280"/>
+            <a:ext cx="101880" cy="439920"/>
           </a:xfrm>
           <a:prstGeom prst="straightConnector1">
             <a:avLst/>
@@ -14621,8 +14594,8 @@
         </p:nvCxnSpPr>
         <p:spPr>
           <a:xfrm flipV="1">
-            <a:off x="2795760" y="2073960"/>
-            <a:ext cx="556920" cy="441000"/>
+            <a:off x="2795400" y="2073960"/>
+            <a:ext cx="557280" cy="441000"/>
           </a:xfrm>
           <a:prstGeom prst="straightConnector1">
             <a:avLst/>
@@ -14644,7 +14617,7 @@
         <p:spPr>
           <a:xfrm>
             <a:off x="10543680" y="457200"/>
-            <a:ext cx="1621800" cy="303120"/>
+            <a:ext cx="1621440" cy="303120"/>
           </a:xfrm>
           <a:prstGeom prst="rect">
             <a:avLst/>
@@ -14701,7 +14674,7 @@
         <p:spPr>
           <a:xfrm>
             <a:off x="10543680" y="718560"/>
-            <a:ext cx="1621800" cy="516600"/>
+            <a:ext cx="1621440" cy="516600"/>
           </a:xfrm>
           <a:prstGeom prst="rect">
             <a:avLst/>
@@ -14791,7 +14764,7 @@
         <p:spPr>
           <a:xfrm>
             <a:off x="10543680" y="457200"/>
-            <a:ext cx="1621800" cy="303120"/>
+            <a:ext cx="1621440" cy="303120"/>
           </a:xfrm>
           <a:prstGeom prst="rect">
             <a:avLst/>
@@ -14848,7 +14821,7 @@
         <p:spPr>
           <a:xfrm>
             <a:off x="10543680" y="718560"/>
-            <a:ext cx="1621800" cy="2224440"/>
+            <a:ext cx="1621440" cy="2224440"/>
           </a:xfrm>
           <a:prstGeom prst="rect">
             <a:avLst/>
@@ -15100,7 +15073,7 @@
         <p:spPr>
           <a:xfrm>
             <a:off x="8282160" y="1443600"/>
-            <a:ext cx="2053800" cy="383040"/>
+            <a:ext cx="2053440" cy="382680"/>
           </a:xfrm>
           <a:prstGeom prst="diamond">
             <a:avLst/>
@@ -15167,8 +15140,8 @@
         </p:nvCxnSpPr>
         <p:spPr>
           <a:xfrm>
-            <a:off x="9309240" y="1826640"/>
-            <a:ext cx="1260720" cy="2288160"/>
+            <a:off x="9308880" y="1826280"/>
+            <a:ext cx="1261080" cy="2288520"/>
           </a:xfrm>
           <a:prstGeom prst="straightConnector1">
             <a:avLst/>
@@ -15192,8 +15165,8 @@
         </p:nvCxnSpPr>
         <p:spPr>
           <a:xfrm flipH="1" flipV="1">
-            <a:off x="10335960" y="1635120"/>
-            <a:ext cx="208080" cy="195840"/>
+            <a:off x="10335600" y="1635120"/>
+            <a:ext cx="208440" cy="195840"/>
           </a:xfrm>
           <a:prstGeom prst="straightConnector1">
             <a:avLst/>
@@ -15218,7 +15191,7 @@
         <p:spPr>
           <a:xfrm flipH="1" flipV="1">
             <a:off x="7467120" y="1220040"/>
-            <a:ext cx="1842480" cy="223920"/>
+            <a:ext cx="1842120" cy="223920"/>
           </a:xfrm>
           <a:prstGeom prst="straightConnector1">
             <a:avLst/>
@@ -15240,7 +15213,7 @@
         <p:spPr>
           <a:xfrm>
             <a:off x="5412240" y="5029200"/>
-            <a:ext cx="1621800" cy="303120"/>
+            <a:ext cx="1621440" cy="303120"/>
           </a:xfrm>
           <a:prstGeom prst="rect">
             <a:avLst/>
@@ -15297,7 +15270,7 @@
         <p:spPr>
           <a:xfrm>
             <a:off x="3710160" y="4343400"/>
-            <a:ext cx="1825200" cy="383040"/>
+            <a:ext cx="1824840" cy="382680"/>
           </a:xfrm>
           <a:prstGeom prst="diamond">
             <a:avLst/>
@@ -15390,8 +15363,8 @@
         </p:nvCxnSpPr>
         <p:spPr>
           <a:xfrm>
-            <a:off x="4622760" y="4726440"/>
-            <a:ext cx="789840" cy="454680"/>
+            <a:off x="4622760" y="4726080"/>
+            <a:ext cx="789840" cy="455040"/>
           </a:xfrm>
           <a:prstGeom prst="straightConnector1">
             <a:avLst/>
@@ -15438,7 +15411,7 @@
         <p:spPr>
           <a:xfrm>
             <a:off x="4626720" y="3200400"/>
-            <a:ext cx="1824480" cy="682200"/>
+            <a:ext cx="1824120" cy="681840"/>
           </a:xfrm>
           <a:prstGeom prst="diamond">
             <a:avLst/>
@@ -15505,8 +15478,8 @@
         </p:nvCxnSpPr>
         <p:spPr>
           <a:xfrm flipH="1" flipV="1">
-            <a:off x="5538960" y="3882600"/>
-            <a:ext cx="684360" cy="1146960"/>
+            <a:off x="5538960" y="3882240"/>
+            <a:ext cx="684360" cy="1147320"/>
           </a:xfrm>
           <a:prstGeom prst="straightConnector1">
             <a:avLst/>
@@ -15528,7 +15501,7 @@
         <p:spPr>
           <a:xfrm>
             <a:off x="2693880" y="4415400"/>
-            <a:ext cx="478080" cy="383040"/>
+            <a:ext cx="477720" cy="382680"/>
           </a:xfrm>
           <a:prstGeom prst="triangle">
             <a:avLst>
@@ -15620,7 +15593,7 @@
         <p:spPr>
           <a:xfrm>
             <a:off x="2109960" y="5163480"/>
-            <a:ext cx="1621800" cy="303120"/>
+            <a:ext cx="1621440" cy="303120"/>
           </a:xfrm>
           <a:prstGeom prst="rect">
             <a:avLst/>
@@ -15677,7 +15650,7 @@
         <p:spPr>
           <a:xfrm>
             <a:off x="2109960" y="5163480"/>
-            <a:ext cx="1621800" cy="303120"/>
+            <a:ext cx="1621440" cy="303120"/>
           </a:xfrm>
           <a:prstGeom prst="rect">
             <a:avLst/>
@@ -15734,7 +15707,7 @@
         <p:spPr>
           <a:xfrm>
             <a:off x="2109960" y="5424840"/>
-            <a:ext cx="1621800" cy="363960"/>
+            <a:ext cx="1621440" cy="363960"/>
           </a:xfrm>
           <a:prstGeom prst="rect">
             <a:avLst/>
@@ -15802,8 +15775,8 @@
         </p:nvCxnSpPr>
         <p:spPr>
           <a:xfrm flipH="1">
-            <a:off x="2920680" y="4798440"/>
-            <a:ext cx="12600" cy="365400"/>
+            <a:off x="2920680" y="4798080"/>
+            <a:ext cx="12600" cy="365760"/>
           </a:xfrm>
           <a:prstGeom prst="straightConnector1">
             <a:avLst/>
@@ -15825,7 +15798,7 @@
         <p:spPr>
           <a:xfrm>
             <a:off x="7627320" y="4800600"/>
-            <a:ext cx="1567080" cy="383040"/>
+            <a:ext cx="1566720" cy="382680"/>
           </a:xfrm>
           <a:prstGeom prst="diamond">
             <a:avLst/>
@@ -15890,7 +15863,7 @@
         <p:spPr>
           <a:xfrm>
             <a:off x="7627320" y="5329800"/>
-            <a:ext cx="1795680" cy="383040"/>
+            <a:ext cx="1795320" cy="382680"/>
           </a:xfrm>
           <a:prstGeom prst="diamond">
             <a:avLst/>
@@ -15957,8 +15930,8 @@
         </p:nvCxnSpPr>
         <p:spPr>
           <a:xfrm flipH="1">
-            <a:off x="9194400" y="4114440"/>
-            <a:ext cx="1375560" cy="878040"/>
+            <a:off x="9194040" y="4114440"/>
+            <a:ext cx="1375920" cy="878040"/>
           </a:xfrm>
           <a:prstGeom prst="straightConnector1">
             <a:avLst/>
@@ -15983,8 +15956,8 @@
         </p:nvCxnSpPr>
         <p:spPr>
           <a:xfrm flipH="1">
-            <a:off x="7034040" y="4992120"/>
-            <a:ext cx="593640" cy="189000"/>
+            <a:off x="7033680" y="4992120"/>
+            <a:ext cx="594000" cy="189000"/>
           </a:xfrm>
           <a:prstGeom prst="straightConnector1">
             <a:avLst/>
@@ -16008,8 +15981,8 @@
         </p:nvCxnSpPr>
         <p:spPr>
           <a:xfrm flipH="1" flipV="1">
-            <a:off x="7034040" y="5180760"/>
-            <a:ext cx="593640" cy="340920"/>
+            <a:off x="7033680" y="5180760"/>
+            <a:ext cx="594000" cy="340920"/>
           </a:xfrm>
           <a:prstGeom prst="straightConnector1">
             <a:avLst/>
@@ -16033,8 +16006,8 @@
         </p:nvCxnSpPr>
         <p:spPr>
           <a:xfrm flipH="1">
-            <a:off x="9423000" y="4114440"/>
-            <a:ext cx="1146960" cy="1407240"/>
+            <a:off x="9422640" y="4114440"/>
+            <a:ext cx="1147320" cy="1407240"/>
           </a:xfrm>
           <a:prstGeom prst="straightConnector1">
             <a:avLst/>
@@ -16059,8 +16032,8 @@
         </p:nvCxnSpPr>
         <p:spPr>
           <a:xfrm flipH="1">
-            <a:off x="4163400" y="1105920"/>
-            <a:ext cx="263880" cy="176400"/>
+            <a:off x="4163040" y="1105920"/>
+            <a:ext cx="264240" cy="176400"/>
           </a:xfrm>
           <a:prstGeom prst="straightConnector1">
             <a:avLst/>
@@ -16082,7 +16055,7 @@
         <p:spPr>
           <a:xfrm>
             <a:off x="8053560" y="2057400"/>
-            <a:ext cx="1218600" cy="383040"/>
+            <a:ext cx="1218240" cy="382680"/>
           </a:xfrm>
           <a:prstGeom prst="ellipse">
             <a:avLst/>
@@ -16147,8 +16120,8 @@
         </p:nvCxnSpPr>
         <p:spPr>
           <a:xfrm flipV="1">
-            <a:off x="8663040" y="1826640"/>
-            <a:ext cx="646560" cy="231120"/>
+            <a:off x="8662680" y="1826280"/>
+            <a:ext cx="646560" cy="231480"/>
           </a:xfrm>
           <a:prstGeom prst="straightConnector1">
             <a:avLst/>
@@ -16200,7 +16173,7 @@
         <p:spPr>
           <a:xfrm flipH="1">
             <a:off x="0" y="3073320"/>
-            <a:ext cx="1833480" cy="4680"/>
+            <a:ext cx="1833840" cy="5040"/>
           </a:xfrm>
           <a:prstGeom prst="straightConnector1">
             <a:avLst/>
@@ -16223,7 +16196,7 @@
         <p:spPr>
           <a:xfrm>
             <a:off x="0" y="2489400"/>
-            <a:ext cx="1833480" cy="4680"/>
+            <a:ext cx="1833840" cy="5040"/>
           </a:xfrm>
           <a:prstGeom prst="straightConnector1">
             <a:avLst/>
@@ -16246,7 +16219,7 @@
         <p:spPr>
           <a:xfrm>
             <a:off x="0" y="2781360"/>
-            <a:ext cx="1833480" cy="4680"/>
+            <a:ext cx="1833840" cy="5040"/>
           </a:xfrm>
           <a:prstGeom prst="straightConnector1">
             <a:avLst/>
@@ -16269,7 +16242,7 @@
         <p:spPr>
           <a:xfrm flipH="1">
             <a:off x="0" y="3657600"/>
-            <a:ext cx="1833480" cy="4680"/>
+            <a:ext cx="1833840" cy="5040"/>
           </a:xfrm>
           <a:prstGeom prst="straightConnector1">
             <a:avLst/>
@@ -16291,7 +16264,7 @@
         <p:spPr>
           <a:xfrm>
             <a:off x="128520" y="6134040"/>
-            <a:ext cx="1567080" cy="383040"/>
+            <a:ext cx="1566720" cy="382680"/>
           </a:xfrm>
           <a:prstGeom prst="diamond">
             <a:avLst/>
@@ -16356,7 +16329,7 @@
         <p:spPr>
           <a:xfrm>
             <a:off x="302760" y="5454000"/>
-            <a:ext cx="1218600" cy="383040"/>
+            <a:ext cx="1218240" cy="382680"/>
           </a:xfrm>
           <a:prstGeom prst="ellipse">
             <a:avLst/>
@@ -16419,9 +16392,9 @@
         <p:grpSpPr>
           <a:xfrm>
             <a:off x="101160" y="336240"/>
-            <a:ext cx="1621800" cy="777960"/>
+            <a:ext cx="1621440" cy="777960"/>
             <a:chOff x="101160" y="336240"/>
-            <a:chExt cx="1621800" cy="777960"/>
+            <a:chExt cx="1621440" cy="777960"/>
           </a:xfrm>
         </p:grpSpPr>
         <p:sp>
@@ -16433,7 +16406,7 @@
           <p:spPr>
             <a:xfrm>
               <a:off x="101160" y="336240"/>
-              <a:ext cx="1621800" cy="303120"/>
+              <a:ext cx="1621440" cy="303120"/>
             </a:xfrm>
             <a:prstGeom prst="rect">
               <a:avLst/>
@@ -16490,7 +16463,7 @@
           <p:spPr>
             <a:xfrm>
               <a:off x="101160" y="597600"/>
-              <a:ext cx="1621800" cy="516600"/>
+              <a:ext cx="1621440" cy="516600"/>
             </a:xfrm>
             <a:prstGeom prst="rect">
               <a:avLst/>
@@ -16581,7 +16554,7 @@
         <p:spPr>
           <a:xfrm>
             <a:off x="128520" y="4629600"/>
-            <a:ext cx="1567080" cy="527760"/>
+            <a:ext cx="1566720" cy="527400"/>
           </a:xfrm>
           <a:prstGeom prst="diamond">
             <a:avLst/>
@@ -16669,7 +16642,7 @@
         <p:spPr>
           <a:xfrm>
             <a:off x="0" y="3365640"/>
-            <a:ext cx="1833480" cy="4680"/>
+            <a:ext cx="1833840" cy="5040"/>
           </a:xfrm>
           <a:prstGeom prst="straightConnector1">
             <a:avLst/>
@@ -16691,7 +16664,7 @@
         <p:spPr>
           <a:xfrm>
             <a:off x="673200" y="3949920"/>
-            <a:ext cx="478080" cy="383040"/>
+            <a:ext cx="477720" cy="382680"/>
           </a:xfrm>
           <a:prstGeom prst="triangle">
             <a:avLst>
@@ -16758,9 +16731,9 @@
         <p:grpSpPr>
           <a:xfrm>
             <a:off x="101160" y="1413000"/>
-            <a:ext cx="1621800" cy="777960"/>
+            <a:ext cx="1621440" cy="777960"/>
             <a:chOff x="101160" y="1413000"/>
-            <a:chExt cx="1621800" cy="777960"/>
+            <a:chExt cx="1621440" cy="777960"/>
           </a:xfrm>
         </p:grpSpPr>
         <p:sp>
@@ -16772,7 +16745,7 @@
           <p:spPr>
             <a:xfrm>
               <a:off x="101160" y="1413000"/>
-              <a:ext cx="1621800" cy="303120"/>
+              <a:ext cx="1621440" cy="303120"/>
             </a:xfrm>
             <a:prstGeom prst="rect">
               <a:avLst/>
@@ -16830,7 +16803,7 @@
           <p:spPr>
             <a:xfrm>
               <a:off x="101160" y="1674360"/>
-              <a:ext cx="1621800" cy="516600"/>
+              <a:ext cx="1621440" cy="516600"/>
             </a:xfrm>
             <a:prstGeom prst="rect">
               <a:avLst/>
@@ -16922,7 +16895,7 @@
         <p:spPr>
           <a:xfrm>
             <a:off x="4775040" y="457200"/>
-            <a:ext cx="1621800" cy="303120"/>
+            <a:ext cx="1621440" cy="303120"/>
           </a:xfrm>
           <a:prstGeom prst="rect">
             <a:avLst/>
@@ -16979,7 +16952,7 @@
         <p:spPr>
           <a:xfrm>
             <a:off x="4775040" y="718560"/>
-            <a:ext cx="1621800" cy="730080"/>
+            <a:ext cx="1621440" cy="730080"/>
           </a:xfrm>
           <a:prstGeom prst="rect">
             <a:avLst/>
@@ -17096,9 +17069,9 @@
         <p:grpSpPr>
           <a:xfrm>
             <a:off x="4572000" y="4274280"/>
-            <a:ext cx="1621800" cy="991440"/>
+            <a:ext cx="1621440" cy="991440"/>
             <a:chOff x="4572000" y="4274280"/>
-            <a:chExt cx="1621800" cy="991440"/>
+            <a:chExt cx="1621440" cy="991440"/>
           </a:xfrm>
         </p:grpSpPr>
         <p:sp>
@@ -17110,7 +17083,7 @@
           <p:spPr>
             <a:xfrm>
               <a:off x="4572000" y="4274280"/>
-              <a:ext cx="1621800" cy="303120"/>
+              <a:ext cx="1621440" cy="303120"/>
             </a:xfrm>
             <a:prstGeom prst="rect">
               <a:avLst/>
@@ -17167,7 +17140,7 @@
           <p:spPr>
             <a:xfrm>
               <a:off x="4572000" y="4535640"/>
-              <a:ext cx="1621800" cy="730080"/>
+              <a:ext cx="1621440" cy="730080"/>
             </a:xfrm>
             <a:prstGeom prst="rect">
               <a:avLst/>
@@ -17285,7 +17258,7 @@
         <p:spPr>
           <a:xfrm>
             <a:off x="3231360" y="2899800"/>
-            <a:ext cx="1567080" cy="383040"/>
+            <a:ext cx="1566720" cy="382680"/>
           </a:xfrm>
           <a:prstGeom prst="diamond">
             <a:avLst/>
@@ -17350,7 +17323,7 @@
         <p:spPr>
           <a:xfrm>
             <a:off x="4602960" y="2585160"/>
-            <a:ext cx="1795680" cy="384480"/>
+            <a:ext cx="1795320" cy="384120"/>
           </a:xfrm>
           <a:prstGeom prst="diamond">
             <a:avLst/>
@@ -17417,8 +17390,8 @@
         </p:nvCxnSpPr>
         <p:spPr>
           <a:xfrm flipH="1" flipV="1">
-            <a:off x="4015080" y="3282840"/>
-            <a:ext cx="1368000" cy="991800"/>
+            <a:off x="4014720" y="3282480"/>
+            <a:ext cx="1368360" cy="992160"/>
           </a:xfrm>
           <a:prstGeom prst="straightConnector1">
             <a:avLst/>
@@ -17468,8 +17441,8 @@
         </p:nvCxnSpPr>
         <p:spPr>
           <a:xfrm flipV="1">
-            <a:off x="5382720" y="2969640"/>
-            <a:ext cx="118440" cy="1305000"/>
+            <a:off x="5382720" y="2969280"/>
+            <a:ext cx="118440" cy="1305360"/>
           </a:xfrm>
           <a:prstGeom prst="straightConnector1">
             <a:avLst/>
@@ -17493,8 +17466,8 @@
         </p:nvCxnSpPr>
         <p:spPr>
           <a:xfrm flipH="1">
-            <a:off x="4015080" y="1448640"/>
-            <a:ext cx="1571040" cy="1451520"/>
+            <a:off x="4014720" y="1448640"/>
+            <a:ext cx="1571400" cy="1451520"/>
           </a:xfrm>
           <a:prstGeom prst="straightConnector1">
             <a:avLst/>
@@ -17516,7 +17489,7 @@
         <p:spPr>
           <a:xfrm>
             <a:off x="2743200" y="457200"/>
-            <a:ext cx="1567080" cy="383040"/>
+            <a:ext cx="1566720" cy="382680"/>
           </a:xfrm>
           <a:prstGeom prst="diamond">
             <a:avLst/>
@@ -17583,8 +17556,8 @@
         </p:nvCxnSpPr>
         <p:spPr>
           <a:xfrm flipH="1" flipV="1">
-            <a:off x="4310280" y="648720"/>
-            <a:ext cx="465120" cy="435240"/>
+            <a:off x="4309920" y="648720"/>
+            <a:ext cx="465480" cy="435240"/>
           </a:xfrm>
           <a:prstGeom prst="straightConnector1">
             <a:avLst/>
@@ -17608,8 +17581,8 @@
         </p:nvCxnSpPr>
         <p:spPr>
           <a:xfrm flipH="1" flipV="1">
-            <a:off x="3526920" y="840240"/>
-            <a:ext cx="1248480" cy="243720"/>
+            <a:off x="3526560" y="839880"/>
+            <a:ext cx="1248840" cy="244080"/>
           </a:xfrm>
           <a:prstGeom prst="straightConnector1">
             <a:avLst/>
@@ -17631,9 +17604,9 @@
         <p:grpSpPr>
           <a:xfrm>
             <a:off x="8686800" y="837360"/>
-            <a:ext cx="1621800" cy="991440"/>
+            <a:ext cx="1621440" cy="991440"/>
             <a:chOff x="8686800" y="837360"/>
-            <a:chExt cx="1621800" cy="991440"/>
+            <a:chExt cx="1621440" cy="991440"/>
           </a:xfrm>
         </p:grpSpPr>
         <p:sp>
@@ -17645,7 +17618,7 @@
           <p:spPr>
             <a:xfrm>
               <a:off x="8686800" y="837360"/>
-              <a:ext cx="1621800" cy="303120"/>
+              <a:ext cx="1621440" cy="303120"/>
             </a:xfrm>
             <a:prstGeom prst="rect">
               <a:avLst/>
@@ -17702,7 +17675,7 @@
           <p:spPr>
             <a:xfrm>
               <a:off x="8686800" y="1098720"/>
-              <a:ext cx="1621800" cy="730080"/>
+              <a:ext cx="1621440" cy="730080"/>
             </a:xfrm>
             <a:prstGeom prst="rect">
               <a:avLst/>
@@ -17820,7 +17793,7 @@
         <p:spPr>
           <a:xfrm>
             <a:off x="128880" y="6134040"/>
-            <a:ext cx="1567080" cy="383040"/>
+            <a:ext cx="1566720" cy="382680"/>
           </a:xfrm>
           <a:prstGeom prst="diamond">
             <a:avLst/>
@@ -17885,7 +17858,7 @@
         <p:spPr>
           <a:xfrm>
             <a:off x="7315200" y="228600"/>
-            <a:ext cx="1567080" cy="383040"/>
+            <a:ext cx="1566720" cy="382680"/>
           </a:xfrm>
           <a:prstGeom prst="diamond">
             <a:avLst/>
@@ -17950,7 +17923,7 @@
         <p:spPr>
           <a:xfrm>
             <a:off x="360" y="3366000"/>
-            <a:ext cx="1833480" cy="4680"/>
+            <a:ext cx="1833840" cy="5040"/>
           </a:xfrm>
           <a:prstGeom prst="straightConnector1">
             <a:avLst/>
@@ -17974,8 +17947,8 @@
         </p:nvCxnSpPr>
         <p:spPr>
           <a:xfrm flipH="1">
-            <a:off x="6396840" y="420120"/>
-            <a:ext cx="918720" cy="663840"/>
+            <a:off x="6396480" y="420120"/>
+            <a:ext cx="919080" cy="663840"/>
           </a:xfrm>
           <a:prstGeom prst="straightConnector1">
             <a:avLst/>
@@ -17997,7 +17970,7 @@
         <p:spPr>
           <a:xfrm>
             <a:off x="6629400" y="1442160"/>
-            <a:ext cx="1826280" cy="612720"/>
+            <a:ext cx="1825920" cy="612360"/>
           </a:xfrm>
           <a:prstGeom prst="diamond">
             <a:avLst/>
@@ -18064,8 +18037,8 @@
         </p:nvCxnSpPr>
         <p:spPr>
           <a:xfrm flipH="1" flipV="1">
-            <a:off x="8882280" y="420120"/>
-            <a:ext cx="615600" cy="417600"/>
+            <a:off x="8881920" y="420120"/>
+            <a:ext cx="615960" cy="417600"/>
           </a:xfrm>
           <a:prstGeom prst="straightConnector1">
             <a:avLst/>
@@ -18088,7 +18061,7 @@
         <p:spPr>
           <a:xfrm>
             <a:off x="6629400" y="2514600"/>
-            <a:ext cx="1567080" cy="383040"/>
+            <a:ext cx="1566720" cy="382680"/>
           </a:xfrm>
           <a:prstGeom prst="diamond">
             <a:avLst/>
@@ -18155,8 +18128,8 @@
         </p:nvCxnSpPr>
         <p:spPr>
           <a:xfrm flipH="1">
-            <a:off x="8196480" y="1828800"/>
-            <a:ext cx="1301400" cy="877680"/>
+            <a:off x="8196120" y="1828800"/>
+            <a:ext cx="1301760" cy="877680"/>
           </a:xfrm>
           <a:prstGeom prst="straightConnector1">
             <a:avLst/>
@@ -18180,8 +18153,8 @@
         </p:nvCxnSpPr>
         <p:spPr>
           <a:xfrm flipH="1">
-            <a:off x="6193800" y="2706120"/>
-            <a:ext cx="435960" cy="2064240"/>
+            <a:off x="6193440" y="2706120"/>
+            <a:ext cx="436320" cy="2064240"/>
           </a:xfrm>
           <a:prstGeom prst="straightConnector1">
             <a:avLst/>
@@ -18205,8 +18178,8 @@
         </p:nvCxnSpPr>
         <p:spPr>
           <a:xfrm flipH="1">
-            <a:off x="8455680" y="1333080"/>
-            <a:ext cx="231480" cy="415800"/>
+            <a:off x="8455320" y="1333080"/>
+            <a:ext cx="231840" cy="415800"/>
           </a:xfrm>
           <a:prstGeom prst="straightConnector1">
             <a:avLst/>
@@ -18253,9 +18226,9 @@
         <p:grpSpPr>
           <a:xfrm>
             <a:off x="101160" y="336240"/>
-            <a:ext cx="1621800" cy="777960"/>
+            <a:ext cx="1621440" cy="777960"/>
             <a:chOff x="101160" y="336240"/>
-            <a:chExt cx="1621800" cy="777960"/>
+            <a:chExt cx="1621440" cy="777960"/>
           </a:xfrm>
         </p:grpSpPr>
         <p:sp>
@@ -18267,7 +18240,7 @@
           <p:spPr>
             <a:xfrm>
               <a:off x="101160" y="336240"/>
-              <a:ext cx="1621800" cy="303120"/>
+              <a:ext cx="1621440" cy="303120"/>
             </a:xfrm>
             <a:prstGeom prst="rect">
               <a:avLst/>
@@ -18324,7 +18297,7 @@
           <p:spPr>
             <a:xfrm>
               <a:off x="101160" y="597600"/>
-              <a:ext cx="1621800" cy="516600"/>
+              <a:ext cx="1621440" cy="516600"/>
             </a:xfrm>
             <a:prstGeom prst="rect">
               <a:avLst/>
@@ -18415,9 +18388,9 @@
         <p:grpSpPr>
           <a:xfrm>
             <a:off x="6760440" y="4359960"/>
-            <a:ext cx="1621800" cy="561960"/>
+            <a:ext cx="1621440" cy="561600"/>
             <a:chOff x="6760440" y="4359960"/>
-            <a:chExt cx="1621800" cy="561960"/>
+            <a:chExt cx="1621440" cy="561600"/>
           </a:xfrm>
         </p:grpSpPr>
         <p:sp>
@@ -18429,7 +18402,7 @@
           <p:spPr>
             <a:xfrm>
               <a:off x="6760440" y="4359960"/>
-              <a:ext cx="1621800" cy="303120"/>
+              <a:ext cx="1621440" cy="303120"/>
             </a:xfrm>
             <a:prstGeom prst="rect">
               <a:avLst/>
@@ -18486,7 +18459,7 @@
           <p:spPr>
             <a:xfrm>
               <a:off x="6760440" y="4621320"/>
-              <a:ext cx="1621800" cy="300600"/>
+              <a:ext cx="1621440" cy="300240"/>
             </a:xfrm>
             <a:prstGeom prst="rect">
               <a:avLst/>
@@ -18535,7 +18508,7 @@
         <p:spPr>
           <a:xfrm>
             <a:off x="9144000" y="2057400"/>
-            <a:ext cx="478080" cy="383040"/>
+            <a:ext cx="477720" cy="382680"/>
           </a:xfrm>
           <a:prstGeom prst="triangle">
             <a:avLst>
@@ -18603,8 +18576,8 @@
         </p:nvCxnSpPr>
         <p:spPr>
           <a:xfrm flipH="1">
-            <a:off x="8026200" y="4112280"/>
-            <a:ext cx="1434600" cy="250200"/>
+            <a:off x="8026200" y="4111920"/>
+            <a:ext cx="1434600" cy="250920"/>
           </a:xfrm>
           <a:prstGeom prst="straightConnector1">
             <a:avLst/>
@@ -18627,8 +18600,8 @@
         </p:nvCxnSpPr>
         <p:spPr>
           <a:xfrm flipH="1" flipV="1">
-            <a:off x="9460440" y="4112280"/>
-            <a:ext cx="473400" cy="231840"/>
+            <a:off x="9460440" y="4111920"/>
+            <a:ext cx="473760" cy="232560"/>
           </a:xfrm>
           <a:prstGeom prst="straightConnector1">
             <a:avLst/>
@@ -18651,8 +18624,8 @@
         </p:nvCxnSpPr>
         <p:spPr>
           <a:xfrm flipH="1">
-            <a:off x="9346320" y="2440440"/>
-            <a:ext cx="37080" cy="441720"/>
+            <a:off x="9346320" y="2440080"/>
+            <a:ext cx="37080" cy="442440"/>
           </a:xfrm>
           <a:prstGeom prst="straightConnector1">
             <a:avLst/>
@@ -18699,7 +18672,7 @@
         <p:spPr>
           <a:xfrm>
             <a:off x="7089840" y="5715000"/>
-            <a:ext cx="1621800" cy="303120"/>
+            <a:ext cx="1621440" cy="303120"/>
           </a:xfrm>
           <a:prstGeom prst="rect">
             <a:avLst/>
@@ -18756,7 +18729,7 @@
         <p:spPr>
           <a:xfrm>
             <a:off x="6760440" y="5183280"/>
-            <a:ext cx="1825200" cy="383040"/>
+            <a:ext cx="1824840" cy="382680"/>
           </a:xfrm>
           <a:prstGeom prst="diamond">
             <a:avLst/>
@@ -18821,7 +18794,7 @@
         <p:spPr>
           <a:xfrm flipH="1">
             <a:off x="0" y="3657600"/>
-            <a:ext cx="1833480" cy="4680"/>
+            <a:ext cx="1833840" cy="5040"/>
           </a:xfrm>
           <a:prstGeom prst="straightConnector1">
             <a:avLst/>
@@ -18843,9 +18816,9 @@
         <p:grpSpPr>
           <a:xfrm>
             <a:off x="8534520" y="2879640"/>
-            <a:ext cx="1621800" cy="562680"/>
+            <a:ext cx="1621440" cy="562320"/>
             <a:chOff x="8534520" y="2879640"/>
-            <a:chExt cx="1621800" cy="562680"/>
+            <a:chExt cx="1621440" cy="562320"/>
           </a:xfrm>
         </p:grpSpPr>
         <p:sp>
@@ -18857,7 +18830,7 @@
           <p:spPr>
             <a:xfrm>
               <a:off x="8534520" y="2879640"/>
-              <a:ext cx="1621800" cy="303120"/>
+              <a:ext cx="1621440" cy="303120"/>
             </a:xfrm>
             <a:prstGeom prst="rect">
               <a:avLst/>
@@ -18914,7 +18887,7 @@
           <p:spPr>
             <a:xfrm>
               <a:off x="8534520" y="3141000"/>
-              <a:ext cx="1621800" cy="301320"/>
+              <a:ext cx="1621440" cy="300960"/>
             </a:xfrm>
             <a:prstGeom prst="rect">
               <a:avLst/>
@@ -18963,9 +18936,9 @@
         <p:grpSpPr>
           <a:xfrm>
             <a:off x="8534520" y="2879640"/>
-            <a:ext cx="1621800" cy="564480"/>
+            <a:ext cx="1621440" cy="564480"/>
             <a:chOff x="8534520" y="2879640"/>
-            <a:chExt cx="1621800" cy="564480"/>
+            <a:chExt cx="1621440" cy="564480"/>
           </a:xfrm>
         </p:grpSpPr>
         <p:sp>
@@ -18977,7 +18950,7 @@
           <p:spPr>
             <a:xfrm>
               <a:off x="8534520" y="2879640"/>
-              <a:ext cx="1621800" cy="303120"/>
+              <a:ext cx="1621440" cy="303120"/>
             </a:xfrm>
             <a:prstGeom prst="rect">
               <a:avLst/>
@@ -19034,7 +19007,7 @@
           <p:spPr>
             <a:xfrm>
               <a:off x="8534520" y="3141000"/>
-              <a:ext cx="1621800" cy="303120"/>
+              <a:ext cx="1621440" cy="303120"/>
             </a:xfrm>
             <a:prstGeom prst="rect">
               <a:avLst/>
@@ -19097,7 +19070,7 @@
         <p:spPr>
           <a:xfrm>
             <a:off x="9221400" y="3729240"/>
-            <a:ext cx="478080" cy="383040"/>
+            <a:ext cx="477720" cy="382680"/>
           </a:xfrm>
           <a:prstGeom prst="triangle">
             <a:avLst>
@@ -19189,7 +19162,7 @@
         <p:spPr>
           <a:xfrm>
             <a:off x="8556840" y="3657600"/>
-            <a:ext cx="1833480" cy="4680"/>
+            <a:ext cx="1833840" cy="5040"/>
           </a:xfrm>
           <a:prstGeom prst="straightConnector1">
             <a:avLst/>
@@ -19212,7 +19185,7 @@
         <p:spPr>
           <a:xfrm>
             <a:off x="9601200" y="3382920"/>
-            <a:ext cx="911880" cy="343800"/>
+            <a:ext cx="911520" cy="343440"/>
           </a:xfrm>
           <a:prstGeom prst="rect">
             <a:avLst/>
@@ -19265,7 +19238,7 @@
         <p:spPr>
           <a:xfrm>
             <a:off x="2057400" y="2132280"/>
-            <a:ext cx="1621800" cy="303120"/>
+            <a:ext cx="1621440" cy="303120"/>
           </a:xfrm>
           <a:prstGeom prst="rect">
             <a:avLst/>
@@ -19322,7 +19295,7 @@
         <p:spPr>
           <a:xfrm>
             <a:off x="2057400" y="2393640"/>
-            <a:ext cx="1621800" cy="193320"/>
+            <a:ext cx="1621440" cy="192960"/>
           </a:xfrm>
           <a:prstGeom prst="rect">
             <a:avLst/>
@@ -19370,7 +19343,7 @@
         <p:spPr>
           <a:xfrm>
             <a:off x="2613960" y="1217880"/>
-            <a:ext cx="478080" cy="383040"/>
+            <a:ext cx="477720" cy="382680"/>
           </a:xfrm>
           <a:prstGeom prst="triangle">
             <a:avLst>
@@ -19439,8 +19412,8 @@
         </p:nvCxnSpPr>
         <p:spPr>
           <a:xfrm>
-            <a:off x="2853000" y="1600920"/>
-            <a:ext cx="15480" cy="531720"/>
+            <a:off x="2853000" y="1600560"/>
+            <a:ext cx="15480" cy="532080"/>
           </a:xfrm>
           <a:prstGeom prst="straightConnector1">
             <a:avLst/>
@@ -19489,8 +19462,8 @@
         </p:nvCxnSpPr>
         <p:spPr>
           <a:xfrm>
-            <a:off x="7571160" y="4921920"/>
-            <a:ext cx="102240" cy="261720"/>
+            <a:off x="7571160" y="4921560"/>
+            <a:ext cx="102240" cy="262080"/>
           </a:xfrm>
           <a:prstGeom prst="straightConnector1">
             <a:avLst/>
@@ -19515,8 +19488,8 @@
         </p:nvCxnSpPr>
         <p:spPr>
           <a:xfrm>
-            <a:off x="7673040" y="5566320"/>
-            <a:ext cx="227880" cy="149040"/>
+            <a:off x="7673040" y="5565960"/>
+            <a:ext cx="227880" cy="149400"/>
           </a:xfrm>
           <a:prstGeom prst="straightConnector1">
             <a:avLst/>
@@ -19538,9 +19511,9 @@
         <p:grpSpPr>
           <a:xfrm>
             <a:off x="10265040" y="5029200"/>
-            <a:ext cx="1621800" cy="562320"/>
+            <a:ext cx="1621440" cy="561960"/>
             <a:chOff x="10265040" y="5029200"/>
-            <a:chExt cx="1621800" cy="562320"/>
+            <a:chExt cx="1621440" cy="561960"/>
           </a:xfrm>
         </p:grpSpPr>
         <p:sp>
@@ -19552,7 +19525,7 @@
           <p:spPr>
             <a:xfrm>
               <a:off x="10265040" y="5029200"/>
-              <a:ext cx="1621800" cy="303120"/>
+              <a:ext cx="1621440" cy="303120"/>
             </a:xfrm>
             <a:prstGeom prst="rect">
               <a:avLst/>
@@ -19609,7 +19582,7 @@
           <p:spPr>
             <a:xfrm>
               <a:off x="10265040" y="5290560"/>
-              <a:ext cx="1621800" cy="300960"/>
+              <a:ext cx="1621440" cy="300600"/>
             </a:xfrm>
             <a:prstGeom prst="rect">
               <a:avLst/>
@@ -19660,8 +19633,8 @@
         </p:nvCxnSpPr>
         <p:spPr>
           <a:xfrm flipH="1" flipV="1">
-            <a:off x="9699480" y="4112280"/>
-            <a:ext cx="1376640" cy="917280"/>
+            <a:off x="9699120" y="4111920"/>
+            <a:ext cx="1377000" cy="917640"/>
           </a:xfrm>
           <a:prstGeom prst="straightConnector1">
             <a:avLst/>
@@ -19683,9 +19656,9 @@
         <p:grpSpPr>
           <a:xfrm>
             <a:off x="9122040" y="4343400"/>
-            <a:ext cx="1621800" cy="562320"/>
+            <a:ext cx="1621440" cy="561960"/>
             <a:chOff x="9122040" y="4343400"/>
-            <a:chExt cx="1621800" cy="562320"/>
+            <a:chExt cx="1621440" cy="561960"/>
           </a:xfrm>
         </p:grpSpPr>
         <p:sp>
@@ -19697,7 +19670,7 @@
           <p:spPr>
             <a:xfrm>
               <a:off x="9122040" y="4343400"/>
-              <a:ext cx="1621800" cy="303120"/>
+              <a:ext cx="1621440" cy="303120"/>
             </a:xfrm>
             <a:prstGeom prst="rect">
               <a:avLst/>
@@ -19754,7 +19727,7 @@
           <p:spPr>
             <a:xfrm>
               <a:off x="9122040" y="4604760"/>
-              <a:ext cx="1621800" cy="300960"/>
+              <a:ext cx="1621440" cy="300600"/>
             </a:xfrm>
             <a:prstGeom prst="rect">
               <a:avLst/>
@@ -19803,7 +19776,7 @@
         <p:spPr>
           <a:xfrm>
             <a:off x="10037520" y="2131560"/>
-            <a:ext cx="478080" cy="383040"/>
+            <a:ext cx="477720" cy="382680"/>
           </a:xfrm>
           <a:prstGeom prst="triangle">
             <a:avLst>
@@ -19895,9 +19868,9 @@
         <p:grpSpPr>
           <a:xfrm>
             <a:off x="10494000" y="2866680"/>
-            <a:ext cx="1621800" cy="562320"/>
+            <a:ext cx="1621440" cy="561960"/>
             <a:chOff x="10494000" y="2866680"/>
-            <a:chExt cx="1621800" cy="562320"/>
+            <a:chExt cx="1621440" cy="561960"/>
           </a:xfrm>
         </p:grpSpPr>
         <p:sp>
@@ -19909,7 +19882,7 @@
           <p:spPr>
             <a:xfrm>
               <a:off x="10494000" y="2866680"/>
-              <a:ext cx="1621800" cy="303120"/>
+              <a:ext cx="1621440" cy="303120"/>
             </a:xfrm>
             <a:prstGeom prst="rect">
               <a:avLst/>
@@ -19966,7 +19939,7 @@
           <p:spPr>
             <a:xfrm>
               <a:off x="10494000" y="3128040"/>
-              <a:ext cx="1621800" cy="300960"/>
+              <a:ext cx="1621440" cy="300600"/>
             </a:xfrm>
             <a:prstGeom prst="rect">
               <a:avLst/>
@@ -19991,6 +19964,11 @@
               <a:spAutoFit/>
             </a:bodyPr>
             <a:p>
+              <a:pPr>
+                <a:lnSpc>
+                  <a:spcPct val="100000"/>
+                </a:lnSpc>
+              </a:pPr>
               <a:endParaRPr b="0" lang="en-US" sz="1800" spc="-1" strike="noStrike">
                 <a:solidFill>
                   <a:srgbClr val="000000"/>
@@ -20012,8 +19990,8 @@
         </p:nvCxnSpPr>
         <p:spPr>
           <a:xfrm>
-            <a:off x="10276560" y="2514600"/>
-            <a:ext cx="1028520" cy="352440"/>
+            <a:off x="10276560" y="2514240"/>
+            <a:ext cx="1028520" cy="352800"/>
           </a:xfrm>
           <a:prstGeom prst="straightConnector1">
             <a:avLst/>
@@ -20065,7 +20043,7 @@
         <p:spPr>
           <a:xfrm flipH="1">
             <a:off x="0" y="3073320"/>
-            <a:ext cx="1833480" cy="4680"/>
+            <a:ext cx="1833840" cy="5040"/>
           </a:xfrm>
           <a:prstGeom prst="straightConnector1">
             <a:avLst/>
@@ -20088,7 +20066,7 @@
         <p:spPr>
           <a:xfrm>
             <a:off x="0" y="2489400"/>
-            <a:ext cx="1833480" cy="4680"/>
+            <a:ext cx="1833840" cy="5040"/>
           </a:xfrm>
           <a:prstGeom prst="straightConnector1">
             <a:avLst/>
@@ -20111,7 +20089,7 @@
         <p:spPr>
           <a:xfrm>
             <a:off x="0" y="2781360"/>
-            <a:ext cx="1833480" cy="4680"/>
+            <a:ext cx="1833840" cy="5040"/>
           </a:xfrm>
           <a:prstGeom prst="straightConnector1">
             <a:avLst/>
@@ -20134,7 +20112,7 @@
         <p:spPr>
           <a:xfrm flipH="1">
             <a:off x="0" y="3657600"/>
-            <a:ext cx="1833480" cy="4680"/>
+            <a:ext cx="1833840" cy="5040"/>
           </a:xfrm>
           <a:prstGeom prst="straightConnector1">
             <a:avLst/>
@@ -20156,7 +20134,7 @@
         <p:spPr>
           <a:xfrm>
             <a:off x="128520" y="6134040"/>
-            <a:ext cx="1567080" cy="383040"/>
+            <a:ext cx="1566720" cy="382680"/>
           </a:xfrm>
           <a:prstGeom prst="diamond">
             <a:avLst/>
@@ -20221,7 +20199,7 @@
         <p:spPr>
           <a:xfrm>
             <a:off x="302760" y="5454000"/>
-            <a:ext cx="1218600" cy="383040"/>
+            <a:ext cx="1218240" cy="382680"/>
           </a:xfrm>
           <a:prstGeom prst="ellipse">
             <a:avLst/>
@@ -20284,7 +20262,7 @@
         <p:spPr>
           <a:xfrm>
             <a:off x="101160" y="336240"/>
-            <a:ext cx="1621800" cy="303120"/>
+            <a:ext cx="1621440" cy="303120"/>
           </a:xfrm>
           <a:prstGeom prst="rect">
             <a:avLst/>
@@ -20341,7 +20319,7 @@
         <p:spPr>
           <a:xfrm>
             <a:off x="101160" y="597600"/>
-            <a:ext cx="1621800" cy="516600"/>
+            <a:ext cx="1621440" cy="516600"/>
           </a:xfrm>
           <a:prstGeom prst="rect">
             <a:avLst/>
@@ -20431,7 +20409,7 @@
         <p:spPr>
           <a:xfrm>
             <a:off x="8458200" y="5486400"/>
-            <a:ext cx="1621800" cy="303120"/>
+            <a:ext cx="1621440" cy="303120"/>
           </a:xfrm>
           <a:prstGeom prst="rect">
             <a:avLst/>
@@ -20488,7 +20466,7 @@
         <p:spPr>
           <a:xfrm>
             <a:off x="128520" y="4629600"/>
-            <a:ext cx="1567080" cy="527760"/>
+            <a:ext cx="1566720" cy="527400"/>
           </a:xfrm>
           <a:prstGeom prst="diamond">
             <a:avLst/>
@@ -20576,7 +20554,7 @@
         <p:spPr>
           <a:xfrm>
             <a:off x="0" y="3365640"/>
-            <a:ext cx="1833480" cy="4680"/>
+            <a:ext cx="1833840" cy="5040"/>
           </a:xfrm>
           <a:prstGeom prst="straightConnector1">
             <a:avLst/>
@@ -20598,7 +20576,7 @@
         <p:spPr>
           <a:xfrm>
             <a:off x="673200" y="3949920"/>
-            <a:ext cx="478080" cy="383040"/>
+            <a:ext cx="477720" cy="382680"/>
           </a:xfrm>
           <a:prstGeom prst="triangle">
             <a:avLst>
@@ -20665,9 +20643,9 @@
         <p:grpSpPr>
           <a:xfrm>
             <a:off x="101160" y="1413000"/>
-            <a:ext cx="1621800" cy="777960"/>
+            <a:ext cx="1621440" cy="777960"/>
             <a:chOff x="101160" y="1413000"/>
-            <a:chExt cx="1621800" cy="777960"/>
+            <a:chExt cx="1621440" cy="777960"/>
           </a:xfrm>
         </p:grpSpPr>
         <p:sp>
@@ -20679,7 +20657,7 @@
           <p:spPr>
             <a:xfrm>
               <a:off x="101160" y="1413000"/>
-              <a:ext cx="1621800" cy="303120"/>
+              <a:ext cx="1621440" cy="303120"/>
             </a:xfrm>
             <a:prstGeom prst="rect">
               <a:avLst/>
@@ -20737,7 +20715,7 @@
           <p:spPr>
             <a:xfrm>
               <a:off x="101160" y="1674360"/>
-              <a:ext cx="1621800" cy="516600"/>
+              <a:ext cx="1621440" cy="516600"/>
             </a:xfrm>
             <a:prstGeom prst="rect">
               <a:avLst/>
@@ -20829,7 +20807,7 @@
         <p:spPr>
           <a:xfrm>
             <a:off x="5463360" y="2131920"/>
-            <a:ext cx="1621800" cy="303120"/>
+            <a:ext cx="1621440" cy="303120"/>
           </a:xfrm>
           <a:prstGeom prst="rect">
             <a:avLst/>
@@ -20892,7 +20870,7 @@
         <p:spPr>
           <a:xfrm>
             <a:off x="5463360" y="1828800"/>
-            <a:ext cx="1621800" cy="303120"/>
+            <a:ext cx="1621440" cy="303120"/>
           </a:xfrm>
           <a:prstGeom prst="rect">
             <a:avLst/>
@@ -20949,9 +20927,9 @@
         <p:grpSpPr>
           <a:xfrm>
             <a:off x="4296600" y="4022640"/>
-            <a:ext cx="1621800" cy="777960"/>
+            <a:ext cx="1621440" cy="777960"/>
             <a:chOff x="4296600" y="4022640"/>
-            <a:chExt cx="1621800" cy="777960"/>
+            <a:chExt cx="1621440" cy="777960"/>
           </a:xfrm>
         </p:grpSpPr>
         <p:sp>
@@ -20963,7 +20941,7 @@
           <p:spPr>
             <a:xfrm>
               <a:off x="4296600" y="4022640"/>
-              <a:ext cx="1621800" cy="303120"/>
+              <a:ext cx="1621440" cy="303120"/>
             </a:xfrm>
             <a:prstGeom prst="rect">
               <a:avLst/>
@@ -21020,7 +20998,7 @@
           <p:spPr>
             <a:xfrm>
               <a:off x="4296600" y="4284000"/>
-              <a:ext cx="1621800" cy="516600"/>
+              <a:ext cx="1621440" cy="516600"/>
             </a:xfrm>
             <a:prstGeom prst="rect">
               <a:avLst/>
@@ -21111,9 +21089,9 @@
         <p:grpSpPr>
           <a:xfrm>
             <a:off x="9348840" y="2254320"/>
-            <a:ext cx="1621800" cy="1631880"/>
+            <a:ext cx="1621440" cy="1631880"/>
             <a:chOff x="9348840" y="2254320"/>
-            <a:chExt cx="1621800" cy="1631880"/>
+            <a:chExt cx="1621440" cy="1631880"/>
           </a:xfrm>
         </p:grpSpPr>
         <p:sp>
@@ -21125,7 +21103,7 @@
           <p:spPr>
             <a:xfrm>
               <a:off x="9348840" y="2254320"/>
-              <a:ext cx="1621800" cy="303120"/>
+              <a:ext cx="1621440" cy="303120"/>
             </a:xfrm>
             <a:prstGeom prst="rect">
               <a:avLst/>
@@ -21182,7 +21160,7 @@
           <p:spPr>
             <a:xfrm>
               <a:off x="9348840" y="2515680"/>
-              <a:ext cx="1621800" cy="1370520"/>
+              <a:ext cx="1621440" cy="1370520"/>
             </a:xfrm>
             <a:prstGeom prst="rect">
               <a:avLst/>
@@ -21381,7 +21359,7 @@
         <p:spPr>
           <a:xfrm>
             <a:off x="9402120" y="4572000"/>
-            <a:ext cx="1567080" cy="383040"/>
+            <a:ext cx="1566720" cy="382680"/>
           </a:xfrm>
           <a:prstGeom prst="diamond">
             <a:avLst/>
@@ -21446,7 +21424,7 @@
         <p:spPr>
           <a:xfrm>
             <a:off x="7007400" y="4572000"/>
-            <a:ext cx="1675800" cy="383040"/>
+            <a:ext cx="1675440" cy="382680"/>
           </a:xfrm>
           <a:prstGeom prst="ellipse">
             <a:avLst/>
@@ -21509,9 +21487,9 @@
         <p:grpSpPr>
           <a:xfrm>
             <a:off x="9348840" y="2254320"/>
-            <a:ext cx="1621800" cy="1631880"/>
+            <a:ext cx="1621440" cy="1631880"/>
             <a:chOff x="9348840" y="2254320"/>
-            <a:chExt cx="1621800" cy="1631880"/>
+            <a:chExt cx="1621440" cy="1631880"/>
           </a:xfrm>
         </p:grpSpPr>
         <p:sp>
@@ -21523,7 +21501,7 @@
           <p:spPr>
             <a:xfrm>
               <a:off x="9348840" y="2254320"/>
-              <a:ext cx="1621800" cy="303120"/>
+              <a:ext cx="1621440" cy="303120"/>
             </a:xfrm>
             <a:prstGeom prst="rect">
               <a:avLst/>
@@ -21580,7 +21558,7 @@
           <p:spPr>
             <a:xfrm>
               <a:off x="9348840" y="2515680"/>
-              <a:ext cx="1621800" cy="1370520"/>
+              <a:ext cx="1621440" cy="1370520"/>
             </a:xfrm>
             <a:prstGeom prst="rect">
               <a:avLst/>
@@ -21779,9 +21757,9 @@
         <p:grpSpPr>
           <a:xfrm>
             <a:off x="9348840" y="2254320"/>
-            <a:ext cx="1621800" cy="1845360"/>
+            <a:ext cx="1621440" cy="1845360"/>
             <a:chOff x="9348840" y="2254320"/>
-            <a:chExt cx="1621800" cy="1845360"/>
+            <a:chExt cx="1621440" cy="1845360"/>
           </a:xfrm>
         </p:grpSpPr>
         <p:sp>
@@ -21793,7 +21771,7 @@
           <p:spPr>
             <a:xfrm>
               <a:off x="9348840" y="2254320"/>
-              <a:ext cx="1621800" cy="303120"/>
+              <a:ext cx="1621440" cy="303120"/>
             </a:xfrm>
             <a:prstGeom prst="rect">
               <a:avLst/>
@@ -21850,7 +21828,7 @@
           <p:spPr>
             <a:xfrm>
               <a:off x="9348840" y="2515680"/>
-              <a:ext cx="1621800" cy="1584000"/>
+              <a:ext cx="1621440" cy="1584000"/>
             </a:xfrm>
             <a:prstGeom prst="rect">
               <a:avLst/>
@@ -22076,7 +22054,7 @@
         <p:spPr>
           <a:xfrm>
             <a:off x="7086600" y="3501720"/>
-            <a:ext cx="1825200" cy="383040"/>
+            <a:ext cx="1824840" cy="382680"/>
           </a:xfrm>
           <a:prstGeom prst="diamond">
             <a:avLst/>
@@ -22141,7 +22119,7 @@
         <p:spPr>
           <a:xfrm>
             <a:off x="7543800" y="1869840"/>
-            <a:ext cx="1795680" cy="383040"/>
+            <a:ext cx="1795320" cy="382680"/>
           </a:xfrm>
           <a:prstGeom prst="diamond">
             <a:avLst/>
@@ -22208,8 +22186,8 @@
         </p:nvCxnSpPr>
         <p:spPr>
           <a:xfrm flipV="1">
-            <a:off x="7085160" y="2061360"/>
-            <a:ext cx="459000" cy="222480"/>
+            <a:off x="7084800" y="2061360"/>
+            <a:ext cx="459360" cy="222480"/>
           </a:xfrm>
           <a:prstGeom prst="straightConnector1">
             <a:avLst/>
@@ -22234,8 +22212,8 @@
         </p:nvCxnSpPr>
         <p:spPr>
           <a:xfrm flipH="1">
-            <a:off x="9268920" y="4955040"/>
-            <a:ext cx="917280" cy="531720"/>
+            <a:off x="9268920" y="4954680"/>
+            <a:ext cx="916920" cy="532080"/>
           </a:xfrm>
           <a:prstGeom prst="straightConnector1">
             <a:avLst/>
@@ -22260,7 +22238,7 @@
         <p:spPr>
           <a:xfrm>
             <a:off x="10159560" y="4099680"/>
-            <a:ext cx="26640" cy="472680"/>
+            <a:ext cx="26280" cy="472680"/>
           </a:xfrm>
           <a:prstGeom prst="straightConnector1">
             <a:avLst/>
@@ -22284,8 +22262,8 @@
         </p:nvCxnSpPr>
         <p:spPr>
           <a:xfrm flipH="1">
-            <a:off x="8683200" y="4763520"/>
-            <a:ext cx="719280" cy="360"/>
+            <a:off x="8682840" y="4763520"/>
+            <a:ext cx="719640" cy="360"/>
           </a:xfrm>
           <a:prstGeom prst="straightConnector1">
             <a:avLst/>
@@ -22307,7 +22285,7 @@
         <p:spPr>
           <a:xfrm>
             <a:off x="6629400" y="5099760"/>
-            <a:ext cx="1596600" cy="383040"/>
+            <a:ext cx="1596240" cy="382680"/>
           </a:xfrm>
           <a:prstGeom prst="ellipse">
             <a:avLst/>
@@ -22372,8 +22350,8 @@
         </p:nvCxnSpPr>
         <p:spPr>
           <a:xfrm flipH="1">
-            <a:off x="8226000" y="4763520"/>
-            <a:ext cx="1176480" cy="528120"/>
+            <a:off x="8225640" y="4763520"/>
+            <a:ext cx="1176840" cy="528120"/>
           </a:xfrm>
           <a:prstGeom prst="straightConnector1">
             <a:avLst/>
@@ -22397,8 +22375,8 @@
         </p:nvCxnSpPr>
         <p:spPr>
           <a:xfrm flipH="1">
-            <a:off x="3630960" y="2549520"/>
-            <a:ext cx="3960" cy="457560"/>
+            <a:off x="3630600" y="2549520"/>
+            <a:ext cx="4320" cy="457560"/>
           </a:xfrm>
           <a:prstGeom prst="straightConnector1">
             <a:avLst/>
@@ -22420,7 +22398,7 @@
         <p:spPr>
           <a:xfrm>
             <a:off x="5234760" y="2815200"/>
-            <a:ext cx="1567080" cy="383040"/>
+            <a:ext cx="1566720" cy="382680"/>
           </a:xfrm>
           <a:prstGeom prst="diamond">
             <a:avLst/>
@@ -22485,7 +22463,7 @@
         <p:spPr>
           <a:xfrm>
             <a:off x="3634560" y="2358000"/>
-            <a:ext cx="1567080" cy="383040"/>
+            <a:ext cx="1566720" cy="382680"/>
           </a:xfrm>
           <a:prstGeom prst="diamond">
             <a:avLst/>
@@ -22550,7 +22528,7 @@
         <p:spPr>
           <a:xfrm>
             <a:off x="2034360" y="2815200"/>
-            <a:ext cx="1596600" cy="383040"/>
+            <a:ext cx="1596240" cy="382680"/>
           </a:xfrm>
           <a:prstGeom prst="ellipse">
             <a:avLst/>
@@ -22615,8 +22593,8 @@
         </p:nvCxnSpPr>
         <p:spPr>
           <a:xfrm flipH="1" flipV="1">
-            <a:off x="4418280" y="2741040"/>
-            <a:ext cx="689400" cy="1281960"/>
+            <a:off x="4417920" y="2740680"/>
+            <a:ext cx="689760" cy="1282320"/>
           </a:xfrm>
           <a:prstGeom prst="straightConnector1">
             <a:avLst/>
@@ -22641,8 +22619,8 @@
         </p:nvCxnSpPr>
         <p:spPr>
           <a:xfrm flipH="1">
-            <a:off x="4418280" y="1980360"/>
-            <a:ext cx="1045440" cy="378000"/>
+            <a:off x="4417920" y="1980360"/>
+            <a:ext cx="1045800" cy="378000"/>
           </a:xfrm>
           <a:prstGeom prst="straightConnector1">
             <a:avLst/>
@@ -22666,8 +22644,8 @@
         </p:nvCxnSpPr>
         <p:spPr>
           <a:xfrm flipV="1">
-            <a:off x="5107320" y="3198240"/>
-            <a:ext cx="911520" cy="824760"/>
+            <a:off x="5107320" y="3197880"/>
+            <a:ext cx="911160" cy="825120"/>
           </a:xfrm>
           <a:prstGeom prst="straightConnector1">
             <a:avLst/>
@@ -22692,8 +22670,8 @@
         </p:nvCxnSpPr>
         <p:spPr>
           <a:xfrm flipV="1">
-            <a:off x="6018480" y="2435040"/>
-            <a:ext cx="255960" cy="380520"/>
+            <a:off x="6018120" y="2435040"/>
+            <a:ext cx="256320" cy="380520"/>
           </a:xfrm>
           <a:prstGeom prst="straightConnector1">
             <a:avLst/>
@@ -22717,8 +22695,8 @@
         </p:nvCxnSpPr>
         <p:spPr>
           <a:xfrm flipV="1">
-            <a:off x="5918400" y="3693240"/>
-            <a:ext cx="1168560" cy="718560"/>
+            <a:off x="5918040" y="3693240"/>
+            <a:ext cx="1168920" cy="718560"/>
           </a:xfrm>
           <a:prstGeom prst="straightConnector1">
             <a:avLst/>
@@ -22743,8 +22721,8 @@
         </p:nvCxnSpPr>
         <p:spPr>
           <a:xfrm flipH="1">
-            <a:off x="8911800" y="3177000"/>
-            <a:ext cx="437400" cy="516600"/>
+            <a:off x="8911440" y="3177000"/>
+            <a:ext cx="437760" cy="516600"/>
           </a:xfrm>
           <a:prstGeom prst="straightConnector1">
             <a:avLst/>
@@ -22768,8 +22746,8 @@
         </p:nvCxnSpPr>
         <p:spPr>
           <a:xfrm flipH="1" flipV="1">
-            <a:off x="9339480" y="2061360"/>
-            <a:ext cx="820440" cy="193320"/>
+            <a:off x="9339120" y="2061360"/>
+            <a:ext cx="820800" cy="193320"/>
           </a:xfrm>
           <a:prstGeom prst="straightConnector1">
             <a:avLst/>
@@ -22791,7 +22769,7 @@
         <p:spPr>
           <a:xfrm>
             <a:off x="2722320" y="5330520"/>
-            <a:ext cx="1825200" cy="383040"/>
+            <a:ext cx="1824840" cy="382680"/>
           </a:xfrm>
           <a:prstGeom prst="diamond">
             <a:avLst/>
@@ -22883,8 +22861,8 @@
         </p:nvCxnSpPr>
         <p:spPr>
           <a:xfrm flipH="1">
-            <a:off x="4547520" y="4800600"/>
-            <a:ext cx="560160" cy="721800"/>
+            <a:off x="4547160" y="4800600"/>
+            <a:ext cx="560520" cy="721800"/>
           </a:xfrm>
           <a:prstGeom prst="straightConnector1">
             <a:avLst/>
@@ -22906,7 +22884,7 @@
         <p:spPr>
           <a:xfrm>
             <a:off x="7315200" y="4114800"/>
-            <a:ext cx="1675800" cy="383040"/>
+            <a:ext cx="1675440" cy="382680"/>
           </a:xfrm>
           <a:prstGeom prst="ellipse">
             <a:avLst/>
@@ -22971,8 +22949,8 @@
         </p:nvCxnSpPr>
         <p:spPr>
           <a:xfrm flipH="1" flipV="1">
-            <a:off x="8991000" y="4306320"/>
-            <a:ext cx="411480" cy="457560"/>
+            <a:off x="8990640" y="4306320"/>
+            <a:ext cx="411840" cy="457560"/>
           </a:xfrm>
           <a:prstGeom prst="straightConnector1">
             <a:avLst/>
@@ -23024,7 +23002,7 @@
         <p:spPr>
           <a:xfrm flipH="1">
             <a:off x="0" y="3073320"/>
-            <a:ext cx="1833480" cy="4680"/>
+            <a:ext cx="1833840" cy="5040"/>
           </a:xfrm>
           <a:prstGeom prst="straightConnector1">
             <a:avLst/>
@@ -23047,7 +23025,7 @@
         <p:spPr>
           <a:xfrm>
             <a:off x="0" y="2489400"/>
-            <a:ext cx="1833480" cy="4680"/>
+            <a:ext cx="1833840" cy="5040"/>
           </a:xfrm>
           <a:prstGeom prst="straightConnector1">
             <a:avLst/>
@@ -23070,7 +23048,7 @@
         <p:spPr>
           <a:xfrm>
             <a:off x="0" y="2781360"/>
-            <a:ext cx="1833480" cy="4680"/>
+            <a:ext cx="1833840" cy="5040"/>
           </a:xfrm>
           <a:prstGeom prst="straightConnector1">
             <a:avLst/>
@@ -23093,7 +23071,7 @@
         <p:spPr>
           <a:xfrm flipH="1">
             <a:off x="0" y="3657600"/>
-            <a:ext cx="1833480" cy="4680"/>
+            <a:ext cx="1833840" cy="5040"/>
           </a:xfrm>
           <a:prstGeom prst="straightConnector1">
             <a:avLst/>
@@ -23115,7 +23093,7 @@
         <p:spPr>
           <a:xfrm>
             <a:off x="128520" y="6134040"/>
-            <a:ext cx="1567080" cy="383040"/>
+            <a:ext cx="1566720" cy="382680"/>
           </a:xfrm>
           <a:prstGeom prst="diamond">
             <a:avLst/>
@@ -23180,7 +23158,7 @@
         <p:spPr>
           <a:xfrm>
             <a:off x="302760" y="5454000"/>
-            <a:ext cx="1218600" cy="383040"/>
+            <a:ext cx="1218240" cy="382680"/>
           </a:xfrm>
           <a:prstGeom prst="ellipse">
             <a:avLst/>
@@ -23243,9 +23221,9 @@
         <p:grpSpPr>
           <a:xfrm>
             <a:off x="101160" y="336240"/>
-            <a:ext cx="1621800" cy="777960"/>
+            <a:ext cx="1621440" cy="777960"/>
             <a:chOff x="101160" y="336240"/>
-            <a:chExt cx="1621800" cy="777960"/>
+            <a:chExt cx="1621440" cy="777960"/>
           </a:xfrm>
         </p:grpSpPr>
         <p:sp>
@@ -23257,7 +23235,7 @@
           <p:spPr>
             <a:xfrm>
               <a:off x="101160" y="336240"/>
-              <a:ext cx="1621800" cy="303120"/>
+              <a:ext cx="1621440" cy="303120"/>
             </a:xfrm>
             <a:prstGeom prst="rect">
               <a:avLst/>
@@ -23314,7 +23292,7 @@
           <p:spPr>
             <a:xfrm>
               <a:off x="101160" y="597600"/>
-              <a:ext cx="1621800" cy="516600"/>
+              <a:ext cx="1621440" cy="516600"/>
             </a:xfrm>
             <a:prstGeom prst="rect">
               <a:avLst/>
@@ -23405,7 +23383,7 @@
         <p:spPr>
           <a:xfrm>
             <a:off x="128520" y="4629600"/>
-            <a:ext cx="1567080" cy="527760"/>
+            <a:ext cx="1566720" cy="527400"/>
           </a:xfrm>
           <a:prstGeom prst="diamond">
             <a:avLst/>
@@ -23493,7 +23471,7 @@
         <p:spPr>
           <a:xfrm>
             <a:off x="0" y="3365640"/>
-            <a:ext cx="1833480" cy="4680"/>
+            <a:ext cx="1833840" cy="5040"/>
           </a:xfrm>
           <a:prstGeom prst="straightConnector1">
             <a:avLst/>
@@ -23515,7 +23493,7 @@
         <p:spPr>
           <a:xfrm>
             <a:off x="673200" y="3949920"/>
-            <a:ext cx="478080" cy="383040"/>
+            <a:ext cx="477720" cy="382680"/>
           </a:xfrm>
           <a:prstGeom prst="triangle">
             <a:avLst>
@@ -23582,9 +23560,9 @@
         <p:grpSpPr>
           <a:xfrm>
             <a:off x="101160" y="1413000"/>
-            <a:ext cx="1621800" cy="777960"/>
+            <a:ext cx="1621440" cy="777960"/>
             <a:chOff x="101160" y="1413000"/>
-            <a:chExt cx="1621800" cy="777960"/>
+            <a:chExt cx="1621440" cy="777960"/>
           </a:xfrm>
         </p:grpSpPr>
         <p:sp>
@@ -23596,7 +23574,7 @@
           <p:spPr>
             <a:xfrm>
               <a:off x="101160" y="1413000"/>
-              <a:ext cx="1621800" cy="303120"/>
+              <a:ext cx="1621440" cy="303120"/>
             </a:xfrm>
             <a:prstGeom prst="rect">
               <a:avLst/>
@@ -23654,7 +23632,7 @@
           <p:spPr>
             <a:xfrm>
               <a:off x="101160" y="1674360"/>
-              <a:ext cx="1621800" cy="516600"/>
+              <a:ext cx="1621440" cy="516600"/>
             </a:xfrm>
             <a:prstGeom prst="rect">
               <a:avLst/>

</xml_diff>

<commit_message>
Fully documented spoken explanation of database & related game mechanics
</commit_message>
<xml_diff>
--- a/documentation/include/ER-Diagram.pptx
+++ b/documentation/include/ER-Diagram.pptx
@@ -353,7 +353,7 @@
             <a:pPr indent="0" algn="r">
               <a:buNone/>
             </a:pPr>
-            <a:fld id="{C016BF43-2EEE-48E5-99AB-B483D340BFD1}" type="slidenum">
+            <a:fld id="{99128869-68AA-4564-A7C8-F1E51C93CBC2}" type="slidenum">
               <a:rPr b="0" lang="en-US" sz="1400" spc="-1" strike="noStrike">
                 <a:solidFill>
                   <a:srgbClr val="000000"/>
@@ -407,7 +407,7 @@
         <p:spPr>
           <a:xfrm>
             <a:off x="685800" y="1143000"/>
-            <a:ext cx="5481360" cy="3081240"/>
+            <a:ext cx="5481000" cy="3080880"/>
           </a:xfrm>
           <a:prstGeom prst="rect">
             <a:avLst/>
@@ -430,7 +430,7 @@
         <p:spPr>
           <a:xfrm>
             <a:off x="685800" y="4400640"/>
-            <a:ext cx="5481360" cy="3595320"/>
+            <a:ext cx="5481000" cy="3594960"/>
           </a:xfrm>
           <a:prstGeom prst="rect">
             <a:avLst/>
@@ -470,7 +470,7 @@
         <p:spPr>
           <a:xfrm>
             <a:off x="3884760" y="8685360"/>
-            <a:ext cx="2966760" cy="453600"/>
+            <a:ext cx="2966400" cy="453240"/>
           </a:xfrm>
           <a:prstGeom prst="rect">
             <a:avLst/>
@@ -512,7 +512,7 @@
                 <a:tab algn="l" pos="0"/>
               </a:tabLst>
             </a:pPr>
-            <a:fld id="{5C4AE3F0-D07F-4910-9492-D5B4073CCB6A}" type="slidenum">
+            <a:fld id="{C702C4A5-78C1-4E06-AFD4-942A19007132}" type="slidenum">
               <a:rPr b="0" lang="en-US" sz="1200" spc="-1" strike="noStrike">
                 <a:solidFill>
                   <a:schemeClr val="dk1"/>
@@ -566,7 +566,7 @@
         <p:spPr>
           <a:xfrm>
             <a:off x="685800" y="1143000"/>
-            <a:ext cx="5481360" cy="3081240"/>
+            <a:ext cx="5481000" cy="3080880"/>
           </a:xfrm>
           <a:prstGeom prst="rect">
             <a:avLst/>
@@ -589,7 +589,7 @@
         <p:spPr>
           <a:xfrm>
             <a:off x="685800" y="4400640"/>
-            <a:ext cx="5481360" cy="3595320"/>
+            <a:ext cx="5481000" cy="3594960"/>
           </a:xfrm>
           <a:prstGeom prst="rect">
             <a:avLst/>
@@ -629,7 +629,7 @@
         <p:spPr>
           <a:xfrm>
             <a:off x="3884760" y="8685360"/>
-            <a:ext cx="2966760" cy="453600"/>
+            <a:ext cx="2966400" cy="453240"/>
           </a:xfrm>
           <a:prstGeom prst="rect">
             <a:avLst/>
@@ -671,7 +671,7 @@
                 <a:tab algn="l" pos="0"/>
               </a:tabLst>
             </a:pPr>
-            <a:fld id="{EFCEC852-A440-4866-B644-B8F174F5A7D8}" type="slidenum">
+            <a:fld id="{D8E56EAC-A97D-4254-B445-311C359AA666}" type="slidenum">
               <a:rPr b="0" lang="en-US" sz="1200" spc="-1" strike="noStrike">
                 <a:solidFill>
                   <a:schemeClr val="dk1"/>
@@ -725,7 +725,7 @@
         <p:spPr>
           <a:xfrm>
             <a:off x="685800" y="1143000"/>
-            <a:ext cx="5481360" cy="3081240"/>
+            <a:ext cx="5481000" cy="3080880"/>
           </a:xfrm>
           <a:prstGeom prst="rect">
             <a:avLst/>
@@ -748,7 +748,7 @@
         <p:spPr>
           <a:xfrm>
             <a:off x="685800" y="4400640"/>
-            <a:ext cx="5481360" cy="3595320"/>
+            <a:ext cx="5481000" cy="3594960"/>
           </a:xfrm>
           <a:prstGeom prst="rect">
             <a:avLst/>
@@ -788,7 +788,7 @@
         <p:spPr>
           <a:xfrm>
             <a:off x="3884760" y="8685360"/>
-            <a:ext cx="2966760" cy="453600"/>
+            <a:ext cx="2966400" cy="453240"/>
           </a:xfrm>
           <a:prstGeom prst="rect">
             <a:avLst/>
@@ -830,7 +830,7 @@
                 <a:tab algn="l" pos="0"/>
               </a:tabLst>
             </a:pPr>
-            <a:fld id="{54CCA559-2012-41B0-B2B1-6B8C04DFC51A}" type="slidenum">
+            <a:fld id="{DD8569F6-CD42-421F-A95B-37DF2BA2574C}" type="slidenum">
               <a:rPr b="0" lang="en-US" sz="1200" spc="-1" strike="noStrike">
                 <a:solidFill>
                   <a:schemeClr val="dk1"/>
@@ -884,7 +884,7 @@
         <p:spPr>
           <a:xfrm>
             <a:off x="685800" y="1143000"/>
-            <a:ext cx="5481360" cy="3081240"/>
+            <a:ext cx="5481000" cy="3080880"/>
           </a:xfrm>
           <a:prstGeom prst="rect">
             <a:avLst/>
@@ -907,7 +907,7 @@
         <p:spPr>
           <a:xfrm>
             <a:off x="685800" y="4400640"/>
-            <a:ext cx="5481360" cy="3595320"/>
+            <a:ext cx="5481000" cy="3594960"/>
           </a:xfrm>
           <a:prstGeom prst="rect">
             <a:avLst/>
@@ -947,7 +947,7 @@
         <p:spPr>
           <a:xfrm>
             <a:off x="3884760" y="8685360"/>
-            <a:ext cx="2966760" cy="453600"/>
+            <a:ext cx="2966400" cy="453240"/>
           </a:xfrm>
           <a:prstGeom prst="rect">
             <a:avLst/>
@@ -989,7 +989,7 @@
                 <a:tab algn="l" pos="0"/>
               </a:tabLst>
             </a:pPr>
-            <a:fld id="{87F5B150-51C2-4FB8-B9AD-050A5F88C71F}" type="slidenum">
+            <a:fld id="{384690D6-CCC9-490B-96C8-35DC418FBDF7}" type="slidenum">
               <a:rPr b="0" lang="en-US" sz="1200" spc="-1" strike="noStrike">
                 <a:solidFill>
                   <a:schemeClr val="dk1"/>
@@ -1233,7 +1233,7 @@
         <p:txBody>
           <a:bodyPr/>
           <a:p>
-            <a:fld id="{20484E30-610B-4FD5-8375-A97B6D87C0A6}" type="slidenum">
+            <a:fld id="{EE087D48-DC06-4EAB-8D7C-44A284E211E9}" type="slidenum">
               <a:t>&lt;#&gt;</a:t>
             </a:fld>
           </a:p>
@@ -1442,7 +1442,7 @@
         <p:txBody>
           <a:bodyPr/>
           <a:p>
-            <a:fld id="{D62AEF25-0164-4D7E-8953-F2EC33A3A2D5}" type="slidenum">
+            <a:fld id="{D298313E-6AC7-461C-843A-B9F33BE23FBB}" type="slidenum">
               <a:t>&lt;#&gt;</a:t>
             </a:fld>
           </a:p>
@@ -1565,7 +1565,7 @@
         <p:txBody>
           <a:bodyPr/>
           <a:p>
-            <a:fld id="{D0D69AE3-3544-46B8-B407-292A977102B6}" type="slidenum">
+            <a:fld id="{6A1FB925-B854-42C9-AA8E-B4F1A88C1E35}" type="slidenum">
               <a:t>&lt;#&gt;</a:t>
             </a:fld>
           </a:p>
@@ -1648,7 +1648,7 @@
         <p:txBody>
           <a:bodyPr/>
           <a:p>
-            <a:fld id="{5C381B4A-3521-4286-860F-666E2CDE2782}" type="slidenum">
+            <a:fld id="{30EB9918-1384-47D6-BB0D-490C5365AA0A}" type="slidenum">
               <a:t>&lt;#&gt;</a:t>
             </a:fld>
           </a:p>
@@ -1900,7 +1900,7 @@
         <p:txBody>
           <a:bodyPr/>
           <a:p>
-            <a:fld id="{E5F8F3B7-758B-4B9A-AB51-3B169DC412C3}" type="slidenum">
+            <a:fld id="{AD8E31DE-495D-4D68-B70E-EAE2DA01B2B6}" type="slidenum">
               <a:t>&lt;#&gt;</a:t>
             </a:fld>
           </a:p>
@@ -2152,7 +2152,7 @@
         <p:txBody>
           <a:bodyPr/>
           <a:p>
-            <a:fld id="{3C5F612F-3166-4A4F-9C92-F557F2C9BE61}" type="slidenum">
+            <a:fld id="{D397925B-C897-4837-9DE0-95457AABB99D}" type="slidenum">
               <a:t>&lt;#&gt;</a:t>
             </a:fld>
           </a:p>
@@ -2361,7 +2361,7 @@
         <p:txBody>
           <a:bodyPr/>
           <a:p>
-            <a:fld id="{7C7F39F2-455D-40D5-B205-FC82C8E456EC}" type="slidenum">
+            <a:fld id="{481FEB97-2402-496F-ABE6-B837ADA3CB28}" type="slidenum">
               <a:t>&lt;#&gt;</a:t>
             </a:fld>
           </a:p>
@@ -2656,7 +2656,7 @@
         <p:txBody>
           <a:bodyPr/>
           <a:p>
-            <a:fld id="{DECF932A-AF85-4B45-9B0F-4C39C3C0BBCF}" type="slidenum">
+            <a:fld id="{64969CAD-657E-4B7B-98CD-634ADD3F29A7}" type="slidenum">
               <a:t>&lt;#&gt;</a:t>
             </a:fld>
           </a:p>
@@ -2739,7 +2739,7 @@
         <p:txBody>
           <a:bodyPr/>
           <a:p>
-            <a:fld id="{3A545312-9637-4971-9356-A8C191D6D94B}" type="slidenum">
+            <a:fld id="{DCC498AD-1699-47E2-8C82-891BE6D17A3D}" type="slidenum">
               <a:t>&lt;#&gt;</a:t>
             </a:fld>
           </a:p>
@@ -2822,7 +2822,7 @@
         <p:txBody>
           <a:bodyPr/>
           <a:p>
-            <a:fld id="{DCBECA37-205E-46FF-BE86-028311677942}" type="slidenum">
+            <a:fld id="{BD8BDD7D-074A-4629-BF24-B3534512C9B1}" type="slidenum">
               <a:t>&lt;#&gt;</a:t>
             </a:fld>
           </a:p>
@@ -2988,7 +2988,7 @@
         <p:txBody>
           <a:bodyPr/>
           <a:p>
-            <a:fld id="{8FAC318E-E5B9-4A96-9750-7A7505D6C153}" type="slidenum">
+            <a:fld id="{A710732E-8C3D-4677-A660-78185AE6B256}" type="slidenum">
               <a:t>&lt;#&gt;</a:t>
             </a:fld>
           </a:p>
@@ -3154,7 +3154,7 @@
         <p:txBody>
           <a:bodyPr/>
           <a:p>
-            <a:fld id="{64319F50-F8E0-4BB3-B48F-0A7A4B1F6AEB}" type="slidenum">
+            <a:fld id="{9D2B39F2-B13F-4BA8-B836-62A02A169D65}" type="slidenum">
               <a:t>&lt;#&gt;</a:t>
             </a:fld>
           </a:p>
@@ -3219,9 +3219,9 @@
         <p:grpSpPr>
           <a:xfrm>
             <a:off x="6199200" y="6162840"/>
-            <a:ext cx="5987880" cy="690120"/>
+            <a:ext cx="5987520" cy="689760"/>
             <a:chOff x="6199200" y="6162840"/>
-            <a:chExt cx="5987880" cy="690120"/>
+            <a:chExt cx="5987520" cy="689760"/>
           </a:xfrm>
         </p:grpSpPr>
         <p:pic>
@@ -3237,7 +3237,7 @@
           <p:spPr>
             <a:xfrm>
               <a:off x="6199200" y="6162840"/>
-              <a:ext cx="4051440" cy="690120"/>
+              <a:ext cx="4051080" cy="689760"/>
             </a:xfrm>
             <a:prstGeom prst="rect">
               <a:avLst/>
@@ -3260,7 +3260,7 @@
           <p:spPr>
             <a:xfrm>
               <a:off x="10270080" y="6162840"/>
-              <a:ext cx="1917000" cy="606600"/>
+              <a:ext cx="1916640" cy="606240"/>
             </a:xfrm>
             <a:prstGeom prst="rect">
               <a:avLst/>
@@ -4026,7 +4026,7 @@
         <p:spPr>
           <a:xfrm>
             <a:off x="4038480" y="6356520"/>
-            <a:ext cx="4109760" cy="360000"/>
+            <a:ext cx="4109400" cy="359640"/>
           </a:xfrm>
           <a:prstGeom prst="rect">
             <a:avLst/>
@@ -4098,7 +4098,7 @@
         <p:spPr>
           <a:xfrm>
             <a:off x="8610480" y="6356520"/>
-            <a:ext cx="2738160" cy="360000"/>
+            <a:ext cx="2737800" cy="359640"/>
           </a:xfrm>
           <a:prstGeom prst="rect">
             <a:avLst/>
@@ -4141,7 +4141,7 @@
                 <a:tab algn="l" pos="0"/>
               </a:tabLst>
             </a:pPr>
-            <a:fld id="{CEEAF0C3-9F3E-49B2-9120-3C8945CC0535}" type="slidenum">
+            <a:fld id="{AD9C8D63-7A3F-4740-A9D5-1FA72FA11DB4}" type="slidenum">
               <a:rPr b="0" lang="en-US" sz="1200" spc="-1" strike="noStrike">
                 <a:solidFill>
                   <a:schemeClr val="dk1">
@@ -4174,7 +4174,7 @@
         <p:spPr>
           <a:xfrm>
             <a:off x="838080" y="6356520"/>
-            <a:ext cx="2738160" cy="360000"/>
+            <a:ext cx="2737800" cy="359640"/>
           </a:xfrm>
           <a:prstGeom prst="rect">
             <a:avLst/>
@@ -4263,9 +4263,9 @@
         <p:grpSpPr>
           <a:xfrm>
             <a:off x="6199200" y="6162840"/>
-            <a:ext cx="5987880" cy="690120"/>
+            <a:ext cx="5987520" cy="689760"/>
             <a:chOff x="6199200" y="6162840"/>
-            <a:chExt cx="5987880" cy="690120"/>
+            <a:chExt cx="5987520" cy="689760"/>
           </a:xfrm>
         </p:grpSpPr>
         <p:pic>
@@ -4281,7 +4281,7 @@
           <p:spPr>
             <a:xfrm>
               <a:off x="6199200" y="6162840"/>
-              <a:ext cx="4051440" cy="690120"/>
+              <a:ext cx="4051080" cy="689760"/>
             </a:xfrm>
             <a:prstGeom prst="rect">
               <a:avLst/>
@@ -4304,7 +4304,7 @@
           <p:spPr>
             <a:xfrm>
               <a:off x="10270080" y="6162840"/>
-              <a:ext cx="1917000" cy="606600"/>
+              <a:ext cx="1916640" cy="606240"/>
             </a:xfrm>
             <a:prstGeom prst="rect">
               <a:avLst/>
@@ -4827,7 +4827,7 @@
         <p:spPr>
           <a:xfrm>
             <a:off x="4038480" y="6356520"/>
-            <a:ext cx="4109760" cy="360000"/>
+            <a:ext cx="4109400" cy="359640"/>
           </a:xfrm>
           <a:prstGeom prst="rect">
             <a:avLst/>
@@ -4899,7 +4899,7 @@
         <p:spPr>
           <a:xfrm>
             <a:off x="8610480" y="6356520"/>
-            <a:ext cx="2738160" cy="360000"/>
+            <a:ext cx="2737800" cy="359640"/>
           </a:xfrm>
           <a:prstGeom prst="rect">
             <a:avLst/>
@@ -4942,7 +4942,7 @@
                 <a:tab algn="l" pos="0"/>
               </a:tabLst>
             </a:pPr>
-            <a:fld id="{56ED309F-6399-4D2A-87C3-E2E646EFA8E2}" type="slidenum">
+            <a:fld id="{0483F2FB-EA73-40DA-A2FE-0EDF37A76B9F}" type="slidenum">
               <a:rPr b="0" lang="en-US" sz="1200" spc="-1" strike="noStrike">
                 <a:solidFill>
                   <a:schemeClr val="dk1">
@@ -4975,7 +4975,7 @@
         <p:spPr>
           <a:xfrm>
             <a:off x="838080" y="6356520"/>
-            <a:ext cx="2738160" cy="360000"/>
+            <a:ext cx="2737800" cy="359640"/>
           </a:xfrm>
           <a:prstGeom prst="rect">
             <a:avLst/>
@@ -5064,9 +5064,9 @@
         <p:grpSpPr>
           <a:xfrm>
             <a:off x="6199200" y="6162840"/>
-            <a:ext cx="5987880" cy="690120"/>
+            <a:ext cx="5987520" cy="689760"/>
             <a:chOff x="6199200" y="6162840"/>
-            <a:chExt cx="5987880" cy="690120"/>
+            <a:chExt cx="5987520" cy="689760"/>
           </a:xfrm>
         </p:grpSpPr>
         <p:pic>
@@ -5082,7 +5082,7 @@
           <p:spPr>
             <a:xfrm>
               <a:off x="6199200" y="6162840"/>
-              <a:ext cx="4051440" cy="690120"/>
+              <a:ext cx="4051080" cy="689760"/>
             </a:xfrm>
             <a:prstGeom prst="rect">
               <a:avLst/>
@@ -5105,7 +5105,7 @@
           <p:spPr>
             <a:xfrm>
               <a:off x="10270080" y="6162840"/>
-              <a:ext cx="1917000" cy="606600"/>
+              <a:ext cx="1916640" cy="606240"/>
             </a:xfrm>
             <a:prstGeom prst="rect">
               <a:avLst/>
@@ -5178,7 +5178,7 @@
         <p:spPr>
           <a:xfrm>
             <a:off x="4038480" y="6356520"/>
-            <a:ext cx="4109760" cy="360000"/>
+            <a:ext cx="4109400" cy="359640"/>
           </a:xfrm>
           <a:prstGeom prst="rect">
             <a:avLst/>
@@ -5250,7 +5250,7 @@
         <p:spPr>
           <a:xfrm>
             <a:off x="8610480" y="6356520"/>
-            <a:ext cx="2738160" cy="360000"/>
+            <a:ext cx="2737800" cy="359640"/>
           </a:xfrm>
           <a:prstGeom prst="rect">
             <a:avLst/>
@@ -5293,7 +5293,7 @@
                 <a:tab algn="l" pos="0"/>
               </a:tabLst>
             </a:pPr>
-            <a:fld id="{15E77AF7-D088-4A06-BD8E-247495D20BA3}" type="slidenum">
+            <a:fld id="{FA81FB33-E174-4FE9-9E6F-E3CD661A8382}" type="slidenum">
               <a:rPr b="0" lang="en-US" sz="1200" spc="-1" strike="noStrike">
                 <a:solidFill>
                   <a:schemeClr val="dk1">
@@ -5326,7 +5326,7 @@
         <p:spPr>
           <a:xfrm>
             <a:off x="838080" y="6356520"/>
-            <a:ext cx="2738160" cy="360000"/>
+            <a:ext cx="2737800" cy="359640"/>
           </a:xfrm>
           <a:prstGeom prst="rect">
             <a:avLst/>
@@ -5415,9 +5415,9 @@
         <p:grpSpPr>
           <a:xfrm>
             <a:off x="6199200" y="6162840"/>
-            <a:ext cx="5987880" cy="690120"/>
+            <a:ext cx="5987520" cy="689760"/>
             <a:chOff x="6199200" y="6162840"/>
-            <a:chExt cx="5987880" cy="690120"/>
+            <a:chExt cx="5987520" cy="689760"/>
           </a:xfrm>
         </p:grpSpPr>
         <p:pic>
@@ -5433,7 +5433,7 @@
           <p:spPr>
             <a:xfrm>
               <a:off x="6199200" y="6162840"/>
-              <a:ext cx="4051440" cy="690120"/>
+              <a:ext cx="4051080" cy="689760"/>
             </a:xfrm>
             <a:prstGeom prst="rect">
               <a:avLst/>
@@ -5456,7 +5456,7 @@
           <p:spPr>
             <a:xfrm>
               <a:off x="10270080" y="6162840"/>
-              <a:ext cx="1917000" cy="606600"/>
+              <a:ext cx="1916640" cy="606240"/>
             </a:xfrm>
             <a:prstGeom prst="rect">
               <a:avLst/>
@@ -5480,7 +5480,7 @@
         <p:spPr>
           <a:xfrm>
             <a:off x="4038480" y="6356520"/>
-            <a:ext cx="4109760" cy="360000"/>
+            <a:ext cx="4109400" cy="359640"/>
           </a:xfrm>
           <a:prstGeom prst="rect">
             <a:avLst/>
@@ -5552,7 +5552,7 @@
         <p:spPr>
           <a:xfrm>
             <a:off x="8610480" y="6356520"/>
-            <a:ext cx="2738160" cy="360000"/>
+            <a:ext cx="2737800" cy="359640"/>
           </a:xfrm>
           <a:prstGeom prst="rect">
             <a:avLst/>
@@ -5595,7 +5595,7 @@
                 <a:tab algn="l" pos="0"/>
               </a:tabLst>
             </a:pPr>
-            <a:fld id="{AD5F9B68-65B0-4838-979C-FFB6F66EBB07}" type="slidenum">
+            <a:fld id="{91FFAC86-7436-4B5B-A293-AB611F90C511}" type="slidenum">
               <a:rPr b="0" lang="en-US" sz="1200" spc="-1" strike="noStrike">
                 <a:solidFill>
                   <a:schemeClr val="dk1">
@@ -5628,7 +5628,7 @@
         <p:spPr>
           <a:xfrm>
             <a:off x="838080" y="6356520"/>
-            <a:ext cx="2738160" cy="360000"/>
+            <a:ext cx="2737800" cy="359640"/>
           </a:xfrm>
           <a:prstGeom prst="rect">
             <a:avLst/>
@@ -5717,9 +5717,9 @@
         <p:grpSpPr>
           <a:xfrm>
             <a:off x="6199200" y="6162840"/>
-            <a:ext cx="5987880" cy="690120"/>
+            <a:ext cx="5987520" cy="689760"/>
             <a:chOff x="6199200" y="6162840"/>
-            <a:chExt cx="5987880" cy="690120"/>
+            <a:chExt cx="5987520" cy="689760"/>
           </a:xfrm>
         </p:grpSpPr>
         <p:pic>
@@ -5735,7 +5735,7 @@
           <p:spPr>
             <a:xfrm>
               <a:off x="6199200" y="6162840"/>
-              <a:ext cx="4051440" cy="690120"/>
+              <a:ext cx="4051080" cy="689760"/>
             </a:xfrm>
             <a:prstGeom prst="rect">
               <a:avLst/>
@@ -5758,7 +5758,7 @@
           <p:spPr>
             <a:xfrm>
               <a:off x="10270080" y="6162840"/>
-              <a:ext cx="1917000" cy="606600"/>
+              <a:ext cx="1916640" cy="606240"/>
             </a:xfrm>
             <a:prstGeom prst="rect">
               <a:avLst/>
@@ -5807,7 +5807,25 @@
                 </a:solidFill>
                 <a:latin typeface="Arial"/>
               </a:rPr>
-              <a:t>Click to edit the title text format</a:t>
+              <a:t>Click to edit </a:t>
+            </a:r>
+            <a:r>
+              <a:rPr b="0" lang="en-US" sz="1800" spc="-1" strike="noStrike">
+                <a:solidFill>
+                  <a:srgbClr val="000000"/>
+                </a:solidFill>
+                <a:latin typeface="Arial"/>
+              </a:rPr>
+              <a:t>the title text </a:t>
+            </a:r>
+            <a:r>
+              <a:rPr b="0" lang="en-US" sz="1800" spc="-1" strike="noStrike">
+                <a:solidFill>
+                  <a:srgbClr val="000000"/>
+                </a:solidFill>
+                <a:latin typeface="Arial"/>
+              </a:rPr>
+              <a:t>format</a:t>
             </a:r>
             <a:endParaRPr b="0" lang="en-US" sz="1800" spc="-1" strike="noStrike">
               <a:solidFill>
@@ -6506,7 +6524,7 @@
         <p:spPr>
           <a:xfrm>
             <a:off x="4038480" y="6356520"/>
-            <a:ext cx="4109760" cy="360000"/>
+            <a:ext cx="4109400" cy="359640"/>
           </a:xfrm>
           <a:prstGeom prst="rect">
             <a:avLst/>
@@ -6578,7 +6596,7 @@
         <p:spPr>
           <a:xfrm>
             <a:off x="8610480" y="6356520"/>
-            <a:ext cx="2738160" cy="360000"/>
+            <a:ext cx="2737800" cy="359640"/>
           </a:xfrm>
           <a:prstGeom prst="rect">
             <a:avLst/>
@@ -6621,7 +6639,7 @@
                 <a:tab algn="l" pos="0"/>
               </a:tabLst>
             </a:pPr>
-            <a:fld id="{B4169288-DD86-499C-8C0F-89E5B4D21E64}" type="slidenum">
+            <a:fld id="{E37C47A6-D104-42BB-A42B-2EA2C6B527A2}" type="slidenum">
               <a:rPr b="0" lang="en-US" sz="1200" spc="-1" strike="noStrike">
                 <a:solidFill>
                   <a:schemeClr val="dk1">
@@ -6654,7 +6672,7 @@
         <p:spPr>
           <a:xfrm>
             <a:off x="838080" y="6356520"/>
-            <a:ext cx="2738160" cy="360000"/>
+            <a:ext cx="2737800" cy="359640"/>
           </a:xfrm>
           <a:prstGeom prst="rect">
             <a:avLst/>
@@ -6743,9 +6761,9 @@
         <p:grpSpPr>
           <a:xfrm>
             <a:off x="6199200" y="6162840"/>
-            <a:ext cx="5987880" cy="690120"/>
+            <a:ext cx="5987520" cy="689760"/>
             <a:chOff x="6199200" y="6162840"/>
-            <a:chExt cx="5987880" cy="690120"/>
+            <a:chExt cx="5987520" cy="689760"/>
           </a:xfrm>
         </p:grpSpPr>
         <p:pic>
@@ -6761,7 +6779,7 @@
           <p:spPr>
             <a:xfrm>
               <a:off x="6199200" y="6162840"/>
-              <a:ext cx="4051440" cy="690120"/>
+              <a:ext cx="4051080" cy="689760"/>
             </a:xfrm>
             <a:prstGeom prst="rect">
               <a:avLst/>
@@ -6784,7 +6802,7 @@
           <p:spPr>
             <a:xfrm>
               <a:off x="10270080" y="6162840"/>
-              <a:ext cx="1917000" cy="606600"/>
+              <a:ext cx="1916640" cy="606240"/>
             </a:xfrm>
             <a:prstGeom prst="rect">
               <a:avLst/>
@@ -7532,7 +7550,7 @@
         <p:spPr>
           <a:xfrm>
             <a:off x="4038480" y="6356520"/>
-            <a:ext cx="4109760" cy="360000"/>
+            <a:ext cx="4109400" cy="359640"/>
           </a:xfrm>
           <a:prstGeom prst="rect">
             <a:avLst/>
@@ -7604,7 +7622,7 @@
         <p:spPr>
           <a:xfrm>
             <a:off x="8610480" y="6356520"/>
-            <a:ext cx="2738160" cy="360000"/>
+            <a:ext cx="2737800" cy="359640"/>
           </a:xfrm>
           <a:prstGeom prst="rect">
             <a:avLst/>
@@ -7647,7 +7665,7 @@
                 <a:tab algn="l" pos="0"/>
               </a:tabLst>
             </a:pPr>
-            <a:fld id="{46D8A70A-6F77-4A92-865C-B1A56C52D949}" type="slidenum">
+            <a:fld id="{5720BD2A-D147-4EED-912A-D80916CABFAE}" type="slidenum">
               <a:rPr b="0" lang="en-US" sz="1200" spc="-1" strike="noStrike">
                 <a:solidFill>
                   <a:schemeClr val="dk1">
@@ -7680,7 +7698,7 @@
         <p:spPr>
           <a:xfrm>
             <a:off x="838080" y="6356520"/>
-            <a:ext cx="2738160" cy="360000"/>
+            <a:ext cx="2737800" cy="359640"/>
           </a:xfrm>
           <a:prstGeom prst="rect">
             <a:avLst/>
@@ -7769,9 +7787,9 @@
         <p:grpSpPr>
           <a:xfrm>
             <a:off x="6199200" y="6162840"/>
-            <a:ext cx="5987880" cy="690120"/>
+            <a:ext cx="5987520" cy="689760"/>
             <a:chOff x="6199200" y="6162840"/>
-            <a:chExt cx="5987880" cy="690120"/>
+            <a:chExt cx="5987520" cy="689760"/>
           </a:xfrm>
         </p:grpSpPr>
         <p:pic>
@@ -7787,7 +7805,7 @@
           <p:spPr>
             <a:xfrm>
               <a:off x="6199200" y="6162840"/>
-              <a:ext cx="4051440" cy="690120"/>
+              <a:ext cx="4051080" cy="689760"/>
             </a:xfrm>
             <a:prstGeom prst="rect">
               <a:avLst/>
@@ -7810,7 +7828,7 @@
           <p:spPr>
             <a:xfrm>
               <a:off x="10270080" y="6162840"/>
-              <a:ext cx="1917000" cy="606600"/>
+              <a:ext cx="1916640" cy="606240"/>
             </a:xfrm>
             <a:prstGeom prst="rect">
               <a:avLst/>
@@ -8333,7 +8351,7 @@
         <p:spPr>
           <a:xfrm>
             <a:off x="4038480" y="6356520"/>
-            <a:ext cx="4109760" cy="360000"/>
+            <a:ext cx="4109400" cy="359640"/>
           </a:xfrm>
           <a:prstGeom prst="rect">
             <a:avLst/>
@@ -8405,7 +8423,7 @@
         <p:spPr>
           <a:xfrm>
             <a:off x="8610480" y="6356520"/>
-            <a:ext cx="2738160" cy="360000"/>
+            <a:ext cx="2737800" cy="359640"/>
           </a:xfrm>
           <a:prstGeom prst="rect">
             <a:avLst/>
@@ -8448,7 +8466,7 @@
                 <a:tab algn="l" pos="0"/>
               </a:tabLst>
             </a:pPr>
-            <a:fld id="{C014EB7F-BC8D-4E4E-8441-9FFEEDFFBCFD}" type="slidenum">
+            <a:fld id="{5C6242BC-52BB-4629-9600-54D2BBAC12A7}" type="slidenum">
               <a:rPr b="0" lang="en-US" sz="1200" spc="-1" strike="noStrike">
                 <a:solidFill>
                   <a:schemeClr val="dk1">
@@ -8481,7 +8499,7 @@
         <p:spPr>
           <a:xfrm>
             <a:off x="838080" y="6356520"/>
-            <a:ext cx="2738160" cy="360000"/>
+            <a:ext cx="2737800" cy="359640"/>
           </a:xfrm>
           <a:prstGeom prst="rect">
             <a:avLst/>
@@ -8570,9 +8588,9 @@
         <p:grpSpPr>
           <a:xfrm>
             <a:off x="6199200" y="6162840"/>
-            <a:ext cx="5987880" cy="690120"/>
+            <a:ext cx="5987520" cy="689760"/>
             <a:chOff x="6199200" y="6162840"/>
-            <a:chExt cx="5987880" cy="690120"/>
+            <a:chExt cx="5987520" cy="689760"/>
           </a:xfrm>
         </p:grpSpPr>
         <p:pic>
@@ -8588,7 +8606,7 @@
           <p:spPr>
             <a:xfrm>
               <a:off x="6199200" y="6162840"/>
-              <a:ext cx="4051440" cy="690120"/>
+              <a:ext cx="4051080" cy="689760"/>
             </a:xfrm>
             <a:prstGeom prst="rect">
               <a:avLst/>
@@ -8611,7 +8629,7 @@
           <p:spPr>
             <a:xfrm>
               <a:off x="10270080" y="6162840"/>
-              <a:ext cx="1917000" cy="606600"/>
+              <a:ext cx="1916640" cy="606240"/>
             </a:xfrm>
             <a:prstGeom prst="rect">
               <a:avLst/>
@@ -9584,7 +9602,7 @@
         <p:spPr>
           <a:xfrm>
             <a:off x="4038480" y="6356520"/>
-            <a:ext cx="4109760" cy="360000"/>
+            <a:ext cx="4109400" cy="359640"/>
           </a:xfrm>
           <a:prstGeom prst="rect">
             <a:avLst/>
@@ -9656,7 +9674,7 @@
         <p:spPr>
           <a:xfrm>
             <a:off x="8610480" y="6356520"/>
-            <a:ext cx="2738160" cy="360000"/>
+            <a:ext cx="2737800" cy="359640"/>
           </a:xfrm>
           <a:prstGeom prst="rect">
             <a:avLst/>
@@ -9699,7 +9717,7 @@
                 <a:tab algn="l" pos="0"/>
               </a:tabLst>
             </a:pPr>
-            <a:fld id="{C605A10B-FAEC-4234-B046-5991DDEA99DA}" type="slidenum">
+            <a:fld id="{860013EF-EB4C-4D29-A24D-37CAD938FDAD}" type="slidenum">
               <a:rPr b="0" lang="en-US" sz="1200" spc="-1" strike="noStrike">
                 <a:solidFill>
                   <a:schemeClr val="dk1">
@@ -9732,7 +9750,7 @@
         <p:spPr>
           <a:xfrm>
             <a:off x="838080" y="6356520"/>
-            <a:ext cx="2738160" cy="360000"/>
+            <a:ext cx="2737800" cy="359640"/>
           </a:xfrm>
           <a:prstGeom prst="rect">
             <a:avLst/>
@@ -9821,9 +9839,9 @@
         <p:grpSpPr>
           <a:xfrm>
             <a:off x="6199200" y="6162840"/>
-            <a:ext cx="5987880" cy="690120"/>
+            <a:ext cx="5987520" cy="689760"/>
             <a:chOff x="6199200" y="6162840"/>
-            <a:chExt cx="5987880" cy="690120"/>
+            <a:chExt cx="5987520" cy="689760"/>
           </a:xfrm>
         </p:grpSpPr>
         <p:pic>
@@ -9839,7 +9857,7 @@
           <p:spPr>
             <a:xfrm>
               <a:off x="6199200" y="6162840"/>
-              <a:ext cx="4051440" cy="690120"/>
+              <a:ext cx="4051080" cy="689760"/>
             </a:xfrm>
             <a:prstGeom prst="rect">
               <a:avLst/>
@@ -9862,7 +9880,7 @@
           <p:spPr>
             <a:xfrm>
               <a:off x="10270080" y="6162840"/>
-              <a:ext cx="1917000" cy="606600"/>
+              <a:ext cx="1916640" cy="606240"/>
             </a:xfrm>
             <a:prstGeom prst="rect">
               <a:avLst/>
@@ -9886,7 +9904,7 @@
         <p:spPr>
           <a:xfrm>
             <a:off x="4038480" y="6356520"/>
-            <a:ext cx="4109760" cy="360000"/>
+            <a:ext cx="4109400" cy="359640"/>
           </a:xfrm>
           <a:prstGeom prst="rect">
             <a:avLst/>
@@ -9958,7 +9976,7 @@
         <p:spPr>
           <a:xfrm>
             <a:off x="8610480" y="6356520"/>
-            <a:ext cx="2738160" cy="360000"/>
+            <a:ext cx="2737800" cy="359640"/>
           </a:xfrm>
           <a:prstGeom prst="rect">
             <a:avLst/>
@@ -10001,7 +10019,7 @@
                 <a:tab algn="l" pos="0"/>
               </a:tabLst>
             </a:pPr>
-            <a:fld id="{58C549DF-5409-418E-979B-7B9C22AA4F34}" type="slidenum">
+            <a:fld id="{371E11D5-3C5D-4883-A017-2C400ADCF6BB}" type="slidenum">
               <a:rPr b="0" lang="en-US" sz="1200" spc="-1" strike="noStrike">
                 <a:solidFill>
                   <a:schemeClr val="dk1">
@@ -10034,7 +10052,7 @@
         <p:spPr>
           <a:xfrm>
             <a:off x="838080" y="6356520"/>
-            <a:ext cx="2738160" cy="360000"/>
+            <a:ext cx="2737800" cy="359640"/>
           </a:xfrm>
           <a:prstGeom prst="rect">
             <a:avLst/>
@@ -10123,9 +10141,9 @@
         <p:grpSpPr>
           <a:xfrm>
             <a:off x="6199200" y="6162840"/>
-            <a:ext cx="5987880" cy="690120"/>
+            <a:ext cx="5987520" cy="689760"/>
             <a:chOff x="6199200" y="6162840"/>
-            <a:chExt cx="5987880" cy="690120"/>
+            <a:chExt cx="5987520" cy="689760"/>
           </a:xfrm>
         </p:grpSpPr>
         <p:pic>
@@ -10141,7 +10159,7 @@
           <p:spPr>
             <a:xfrm>
               <a:off x="6199200" y="6162840"/>
-              <a:ext cx="4051440" cy="690120"/>
+              <a:ext cx="4051080" cy="689760"/>
             </a:xfrm>
             <a:prstGeom prst="rect">
               <a:avLst/>
@@ -10164,7 +10182,7 @@
           <p:spPr>
             <a:xfrm>
               <a:off x="10270080" y="6162840"/>
-              <a:ext cx="1917000" cy="606600"/>
+              <a:ext cx="1916640" cy="606240"/>
             </a:xfrm>
             <a:prstGeom prst="rect">
               <a:avLst/>
@@ -10188,7 +10206,7 @@
         <p:spPr>
           <a:xfrm>
             <a:off x="4038480" y="6356520"/>
-            <a:ext cx="4109760" cy="360000"/>
+            <a:ext cx="4109400" cy="359640"/>
           </a:xfrm>
           <a:prstGeom prst="rect">
             <a:avLst/>
@@ -10260,7 +10278,7 @@
         <p:spPr>
           <a:xfrm>
             <a:off x="8610480" y="6356520"/>
-            <a:ext cx="2738160" cy="360000"/>
+            <a:ext cx="2737800" cy="359640"/>
           </a:xfrm>
           <a:prstGeom prst="rect">
             <a:avLst/>
@@ -10303,7 +10321,7 @@
                 <a:tab algn="l" pos="0"/>
               </a:tabLst>
             </a:pPr>
-            <a:fld id="{6A0884A0-819F-41F5-9951-5CEFD3DA65ED}" type="slidenum">
+            <a:fld id="{F37EC03E-7B5B-4ECE-8883-899F6804E848}" type="slidenum">
               <a:rPr b="0" lang="en-US" sz="1200" spc="-1" strike="noStrike">
                 <a:solidFill>
                   <a:schemeClr val="dk1">
@@ -10336,7 +10354,7 @@
         <p:spPr>
           <a:xfrm>
             <a:off x="838080" y="6356520"/>
-            <a:ext cx="2738160" cy="360000"/>
+            <a:ext cx="2737800" cy="359640"/>
           </a:xfrm>
           <a:prstGeom prst="rect">
             <a:avLst/>
@@ -10699,9 +10717,9 @@
         <p:grpSpPr>
           <a:xfrm>
             <a:off x="6199200" y="6162840"/>
-            <a:ext cx="5987880" cy="690120"/>
+            <a:ext cx="5987520" cy="689760"/>
             <a:chOff x="6199200" y="6162840"/>
-            <a:chExt cx="5987880" cy="690120"/>
+            <a:chExt cx="5987520" cy="689760"/>
           </a:xfrm>
         </p:grpSpPr>
         <p:pic>
@@ -10717,7 +10735,7 @@
           <p:spPr>
             <a:xfrm>
               <a:off x="6199200" y="6162840"/>
-              <a:ext cx="4051440" cy="690120"/>
+              <a:ext cx="4051080" cy="689760"/>
             </a:xfrm>
             <a:prstGeom prst="rect">
               <a:avLst/>
@@ -10740,7 +10758,7 @@
           <p:spPr>
             <a:xfrm>
               <a:off x="10270080" y="6162840"/>
-              <a:ext cx="1917000" cy="606600"/>
+              <a:ext cx="1916640" cy="606240"/>
             </a:xfrm>
             <a:prstGeom prst="rect">
               <a:avLst/>
@@ -11038,7 +11056,7 @@
         <p:spPr>
           <a:xfrm>
             <a:off x="4038480" y="6356520"/>
-            <a:ext cx="4109760" cy="360000"/>
+            <a:ext cx="4109400" cy="359640"/>
           </a:xfrm>
           <a:prstGeom prst="rect">
             <a:avLst/>
@@ -11110,7 +11128,7 @@
         <p:spPr>
           <a:xfrm>
             <a:off x="8610480" y="6356520"/>
-            <a:ext cx="2738160" cy="360000"/>
+            <a:ext cx="2737800" cy="359640"/>
           </a:xfrm>
           <a:prstGeom prst="rect">
             <a:avLst/>
@@ -11153,7 +11171,7 @@
                 <a:tab algn="l" pos="0"/>
               </a:tabLst>
             </a:pPr>
-            <a:fld id="{F414653B-7ADE-45D0-B996-E1104EAC93E3}" type="slidenum">
+            <a:fld id="{53B66028-F559-4492-B278-1ED723B94D26}" type="slidenum">
               <a:rPr b="0" lang="en-US" sz="1200" spc="-1" strike="noStrike">
                 <a:solidFill>
                   <a:schemeClr val="dk1">
@@ -11186,7 +11204,7 @@
         <p:spPr>
           <a:xfrm>
             <a:off x="838080" y="6356520"/>
-            <a:ext cx="2738160" cy="360000"/>
+            <a:ext cx="2737800" cy="359640"/>
           </a:xfrm>
           <a:prstGeom prst="rect">
             <a:avLst/>
@@ -11275,9 +11293,9 @@
         <p:grpSpPr>
           <a:xfrm>
             <a:off x="6199200" y="6162840"/>
-            <a:ext cx="5987880" cy="690120"/>
+            <a:ext cx="5987520" cy="689760"/>
             <a:chOff x="6199200" y="6162840"/>
-            <a:chExt cx="5987880" cy="690120"/>
+            <a:chExt cx="5987520" cy="689760"/>
           </a:xfrm>
         </p:grpSpPr>
         <p:pic>
@@ -11293,7 +11311,7 @@
           <p:spPr>
             <a:xfrm>
               <a:off x="6199200" y="6162840"/>
-              <a:ext cx="4051440" cy="690120"/>
+              <a:ext cx="4051080" cy="689760"/>
             </a:xfrm>
             <a:prstGeom prst="rect">
               <a:avLst/>
@@ -11316,7 +11334,7 @@
           <p:spPr>
             <a:xfrm>
               <a:off x="10270080" y="6162840"/>
-              <a:ext cx="1917000" cy="606600"/>
+              <a:ext cx="1916640" cy="606240"/>
             </a:xfrm>
             <a:prstGeom prst="rect">
               <a:avLst/>
@@ -11614,7 +11632,7 @@
         <p:spPr>
           <a:xfrm>
             <a:off x="4038480" y="6356520"/>
-            <a:ext cx="4109760" cy="360000"/>
+            <a:ext cx="4109400" cy="359640"/>
           </a:xfrm>
           <a:prstGeom prst="rect">
             <a:avLst/>
@@ -11686,7 +11704,7 @@
         <p:spPr>
           <a:xfrm>
             <a:off x="8610480" y="6356520"/>
-            <a:ext cx="2738160" cy="360000"/>
+            <a:ext cx="2737800" cy="359640"/>
           </a:xfrm>
           <a:prstGeom prst="rect">
             <a:avLst/>
@@ -11729,7 +11747,7 @@
                 <a:tab algn="l" pos="0"/>
               </a:tabLst>
             </a:pPr>
-            <a:fld id="{F0078DBE-E2DE-4268-B73C-1C4A80BAAC30}" type="slidenum">
+            <a:fld id="{6D964043-F749-48BA-AE18-4F821CF91062}" type="slidenum">
               <a:rPr b="0" lang="en-US" sz="1200" spc="-1" strike="noStrike">
                 <a:solidFill>
                   <a:schemeClr val="dk1">
@@ -11762,7 +11780,7 @@
         <p:spPr>
           <a:xfrm>
             <a:off x="838080" y="6356520"/>
-            <a:ext cx="2738160" cy="360000"/>
+            <a:ext cx="2737800" cy="359640"/>
           </a:xfrm>
           <a:prstGeom prst="rect">
             <a:avLst/>
@@ -11844,7 +11862,7 @@
         <p:spPr>
           <a:xfrm flipH="1">
             <a:off x="0" y="3073320"/>
-            <a:ext cx="1833840" cy="5040"/>
+            <a:ext cx="1834200" cy="5400"/>
           </a:xfrm>
           <a:prstGeom prst="straightConnector1">
             <a:avLst/>
@@ -11867,7 +11885,7 @@
         <p:spPr>
           <a:xfrm>
             <a:off x="0" y="2489400"/>
-            <a:ext cx="1833840" cy="5040"/>
+            <a:ext cx="1834200" cy="5400"/>
           </a:xfrm>
           <a:prstGeom prst="straightConnector1">
             <a:avLst/>
@@ -11890,7 +11908,7 @@
         <p:spPr>
           <a:xfrm>
             <a:off x="0" y="2781360"/>
-            <a:ext cx="1833840" cy="5040"/>
+            <a:ext cx="1834200" cy="5400"/>
           </a:xfrm>
           <a:prstGeom prst="straightConnector1">
             <a:avLst/>
@@ -11913,7 +11931,7 @@
         <p:spPr>
           <a:xfrm flipH="1">
             <a:off x="0" y="3657600"/>
-            <a:ext cx="1833840" cy="5040"/>
+            <a:ext cx="1834200" cy="5400"/>
           </a:xfrm>
           <a:prstGeom prst="straightConnector1">
             <a:avLst/>
@@ -11935,7 +11953,7 @@
         <p:spPr>
           <a:xfrm>
             <a:off x="128520" y="6134040"/>
-            <a:ext cx="1566720" cy="382680"/>
+            <a:ext cx="1566360" cy="382320"/>
           </a:xfrm>
           <a:prstGeom prst="diamond">
             <a:avLst/>
@@ -12000,7 +12018,7 @@
         <p:spPr>
           <a:xfrm>
             <a:off x="302760" y="5454000"/>
-            <a:ext cx="1218240" cy="382680"/>
+            <a:ext cx="1217880" cy="382320"/>
           </a:xfrm>
           <a:prstGeom prst="ellipse">
             <a:avLst/>
@@ -12063,7 +12081,7 @@
         <p:spPr>
           <a:xfrm>
             <a:off x="101160" y="336240"/>
-            <a:ext cx="1621440" cy="303120"/>
+            <a:ext cx="1621080" cy="303120"/>
           </a:xfrm>
           <a:prstGeom prst="rect">
             <a:avLst/>
@@ -12120,7 +12138,7 @@
         <p:spPr>
           <a:xfrm>
             <a:off x="101160" y="597600"/>
-            <a:ext cx="1621440" cy="516600"/>
+            <a:ext cx="1621080" cy="516600"/>
           </a:xfrm>
           <a:prstGeom prst="rect">
             <a:avLst/>
@@ -12210,7 +12228,7 @@
         <p:spPr>
           <a:xfrm>
             <a:off x="101160" y="336240"/>
-            <a:ext cx="1621440" cy="303120"/>
+            <a:ext cx="1621080" cy="303120"/>
           </a:xfrm>
           <a:prstGeom prst="rect">
             <a:avLst/>
@@ -12267,7 +12285,7 @@
         <p:spPr>
           <a:xfrm>
             <a:off x="101160" y="597600"/>
-            <a:ext cx="1621440" cy="516600"/>
+            <a:ext cx="1621080" cy="516600"/>
           </a:xfrm>
           <a:prstGeom prst="rect">
             <a:avLst/>
@@ -12357,7 +12375,7 @@
         <p:spPr>
           <a:xfrm>
             <a:off x="2541600" y="228600"/>
-            <a:ext cx="1621440" cy="303120"/>
+            <a:ext cx="1621080" cy="303120"/>
           </a:xfrm>
           <a:prstGeom prst="rect">
             <a:avLst/>
@@ -12414,7 +12432,7 @@
         <p:spPr>
           <a:xfrm>
             <a:off x="2541600" y="489960"/>
-            <a:ext cx="1621440" cy="1584000"/>
+            <a:ext cx="1621080" cy="1584000"/>
           </a:xfrm>
           <a:prstGeom prst="rect">
             <a:avLst/>
@@ -12639,7 +12657,7 @@
         <p:spPr>
           <a:xfrm>
             <a:off x="6656400" y="228600"/>
-            <a:ext cx="1621440" cy="303120"/>
+            <a:ext cx="1621080" cy="303120"/>
           </a:xfrm>
           <a:prstGeom prst="rect">
             <a:avLst/>
@@ -12696,7 +12714,7 @@
         <p:spPr>
           <a:xfrm>
             <a:off x="6656400" y="489960"/>
-            <a:ext cx="1621440" cy="516600"/>
+            <a:ext cx="1621080" cy="516600"/>
           </a:xfrm>
           <a:prstGeom prst="rect">
             <a:avLst/>
@@ -12786,7 +12804,7 @@
         <p:spPr>
           <a:xfrm>
             <a:off x="6656400" y="228600"/>
-            <a:ext cx="1621440" cy="303120"/>
+            <a:ext cx="1621080" cy="303120"/>
           </a:xfrm>
           <a:prstGeom prst="rect">
             <a:avLst/>
@@ -12843,7 +12861,7 @@
         <p:spPr>
           <a:xfrm>
             <a:off x="6656400" y="489960"/>
-            <a:ext cx="1621440" cy="730080"/>
+            <a:ext cx="1621080" cy="730080"/>
           </a:xfrm>
           <a:prstGeom prst="rect">
             <a:avLst/>
@@ -12960,7 +12978,7 @@
         <p:spPr>
           <a:xfrm>
             <a:off x="128520" y="4629600"/>
-            <a:ext cx="1566720" cy="527400"/>
+            <a:ext cx="1566360" cy="527040"/>
           </a:xfrm>
           <a:prstGeom prst="diamond">
             <a:avLst/>
@@ -13048,7 +13066,7 @@
         <p:spPr>
           <a:xfrm>
             <a:off x="0" y="3365640"/>
-            <a:ext cx="1833840" cy="5040"/>
+            <a:ext cx="1834200" cy="5400"/>
           </a:xfrm>
           <a:prstGeom prst="straightConnector1">
             <a:avLst/>
@@ -13070,7 +13088,7 @@
         <p:spPr>
           <a:xfrm>
             <a:off x="673200" y="3949920"/>
-            <a:ext cx="477720" cy="382680"/>
+            <a:ext cx="477360" cy="382320"/>
           </a:xfrm>
           <a:prstGeom prst="triangle">
             <a:avLst>
@@ -13137,9 +13155,9 @@
         <p:grpSpPr>
           <a:xfrm>
             <a:off x="101160" y="1413000"/>
-            <a:ext cx="1621440" cy="777960"/>
+            <a:ext cx="1621080" cy="777960"/>
             <a:chOff x="101160" y="1413000"/>
-            <a:chExt cx="1621440" cy="777960"/>
+            <a:chExt cx="1621080" cy="777960"/>
           </a:xfrm>
         </p:grpSpPr>
         <p:sp>
@@ -13151,7 +13169,7 @@
           <p:spPr>
             <a:xfrm>
               <a:off x="101160" y="1413000"/>
-              <a:ext cx="1621440" cy="303120"/>
+              <a:ext cx="1621080" cy="303120"/>
             </a:xfrm>
             <a:prstGeom prst="rect">
               <a:avLst/>
@@ -13209,7 +13227,7 @@
           <p:spPr>
             <a:xfrm>
               <a:off x="101160" y="1674360"/>
-              <a:ext cx="1621440" cy="516600"/>
+              <a:ext cx="1621080" cy="516600"/>
             </a:xfrm>
             <a:prstGeom prst="rect">
               <a:avLst/>
@@ -13301,7 +13319,7 @@
         <p:spPr>
           <a:xfrm>
             <a:off x="4426920" y="914400"/>
-            <a:ext cx="1566720" cy="382680"/>
+            <a:ext cx="1566360" cy="382320"/>
           </a:xfrm>
           <a:prstGeom prst="diamond">
             <a:avLst/>
@@ -13368,8 +13386,8 @@
         </p:nvCxnSpPr>
         <p:spPr>
           <a:xfrm flipH="1">
-            <a:off x="5993640" y="855000"/>
-            <a:ext cx="663120" cy="251280"/>
+            <a:off x="5993280" y="855000"/>
+            <a:ext cx="663480" cy="250920"/>
           </a:xfrm>
           <a:prstGeom prst="straightConnector1">
             <a:avLst/>
@@ -13392,7 +13410,7 @@
         <p:spPr>
           <a:xfrm>
             <a:off x="6255720" y="1828800"/>
-            <a:ext cx="1795320" cy="382680"/>
+            <a:ext cx="1794960" cy="382320"/>
           </a:xfrm>
           <a:prstGeom prst="diamond">
             <a:avLst/>
@@ -13459,7 +13477,7 @@
         </p:nvCxnSpPr>
         <p:spPr>
           <a:xfrm flipV="1">
-            <a:off x="7153560" y="1220040"/>
+            <a:off x="7153200" y="1220040"/>
             <a:ext cx="313920" cy="609120"/>
           </a:xfrm>
           <a:prstGeom prst="straightConnector1">
@@ -13483,8 +13501,8 @@
         </p:nvCxnSpPr>
         <p:spPr>
           <a:xfrm flipH="1" flipV="1">
-            <a:off x="7153560" y="2211480"/>
-            <a:ext cx="457560" cy="534600"/>
+            <a:off x="7153200" y="2211120"/>
+            <a:ext cx="458280" cy="535320"/>
           </a:xfrm>
           <a:prstGeom prst="straightConnector1">
             <a:avLst/>
@@ -13507,7 +13525,7 @@
         <p:spPr>
           <a:xfrm>
             <a:off x="128520" y="6134400"/>
-            <a:ext cx="1566720" cy="382680"/>
+            <a:ext cx="1566360" cy="382320"/>
           </a:xfrm>
           <a:prstGeom prst="diamond">
             <a:avLst/>
@@ -13572,9 +13590,9 @@
         <p:grpSpPr>
           <a:xfrm>
             <a:off x="6681960" y="2743200"/>
-            <a:ext cx="1850040" cy="1216440"/>
+            <a:ext cx="1849680" cy="1216440"/>
             <a:chOff x="6681960" y="2743200"/>
-            <a:chExt cx="1850040" cy="1216440"/>
+            <a:chExt cx="1849680" cy="1216440"/>
           </a:xfrm>
         </p:grpSpPr>
         <p:sp>
@@ -13586,7 +13604,7 @@
           <p:spPr>
             <a:xfrm>
               <a:off x="6681960" y="2743200"/>
-              <a:ext cx="1850040" cy="303120"/>
+              <a:ext cx="1849680" cy="303120"/>
             </a:xfrm>
             <a:prstGeom prst="rect">
               <a:avLst/>
@@ -13643,7 +13661,7 @@
           <p:spPr>
             <a:xfrm>
               <a:off x="6681960" y="3016080"/>
-              <a:ext cx="1850040" cy="943560"/>
+              <a:ext cx="1849680" cy="943560"/>
             </a:xfrm>
             <a:prstGeom prst="rect">
               <a:avLst/>
@@ -13790,7 +13808,7 @@
         <p:spPr>
           <a:xfrm>
             <a:off x="9173520" y="3501000"/>
-            <a:ext cx="477720" cy="382680"/>
+            <a:ext cx="477360" cy="382320"/>
           </a:xfrm>
           <a:prstGeom prst="triangle">
             <a:avLst>
@@ -13857,7 +13875,7 @@
         <p:spPr>
           <a:xfrm>
             <a:off x="10569600" y="3126240"/>
-            <a:ext cx="1621440" cy="303120"/>
+            <a:ext cx="1621080" cy="303120"/>
           </a:xfrm>
           <a:prstGeom prst="rect">
             <a:avLst/>
@@ -13914,7 +13932,7 @@
         <p:spPr>
           <a:xfrm>
             <a:off x="10569600" y="3429360"/>
-            <a:ext cx="1621440" cy="1370520"/>
+            <a:ext cx="1621080" cy="1370520"/>
           </a:xfrm>
           <a:prstGeom prst="rect">
             <a:avLst/>
@@ -14072,8 +14090,8 @@
         </p:nvCxnSpPr>
         <p:spPr>
           <a:xfrm>
-            <a:off x="9532080" y="3692520"/>
-            <a:ext cx="1037880" cy="422280"/>
+            <a:off x="9531720" y="3692160"/>
+            <a:ext cx="1038240" cy="422640"/>
           </a:xfrm>
           <a:prstGeom prst="straightConnector1">
             <a:avLst/>
@@ -14097,8 +14115,8 @@
         </p:nvCxnSpPr>
         <p:spPr>
           <a:xfrm flipH="1" flipV="1">
-            <a:off x="8532000" y="3351240"/>
-            <a:ext cx="761400" cy="341640"/>
+            <a:off x="8531640" y="3351240"/>
+            <a:ext cx="761400" cy="341280"/>
           </a:xfrm>
           <a:prstGeom prst="straightConnector1">
             <a:avLst/>
@@ -14120,7 +14138,7 @@
         <p:spPr>
           <a:xfrm>
             <a:off x="2086200" y="3336840"/>
-            <a:ext cx="1621440" cy="303120"/>
+            <a:ext cx="1621080" cy="303120"/>
           </a:xfrm>
           <a:prstGeom prst="rect">
             <a:avLst/>
@@ -14177,7 +14195,7 @@
         <p:spPr>
           <a:xfrm>
             <a:off x="2086200" y="3598200"/>
-            <a:ext cx="1621440" cy="516600"/>
+            <a:ext cx="1621080" cy="516600"/>
           </a:xfrm>
           <a:prstGeom prst="rect">
             <a:avLst/>
@@ -14267,7 +14285,7 @@
         <p:spPr>
           <a:xfrm>
             <a:off x="2086200" y="3336840"/>
-            <a:ext cx="1621440" cy="303120"/>
+            <a:ext cx="1621080" cy="303120"/>
           </a:xfrm>
           <a:prstGeom prst="rect">
             <a:avLst/>
@@ -14324,7 +14342,7 @@
         <p:spPr>
           <a:xfrm>
             <a:off x="2086200" y="3598200"/>
-            <a:ext cx="1621440" cy="516600"/>
+            <a:ext cx="1621080" cy="516600"/>
           </a:xfrm>
           <a:prstGeom prst="rect">
             <a:avLst/>
@@ -14414,7 +14432,7 @@
         <p:spPr>
           <a:xfrm>
             <a:off x="1883160" y="2514600"/>
-            <a:ext cx="1824480" cy="382680"/>
+            <a:ext cx="1824120" cy="382320"/>
           </a:xfrm>
           <a:prstGeom prst="diamond">
             <a:avLst/>
@@ -14479,7 +14497,7 @@
         <p:spPr>
           <a:xfrm>
             <a:off x="3481560" y="2899800"/>
-            <a:ext cx="1595880" cy="382680"/>
+            <a:ext cx="1595520" cy="382320"/>
           </a:xfrm>
           <a:prstGeom prst="ellipse">
             <a:avLst/>
@@ -14544,8 +14562,8 @@
         </p:nvCxnSpPr>
         <p:spPr>
           <a:xfrm>
-            <a:off x="3707640" y="2706120"/>
-            <a:ext cx="572400" cy="194040"/>
+            <a:off x="3707280" y="2705760"/>
+            <a:ext cx="572400" cy="194400"/>
           </a:xfrm>
           <a:prstGeom prst="straightConnector1">
             <a:avLst/>
@@ -14569,8 +14587,8 @@
         </p:nvCxnSpPr>
         <p:spPr>
           <a:xfrm flipH="1" flipV="1">
-            <a:off x="2795400" y="2897280"/>
-            <a:ext cx="101880" cy="439920"/>
+            <a:off x="2795400" y="2896920"/>
+            <a:ext cx="101520" cy="440280"/>
           </a:xfrm>
           <a:prstGeom prst="straightConnector1">
             <a:avLst/>
@@ -14595,7 +14613,7 @@
         <p:spPr>
           <a:xfrm flipV="1">
             <a:off x="2795400" y="2073960"/>
-            <a:ext cx="557280" cy="441000"/>
+            <a:ext cx="556920" cy="441000"/>
           </a:xfrm>
           <a:prstGeom prst="straightConnector1">
             <a:avLst/>
@@ -14617,7 +14635,7 @@
         <p:spPr>
           <a:xfrm>
             <a:off x="10543680" y="457200"/>
-            <a:ext cx="1621440" cy="303120"/>
+            <a:ext cx="1621080" cy="303120"/>
           </a:xfrm>
           <a:prstGeom prst="rect">
             <a:avLst/>
@@ -14674,7 +14692,7 @@
         <p:spPr>
           <a:xfrm>
             <a:off x="10543680" y="718560"/>
-            <a:ext cx="1621440" cy="516600"/>
+            <a:ext cx="1621080" cy="516600"/>
           </a:xfrm>
           <a:prstGeom prst="rect">
             <a:avLst/>
@@ -14764,7 +14782,7 @@
         <p:spPr>
           <a:xfrm>
             <a:off x="10543680" y="457200"/>
-            <a:ext cx="1621440" cy="303120"/>
+            <a:ext cx="1621080" cy="303120"/>
           </a:xfrm>
           <a:prstGeom prst="rect">
             <a:avLst/>
@@ -14821,7 +14839,7 @@
         <p:spPr>
           <a:xfrm>
             <a:off x="10543680" y="718560"/>
-            <a:ext cx="1621440" cy="2224440"/>
+            <a:ext cx="1621080" cy="2224440"/>
           </a:xfrm>
           <a:prstGeom prst="rect">
             <a:avLst/>
@@ -14999,7 +15017,7 @@
                 </a:solidFill>
                 <a:latin typeface="Calibri"/>
               </a:rPr>
-              <a:t>Consumption/uur</a:t>
+              <a:t>Consumption/hour</a:t>
             </a:r>
             <a:endParaRPr b="0" lang="en-US" sz="1400" spc="-1" strike="noStrike">
               <a:solidFill>
@@ -15073,7 +15091,7 @@
         <p:spPr>
           <a:xfrm>
             <a:off x="8282160" y="1443600"/>
-            <a:ext cx="2053440" cy="382680"/>
+            <a:ext cx="2053080" cy="382320"/>
           </a:xfrm>
           <a:prstGeom prst="diamond">
             <a:avLst/>
@@ -15140,8 +15158,8 @@
         </p:nvCxnSpPr>
         <p:spPr>
           <a:xfrm>
-            <a:off x="9308880" y="1826280"/>
-            <a:ext cx="1261080" cy="2288520"/>
+            <a:off x="9308880" y="1825920"/>
+            <a:ext cx="1261080" cy="2288880"/>
           </a:xfrm>
           <a:prstGeom prst="straightConnector1">
             <a:avLst/>
@@ -15165,8 +15183,8 @@
         </p:nvCxnSpPr>
         <p:spPr>
           <a:xfrm flipH="1" flipV="1">
-            <a:off x="10335600" y="1635120"/>
-            <a:ext cx="208440" cy="195840"/>
+            <a:off x="10335240" y="1634760"/>
+            <a:ext cx="208800" cy="196200"/>
           </a:xfrm>
           <a:prstGeom prst="straightConnector1">
             <a:avLst/>
@@ -15190,8 +15208,8 @@
         </p:nvCxnSpPr>
         <p:spPr>
           <a:xfrm flipH="1" flipV="1">
-            <a:off x="7467120" y="1220040"/>
-            <a:ext cx="1842120" cy="223920"/>
+            <a:off x="7466760" y="1220040"/>
+            <a:ext cx="1842480" cy="223920"/>
           </a:xfrm>
           <a:prstGeom prst="straightConnector1">
             <a:avLst/>
@@ -15213,7 +15231,7 @@
         <p:spPr>
           <a:xfrm>
             <a:off x="5412240" y="5029200"/>
-            <a:ext cx="1621440" cy="303120"/>
+            <a:ext cx="1621080" cy="303120"/>
           </a:xfrm>
           <a:prstGeom prst="rect">
             <a:avLst/>
@@ -15270,7 +15288,7 @@
         <p:spPr>
           <a:xfrm>
             <a:off x="3710160" y="4343400"/>
-            <a:ext cx="1824840" cy="382680"/>
+            <a:ext cx="1824480" cy="382320"/>
           </a:xfrm>
           <a:prstGeom prst="diamond">
             <a:avLst/>
@@ -15337,8 +15355,8 @@
         </p:nvCxnSpPr>
         <p:spPr>
           <a:xfrm>
-            <a:off x="2896920" y="4114800"/>
-            <a:ext cx="813600" cy="420480"/>
+            <a:off x="2896560" y="4114800"/>
+            <a:ext cx="813960" cy="420120"/>
           </a:xfrm>
           <a:prstGeom prst="straightConnector1">
             <a:avLst/>
@@ -15363,8 +15381,8 @@
         </p:nvCxnSpPr>
         <p:spPr>
           <a:xfrm>
-            <a:off x="4622760" y="4726080"/>
-            <a:ext cx="789840" cy="455040"/>
+            <a:off x="4622400" y="4725720"/>
+            <a:ext cx="790200" cy="455400"/>
           </a:xfrm>
           <a:prstGeom prst="straightConnector1">
             <a:avLst/>
@@ -15388,7 +15406,7 @@
         </p:nvCxnSpPr>
         <p:spPr>
           <a:xfrm flipH="1" flipV="1">
-            <a:off x="3352320" y="2073960"/>
+            <a:off x="3351960" y="2073960"/>
             <a:ext cx="2187000" cy="1126800"/>
           </a:xfrm>
           <a:prstGeom prst="straightConnector1">
@@ -15411,7 +15429,7 @@
         <p:spPr>
           <a:xfrm>
             <a:off x="4626720" y="3200400"/>
-            <a:ext cx="1824120" cy="681840"/>
+            <a:ext cx="1823760" cy="681480"/>
           </a:xfrm>
           <a:prstGeom prst="diamond">
             <a:avLst/>
@@ -15478,8 +15496,8 @@
         </p:nvCxnSpPr>
         <p:spPr>
           <a:xfrm flipH="1" flipV="1">
-            <a:off x="5538960" y="3882240"/>
-            <a:ext cx="684360" cy="1147320"/>
+            <a:off x="5538600" y="3881880"/>
+            <a:ext cx="684360" cy="1147680"/>
           </a:xfrm>
           <a:prstGeom prst="straightConnector1">
             <a:avLst/>
@@ -15501,7 +15519,7 @@
         <p:spPr>
           <a:xfrm>
             <a:off x="2693880" y="4415400"/>
-            <a:ext cx="477720" cy="382680"/>
+            <a:ext cx="477360" cy="382320"/>
           </a:xfrm>
           <a:prstGeom prst="triangle">
             <a:avLst>
@@ -15570,7 +15588,7 @@
         </p:nvCxnSpPr>
         <p:spPr>
           <a:xfrm flipH="1" flipV="1">
-            <a:off x="2896920" y="4114800"/>
+            <a:off x="2896560" y="4114800"/>
             <a:ext cx="36360" cy="300960"/>
           </a:xfrm>
           <a:prstGeom prst="straightConnector1">
@@ -15593,7 +15611,7 @@
         <p:spPr>
           <a:xfrm>
             <a:off x="2109960" y="5163480"/>
-            <a:ext cx="1621440" cy="303120"/>
+            <a:ext cx="1621080" cy="303120"/>
           </a:xfrm>
           <a:prstGeom prst="rect">
             <a:avLst/>
@@ -15650,7 +15668,7 @@
         <p:spPr>
           <a:xfrm>
             <a:off x="2109960" y="5163480"/>
-            <a:ext cx="1621440" cy="303120"/>
+            <a:ext cx="1621080" cy="303120"/>
           </a:xfrm>
           <a:prstGeom prst="rect">
             <a:avLst/>
@@ -15707,7 +15725,7 @@
         <p:spPr>
           <a:xfrm>
             <a:off x="2109960" y="5424840"/>
-            <a:ext cx="1621440" cy="363960"/>
+            <a:ext cx="1621080" cy="363960"/>
           </a:xfrm>
           <a:prstGeom prst="rect">
             <a:avLst/>
@@ -15775,8 +15793,8 @@
         </p:nvCxnSpPr>
         <p:spPr>
           <a:xfrm flipH="1">
-            <a:off x="2920680" y="4798080"/>
-            <a:ext cx="12600" cy="365760"/>
+            <a:off x="2920320" y="4797720"/>
+            <a:ext cx="12600" cy="366120"/>
           </a:xfrm>
           <a:prstGeom prst="straightConnector1">
             <a:avLst/>
@@ -15798,7 +15816,7 @@
         <p:spPr>
           <a:xfrm>
             <a:off x="7627320" y="4800600"/>
-            <a:ext cx="1566720" cy="382680"/>
+            <a:ext cx="1566360" cy="382320"/>
           </a:xfrm>
           <a:prstGeom prst="diamond">
             <a:avLst/>
@@ -15863,7 +15881,7 @@
         <p:spPr>
           <a:xfrm>
             <a:off x="7627320" y="5329800"/>
-            <a:ext cx="1795320" cy="382680"/>
+            <a:ext cx="1794960" cy="382320"/>
           </a:xfrm>
           <a:prstGeom prst="diamond">
             <a:avLst/>
@@ -15930,8 +15948,8 @@
         </p:nvCxnSpPr>
         <p:spPr>
           <a:xfrm flipH="1">
-            <a:off x="9194040" y="4114440"/>
-            <a:ext cx="1375920" cy="878040"/>
+            <a:off x="9193680" y="4114440"/>
+            <a:ext cx="1376280" cy="877680"/>
           </a:xfrm>
           <a:prstGeom prst="straightConnector1">
             <a:avLst/>
@@ -15956,8 +15974,8 @@
         </p:nvCxnSpPr>
         <p:spPr>
           <a:xfrm flipH="1">
-            <a:off x="7033680" y="4992120"/>
-            <a:ext cx="594000" cy="189000"/>
+            <a:off x="7033320" y="4991760"/>
+            <a:ext cx="594360" cy="189360"/>
           </a:xfrm>
           <a:prstGeom prst="straightConnector1">
             <a:avLst/>
@@ -15981,8 +15999,8 @@
         </p:nvCxnSpPr>
         <p:spPr>
           <a:xfrm flipH="1" flipV="1">
-            <a:off x="7033680" y="5180760"/>
-            <a:ext cx="594000" cy="340920"/>
+            <a:off x="7033320" y="5180760"/>
+            <a:ext cx="594360" cy="340560"/>
           </a:xfrm>
           <a:prstGeom prst="straightConnector1">
             <a:avLst/>
@@ -16006,8 +16024,8 @@
         </p:nvCxnSpPr>
         <p:spPr>
           <a:xfrm flipH="1">
-            <a:off x="9422640" y="4114440"/>
-            <a:ext cx="1147320" cy="1407240"/>
+            <a:off x="9422280" y="4114440"/>
+            <a:ext cx="1147680" cy="1406880"/>
           </a:xfrm>
           <a:prstGeom prst="straightConnector1">
             <a:avLst/>
@@ -16032,8 +16050,8 @@
         </p:nvCxnSpPr>
         <p:spPr>
           <a:xfrm flipH="1">
-            <a:off x="4163040" y="1105920"/>
-            <a:ext cx="264240" cy="176400"/>
+            <a:off x="4162680" y="1105560"/>
+            <a:ext cx="264600" cy="176760"/>
           </a:xfrm>
           <a:prstGeom prst="straightConnector1">
             <a:avLst/>
@@ -16055,7 +16073,7 @@
         <p:spPr>
           <a:xfrm>
             <a:off x="8053560" y="2057400"/>
-            <a:ext cx="1218240" cy="382680"/>
+            <a:ext cx="1217880" cy="382320"/>
           </a:xfrm>
           <a:prstGeom prst="ellipse">
             <a:avLst/>
@@ -16120,8 +16138,8 @@
         </p:nvCxnSpPr>
         <p:spPr>
           <a:xfrm flipV="1">
-            <a:off x="8662680" y="1826280"/>
-            <a:ext cx="646560" cy="231480"/>
+            <a:off x="8662680" y="1825920"/>
+            <a:ext cx="646560" cy="231840"/>
           </a:xfrm>
           <a:prstGeom prst="straightConnector1">
             <a:avLst/>
@@ -16173,7 +16191,7 @@
         <p:spPr>
           <a:xfrm flipH="1">
             <a:off x="0" y="3073320"/>
-            <a:ext cx="1833840" cy="5040"/>
+            <a:ext cx="1834200" cy="5400"/>
           </a:xfrm>
           <a:prstGeom prst="straightConnector1">
             <a:avLst/>
@@ -16196,7 +16214,7 @@
         <p:spPr>
           <a:xfrm>
             <a:off x="0" y="2489400"/>
-            <a:ext cx="1833840" cy="5040"/>
+            <a:ext cx="1834200" cy="5400"/>
           </a:xfrm>
           <a:prstGeom prst="straightConnector1">
             <a:avLst/>
@@ -16219,7 +16237,7 @@
         <p:spPr>
           <a:xfrm>
             <a:off x="0" y="2781360"/>
-            <a:ext cx="1833840" cy="5040"/>
+            <a:ext cx="1834200" cy="5400"/>
           </a:xfrm>
           <a:prstGeom prst="straightConnector1">
             <a:avLst/>
@@ -16242,7 +16260,7 @@
         <p:spPr>
           <a:xfrm flipH="1">
             <a:off x="0" y="3657600"/>
-            <a:ext cx="1833840" cy="5040"/>
+            <a:ext cx="1834200" cy="5400"/>
           </a:xfrm>
           <a:prstGeom prst="straightConnector1">
             <a:avLst/>
@@ -16264,7 +16282,7 @@
         <p:spPr>
           <a:xfrm>
             <a:off x="128520" y="6134040"/>
-            <a:ext cx="1566720" cy="382680"/>
+            <a:ext cx="1566360" cy="382320"/>
           </a:xfrm>
           <a:prstGeom prst="diamond">
             <a:avLst/>
@@ -16329,7 +16347,7 @@
         <p:spPr>
           <a:xfrm>
             <a:off x="302760" y="5454000"/>
-            <a:ext cx="1218240" cy="382680"/>
+            <a:ext cx="1217880" cy="382320"/>
           </a:xfrm>
           <a:prstGeom prst="ellipse">
             <a:avLst/>
@@ -16392,9 +16410,9 @@
         <p:grpSpPr>
           <a:xfrm>
             <a:off x="101160" y="336240"/>
-            <a:ext cx="1621440" cy="777960"/>
+            <a:ext cx="1621080" cy="777960"/>
             <a:chOff x="101160" y="336240"/>
-            <a:chExt cx="1621440" cy="777960"/>
+            <a:chExt cx="1621080" cy="777960"/>
           </a:xfrm>
         </p:grpSpPr>
         <p:sp>
@@ -16406,7 +16424,7 @@
           <p:spPr>
             <a:xfrm>
               <a:off x="101160" y="336240"/>
-              <a:ext cx="1621440" cy="303120"/>
+              <a:ext cx="1621080" cy="303120"/>
             </a:xfrm>
             <a:prstGeom prst="rect">
               <a:avLst/>
@@ -16463,7 +16481,7 @@
           <p:spPr>
             <a:xfrm>
               <a:off x="101160" y="597600"/>
-              <a:ext cx="1621440" cy="516600"/>
+              <a:ext cx="1621080" cy="516600"/>
             </a:xfrm>
             <a:prstGeom prst="rect">
               <a:avLst/>
@@ -16554,7 +16572,7 @@
         <p:spPr>
           <a:xfrm>
             <a:off x="128520" y="4629600"/>
-            <a:ext cx="1566720" cy="527400"/>
+            <a:ext cx="1566360" cy="527040"/>
           </a:xfrm>
           <a:prstGeom prst="diamond">
             <a:avLst/>
@@ -16642,7 +16660,7 @@
         <p:spPr>
           <a:xfrm>
             <a:off x="0" y="3365640"/>
-            <a:ext cx="1833840" cy="5040"/>
+            <a:ext cx="1834200" cy="5400"/>
           </a:xfrm>
           <a:prstGeom prst="straightConnector1">
             <a:avLst/>
@@ -16664,7 +16682,7 @@
         <p:spPr>
           <a:xfrm>
             <a:off x="673200" y="3949920"/>
-            <a:ext cx="477720" cy="382680"/>
+            <a:ext cx="477360" cy="382320"/>
           </a:xfrm>
           <a:prstGeom prst="triangle">
             <a:avLst>
@@ -16731,9 +16749,9 @@
         <p:grpSpPr>
           <a:xfrm>
             <a:off x="101160" y="1413000"/>
-            <a:ext cx="1621440" cy="777960"/>
+            <a:ext cx="1621080" cy="777960"/>
             <a:chOff x="101160" y="1413000"/>
-            <a:chExt cx="1621440" cy="777960"/>
+            <a:chExt cx="1621080" cy="777960"/>
           </a:xfrm>
         </p:grpSpPr>
         <p:sp>
@@ -16745,7 +16763,7 @@
           <p:spPr>
             <a:xfrm>
               <a:off x="101160" y="1413000"/>
-              <a:ext cx="1621440" cy="303120"/>
+              <a:ext cx="1621080" cy="303120"/>
             </a:xfrm>
             <a:prstGeom prst="rect">
               <a:avLst/>
@@ -16803,7 +16821,7 @@
           <p:spPr>
             <a:xfrm>
               <a:off x="101160" y="1674360"/>
-              <a:ext cx="1621440" cy="516600"/>
+              <a:ext cx="1621080" cy="516600"/>
             </a:xfrm>
             <a:prstGeom prst="rect">
               <a:avLst/>
@@ -16895,7 +16913,7 @@
         <p:spPr>
           <a:xfrm>
             <a:off x="4775040" y="457200"/>
-            <a:ext cx="1621440" cy="303120"/>
+            <a:ext cx="1621080" cy="303120"/>
           </a:xfrm>
           <a:prstGeom prst="rect">
             <a:avLst/>
@@ -16952,7 +16970,7 @@
         <p:spPr>
           <a:xfrm>
             <a:off x="4775040" y="718560"/>
-            <a:ext cx="1621440" cy="730080"/>
+            <a:ext cx="1621080" cy="730080"/>
           </a:xfrm>
           <a:prstGeom prst="rect">
             <a:avLst/>
@@ -17069,9 +17087,9 @@
         <p:grpSpPr>
           <a:xfrm>
             <a:off x="4572000" y="4274280"/>
-            <a:ext cx="1621440" cy="991440"/>
+            <a:ext cx="1621080" cy="991440"/>
             <a:chOff x="4572000" y="4274280"/>
-            <a:chExt cx="1621440" cy="991440"/>
+            <a:chExt cx="1621080" cy="991440"/>
           </a:xfrm>
         </p:grpSpPr>
         <p:sp>
@@ -17083,7 +17101,7 @@
           <p:spPr>
             <a:xfrm>
               <a:off x="4572000" y="4274280"/>
-              <a:ext cx="1621440" cy="303120"/>
+              <a:ext cx="1621080" cy="303120"/>
             </a:xfrm>
             <a:prstGeom prst="rect">
               <a:avLst/>
@@ -17140,7 +17158,7 @@
           <p:spPr>
             <a:xfrm>
               <a:off x="4572000" y="4535640"/>
-              <a:ext cx="1621440" cy="730080"/>
+              <a:ext cx="1621080" cy="730080"/>
             </a:xfrm>
             <a:prstGeom prst="rect">
               <a:avLst/>
@@ -17258,7 +17276,7 @@
         <p:spPr>
           <a:xfrm>
             <a:off x="3231360" y="2899800"/>
-            <a:ext cx="1566720" cy="382680"/>
+            <a:ext cx="1566360" cy="382320"/>
           </a:xfrm>
           <a:prstGeom prst="diamond">
             <a:avLst/>
@@ -17323,7 +17341,7 @@
         <p:spPr>
           <a:xfrm>
             <a:off x="4602960" y="2585160"/>
-            <a:ext cx="1795320" cy="384120"/>
+            <a:ext cx="1794960" cy="383760"/>
           </a:xfrm>
           <a:prstGeom prst="diamond">
             <a:avLst/>
@@ -17390,8 +17408,8 @@
         </p:nvCxnSpPr>
         <p:spPr>
           <a:xfrm flipH="1" flipV="1">
-            <a:off x="4014720" y="3282480"/>
-            <a:ext cx="1368360" cy="992160"/>
+            <a:off x="4014720" y="3282120"/>
+            <a:ext cx="1368000" cy="992520"/>
           </a:xfrm>
           <a:prstGeom prst="straightConnector1">
             <a:avLst/>
@@ -17416,7 +17434,7 @@
         </p:nvCxnSpPr>
         <p:spPr>
           <a:xfrm flipV="1">
-            <a:off x="5500800" y="1448640"/>
+            <a:off x="5500440" y="1448640"/>
             <a:ext cx="85320" cy="1136880"/>
           </a:xfrm>
           <a:prstGeom prst="straightConnector1">
@@ -17441,8 +17459,8 @@
         </p:nvCxnSpPr>
         <p:spPr>
           <a:xfrm flipV="1">
-            <a:off x="5382720" y="2969280"/>
-            <a:ext cx="118440" cy="1305360"/>
+            <a:off x="5382360" y="2968920"/>
+            <a:ext cx="118440" cy="1305720"/>
           </a:xfrm>
           <a:prstGeom prst="straightConnector1">
             <a:avLst/>
@@ -17467,7 +17485,7 @@
         <p:spPr>
           <a:xfrm flipH="1">
             <a:off x="4014720" y="1448640"/>
-            <a:ext cx="1571400" cy="1451520"/>
+            <a:ext cx="1571040" cy="1451520"/>
           </a:xfrm>
           <a:prstGeom prst="straightConnector1">
             <a:avLst/>
@@ -17489,7 +17507,7 @@
         <p:spPr>
           <a:xfrm>
             <a:off x="2743200" y="457200"/>
-            <a:ext cx="1566720" cy="382680"/>
+            <a:ext cx="1566360" cy="382320"/>
           </a:xfrm>
           <a:prstGeom prst="diamond">
             <a:avLst/>
@@ -17556,8 +17574,8 @@
         </p:nvCxnSpPr>
         <p:spPr>
           <a:xfrm flipH="1" flipV="1">
-            <a:off x="4309920" y="648720"/>
-            <a:ext cx="465480" cy="435240"/>
+            <a:off x="4309560" y="648360"/>
+            <a:ext cx="465840" cy="435600"/>
           </a:xfrm>
           <a:prstGeom prst="straightConnector1">
             <a:avLst/>
@@ -17581,8 +17599,8 @@
         </p:nvCxnSpPr>
         <p:spPr>
           <a:xfrm flipH="1" flipV="1">
-            <a:off x="3526560" y="839880"/>
-            <a:ext cx="1248840" cy="244080"/>
+            <a:off x="3526560" y="839520"/>
+            <a:ext cx="1248840" cy="244440"/>
           </a:xfrm>
           <a:prstGeom prst="straightConnector1">
             <a:avLst/>
@@ -17604,9 +17622,9 @@
         <p:grpSpPr>
           <a:xfrm>
             <a:off x="8686800" y="837360"/>
-            <a:ext cx="1621440" cy="991440"/>
+            <a:ext cx="1621080" cy="991440"/>
             <a:chOff x="8686800" y="837360"/>
-            <a:chExt cx="1621440" cy="991440"/>
+            <a:chExt cx="1621080" cy="991440"/>
           </a:xfrm>
         </p:grpSpPr>
         <p:sp>
@@ -17618,7 +17636,7 @@
           <p:spPr>
             <a:xfrm>
               <a:off x="8686800" y="837360"/>
-              <a:ext cx="1621440" cy="303120"/>
+              <a:ext cx="1621080" cy="303120"/>
             </a:xfrm>
             <a:prstGeom prst="rect">
               <a:avLst/>
@@ -17675,7 +17693,7 @@
           <p:spPr>
             <a:xfrm>
               <a:off x="8686800" y="1098720"/>
-              <a:ext cx="1621440" cy="730080"/>
+              <a:ext cx="1621080" cy="730080"/>
             </a:xfrm>
             <a:prstGeom prst="rect">
               <a:avLst/>
@@ -17793,7 +17811,7 @@
         <p:spPr>
           <a:xfrm>
             <a:off x="128880" y="6134040"/>
-            <a:ext cx="1566720" cy="382680"/>
+            <a:ext cx="1566360" cy="382320"/>
           </a:xfrm>
           <a:prstGeom prst="diamond">
             <a:avLst/>
@@ -17858,7 +17876,7 @@
         <p:spPr>
           <a:xfrm>
             <a:off x="7315200" y="228600"/>
-            <a:ext cx="1566720" cy="382680"/>
+            <a:ext cx="1566360" cy="382320"/>
           </a:xfrm>
           <a:prstGeom prst="diamond">
             <a:avLst/>
@@ -17923,7 +17941,7 @@
         <p:spPr>
           <a:xfrm>
             <a:off x="360" y="3366000"/>
-            <a:ext cx="1833840" cy="5040"/>
+            <a:ext cx="1834200" cy="5400"/>
           </a:xfrm>
           <a:prstGeom prst="straightConnector1">
             <a:avLst/>
@@ -17947,8 +17965,8 @@
         </p:nvCxnSpPr>
         <p:spPr>
           <a:xfrm flipH="1">
-            <a:off x="6396480" y="420120"/>
-            <a:ext cx="919080" cy="663840"/>
+            <a:off x="6396120" y="419760"/>
+            <a:ext cx="919440" cy="664200"/>
           </a:xfrm>
           <a:prstGeom prst="straightConnector1">
             <a:avLst/>
@@ -17970,7 +17988,7 @@
         <p:spPr>
           <a:xfrm>
             <a:off x="6629400" y="1442160"/>
-            <a:ext cx="1825920" cy="612360"/>
+            <a:ext cx="1825560" cy="612000"/>
           </a:xfrm>
           <a:prstGeom prst="diamond">
             <a:avLst/>
@@ -18037,8 +18055,8 @@
         </p:nvCxnSpPr>
         <p:spPr>
           <a:xfrm flipH="1" flipV="1">
-            <a:off x="8881920" y="420120"/>
-            <a:ext cx="615960" cy="417600"/>
+            <a:off x="8881560" y="419760"/>
+            <a:ext cx="615960" cy="417960"/>
           </a:xfrm>
           <a:prstGeom prst="straightConnector1">
             <a:avLst/>
@@ -18061,7 +18079,7 @@
         <p:spPr>
           <a:xfrm>
             <a:off x="6629400" y="2514600"/>
-            <a:ext cx="1566720" cy="382680"/>
+            <a:ext cx="1566360" cy="382320"/>
           </a:xfrm>
           <a:prstGeom prst="diamond">
             <a:avLst/>
@@ -18128,8 +18146,8 @@
         </p:nvCxnSpPr>
         <p:spPr>
           <a:xfrm flipH="1">
-            <a:off x="8196120" y="1828800"/>
-            <a:ext cx="1301760" cy="877680"/>
+            <a:off x="8195760" y="1828800"/>
+            <a:ext cx="1301760" cy="877320"/>
           </a:xfrm>
           <a:prstGeom prst="straightConnector1">
             <a:avLst/>
@@ -18153,8 +18171,8 @@
         </p:nvCxnSpPr>
         <p:spPr>
           <a:xfrm flipH="1">
-            <a:off x="6193440" y="2706120"/>
-            <a:ext cx="436320" cy="2064240"/>
+            <a:off x="6193080" y="2705760"/>
+            <a:ext cx="436680" cy="2064600"/>
           </a:xfrm>
           <a:prstGeom prst="straightConnector1">
             <a:avLst/>
@@ -18178,8 +18196,8 @@
         </p:nvCxnSpPr>
         <p:spPr>
           <a:xfrm flipH="1">
-            <a:off x="8455320" y="1333080"/>
-            <a:ext cx="231840" cy="415800"/>
+            <a:off x="8454960" y="1333080"/>
+            <a:ext cx="232200" cy="415440"/>
           </a:xfrm>
           <a:prstGeom prst="straightConnector1">
             <a:avLst/>
@@ -18203,8 +18221,8 @@
         </p:nvCxnSpPr>
         <p:spPr>
           <a:xfrm flipH="1" flipV="1">
-            <a:off x="5585760" y="1448640"/>
-            <a:ext cx="1044000" cy="300240"/>
+            <a:off x="5585400" y="1448640"/>
+            <a:ext cx="1044360" cy="299880"/>
           </a:xfrm>
           <a:prstGeom prst="straightConnector1">
             <a:avLst/>
@@ -18226,9 +18244,9 @@
         <p:grpSpPr>
           <a:xfrm>
             <a:off x="101160" y="336240"/>
-            <a:ext cx="1621440" cy="777960"/>
+            <a:ext cx="1621080" cy="777960"/>
             <a:chOff x="101160" y="336240"/>
-            <a:chExt cx="1621440" cy="777960"/>
+            <a:chExt cx="1621080" cy="777960"/>
           </a:xfrm>
         </p:grpSpPr>
         <p:sp>
@@ -18240,7 +18258,7 @@
           <p:spPr>
             <a:xfrm>
               <a:off x="101160" y="336240"/>
-              <a:ext cx="1621440" cy="303120"/>
+              <a:ext cx="1621080" cy="303120"/>
             </a:xfrm>
             <a:prstGeom prst="rect">
               <a:avLst/>
@@ -18297,7 +18315,7 @@
           <p:spPr>
             <a:xfrm>
               <a:off x="101160" y="597600"/>
-              <a:ext cx="1621440" cy="516600"/>
+              <a:ext cx="1621080" cy="516600"/>
             </a:xfrm>
             <a:prstGeom prst="rect">
               <a:avLst/>
@@ -18388,9 +18406,9 @@
         <p:grpSpPr>
           <a:xfrm>
             <a:off x="6760440" y="4359960"/>
-            <a:ext cx="1621440" cy="561600"/>
+            <a:ext cx="1621080" cy="561240"/>
             <a:chOff x="6760440" y="4359960"/>
-            <a:chExt cx="1621440" cy="561600"/>
+            <a:chExt cx="1621080" cy="561240"/>
           </a:xfrm>
         </p:grpSpPr>
         <p:sp>
@@ -18402,7 +18420,7 @@
           <p:spPr>
             <a:xfrm>
               <a:off x="6760440" y="4359960"/>
-              <a:ext cx="1621440" cy="303120"/>
+              <a:ext cx="1621080" cy="303120"/>
             </a:xfrm>
             <a:prstGeom prst="rect">
               <a:avLst/>
@@ -18459,7 +18477,7 @@
           <p:spPr>
             <a:xfrm>
               <a:off x="6760440" y="4621320"/>
-              <a:ext cx="1621440" cy="300240"/>
+              <a:ext cx="1621080" cy="299880"/>
             </a:xfrm>
             <a:prstGeom prst="rect">
               <a:avLst/>
@@ -18508,7 +18526,7 @@
         <p:spPr>
           <a:xfrm>
             <a:off x="9144000" y="2057400"/>
-            <a:ext cx="477720" cy="382680"/>
+            <a:ext cx="477360" cy="382320"/>
           </a:xfrm>
           <a:prstGeom prst="triangle">
             <a:avLst>
@@ -18576,8 +18594,8 @@
         </p:nvCxnSpPr>
         <p:spPr>
           <a:xfrm flipH="1">
-            <a:off x="8026200" y="4111920"/>
-            <a:ext cx="1434600" cy="250920"/>
+            <a:off x="8026200" y="4111560"/>
+            <a:ext cx="1434240" cy="251640"/>
           </a:xfrm>
           <a:prstGeom prst="straightConnector1">
             <a:avLst/>
@@ -18600,8 +18618,8 @@
         </p:nvCxnSpPr>
         <p:spPr>
           <a:xfrm flipH="1" flipV="1">
-            <a:off x="9460440" y="4111920"/>
-            <a:ext cx="473760" cy="232560"/>
+            <a:off x="9460080" y="4111560"/>
+            <a:ext cx="474480" cy="233280"/>
           </a:xfrm>
           <a:prstGeom prst="straightConnector1">
             <a:avLst/>
@@ -18624,8 +18642,8 @@
         </p:nvCxnSpPr>
         <p:spPr>
           <a:xfrm flipH="1">
-            <a:off x="9346320" y="2440080"/>
-            <a:ext cx="37080" cy="442440"/>
+            <a:off x="9346320" y="2439720"/>
+            <a:ext cx="36720" cy="443160"/>
           </a:xfrm>
           <a:prstGeom prst="straightConnector1">
             <a:avLst/>
@@ -18649,7 +18667,7 @@
         </p:nvCxnSpPr>
         <p:spPr>
           <a:xfrm flipH="1">
-            <a:off x="9383040" y="1828800"/>
+            <a:off x="9382680" y="1828800"/>
             <a:ext cx="114840" cy="228960"/>
           </a:xfrm>
           <a:prstGeom prst="straightConnector1">
@@ -18672,7 +18690,7 @@
         <p:spPr>
           <a:xfrm>
             <a:off x="7089840" y="5715000"/>
-            <a:ext cx="1621440" cy="303120"/>
+            <a:ext cx="1621080" cy="303120"/>
           </a:xfrm>
           <a:prstGeom prst="rect">
             <a:avLst/>
@@ -18729,7 +18747,7 @@
         <p:spPr>
           <a:xfrm>
             <a:off x="6760440" y="5183280"/>
-            <a:ext cx="1824840" cy="382680"/>
+            <a:ext cx="1824480" cy="382320"/>
           </a:xfrm>
           <a:prstGeom prst="diamond">
             <a:avLst/>
@@ -18794,7 +18812,7 @@
         <p:spPr>
           <a:xfrm flipH="1">
             <a:off x="0" y="3657600"/>
-            <a:ext cx="1833840" cy="5040"/>
+            <a:ext cx="1834200" cy="5400"/>
           </a:xfrm>
           <a:prstGeom prst="straightConnector1">
             <a:avLst/>
@@ -18816,9 +18834,9 @@
         <p:grpSpPr>
           <a:xfrm>
             <a:off x="8534520" y="2879640"/>
-            <a:ext cx="1621440" cy="562320"/>
+            <a:ext cx="1621080" cy="561960"/>
             <a:chOff x="8534520" y="2879640"/>
-            <a:chExt cx="1621440" cy="562320"/>
+            <a:chExt cx="1621080" cy="561960"/>
           </a:xfrm>
         </p:grpSpPr>
         <p:sp>
@@ -18830,7 +18848,7 @@
           <p:spPr>
             <a:xfrm>
               <a:off x="8534520" y="2879640"/>
-              <a:ext cx="1621440" cy="303120"/>
+              <a:ext cx="1621080" cy="303120"/>
             </a:xfrm>
             <a:prstGeom prst="rect">
               <a:avLst/>
@@ -18887,7 +18905,7 @@
           <p:spPr>
             <a:xfrm>
               <a:off x="8534520" y="3141000"/>
-              <a:ext cx="1621440" cy="300960"/>
+              <a:ext cx="1621080" cy="300600"/>
             </a:xfrm>
             <a:prstGeom prst="rect">
               <a:avLst/>
@@ -18936,9 +18954,9 @@
         <p:grpSpPr>
           <a:xfrm>
             <a:off x="8534520" y="2879640"/>
-            <a:ext cx="1621440" cy="564480"/>
+            <a:ext cx="1621080" cy="564480"/>
             <a:chOff x="8534520" y="2879640"/>
-            <a:chExt cx="1621440" cy="564480"/>
+            <a:chExt cx="1621080" cy="564480"/>
           </a:xfrm>
         </p:grpSpPr>
         <p:sp>
@@ -18950,7 +18968,7 @@
           <p:spPr>
             <a:xfrm>
               <a:off x="8534520" y="2879640"/>
-              <a:ext cx="1621440" cy="303120"/>
+              <a:ext cx="1621080" cy="303120"/>
             </a:xfrm>
             <a:prstGeom prst="rect">
               <a:avLst/>
@@ -19007,7 +19025,7 @@
           <p:spPr>
             <a:xfrm>
               <a:off x="8534520" y="3141000"/>
-              <a:ext cx="1621440" cy="303120"/>
+              <a:ext cx="1621080" cy="303120"/>
             </a:xfrm>
             <a:prstGeom prst="rect">
               <a:avLst/>
@@ -19070,7 +19088,7 @@
         <p:spPr>
           <a:xfrm>
             <a:off x="9221400" y="3729240"/>
-            <a:ext cx="477720" cy="382680"/>
+            <a:ext cx="477360" cy="382320"/>
           </a:xfrm>
           <a:prstGeom prst="triangle">
             <a:avLst>
@@ -19139,7 +19157,7 @@
         </p:nvCxnSpPr>
         <p:spPr>
           <a:xfrm>
-            <a:off x="9345240" y="3444120"/>
+            <a:off x="9344880" y="3444120"/>
             <a:ext cx="115560" cy="285480"/>
           </a:xfrm>
           <a:prstGeom prst="straightConnector1">
@@ -19162,7 +19180,7 @@
         <p:spPr>
           <a:xfrm>
             <a:off x="8556840" y="3657600"/>
-            <a:ext cx="1833840" cy="5040"/>
+            <a:ext cx="1834200" cy="5400"/>
           </a:xfrm>
           <a:prstGeom prst="straightConnector1">
             <a:avLst/>
@@ -19185,7 +19203,7 @@
         <p:spPr>
           <a:xfrm>
             <a:off x="9601200" y="3382920"/>
-            <a:ext cx="911520" cy="343440"/>
+            <a:ext cx="911160" cy="343080"/>
           </a:xfrm>
           <a:prstGeom prst="rect">
             <a:avLst/>
@@ -19238,7 +19256,7 @@
         <p:spPr>
           <a:xfrm>
             <a:off x="2057400" y="2132280"/>
-            <a:ext cx="1621440" cy="303120"/>
+            <a:ext cx="1621080" cy="303120"/>
           </a:xfrm>
           <a:prstGeom prst="rect">
             <a:avLst/>
@@ -19295,7 +19313,7 @@
         <p:spPr>
           <a:xfrm>
             <a:off x="2057400" y="2393640"/>
-            <a:ext cx="1621440" cy="192960"/>
+            <a:ext cx="1621080" cy="192600"/>
           </a:xfrm>
           <a:prstGeom prst="rect">
             <a:avLst/>
@@ -19343,7 +19361,7 @@
         <p:spPr>
           <a:xfrm>
             <a:off x="2613960" y="1217880"/>
-            <a:ext cx="477720" cy="382680"/>
+            <a:ext cx="477360" cy="382320"/>
           </a:xfrm>
           <a:prstGeom prst="triangle">
             <a:avLst>
@@ -19412,8 +19430,8 @@
         </p:nvCxnSpPr>
         <p:spPr>
           <a:xfrm>
-            <a:off x="2853000" y="1600560"/>
-            <a:ext cx="15480" cy="532080"/>
+            <a:off x="2852640" y="1600200"/>
+            <a:ext cx="15480" cy="532440"/>
           </a:xfrm>
           <a:prstGeom prst="straightConnector1">
             <a:avLst/>
@@ -19437,8 +19455,8 @@
         </p:nvCxnSpPr>
         <p:spPr>
           <a:xfrm flipV="1">
-            <a:off x="2853000" y="1083600"/>
-            <a:ext cx="1922400" cy="134640"/>
+            <a:off x="2852640" y="1083600"/>
+            <a:ext cx="1922760" cy="134640"/>
           </a:xfrm>
           <a:prstGeom prst="straightConnector1">
             <a:avLst/>
@@ -19462,8 +19480,8 @@
         </p:nvCxnSpPr>
         <p:spPr>
           <a:xfrm>
-            <a:off x="7571160" y="4921560"/>
-            <a:ext cx="102240" cy="262080"/>
+            <a:off x="7570800" y="4921200"/>
+            <a:ext cx="102240" cy="262440"/>
           </a:xfrm>
           <a:prstGeom prst="straightConnector1">
             <a:avLst/>
@@ -19488,8 +19506,8 @@
         </p:nvCxnSpPr>
         <p:spPr>
           <a:xfrm>
-            <a:off x="7673040" y="5565960"/>
-            <a:ext cx="227880" cy="149400"/>
+            <a:off x="7672680" y="5565600"/>
+            <a:ext cx="227880" cy="149760"/>
           </a:xfrm>
           <a:prstGeom prst="straightConnector1">
             <a:avLst/>
@@ -19511,9 +19529,9 @@
         <p:grpSpPr>
           <a:xfrm>
             <a:off x="10265040" y="5029200"/>
-            <a:ext cx="1621440" cy="561960"/>
+            <a:ext cx="1621080" cy="561600"/>
             <a:chOff x="10265040" y="5029200"/>
-            <a:chExt cx="1621440" cy="561960"/>
+            <a:chExt cx="1621080" cy="561600"/>
           </a:xfrm>
         </p:grpSpPr>
         <p:sp>
@@ -19525,7 +19543,7 @@
           <p:spPr>
             <a:xfrm>
               <a:off x="10265040" y="5029200"/>
-              <a:ext cx="1621440" cy="303120"/>
+              <a:ext cx="1621080" cy="303120"/>
             </a:xfrm>
             <a:prstGeom prst="rect">
               <a:avLst/>
@@ -19582,7 +19600,7 @@
           <p:spPr>
             <a:xfrm>
               <a:off x="10265040" y="5290560"/>
-              <a:ext cx="1621440" cy="300600"/>
+              <a:ext cx="1621080" cy="300240"/>
             </a:xfrm>
             <a:prstGeom prst="rect">
               <a:avLst/>
@@ -19633,8 +19651,8 @@
         </p:nvCxnSpPr>
         <p:spPr>
           <a:xfrm flipH="1" flipV="1">
-            <a:off x="9699120" y="4111920"/>
-            <a:ext cx="1377000" cy="917640"/>
+            <a:off x="9698760" y="4111560"/>
+            <a:ext cx="1377000" cy="918000"/>
           </a:xfrm>
           <a:prstGeom prst="straightConnector1">
             <a:avLst/>
@@ -19656,9 +19674,9 @@
         <p:grpSpPr>
           <a:xfrm>
             <a:off x="9122040" y="4343400"/>
-            <a:ext cx="1621440" cy="561960"/>
+            <a:ext cx="1621080" cy="561600"/>
             <a:chOff x="9122040" y="4343400"/>
-            <a:chExt cx="1621440" cy="561960"/>
+            <a:chExt cx="1621080" cy="561600"/>
           </a:xfrm>
         </p:grpSpPr>
         <p:sp>
@@ -19670,7 +19688,7 @@
           <p:spPr>
             <a:xfrm>
               <a:off x="9122040" y="4343400"/>
-              <a:ext cx="1621440" cy="303120"/>
+              <a:ext cx="1621080" cy="303120"/>
             </a:xfrm>
             <a:prstGeom prst="rect">
               <a:avLst/>
@@ -19727,7 +19745,7 @@
           <p:spPr>
             <a:xfrm>
               <a:off x="9122040" y="4604760"/>
-              <a:ext cx="1621440" cy="300600"/>
+              <a:ext cx="1621080" cy="300240"/>
             </a:xfrm>
             <a:prstGeom prst="rect">
               <a:avLst/>
@@ -19776,7 +19794,7 @@
         <p:spPr>
           <a:xfrm>
             <a:off x="10037520" y="2131560"/>
-            <a:ext cx="477720" cy="382680"/>
+            <a:ext cx="477360" cy="382320"/>
           </a:xfrm>
           <a:prstGeom prst="triangle">
             <a:avLst>
@@ -19845,7 +19863,7 @@
         </p:nvCxnSpPr>
         <p:spPr>
           <a:xfrm>
-            <a:off x="9497520" y="1828800"/>
+            <a:off x="9497160" y="1828800"/>
             <a:ext cx="779400" cy="303120"/>
           </a:xfrm>
           <a:prstGeom prst="straightConnector1">
@@ -19868,9 +19886,9 @@
         <p:grpSpPr>
           <a:xfrm>
             <a:off x="10494000" y="2866680"/>
-            <a:ext cx="1621440" cy="561960"/>
+            <a:ext cx="1621080" cy="561600"/>
             <a:chOff x="10494000" y="2866680"/>
-            <a:chExt cx="1621440" cy="561960"/>
+            <a:chExt cx="1621080" cy="561600"/>
           </a:xfrm>
         </p:grpSpPr>
         <p:sp>
@@ -19882,7 +19900,7 @@
           <p:spPr>
             <a:xfrm>
               <a:off x="10494000" y="2866680"/>
-              <a:ext cx="1621440" cy="303120"/>
+              <a:ext cx="1621080" cy="303120"/>
             </a:xfrm>
             <a:prstGeom prst="rect">
               <a:avLst/>
@@ -19939,7 +19957,7 @@
           <p:spPr>
             <a:xfrm>
               <a:off x="10494000" y="3128040"/>
-              <a:ext cx="1621440" cy="300600"/>
+              <a:ext cx="1621080" cy="300240"/>
             </a:xfrm>
             <a:prstGeom prst="rect">
               <a:avLst/>
@@ -19990,8 +20008,8 @@
         </p:nvCxnSpPr>
         <p:spPr>
           <a:xfrm>
-            <a:off x="10276560" y="2514240"/>
-            <a:ext cx="1028520" cy="352800"/>
+            <a:off x="10276200" y="2513880"/>
+            <a:ext cx="1028520" cy="353160"/>
           </a:xfrm>
           <a:prstGeom prst="straightConnector1">
             <a:avLst/>
@@ -20043,7 +20061,7 @@
         <p:spPr>
           <a:xfrm flipH="1">
             <a:off x="0" y="3073320"/>
-            <a:ext cx="1833840" cy="5040"/>
+            <a:ext cx="1834200" cy="5400"/>
           </a:xfrm>
           <a:prstGeom prst="straightConnector1">
             <a:avLst/>
@@ -20066,7 +20084,7 @@
         <p:spPr>
           <a:xfrm>
             <a:off x="0" y="2489400"/>
-            <a:ext cx="1833840" cy="5040"/>
+            <a:ext cx="1834200" cy="5400"/>
           </a:xfrm>
           <a:prstGeom prst="straightConnector1">
             <a:avLst/>
@@ -20089,7 +20107,7 @@
         <p:spPr>
           <a:xfrm>
             <a:off x="0" y="2781360"/>
-            <a:ext cx="1833840" cy="5040"/>
+            <a:ext cx="1834200" cy="5400"/>
           </a:xfrm>
           <a:prstGeom prst="straightConnector1">
             <a:avLst/>
@@ -20112,7 +20130,7 @@
         <p:spPr>
           <a:xfrm flipH="1">
             <a:off x="0" y="3657600"/>
-            <a:ext cx="1833840" cy="5040"/>
+            <a:ext cx="1834200" cy="5400"/>
           </a:xfrm>
           <a:prstGeom prst="straightConnector1">
             <a:avLst/>
@@ -20134,7 +20152,7 @@
         <p:spPr>
           <a:xfrm>
             <a:off x="128520" y="6134040"/>
-            <a:ext cx="1566720" cy="382680"/>
+            <a:ext cx="1566360" cy="382320"/>
           </a:xfrm>
           <a:prstGeom prst="diamond">
             <a:avLst/>
@@ -20199,7 +20217,7 @@
         <p:spPr>
           <a:xfrm>
             <a:off x="302760" y="5454000"/>
-            <a:ext cx="1218240" cy="382680"/>
+            <a:ext cx="1217880" cy="382320"/>
           </a:xfrm>
           <a:prstGeom prst="ellipse">
             <a:avLst/>
@@ -20262,7 +20280,7 @@
         <p:spPr>
           <a:xfrm>
             <a:off x="101160" y="336240"/>
-            <a:ext cx="1621440" cy="303120"/>
+            <a:ext cx="1621080" cy="303120"/>
           </a:xfrm>
           <a:prstGeom prst="rect">
             <a:avLst/>
@@ -20319,7 +20337,7 @@
         <p:spPr>
           <a:xfrm>
             <a:off x="101160" y="597600"/>
-            <a:ext cx="1621440" cy="516600"/>
+            <a:ext cx="1621080" cy="516600"/>
           </a:xfrm>
           <a:prstGeom prst="rect">
             <a:avLst/>
@@ -20409,7 +20427,7 @@
         <p:spPr>
           <a:xfrm>
             <a:off x="8458200" y="5486400"/>
-            <a:ext cx="1621440" cy="303120"/>
+            <a:ext cx="1621080" cy="303120"/>
           </a:xfrm>
           <a:prstGeom prst="rect">
             <a:avLst/>
@@ -20466,7 +20484,7 @@
         <p:spPr>
           <a:xfrm>
             <a:off x="128520" y="4629600"/>
-            <a:ext cx="1566720" cy="527400"/>
+            <a:ext cx="1566360" cy="527040"/>
           </a:xfrm>
           <a:prstGeom prst="diamond">
             <a:avLst/>
@@ -20554,7 +20572,7 @@
         <p:spPr>
           <a:xfrm>
             <a:off x="0" y="3365640"/>
-            <a:ext cx="1833840" cy="5040"/>
+            <a:ext cx="1834200" cy="5400"/>
           </a:xfrm>
           <a:prstGeom prst="straightConnector1">
             <a:avLst/>
@@ -20576,7 +20594,7 @@
         <p:spPr>
           <a:xfrm>
             <a:off x="673200" y="3949920"/>
-            <a:ext cx="477720" cy="382680"/>
+            <a:ext cx="477360" cy="382320"/>
           </a:xfrm>
           <a:prstGeom prst="triangle">
             <a:avLst>
@@ -20643,9 +20661,9 @@
         <p:grpSpPr>
           <a:xfrm>
             <a:off x="101160" y="1413000"/>
-            <a:ext cx="1621440" cy="777960"/>
+            <a:ext cx="1621080" cy="777960"/>
             <a:chOff x="101160" y="1413000"/>
-            <a:chExt cx="1621440" cy="777960"/>
+            <a:chExt cx="1621080" cy="777960"/>
           </a:xfrm>
         </p:grpSpPr>
         <p:sp>
@@ -20657,7 +20675,7 @@
           <p:spPr>
             <a:xfrm>
               <a:off x="101160" y="1413000"/>
-              <a:ext cx="1621440" cy="303120"/>
+              <a:ext cx="1621080" cy="303120"/>
             </a:xfrm>
             <a:prstGeom prst="rect">
               <a:avLst/>
@@ -20715,7 +20733,7 @@
           <p:spPr>
             <a:xfrm>
               <a:off x="101160" y="1674360"/>
-              <a:ext cx="1621440" cy="516600"/>
+              <a:ext cx="1621080" cy="516600"/>
             </a:xfrm>
             <a:prstGeom prst="rect">
               <a:avLst/>
@@ -20807,7 +20825,7 @@
         <p:spPr>
           <a:xfrm>
             <a:off x="5463360" y="2131920"/>
-            <a:ext cx="1621440" cy="303120"/>
+            <a:ext cx="1621080" cy="303120"/>
           </a:xfrm>
           <a:prstGeom prst="rect">
             <a:avLst/>
@@ -20870,7 +20888,7 @@
         <p:spPr>
           <a:xfrm>
             <a:off x="5463360" y="1828800"/>
-            <a:ext cx="1621440" cy="303120"/>
+            <a:ext cx="1621080" cy="303120"/>
           </a:xfrm>
           <a:prstGeom prst="rect">
             <a:avLst/>
@@ -20927,9 +20945,9 @@
         <p:grpSpPr>
           <a:xfrm>
             <a:off x="4296600" y="4022640"/>
-            <a:ext cx="1621440" cy="777960"/>
+            <a:ext cx="1621080" cy="777960"/>
             <a:chOff x="4296600" y="4022640"/>
-            <a:chExt cx="1621440" cy="777960"/>
+            <a:chExt cx="1621080" cy="777960"/>
           </a:xfrm>
         </p:grpSpPr>
         <p:sp>
@@ -20941,7 +20959,7 @@
           <p:spPr>
             <a:xfrm>
               <a:off x="4296600" y="4022640"/>
-              <a:ext cx="1621440" cy="303120"/>
+              <a:ext cx="1621080" cy="303120"/>
             </a:xfrm>
             <a:prstGeom prst="rect">
               <a:avLst/>
@@ -20998,7 +21016,7 @@
           <p:spPr>
             <a:xfrm>
               <a:off x="4296600" y="4284000"/>
-              <a:ext cx="1621440" cy="516600"/>
+              <a:ext cx="1621080" cy="516600"/>
             </a:xfrm>
             <a:prstGeom prst="rect">
               <a:avLst/>
@@ -21089,9 +21107,9 @@
         <p:grpSpPr>
           <a:xfrm>
             <a:off x="9348840" y="2254320"/>
-            <a:ext cx="1621440" cy="1631880"/>
+            <a:ext cx="1621080" cy="1631880"/>
             <a:chOff x="9348840" y="2254320"/>
-            <a:chExt cx="1621440" cy="1631880"/>
+            <a:chExt cx="1621080" cy="1631880"/>
           </a:xfrm>
         </p:grpSpPr>
         <p:sp>
@@ -21103,7 +21121,7 @@
           <p:spPr>
             <a:xfrm>
               <a:off x="9348840" y="2254320"/>
-              <a:ext cx="1621440" cy="303120"/>
+              <a:ext cx="1621080" cy="303120"/>
             </a:xfrm>
             <a:prstGeom prst="rect">
               <a:avLst/>
@@ -21160,7 +21178,7 @@
           <p:spPr>
             <a:xfrm>
               <a:off x="9348840" y="2515680"/>
-              <a:ext cx="1621440" cy="1370520"/>
+              <a:ext cx="1621080" cy="1370520"/>
             </a:xfrm>
             <a:prstGeom prst="rect">
               <a:avLst/>
@@ -21359,7 +21377,7 @@
         <p:spPr>
           <a:xfrm>
             <a:off x="9402120" y="4572000"/>
-            <a:ext cx="1566720" cy="382680"/>
+            <a:ext cx="1566360" cy="382320"/>
           </a:xfrm>
           <a:prstGeom prst="diamond">
             <a:avLst/>
@@ -21424,7 +21442,7 @@
         <p:spPr>
           <a:xfrm>
             <a:off x="7007400" y="4572000"/>
-            <a:ext cx="1675440" cy="382680"/>
+            <a:ext cx="1675080" cy="382320"/>
           </a:xfrm>
           <a:prstGeom prst="ellipse">
             <a:avLst/>
@@ -21487,9 +21505,9 @@
         <p:grpSpPr>
           <a:xfrm>
             <a:off x="9348840" y="2254320"/>
-            <a:ext cx="1621440" cy="1631880"/>
+            <a:ext cx="1621080" cy="1631880"/>
             <a:chOff x="9348840" y="2254320"/>
-            <a:chExt cx="1621440" cy="1631880"/>
+            <a:chExt cx="1621080" cy="1631880"/>
           </a:xfrm>
         </p:grpSpPr>
         <p:sp>
@@ -21501,7 +21519,7 @@
           <p:spPr>
             <a:xfrm>
               <a:off x="9348840" y="2254320"/>
-              <a:ext cx="1621440" cy="303120"/>
+              <a:ext cx="1621080" cy="303120"/>
             </a:xfrm>
             <a:prstGeom prst="rect">
               <a:avLst/>
@@ -21558,7 +21576,7 @@
           <p:spPr>
             <a:xfrm>
               <a:off x="9348840" y="2515680"/>
-              <a:ext cx="1621440" cy="1370520"/>
+              <a:ext cx="1621080" cy="1370520"/>
             </a:xfrm>
             <a:prstGeom prst="rect">
               <a:avLst/>
@@ -21757,9 +21775,9 @@
         <p:grpSpPr>
           <a:xfrm>
             <a:off x="9348840" y="2254320"/>
-            <a:ext cx="1621440" cy="1845360"/>
+            <a:ext cx="1621080" cy="1845360"/>
             <a:chOff x="9348840" y="2254320"/>
-            <a:chExt cx="1621440" cy="1845360"/>
+            <a:chExt cx="1621080" cy="1845360"/>
           </a:xfrm>
         </p:grpSpPr>
         <p:sp>
@@ -21771,7 +21789,7 @@
           <p:spPr>
             <a:xfrm>
               <a:off x="9348840" y="2254320"/>
-              <a:ext cx="1621440" cy="303120"/>
+              <a:ext cx="1621080" cy="303120"/>
             </a:xfrm>
             <a:prstGeom prst="rect">
               <a:avLst/>
@@ -21828,7 +21846,7 @@
           <p:spPr>
             <a:xfrm>
               <a:off x="9348840" y="2515680"/>
-              <a:ext cx="1621440" cy="1584000"/>
+              <a:ext cx="1621080" cy="1584000"/>
             </a:xfrm>
             <a:prstGeom prst="rect">
               <a:avLst/>
@@ -22054,7 +22072,7 @@
         <p:spPr>
           <a:xfrm>
             <a:off x="7086600" y="3501720"/>
-            <a:ext cx="1824840" cy="382680"/>
+            <a:ext cx="1824480" cy="382320"/>
           </a:xfrm>
           <a:prstGeom prst="diamond">
             <a:avLst/>
@@ -22119,7 +22137,7 @@
         <p:spPr>
           <a:xfrm>
             <a:off x="7543800" y="1869840"/>
-            <a:ext cx="1795320" cy="382680"/>
+            <a:ext cx="1794960" cy="382320"/>
           </a:xfrm>
           <a:prstGeom prst="diamond">
             <a:avLst/>
@@ -22186,8 +22204,8 @@
         </p:nvCxnSpPr>
         <p:spPr>
           <a:xfrm flipV="1">
-            <a:off x="7084800" y="2061360"/>
-            <a:ext cx="459360" cy="222480"/>
+            <a:off x="7084440" y="2061000"/>
+            <a:ext cx="459720" cy="222840"/>
           </a:xfrm>
           <a:prstGeom prst="straightConnector1">
             <a:avLst/>
@@ -22212,8 +22230,8 @@
         </p:nvCxnSpPr>
         <p:spPr>
           <a:xfrm flipH="1">
-            <a:off x="9268920" y="4954680"/>
-            <a:ext cx="916920" cy="532080"/>
+            <a:off x="9268560" y="4954320"/>
+            <a:ext cx="917280" cy="532440"/>
           </a:xfrm>
           <a:prstGeom prst="straightConnector1">
             <a:avLst/>
@@ -22237,8 +22255,8 @@
         </p:nvCxnSpPr>
         <p:spPr>
           <a:xfrm>
-            <a:off x="10159560" y="4099680"/>
-            <a:ext cx="26280" cy="472680"/>
+            <a:off x="10159200" y="4099680"/>
+            <a:ext cx="26640" cy="472680"/>
           </a:xfrm>
           <a:prstGeom prst="straightConnector1">
             <a:avLst/>
@@ -22262,8 +22280,8 @@
         </p:nvCxnSpPr>
         <p:spPr>
           <a:xfrm flipH="1">
-            <a:off x="8682840" y="4763520"/>
-            <a:ext cx="719640" cy="360"/>
+            <a:off x="8682480" y="4763160"/>
+            <a:ext cx="720000" cy="360"/>
           </a:xfrm>
           <a:prstGeom prst="straightConnector1">
             <a:avLst/>
@@ -22285,7 +22303,7 @@
         <p:spPr>
           <a:xfrm>
             <a:off x="6629400" y="5099760"/>
-            <a:ext cx="1596240" cy="382680"/>
+            <a:ext cx="1595880" cy="382320"/>
           </a:xfrm>
           <a:prstGeom prst="ellipse">
             <a:avLst/>
@@ -22350,8 +22368,8 @@
         </p:nvCxnSpPr>
         <p:spPr>
           <a:xfrm flipH="1">
-            <a:off x="8225640" y="4763520"/>
-            <a:ext cx="1176840" cy="528120"/>
+            <a:off x="8225280" y="4763160"/>
+            <a:ext cx="1177200" cy="528120"/>
           </a:xfrm>
           <a:prstGeom prst="straightConnector1">
             <a:avLst/>
@@ -22375,8 +22393,8 @@
         </p:nvCxnSpPr>
         <p:spPr>
           <a:xfrm flipH="1">
-            <a:off x="3630600" y="2549520"/>
-            <a:ext cx="4320" cy="457560"/>
+            <a:off x="3630240" y="2549160"/>
+            <a:ext cx="4680" cy="457560"/>
           </a:xfrm>
           <a:prstGeom prst="straightConnector1">
             <a:avLst/>
@@ -22398,7 +22416,7 @@
         <p:spPr>
           <a:xfrm>
             <a:off x="5234760" y="2815200"/>
-            <a:ext cx="1566720" cy="382680"/>
+            <a:ext cx="1566360" cy="382320"/>
           </a:xfrm>
           <a:prstGeom prst="diamond">
             <a:avLst/>
@@ -22463,7 +22481,7 @@
         <p:spPr>
           <a:xfrm>
             <a:off x="3634560" y="2358000"/>
-            <a:ext cx="1566720" cy="382680"/>
+            <a:ext cx="1566360" cy="382320"/>
           </a:xfrm>
           <a:prstGeom prst="diamond">
             <a:avLst/>
@@ -22528,7 +22546,7 @@
         <p:spPr>
           <a:xfrm>
             <a:off x="2034360" y="2815200"/>
-            <a:ext cx="1596240" cy="382680"/>
+            <a:ext cx="1595880" cy="382320"/>
           </a:xfrm>
           <a:prstGeom prst="ellipse">
             <a:avLst/>
@@ -22593,8 +22611,8 @@
         </p:nvCxnSpPr>
         <p:spPr>
           <a:xfrm flipH="1" flipV="1">
-            <a:off x="4417920" y="2740680"/>
-            <a:ext cx="689760" cy="1282320"/>
+            <a:off x="4417920" y="2740320"/>
+            <a:ext cx="689400" cy="1282680"/>
           </a:xfrm>
           <a:prstGeom prst="straightConnector1">
             <a:avLst/>
@@ -22644,8 +22662,8 @@
         </p:nvCxnSpPr>
         <p:spPr>
           <a:xfrm flipV="1">
-            <a:off x="5107320" y="3197880"/>
-            <a:ext cx="911160" cy="825120"/>
+            <a:off x="5106960" y="3197520"/>
+            <a:ext cx="911520" cy="825480"/>
           </a:xfrm>
           <a:prstGeom prst="straightConnector1">
             <a:avLst/>
@@ -22671,7 +22689,7 @@
         <p:spPr>
           <a:xfrm flipV="1">
             <a:off x="6018120" y="2435040"/>
-            <a:ext cx="256320" cy="380520"/>
+            <a:ext cx="255960" cy="380520"/>
           </a:xfrm>
           <a:prstGeom prst="straightConnector1">
             <a:avLst/>
@@ -22695,8 +22713,8 @@
         </p:nvCxnSpPr>
         <p:spPr>
           <a:xfrm flipV="1">
-            <a:off x="5918040" y="3693240"/>
-            <a:ext cx="1168920" cy="718560"/>
+            <a:off x="5917680" y="3692880"/>
+            <a:ext cx="1169280" cy="718920"/>
           </a:xfrm>
           <a:prstGeom prst="straightConnector1">
             <a:avLst/>
@@ -22721,8 +22739,8 @@
         </p:nvCxnSpPr>
         <p:spPr>
           <a:xfrm flipH="1">
-            <a:off x="8911440" y="3177000"/>
-            <a:ext cx="437760" cy="516600"/>
+            <a:off x="8911080" y="3177000"/>
+            <a:ext cx="438120" cy="516240"/>
           </a:xfrm>
           <a:prstGeom prst="straightConnector1">
             <a:avLst/>
@@ -22746,8 +22764,8 @@
         </p:nvCxnSpPr>
         <p:spPr>
           <a:xfrm flipH="1" flipV="1">
-            <a:off x="9339120" y="2061360"/>
-            <a:ext cx="820800" cy="193320"/>
+            <a:off x="9338760" y="2061000"/>
+            <a:ext cx="820800" cy="193680"/>
           </a:xfrm>
           <a:prstGeom prst="straightConnector1">
             <a:avLst/>
@@ -22769,7 +22787,7 @@
         <p:spPr>
           <a:xfrm>
             <a:off x="2722320" y="5330520"/>
-            <a:ext cx="1824840" cy="382680"/>
+            <a:ext cx="1824480" cy="382320"/>
           </a:xfrm>
           <a:prstGeom prst="diamond">
             <a:avLst/>
@@ -22836,8 +22854,8 @@
         </p:nvCxnSpPr>
         <p:spPr>
           <a:xfrm flipH="1">
-            <a:off x="3634920" y="4411440"/>
-            <a:ext cx="662040" cy="919440"/>
+            <a:off x="3634560" y="4411440"/>
+            <a:ext cx="662400" cy="919440"/>
           </a:xfrm>
           <a:prstGeom prst="straightConnector1">
             <a:avLst/>
@@ -22861,8 +22879,8 @@
         </p:nvCxnSpPr>
         <p:spPr>
           <a:xfrm flipH="1">
-            <a:off x="4547160" y="4800600"/>
-            <a:ext cx="560520" cy="721800"/>
+            <a:off x="4546800" y="4800600"/>
+            <a:ext cx="560520" cy="721440"/>
           </a:xfrm>
           <a:prstGeom prst="straightConnector1">
             <a:avLst/>
@@ -22884,7 +22902,7 @@
         <p:spPr>
           <a:xfrm>
             <a:off x="7315200" y="4114800"/>
-            <a:ext cx="1675440" cy="382680"/>
+            <a:ext cx="1675080" cy="382320"/>
           </a:xfrm>
           <a:prstGeom prst="ellipse">
             <a:avLst/>
@@ -22949,8 +22967,8 @@
         </p:nvCxnSpPr>
         <p:spPr>
           <a:xfrm flipH="1" flipV="1">
-            <a:off x="8990640" y="4306320"/>
-            <a:ext cx="411840" cy="457560"/>
+            <a:off x="8990280" y="4305960"/>
+            <a:ext cx="412200" cy="457560"/>
           </a:xfrm>
           <a:prstGeom prst="straightConnector1">
             <a:avLst/>
@@ -23002,7 +23020,7 @@
         <p:spPr>
           <a:xfrm flipH="1">
             <a:off x="0" y="3073320"/>
-            <a:ext cx="1833840" cy="5040"/>
+            <a:ext cx="1834200" cy="5400"/>
           </a:xfrm>
           <a:prstGeom prst="straightConnector1">
             <a:avLst/>
@@ -23025,7 +23043,7 @@
         <p:spPr>
           <a:xfrm>
             <a:off x="0" y="2489400"/>
-            <a:ext cx="1833840" cy="5040"/>
+            <a:ext cx="1834200" cy="5400"/>
           </a:xfrm>
           <a:prstGeom prst="straightConnector1">
             <a:avLst/>
@@ -23048,7 +23066,7 @@
         <p:spPr>
           <a:xfrm>
             <a:off x="0" y="2781360"/>
-            <a:ext cx="1833840" cy="5040"/>
+            <a:ext cx="1834200" cy="5400"/>
           </a:xfrm>
           <a:prstGeom prst="straightConnector1">
             <a:avLst/>
@@ -23071,7 +23089,7 @@
         <p:spPr>
           <a:xfrm flipH="1">
             <a:off x="0" y="3657600"/>
-            <a:ext cx="1833840" cy="5040"/>
+            <a:ext cx="1834200" cy="5400"/>
           </a:xfrm>
           <a:prstGeom prst="straightConnector1">
             <a:avLst/>
@@ -23093,7 +23111,7 @@
         <p:spPr>
           <a:xfrm>
             <a:off x="128520" y="6134040"/>
-            <a:ext cx="1566720" cy="382680"/>
+            <a:ext cx="1566360" cy="382320"/>
           </a:xfrm>
           <a:prstGeom prst="diamond">
             <a:avLst/>
@@ -23158,7 +23176,7 @@
         <p:spPr>
           <a:xfrm>
             <a:off x="302760" y="5454000"/>
-            <a:ext cx="1218240" cy="382680"/>
+            <a:ext cx="1217880" cy="382320"/>
           </a:xfrm>
           <a:prstGeom prst="ellipse">
             <a:avLst/>
@@ -23221,9 +23239,9 @@
         <p:grpSpPr>
           <a:xfrm>
             <a:off x="101160" y="336240"/>
-            <a:ext cx="1621440" cy="777960"/>
+            <a:ext cx="1621080" cy="777960"/>
             <a:chOff x="101160" y="336240"/>
-            <a:chExt cx="1621440" cy="777960"/>
+            <a:chExt cx="1621080" cy="777960"/>
           </a:xfrm>
         </p:grpSpPr>
         <p:sp>
@@ -23235,7 +23253,7 @@
           <p:spPr>
             <a:xfrm>
               <a:off x="101160" y="336240"/>
-              <a:ext cx="1621440" cy="303120"/>
+              <a:ext cx="1621080" cy="303120"/>
             </a:xfrm>
             <a:prstGeom prst="rect">
               <a:avLst/>
@@ -23292,7 +23310,7 @@
           <p:spPr>
             <a:xfrm>
               <a:off x="101160" y="597600"/>
-              <a:ext cx="1621440" cy="516600"/>
+              <a:ext cx="1621080" cy="516600"/>
             </a:xfrm>
             <a:prstGeom prst="rect">
               <a:avLst/>
@@ -23383,7 +23401,7 @@
         <p:spPr>
           <a:xfrm>
             <a:off x="128520" y="4629600"/>
-            <a:ext cx="1566720" cy="527400"/>
+            <a:ext cx="1566360" cy="527040"/>
           </a:xfrm>
           <a:prstGeom prst="diamond">
             <a:avLst/>
@@ -23471,7 +23489,7 @@
         <p:spPr>
           <a:xfrm>
             <a:off x="0" y="3365640"/>
-            <a:ext cx="1833840" cy="5040"/>
+            <a:ext cx="1834200" cy="5400"/>
           </a:xfrm>
           <a:prstGeom prst="straightConnector1">
             <a:avLst/>
@@ -23493,7 +23511,7 @@
         <p:spPr>
           <a:xfrm>
             <a:off x="673200" y="3949920"/>
-            <a:ext cx="477720" cy="382680"/>
+            <a:ext cx="477360" cy="382320"/>
           </a:xfrm>
           <a:prstGeom prst="triangle">
             <a:avLst>
@@ -23560,9 +23578,9 @@
         <p:grpSpPr>
           <a:xfrm>
             <a:off x="101160" y="1413000"/>
-            <a:ext cx="1621440" cy="777960"/>
+            <a:ext cx="1621080" cy="777960"/>
             <a:chOff x="101160" y="1413000"/>
-            <a:chExt cx="1621440" cy="777960"/>
+            <a:chExt cx="1621080" cy="777960"/>
           </a:xfrm>
         </p:grpSpPr>
         <p:sp>
@@ -23574,7 +23592,7 @@
           <p:spPr>
             <a:xfrm>
               <a:off x="101160" y="1413000"/>
-              <a:ext cx="1621440" cy="303120"/>
+              <a:ext cx="1621080" cy="303120"/>
             </a:xfrm>
             <a:prstGeom prst="rect">
               <a:avLst/>
@@ -23632,7 +23650,7 @@
           <p:spPr>
             <a:xfrm>
               <a:off x="101160" y="1674360"/>
-              <a:ext cx="1621440" cy="516600"/>
+              <a:ext cx="1621080" cy="516600"/>
             </a:xfrm>
             <a:prstGeom prst="rect">
               <a:avLst/>

</xml_diff>

<commit_message>
added package to player by "Holds" relation
</commit_message>
<xml_diff>
--- a/documentation/include/ER-Diagram.pptx
+++ b/documentation/include/ER-Diagram.pptx
@@ -353,7 +353,7 @@
             <a:pPr indent="0" algn="r">
               <a:buNone/>
             </a:pPr>
-            <a:fld id="{C016BF43-2EEE-48E5-99AB-B483D340BFD1}" type="slidenum">
+            <a:fld id="{20A89845-BB4F-4A97-A66B-910B2E90FEA3}" type="slidenum">
               <a:rPr b="0" lang="en-US" sz="1400" spc="-1" strike="noStrike">
                 <a:solidFill>
                   <a:srgbClr val="000000"/>
@@ -396,7 +396,7 @@
       </p:grpSpPr>
       <p:sp>
         <p:nvSpPr>
-          <p:cNvPr id="368" name="PlaceHolder 1"/>
+          <p:cNvPr id="372" name="PlaceHolder 1"/>
           <p:cNvSpPr>
             <a:spLocks noGrp="1"/>
           </p:cNvSpPr>
@@ -407,7 +407,7 @@
         <p:spPr>
           <a:xfrm>
             <a:off x="685800" y="1143000"/>
-            <a:ext cx="5481360" cy="3081240"/>
+            <a:ext cx="5481000" cy="3080880"/>
           </a:xfrm>
           <a:prstGeom prst="rect">
             <a:avLst/>
@@ -419,7 +419,7 @@
       </p:sp>
       <p:sp>
         <p:nvSpPr>
-          <p:cNvPr id="369" name="PlaceHolder 2"/>
+          <p:cNvPr id="373" name="PlaceHolder 2"/>
           <p:cNvSpPr>
             <a:spLocks noGrp="1"/>
           </p:cNvSpPr>
@@ -430,7 +430,7 @@
         <p:spPr>
           <a:xfrm>
             <a:off x="685800" y="4400640"/>
-            <a:ext cx="5481360" cy="3595320"/>
+            <a:ext cx="5481000" cy="3594960"/>
           </a:xfrm>
           <a:prstGeom prst="rect">
             <a:avLst/>
@@ -459,7 +459,7 @@
       </p:sp>
       <p:sp>
         <p:nvSpPr>
-          <p:cNvPr id="370" name="PlaceHolder 3"/>
+          <p:cNvPr id="374" name="PlaceHolder 3"/>
           <p:cNvSpPr>
             <a:spLocks noGrp="1"/>
           </p:cNvSpPr>
@@ -470,7 +470,7 @@
         <p:spPr>
           <a:xfrm>
             <a:off x="3884760" y="8685360"/>
-            <a:ext cx="2966760" cy="453600"/>
+            <a:ext cx="2966400" cy="453240"/>
           </a:xfrm>
           <a:prstGeom prst="rect">
             <a:avLst/>
@@ -512,7 +512,7 @@
                 <a:tab algn="l" pos="0"/>
               </a:tabLst>
             </a:pPr>
-            <a:fld id="{5C4AE3F0-D07F-4910-9492-D5B4073CCB6A}" type="slidenum">
+            <a:fld id="{EC543CC8-45D4-437E-85AE-340A942CFF51}" type="slidenum">
               <a:rPr b="0" lang="en-US" sz="1200" spc="-1" strike="noStrike">
                 <a:solidFill>
                   <a:schemeClr val="dk1"/>
@@ -555,7 +555,7 @@
       </p:grpSpPr>
       <p:sp>
         <p:nvSpPr>
-          <p:cNvPr id="371" name="PlaceHolder 1"/>
+          <p:cNvPr id="375" name="PlaceHolder 1"/>
           <p:cNvSpPr>
             <a:spLocks noGrp="1"/>
           </p:cNvSpPr>
@@ -566,7 +566,7 @@
         <p:spPr>
           <a:xfrm>
             <a:off x="685800" y="1143000"/>
-            <a:ext cx="5481360" cy="3081240"/>
+            <a:ext cx="5481000" cy="3080880"/>
           </a:xfrm>
           <a:prstGeom prst="rect">
             <a:avLst/>
@@ -578,7 +578,7 @@
       </p:sp>
       <p:sp>
         <p:nvSpPr>
-          <p:cNvPr id="372" name="PlaceHolder 2"/>
+          <p:cNvPr id="376" name="PlaceHolder 2"/>
           <p:cNvSpPr>
             <a:spLocks noGrp="1"/>
           </p:cNvSpPr>
@@ -589,7 +589,7 @@
         <p:spPr>
           <a:xfrm>
             <a:off x="685800" y="4400640"/>
-            <a:ext cx="5481360" cy="3595320"/>
+            <a:ext cx="5481000" cy="3594960"/>
           </a:xfrm>
           <a:prstGeom prst="rect">
             <a:avLst/>
@@ -618,7 +618,7 @@
       </p:sp>
       <p:sp>
         <p:nvSpPr>
-          <p:cNvPr id="373" name="PlaceHolder 3"/>
+          <p:cNvPr id="377" name="PlaceHolder 3"/>
           <p:cNvSpPr>
             <a:spLocks noGrp="1"/>
           </p:cNvSpPr>
@@ -629,7 +629,7 @@
         <p:spPr>
           <a:xfrm>
             <a:off x="3884760" y="8685360"/>
-            <a:ext cx="2966760" cy="453600"/>
+            <a:ext cx="2966400" cy="453240"/>
           </a:xfrm>
           <a:prstGeom prst="rect">
             <a:avLst/>
@@ -671,7 +671,7 @@
                 <a:tab algn="l" pos="0"/>
               </a:tabLst>
             </a:pPr>
-            <a:fld id="{EFCEC852-A440-4866-B644-B8F174F5A7D8}" type="slidenum">
+            <a:fld id="{B1A79A79-6151-4BCE-A413-EA94813692DF}" type="slidenum">
               <a:rPr b="0" lang="en-US" sz="1200" spc="-1" strike="noStrike">
                 <a:solidFill>
                   <a:schemeClr val="dk1"/>
@@ -714,7 +714,7 @@
       </p:grpSpPr>
       <p:sp>
         <p:nvSpPr>
-          <p:cNvPr id="374" name="PlaceHolder 1"/>
+          <p:cNvPr id="378" name="PlaceHolder 1"/>
           <p:cNvSpPr>
             <a:spLocks noGrp="1"/>
           </p:cNvSpPr>
@@ -725,7 +725,7 @@
         <p:spPr>
           <a:xfrm>
             <a:off x="685800" y="1143000"/>
-            <a:ext cx="5481360" cy="3081240"/>
+            <a:ext cx="5481000" cy="3080880"/>
           </a:xfrm>
           <a:prstGeom prst="rect">
             <a:avLst/>
@@ -737,7 +737,7 @@
       </p:sp>
       <p:sp>
         <p:nvSpPr>
-          <p:cNvPr id="375" name="PlaceHolder 2"/>
+          <p:cNvPr id="379" name="PlaceHolder 2"/>
           <p:cNvSpPr>
             <a:spLocks noGrp="1"/>
           </p:cNvSpPr>
@@ -748,7 +748,7 @@
         <p:spPr>
           <a:xfrm>
             <a:off x="685800" y="4400640"/>
-            <a:ext cx="5481360" cy="3595320"/>
+            <a:ext cx="5481000" cy="3594960"/>
           </a:xfrm>
           <a:prstGeom prst="rect">
             <a:avLst/>
@@ -777,7 +777,7 @@
       </p:sp>
       <p:sp>
         <p:nvSpPr>
-          <p:cNvPr id="376" name="PlaceHolder 3"/>
+          <p:cNvPr id="380" name="PlaceHolder 3"/>
           <p:cNvSpPr>
             <a:spLocks noGrp="1"/>
           </p:cNvSpPr>
@@ -788,7 +788,7 @@
         <p:spPr>
           <a:xfrm>
             <a:off x="3884760" y="8685360"/>
-            <a:ext cx="2966760" cy="453600"/>
+            <a:ext cx="2966400" cy="453240"/>
           </a:xfrm>
           <a:prstGeom prst="rect">
             <a:avLst/>
@@ -830,7 +830,7 @@
                 <a:tab algn="l" pos="0"/>
               </a:tabLst>
             </a:pPr>
-            <a:fld id="{54CCA559-2012-41B0-B2B1-6B8C04DFC51A}" type="slidenum">
+            <a:fld id="{BFCF05B1-5329-4E1A-A340-C593D42E7145}" type="slidenum">
               <a:rPr b="0" lang="en-US" sz="1200" spc="-1" strike="noStrike">
                 <a:solidFill>
                   <a:schemeClr val="dk1"/>
@@ -873,7 +873,7 @@
       </p:grpSpPr>
       <p:sp>
         <p:nvSpPr>
-          <p:cNvPr id="377" name="PlaceHolder 1"/>
+          <p:cNvPr id="381" name="PlaceHolder 1"/>
           <p:cNvSpPr>
             <a:spLocks noGrp="1"/>
           </p:cNvSpPr>
@@ -884,7 +884,7 @@
         <p:spPr>
           <a:xfrm>
             <a:off x="685800" y="1143000"/>
-            <a:ext cx="5481360" cy="3081240"/>
+            <a:ext cx="5481000" cy="3080880"/>
           </a:xfrm>
           <a:prstGeom prst="rect">
             <a:avLst/>
@@ -896,7 +896,7 @@
       </p:sp>
       <p:sp>
         <p:nvSpPr>
-          <p:cNvPr id="378" name="PlaceHolder 2"/>
+          <p:cNvPr id="382" name="PlaceHolder 2"/>
           <p:cNvSpPr>
             <a:spLocks noGrp="1"/>
           </p:cNvSpPr>
@@ -907,7 +907,7 @@
         <p:spPr>
           <a:xfrm>
             <a:off x="685800" y="4400640"/>
-            <a:ext cx="5481360" cy="3595320"/>
+            <a:ext cx="5481000" cy="3594960"/>
           </a:xfrm>
           <a:prstGeom prst="rect">
             <a:avLst/>
@@ -936,7 +936,7 @@
       </p:sp>
       <p:sp>
         <p:nvSpPr>
-          <p:cNvPr id="379" name="PlaceHolder 3"/>
+          <p:cNvPr id="383" name="PlaceHolder 3"/>
           <p:cNvSpPr>
             <a:spLocks noGrp="1"/>
           </p:cNvSpPr>
@@ -947,7 +947,7 @@
         <p:spPr>
           <a:xfrm>
             <a:off x="3884760" y="8685360"/>
-            <a:ext cx="2966760" cy="453600"/>
+            <a:ext cx="2966400" cy="453240"/>
           </a:xfrm>
           <a:prstGeom prst="rect">
             <a:avLst/>
@@ -989,7 +989,7 @@
                 <a:tab algn="l" pos="0"/>
               </a:tabLst>
             </a:pPr>
-            <a:fld id="{87F5B150-51C2-4FB8-B9AD-050A5F88C71F}" type="slidenum">
+            <a:fld id="{D8FB95D1-8457-4C57-9BFB-7061C22390BE}" type="slidenum">
               <a:rPr b="0" lang="en-US" sz="1200" spc="-1" strike="noStrike">
                 <a:solidFill>
                   <a:schemeClr val="dk1"/>
@@ -1233,7 +1233,7 @@
         <p:txBody>
           <a:bodyPr/>
           <a:p>
-            <a:fld id="{20484E30-610B-4FD5-8375-A97B6D87C0A6}" type="slidenum">
+            <a:fld id="{20B9E24D-3FF9-48EB-8A03-FDAE94D5A53F}" type="slidenum">
               <a:t>&lt;#&gt;</a:t>
             </a:fld>
           </a:p>
@@ -1442,7 +1442,7 @@
         <p:txBody>
           <a:bodyPr/>
           <a:p>
-            <a:fld id="{D62AEF25-0164-4D7E-8953-F2EC33A3A2D5}" type="slidenum">
+            <a:fld id="{0060AC9E-D0ED-4232-90CC-F4BDFC18CB44}" type="slidenum">
               <a:t>&lt;#&gt;</a:t>
             </a:fld>
           </a:p>
@@ -1565,7 +1565,7 @@
         <p:txBody>
           <a:bodyPr/>
           <a:p>
-            <a:fld id="{D0D69AE3-3544-46B8-B407-292A977102B6}" type="slidenum">
+            <a:fld id="{F6B30C64-3554-4513-83C5-4EEAF8CF7D97}" type="slidenum">
               <a:t>&lt;#&gt;</a:t>
             </a:fld>
           </a:p>
@@ -1648,7 +1648,7 @@
         <p:txBody>
           <a:bodyPr/>
           <a:p>
-            <a:fld id="{5C381B4A-3521-4286-860F-666E2CDE2782}" type="slidenum">
+            <a:fld id="{0E8FB3E5-E250-4FEC-A966-4C0B9F6B7BE2}" type="slidenum">
               <a:t>&lt;#&gt;</a:t>
             </a:fld>
           </a:p>
@@ -1900,7 +1900,7 @@
         <p:txBody>
           <a:bodyPr/>
           <a:p>
-            <a:fld id="{E5F8F3B7-758B-4B9A-AB51-3B169DC412C3}" type="slidenum">
+            <a:fld id="{3C4B34D2-D7AE-47AE-9325-2A42AA519B0A}" type="slidenum">
               <a:t>&lt;#&gt;</a:t>
             </a:fld>
           </a:p>
@@ -2152,7 +2152,7 @@
         <p:txBody>
           <a:bodyPr/>
           <a:p>
-            <a:fld id="{3C5F612F-3166-4A4F-9C92-F557F2C9BE61}" type="slidenum">
+            <a:fld id="{BF393C90-0660-42E2-B3D8-6F31DB06F02B}" type="slidenum">
               <a:t>&lt;#&gt;</a:t>
             </a:fld>
           </a:p>
@@ -2361,7 +2361,7 @@
         <p:txBody>
           <a:bodyPr/>
           <a:p>
-            <a:fld id="{7C7F39F2-455D-40D5-B205-FC82C8E456EC}" type="slidenum">
+            <a:fld id="{AECFBD01-1D60-4F28-99DB-9AB88DE34DE7}" type="slidenum">
               <a:t>&lt;#&gt;</a:t>
             </a:fld>
           </a:p>
@@ -2656,7 +2656,7 @@
         <p:txBody>
           <a:bodyPr/>
           <a:p>
-            <a:fld id="{DECF932A-AF85-4B45-9B0F-4C39C3C0BBCF}" type="slidenum">
+            <a:fld id="{83F33FC5-041F-46C5-8B32-A9D25587B0E1}" type="slidenum">
               <a:t>&lt;#&gt;</a:t>
             </a:fld>
           </a:p>
@@ -2739,7 +2739,7 @@
         <p:txBody>
           <a:bodyPr/>
           <a:p>
-            <a:fld id="{3A545312-9637-4971-9356-A8C191D6D94B}" type="slidenum">
+            <a:fld id="{FA9DF45C-3B6E-460E-9BEA-A8BE67B28301}" type="slidenum">
               <a:t>&lt;#&gt;</a:t>
             </a:fld>
           </a:p>
@@ -2822,7 +2822,7 @@
         <p:txBody>
           <a:bodyPr/>
           <a:p>
-            <a:fld id="{DCBECA37-205E-46FF-BE86-028311677942}" type="slidenum">
+            <a:fld id="{3F7313A9-6F29-4D68-BDE6-2A9E919F09F7}" type="slidenum">
               <a:t>&lt;#&gt;</a:t>
             </a:fld>
           </a:p>
@@ -2988,7 +2988,7 @@
         <p:txBody>
           <a:bodyPr/>
           <a:p>
-            <a:fld id="{8FAC318E-E5B9-4A96-9750-7A7505D6C153}" type="slidenum">
+            <a:fld id="{62B7D3B3-58DF-4ADC-9831-B826A56E5F7E}" type="slidenum">
               <a:t>&lt;#&gt;</a:t>
             </a:fld>
           </a:p>
@@ -3154,7 +3154,7 @@
         <p:txBody>
           <a:bodyPr/>
           <a:p>
-            <a:fld id="{64319F50-F8E0-4BB3-B48F-0A7A4B1F6AEB}" type="slidenum">
+            <a:fld id="{E423620C-3EE9-4F89-9F00-D171580AA560}" type="slidenum">
               <a:t>&lt;#&gt;</a:t>
             </a:fld>
           </a:p>
@@ -3219,9 +3219,9 @@
         <p:grpSpPr>
           <a:xfrm>
             <a:off x="6199200" y="6162840"/>
-            <a:ext cx="5987880" cy="690120"/>
+            <a:ext cx="5987520" cy="689760"/>
             <a:chOff x="6199200" y="6162840"/>
-            <a:chExt cx="5987880" cy="690120"/>
+            <a:chExt cx="5987520" cy="689760"/>
           </a:xfrm>
         </p:grpSpPr>
         <p:pic>
@@ -3237,7 +3237,7 @@
           <p:spPr>
             <a:xfrm>
               <a:off x="6199200" y="6162840"/>
-              <a:ext cx="4051440" cy="690120"/>
+              <a:ext cx="4051080" cy="689760"/>
             </a:xfrm>
             <a:prstGeom prst="rect">
               <a:avLst/>
@@ -3260,7 +3260,7 @@
           <p:spPr>
             <a:xfrm>
               <a:off x="10270080" y="6162840"/>
-              <a:ext cx="1917000" cy="606600"/>
+              <a:ext cx="1916640" cy="606240"/>
             </a:xfrm>
             <a:prstGeom prst="rect">
               <a:avLst/>
@@ -3309,25 +3309,7 @@
                 </a:solidFill>
                 <a:latin typeface="Arial"/>
               </a:rPr>
-              <a:t>Click to edit </a:t>
-            </a:r>
-            <a:r>
-              <a:rPr b="0" lang="en-US" sz="1800" spc="-1" strike="noStrike">
-                <a:solidFill>
-                  <a:srgbClr val="000000"/>
-                </a:solidFill>
-                <a:latin typeface="Arial"/>
-              </a:rPr>
-              <a:t>the title text </a:t>
-            </a:r>
-            <a:r>
-              <a:rPr b="0" lang="en-US" sz="1800" spc="-1" strike="noStrike">
-                <a:solidFill>
-                  <a:srgbClr val="000000"/>
-                </a:solidFill>
-                <a:latin typeface="Arial"/>
-              </a:rPr>
-              <a:t>format</a:t>
+              <a:t>Click to edit the title text format</a:t>
             </a:r>
             <a:endParaRPr b="0" lang="en-US" sz="1800" spc="-1" strike="noStrike">
               <a:solidFill>
@@ -4026,7 +4008,7 @@
         <p:spPr>
           <a:xfrm>
             <a:off x="4038480" y="6356520"/>
-            <a:ext cx="4109760" cy="360000"/>
+            <a:ext cx="4109400" cy="359640"/>
           </a:xfrm>
           <a:prstGeom prst="rect">
             <a:avLst/>
@@ -4098,7 +4080,7 @@
         <p:spPr>
           <a:xfrm>
             <a:off x="8610480" y="6356520"/>
-            <a:ext cx="2738160" cy="360000"/>
+            <a:ext cx="2737800" cy="359640"/>
           </a:xfrm>
           <a:prstGeom prst="rect">
             <a:avLst/>
@@ -4141,7 +4123,7 @@
                 <a:tab algn="l" pos="0"/>
               </a:tabLst>
             </a:pPr>
-            <a:fld id="{CEEAF0C3-9F3E-49B2-9120-3C8945CC0535}" type="slidenum">
+            <a:fld id="{C78C7F19-49CF-415E-9894-5247E27A1295}" type="slidenum">
               <a:rPr b="0" lang="en-US" sz="1200" spc="-1" strike="noStrike">
                 <a:solidFill>
                   <a:schemeClr val="dk1">
@@ -4174,7 +4156,7 @@
         <p:spPr>
           <a:xfrm>
             <a:off x="838080" y="6356520"/>
-            <a:ext cx="2738160" cy="360000"/>
+            <a:ext cx="2737800" cy="359640"/>
           </a:xfrm>
           <a:prstGeom prst="rect">
             <a:avLst/>
@@ -4263,9 +4245,9 @@
         <p:grpSpPr>
           <a:xfrm>
             <a:off x="6199200" y="6162840"/>
-            <a:ext cx="5987880" cy="690120"/>
+            <a:ext cx="5987520" cy="689760"/>
             <a:chOff x="6199200" y="6162840"/>
-            <a:chExt cx="5987880" cy="690120"/>
+            <a:chExt cx="5987520" cy="689760"/>
           </a:xfrm>
         </p:grpSpPr>
         <p:pic>
@@ -4281,7 +4263,7 @@
           <p:spPr>
             <a:xfrm>
               <a:off x="6199200" y="6162840"/>
-              <a:ext cx="4051440" cy="690120"/>
+              <a:ext cx="4051080" cy="689760"/>
             </a:xfrm>
             <a:prstGeom prst="rect">
               <a:avLst/>
@@ -4304,7 +4286,7 @@
           <p:spPr>
             <a:xfrm>
               <a:off x="10270080" y="6162840"/>
-              <a:ext cx="1917000" cy="606600"/>
+              <a:ext cx="1916640" cy="606240"/>
             </a:xfrm>
             <a:prstGeom prst="rect">
               <a:avLst/>
@@ -4827,7 +4809,7 @@
         <p:spPr>
           <a:xfrm>
             <a:off x="4038480" y="6356520"/>
-            <a:ext cx="4109760" cy="360000"/>
+            <a:ext cx="4109400" cy="359640"/>
           </a:xfrm>
           <a:prstGeom prst="rect">
             <a:avLst/>
@@ -4899,7 +4881,7 @@
         <p:spPr>
           <a:xfrm>
             <a:off x="8610480" y="6356520"/>
-            <a:ext cx="2738160" cy="360000"/>
+            <a:ext cx="2737800" cy="359640"/>
           </a:xfrm>
           <a:prstGeom prst="rect">
             <a:avLst/>
@@ -4942,7 +4924,7 @@
                 <a:tab algn="l" pos="0"/>
               </a:tabLst>
             </a:pPr>
-            <a:fld id="{56ED309F-6399-4D2A-87C3-E2E646EFA8E2}" type="slidenum">
+            <a:fld id="{5AD42DE4-BC29-44B2-851D-02355F9DD6A5}" type="slidenum">
               <a:rPr b="0" lang="en-US" sz="1200" spc="-1" strike="noStrike">
                 <a:solidFill>
                   <a:schemeClr val="dk1">
@@ -4975,7 +4957,7 @@
         <p:spPr>
           <a:xfrm>
             <a:off x="838080" y="6356520"/>
-            <a:ext cx="2738160" cy="360000"/>
+            <a:ext cx="2737800" cy="359640"/>
           </a:xfrm>
           <a:prstGeom prst="rect">
             <a:avLst/>
@@ -5064,9 +5046,9 @@
         <p:grpSpPr>
           <a:xfrm>
             <a:off x="6199200" y="6162840"/>
-            <a:ext cx="5987880" cy="690120"/>
+            <a:ext cx="5987520" cy="689760"/>
             <a:chOff x="6199200" y="6162840"/>
-            <a:chExt cx="5987880" cy="690120"/>
+            <a:chExt cx="5987520" cy="689760"/>
           </a:xfrm>
         </p:grpSpPr>
         <p:pic>
@@ -5082,7 +5064,7 @@
           <p:spPr>
             <a:xfrm>
               <a:off x="6199200" y="6162840"/>
-              <a:ext cx="4051440" cy="690120"/>
+              <a:ext cx="4051080" cy="689760"/>
             </a:xfrm>
             <a:prstGeom prst="rect">
               <a:avLst/>
@@ -5105,7 +5087,7 @@
           <p:spPr>
             <a:xfrm>
               <a:off x="10270080" y="6162840"/>
-              <a:ext cx="1917000" cy="606600"/>
+              <a:ext cx="1916640" cy="606240"/>
             </a:xfrm>
             <a:prstGeom prst="rect">
               <a:avLst/>
@@ -5178,7 +5160,7 @@
         <p:spPr>
           <a:xfrm>
             <a:off x="4038480" y="6356520"/>
-            <a:ext cx="4109760" cy="360000"/>
+            <a:ext cx="4109400" cy="359640"/>
           </a:xfrm>
           <a:prstGeom prst="rect">
             <a:avLst/>
@@ -5250,7 +5232,7 @@
         <p:spPr>
           <a:xfrm>
             <a:off x="8610480" y="6356520"/>
-            <a:ext cx="2738160" cy="360000"/>
+            <a:ext cx="2737800" cy="359640"/>
           </a:xfrm>
           <a:prstGeom prst="rect">
             <a:avLst/>
@@ -5293,7 +5275,7 @@
                 <a:tab algn="l" pos="0"/>
               </a:tabLst>
             </a:pPr>
-            <a:fld id="{15E77AF7-D088-4A06-BD8E-247495D20BA3}" type="slidenum">
+            <a:fld id="{9120996A-5015-49F0-8217-B26701AF27A9}" type="slidenum">
               <a:rPr b="0" lang="en-US" sz="1200" spc="-1" strike="noStrike">
                 <a:solidFill>
                   <a:schemeClr val="dk1">
@@ -5326,7 +5308,7 @@
         <p:spPr>
           <a:xfrm>
             <a:off x="838080" y="6356520"/>
-            <a:ext cx="2738160" cy="360000"/>
+            <a:ext cx="2737800" cy="359640"/>
           </a:xfrm>
           <a:prstGeom prst="rect">
             <a:avLst/>
@@ -5415,9 +5397,9 @@
         <p:grpSpPr>
           <a:xfrm>
             <a:off x="6199200" y="6162840"/>
-            <a:ext cx="5987880" cy="690120"/>
+            <a:ext cx="5987520" cy="689760"/>
             <a:chOff x="6199200" y="6162840"/>
-            <a:chExt cx="5987880" cy="690120"/>
+            <a:chExt cx="5987520" cy="689760"/>
           </a:xfrm>
         </p:grpSpPr>
         <p:pic>
@@ -5433,7 +5415,7 @@
           <p:spPr>
             <a:xfrm>
               <a:off x="6199200" y="6162840"/>
-              <a:ext cx="4051440" cy="690120"/>
+              <a:ext cx="4051080" cy="689760"/>
             </a:xfrm>
             <a:prstGeom prst="rect">
               <a:avLst/>
@@ -5456,7 +5438,7 @@
           <p:spPr>
             <a:xfrm>
               <a:off x="10270080" y="6162840"/>
-              <a:ext cx="1917000" cy="606600"/>
+              <a:ext cx="1916640" cy="606240"/>
             </a:xfrm>
             <a:prstGeom prst="rect">
               <a:avLst/>
@@ -5480,7 +5462,7 @@
         <p:spPr>
           <a:xfrm>
             <a:off x="4038480" y="6356520"/>
-            <a:ext cx="4109760" cy="360000"/>
+            <a:ext cx="4109400" cy="359640"/>
           </a:xfrm>
           <a:prstGeom prst="rect">
             <a:avLst/>
@@ -5552,7 +5534,7 @@
         <p:spPr>
           <a:xfrm>
             <a:off x="8610480" y="6356520"/>
-            <a:ext cx="2738160" cy="360000"/>
+            <a:ext cx="2737800" cy="359640"/>
           </a:xfrm>
           <a:prstGeom prst="rect">
             <a:avLst/>
@@ -5595,7 +5577,7 @@
                 <a:tab algn="l" pos="0"/>
               </a:tabLst>
             </a:pPr>
-            <a:fld id="{AD5F9B68-65B0-4838-979C-FFB6F66EBB07}" type="slidenum">
+            <a:fld id="{ADA1F0DC-B44C-4D34-BCFC-CA7480EA5231}" type="slidenum">
               <a:rPr b="0" lang="en-US" sz="1200" spc="-1" strike="noStrike">
                 <a:solidFill>
                   <a:schemeClr val="dk1">
@@ -5628,7 +5610,7 @@
         <p:spPr>
           <a:xfrm>
             <a:off x="838080" y="6356520"/>
-            <a:ext cx="2738160" cy="360000"/>
+            <a:ext cx="2737800" cy="359640"/>
           </a:xfrm>
           <a:prstGeom prst="rect">
             <a:avLst/>
@@ -5717,9 +5699,9 @@
         <p:grpSpPr>
           <a:xfrm>
             <a:off x="6199200" y="6162840"/>
-            <a:ext cx="5987880" cy="690120"/>
+            <a:ext cx="5987520" cy="689760"/>
             <a:chOff x="6199200" y="6162840"/>
-            <a:chExt cx="5987880" cy="690120"/>
+            <a:chExt cx="5987520" cy="689760"/>
           </a:xfrm>
         </p:grpSpPr>
         <p:pic>
@@ -5735,7 +5717,7 @@
           <p:spPr>
             <a:xfrm>
               <a:off x="6199200" y="6162840"/>
-              <a:ext cx="4051440" cy="690120"/>
+              <a:ext cx="4051080" cy="689760"/>
             </a:xfrm>
             <a:prstGeom prst="rect">
               <a:avLst/>
@@ -5758,7 +5740,7 @@
           <p:spPr>
             <a:xfrm>
               <a:off x="10270080" y="6162840"/>
-              <a:ext cx="1917000" cy="606600"/>
+              <a:ext cx="1916640" cy="606240"/>
             </a:xfrm>
             <a:prstGeom prst="rect">
               <a:avLst/>
@@ -6506,7 +6488,7 @@
         <p:spPr>
           <a:xfrm>
             <a:off x="4038480" y="6356520"/>
-            <a:ext cx="4109760" cy="360000"/>
+            <a:ext cx="4109400" cy="359640"/>
           </a:xfrm>
           <a:prstGeom prst="rect">
             <a:avLst/>
@@ -6578,7 +6560,7 @@
         <p:spPr>
           <a:xfrm>
             <a:off x="8610480" y="6356520"/>
-            <a:ext cx="2738160" cy="360000"/>
+            <a:ext cx="2737800" cy="359640"/>
           </a:xfrm>
           <a:prstGeom prst="rect">
             <a:avLst/>
@@ -6621,7 +6603,7 @@
                 <a:tab algn="l" pos="0"/>
               </a:tabLst>
             </a:pPr>
-            <a:fld id="{B4169288-DD86-499C-8C0F-89E5B4D21E64}" type="slidenum">
+            <a:fld id="{295C09DD-95F6-45C5-98A9-ECB9FCE5FADE}" type="slidenum">
               <a:rPr b="0" lang="en-US" sz="1200" spc="-1" strike="noStrike">
                 <a:solidFill>
                   <a:schemeClr val="dk1">
@@ -6654,7 +6636,7 @@
         <p:spPr>
           <a:xfrm>
             <a:off x="838080" y="6356520"/>
-            <a:ext cx="2738160" cy="360000"/>
+            <a:ext cx="2737800" cy="359640"/>
           </a:xfrm>
           <a:prstGeom prst="rect">
             <a:avLst/>
@@ -6743,9 +6725,9 @@
         <p:grpSpPr>
           <a:xfrm>
             <a:off x="6199200" y="6162840"/>
-            <a:ext cx="5987880" cy="690120"/>
+            <a:ext cx="5987520" cy="689760"/>
             <a:chOff x="6199200" y="6162840"/>
-            <a:chExt cx="5987880" cy="690120"/>
+            <a:chExt cx="5987520" cy="689760"/>
           </a:xfrm>
         </p:grpSpPr>
         <p:pic>
@@ -6761,7 +6743,7 @@
           <p:spPr>
             <a:xfrm>
               <a:off x="6199200" y="6162840"/>
-              <a:ext cx="4051440" cy="690120"/>
+              <a:ext cx="4051080" cy="689760"/>
             </a:xfrm>
             <a:prstGeom prst="rect">
               <a:avLst/>
@@ -6784,7 +6766,7 @@
           <p:spPr>
             <a:xfrm>
               <a:off x="10270080" y="6162840"/>
-              <a:ext cx="1917000" cy="606600"/>
+              <a:ext cx="1916640" cy="606240"/>
             </a:xfrm>
             <a:prstGeom prst="rect">
               <a:avLst/>
@@ -7532,7 +7514,7 @@
         <p:spPr>
           <a:xfrm>
             <a:off x="4038480" y="6356520"/>
-            <a:ext cx="4109760" cy="360000"/>
+            <a:ext cx="4109400" cy="359640"/>
           </a:xfrm>
           <a:prstGeom prst="rect">
             <a:avLst/>
@@ -7604,7 +7586,7 @@
         <p:spPr>
           <a:xfrm>
             <a:off x="8610480" y="6356520"/>
-            <a:ext cx="2738160" cy="360000"/>
+            <a:ext cx="2737800" cy="359640"/>
           </a:xfrm>
           <a:prstGeom prst="rect">
             <a:avLst/>
@@ -7647,7 +7629,7 @@
                 <a:tab algn="l" pos="0"/>
               </a:tabLst>
             </a:pPr>
-            <a:fld id="{46D8A70A-6F77-4A92-865C-B1A56C52D949}" type="slidenum">
+            <a:fld id="{DA525C46-8ADB-4332-BC07-980D2DA49B45}" type="slidenum">
               <a:rPr b="0" lang="en-US" sz="1200" spc="-1" strike="noStrike">
                 <a:solidFill>
                   <a:schemeClr val="dk1">
@@ -7680,7 +7662,7 @@
         <p:spPr>
           <a:xfrm>
             <a:off x="838080" y="6356520"/>
-            <a:ext cx="2738160" cy="360000"/>
+            <a:ext cx="2737800" cy="359640"/>
           </a:xfrm>
           <a:prstGeom prst="rect">
             <a:avLst/>
@@ -7769,9 +7751,9 @@
         <p:grpSpPr>
           <a:xfrm>
             <a:off x="6199200" y="6162840"/>
-            <a:ext cx="5987880" cy="690120"/>
+            <a:ext cx="5987520" cy="689760"/>
             <a:chOff x="6199200" y="6162840"/>
-            <a:chExt cx="5987880" cy="690120"/>
+            <a:chExt cx="5987520" cy="689760"/>
           </a:xfrm>
         </p:grpSpPr>
         <p:pic>
@@ -7787,7 +7769,7 @@
           <p:spPr>
             <a:xfrm>
               <a:off x="6199200" y="6162840"/>
-              <a:ext cx="4051440" cy="690120"/>
+              <a:ext cx="4051080" cy="689760"/>
             </a:xfrm>
             <a:prstGeom prst="rect">
               <a:avLst/>
@@ -7810,7 +7792,7 @@
           <p:spPr>
             <a:xfrm>
               <a:off x="10270080" y="6162840"/>
-              <a:ext cx="1917000" cy="606600"/>
+              <a:ext cx="1916640" cy="606240"/>
             </a:xfrm>
             <a:prstGeom prst="rect">
               <a:avLst/>
@@ -8333,7 +8315,7 @@
         <p:spPr>
           <a:xfrm>
             <a:off x="4038480" y="6356520"/>
-            <a:ext cx="4109760" cy="360000"/>
+            <a:ext cx="4109400" cy="359640"/>
           </a:xfrm>
           <a:prstGeom prst="rect">
             <a:avLst/>
@@ -8405,7 +8387,7 @@
         <p:spPr>
           <a:xfrm>
             <a:off x="8610480" y="6356520"/>
-            <a:ext cx="2738160" cy="360000"/>
+            <a:ext cx="2737800" cy="359640"/>
           </a:xfrm>
           <a:prstGeom prst="rect">
             <a:avLst/>
@@ -8448,7 +8430,7 @@
                 <a:tab algn="l" pos="0"/>
               </a:tabLst>
             </a:pPr>
-            <a:fld id="{C014EB7F-BC8D-4E4E-8441-9FFEEDFFBCFD}" type="slidenum">
+            <a:fld id="{26D81466-476B-40EE-BC2D-376E8BB30145}" type="slidenum">
               <a:rPr b="0" lang="en-US" sz="1200" spc="-1" strike="noStrike">
                 <a:solidFill>
                   <a:schemeClr val="dk1">
@@ -8481,7 +8463,7 @@
         <p:spPr>
           <a:xfrm>
             <a:off x="838080" y="6356520"/>
-            <a:ext cx="2738160" cy="360000"/>
+            <a:ext cx="2737800" cy="359640"/>
           </a:xfrm>
           <a:prstGeom prst="rect">
             <a:avLst/>
@@ -8570,9 +8552,9 @@
         <p:grpSpPr>
           <a:xfrm>
             <a:off x="6199200" y="6162840"/>
-            <a:ext cx="5987880" cy="690120"/>
+            <a:ext cx="5987520" cy="689760"/>
             <a:chOff x="6199200" y="6162840"/>
-            <a:chExt cx="5987880" cy="690120"/>
+            <a:chExt cx="5987520" cy="689760"/>
           </a:xfrm>
         </p:grpSpPr>
         <p:pic>
@@ -8588,7 +8570,7 @@
           <p:spPr>
             <a:xfrm>
               <a:off x="6199200" y="6162840"/>
-              <a:ext cx="4051440" cy="690120"/>
+              <a:ext cx="4051080" cy="689760"/>
             </a:xfrm>
             <a:prstGeom prst="rect">
               <a:avLst/>
@@ -8611,7 +8593,7 @@
           <p:spPr>
             <a:xfrm>
               <a:off x="10270080" y="6162840"/>
-              <a:ext cx="1917000" cy="606600"/>
+              <a:ext cx="1916640" cy="606240"/>
             </a:xfrm>
             <a:prstGeom prst="rect">
               <a:avLst/>
@@ -9584,7 +9566,7 @@
         <p:spPr>
           <a:xfrm>
             <a:off x="4038480" y="6356520"/>
-            <a:ext cx="4109760" cy="360000"/>
+            <a:ext cx="4109400" cy="359640"/>
           </a:xfrm>
           <a:prstGeom prst="rect">
             <a:avLst/>
@@ -9656,7 +9638,7 @@
         <p:spPr>
           <a:xfrm>
             <a:off x="8610480" y="6356520"/>
-            <a:ext cx="2738160" cy="360000"/>
+            <a:ext cx="2737800" cy="359640"/>
           </a:xfrm>
           <a:prstGeom prst="rect">
             <a:avLst/>
@@ -9699,7 +9681,7 @@
                 <a:tab algn="l" pos="0"/>
               </a:tabLst>
             </a:pPr>
-            <a:fld id="{C605A10B-FAEC-4234-B046-5991DDEA99DA}" type="slidenum">
+            <a:fld id="{23538FB1-E99F-4F37-A746-E9FE9C53414D}" type="slidenum">
               <a:rPr b="0" lang="en-US" sz="1200" spc="-1" strike="noStrike">
                 <a:solidFill>
                   <a:schemeClr val="dk1">
@@ -9732,7 +9714,7 @@
         <p:spPr>
           <a:xfrm>
             <a:off x="838080" y="6356520"/>
-            <a:ext cx="2738160" cy="360000"/>
+            <a:ext cx="2737800" cy="359640"/>
           </a:xfrm>
           <a:prstGeom prst="rect">
             <a:avLst/>
@@ -9821,9 +9803,9 @@
         <p:grpSpPr>
           <a:xfrm>
             <a:off x="6199200" y="6162840"/>
-            <a:ext cx="5987880" cy="690120"/>
+            <a:ext cx="5987520" cy="689760"/>
             <a:chOff x="6199200" y="6162840"/>
-            <a:chExt cx="5987880" cy="690120"/>
+            <a:chExt cx="5987520" cy="689760"/>
           </a:xfrm>
         </p:grpSpPr>
         <p:pic>
@@ -9839,7 +9821,7 @@
           <p:spPr>
             <a:xfrm>
               <a:off x="6199200" y="6162840"/>
-              <a:ext cx="4051440" cy="690120"/>
+              <a:ext cx="4051080" cy="689760"/>
             </a:xfrm>
             <a:prstGeom prst="rect">
               <a:avLst/>
@@ -9862,7 +9844,7 @@
           <p:spPr>
             <a:xfrm>
               <a:off x="10270080" y="6162840"/>
-              <a:ext cx="1917000" cy="606600"/>
+              <a:ext cx="1916640" cy="606240"/>
             </a:xfrm>
             <a:prstGeom prst="rect">
               <a:avLst/>
@@ -9886,7 +9868,7 @@
         <p:spPr>
           <a:xfrm>
             <a:off x="4038480" y="6356520"/>
-            <a:ext cx="4109760" cy="360000"/>
+            <a:ext cx="4109400" cy="359640"/>
           </a:xfrm>
           <a:prstGeom prst="rect">
             <a:avLst/>
@@ -9958,7 +9940,7 @@
         <p:spPr>
           <a:xfrm>
             <a:off x="8610480" y="6356520"/>
-            <a:ext cx="2738160" cy="360000"/>
+            <a:ext cx="2737800" cy="359640"/>
           </a:xfrm>
           <a:prstGeom prst="rect">
             <a:avLst/>
@@ -10001,7 +9983,7 @@
                 <a:tab algn="l" pos="0"/>
               </a:tabLst>
             </a:pPr>
-            <a:fld id="{58C549DF-5409-418E-979B-7B9C22AA4F34}" type="slidenum">
+            <a:fld id="{351389BF-C595-49DB-B037-B2A37892A513}" type="slidenum">
               <a:rPr b="0" lang="en-US" sz="1200" spc="-1" strike="noStrike">
                 <a:solidFill>
                   <a:schemeClr val="dk1">
@@ -10034,7 +10016,7 @@
         <p:spPr>
           <a:xfrm>
             <a:off x="838080" y="6356520"/>
-            <a:ext cx="2738160" cy="360000"/>
+            <a:ext cx="2737800" cy="359640"/>
           </a:xfrm>
           <a:prstGeom prst="rect">
             <a:avLst/>
@@ -10123,9 +10105,9 @@
         <p:grpSpPr>
           <a:xfrm>
             <a:off x="6199200" y="6162840"/>
-            <a:ext cx="5987880" cy="690120"/>
+            <a:ext cx="5987520" cy="689760"/>
             <a:chOff x="6199200" y="6162840"/>
-            <a:chExt cx="5987880" cy="690120"/>
+            <a:chExt cx="5987520" cy="689760"/>
           </a:xfrm>
         </p:grpSpPr>
         <p:pic>
@@ -10141,7 +10123,7 @@
           <p:spPr>
             <a:xfrm>
               <a:off x="6199200" y="6162840"/>
-              <a:ext cx="4051440" cy="690120"/>
+              <a:ext cx="4051080" cy="689760"/>
             </a:xfrm>
             <a:prstGeom prst="rect">
               <a:avLst/>
@@ -10164,7 +10146,7 @@
           <p:spPr>
             <a:xfrm>
               <a:off x="10270080" y="6162840"/>
-              <a:ext cx="1917000" cy="606600"/>
+              <a:ext cx="1916640" cy="606240"/>
             </a:xfrm>
             <a:prstGeom prst="rect">
               <a:avLst/>
@@ -10188,7 +10170,7 @@
         <p:spPr>
           <a:xfrm>
             <a:off x="4038480" y="6356520"/>
-            <a:ext cx="4109760" cy="360000"/>
+            <a:ext cx="4109400" cy="359640"/>
           </a:xfrm>
           <a:prstGeom prst="rect">
             <a:avLst/>
@@ -10260,7 +10242,7 @@
         <p:spPr>
           <a:xfrm>
             <a:off x="8610480" y="6356520"/>
-            <a:ext cx="2738160" cy="360000"/>
+            <a:ext cx="2737800" cy="359640"/>
           </a:xfrm>
           <a:prstGeom prst="rect">
             <a:avLst/>
@@ -10303,7 +10285,7 @@
                 <a:tab algn="l" pos="0"/>
               </a:tabLst>
             </a:pPr>
-            <a:fld id="{6A0884A0-819F-41F5-9951-5CEFD3DA65ED}" type="slidenum">
+            <a:fld id="{45B47D6C-2B77-4289-B5C1-9C50EB0C1CC8}" type="slidenum">
               <a:rPr b="0" lang="en-US" sz="1200" spc="-1" strike="noStrike">
                 <a:solidFill>
                   <a:schemeClr val="dk1">
@@ -10336,7 +10318,7 @@
         <p:spPr>
           <a:xfrm>
             <a:off x="838080" y="6356520"/>
-            <a:ext cx="2738160" cy="360000"/>
+            <a:ext cx="2737800" cy="359640"/>
           </a:xfrm>
           <a:prstGeom prst="rect">
             <a:avLst/>
@@ -10699,9 +10681,9 @@
         <p:grpSpPr>
           <a:xfrm>
             <a:off x="6199200" y="6162840"/>
-            <a:ext cx="5987880" cy="690120"/>
+            <a:ext cx="5987520" cy="689760"/>
             <a:chOff x="6199200" y="6162840"/>
-            <a:chExt cx="5987880" cy="690120"/>
+            <a:chExt cx="5987520" cy="689760"/>
           </a:xfrm>
         </p:grpSpPr>
         <p:pic>
@@ -10717,7 +10699,7 @@
           <p:spPr>
             <a:xfrm>
               <a:off x="6199200" y="6162840"/>
-              <a:ext cx="4051440" cy="690120"/>
+              <a:ext cx="4051080" cy="689760"/>
             </a:xfrm>
             <a:prstGeom prst="rect">
               <a:avLst/>
@@ -10740,7 +10722,7 @@
           <p:spPr>
             <a:xfrm>
               <a:off x="10270080" y="6162840"/>
-              <a:ext cx="1917000" cy="606600"/>
+              <a:ext cx="1916640" cy="606240"/>
             </a:xfrm>
             <a:prstGeom prst="rect">
               <a:avLst/>
@@ -11038,7 +11020,7 @@
         <p:spPr>
           <a:xfrm>
             <a:off x="4038480" y="6356520"/>
-            <a:ext cx="4109760" cy="360000"/>
+            <a:ext cx="4109400" cy="359640"/>
           </a:xfrm>
           <a:prstGeom prst="rect">
             <a:avLst/>
@@ -11110,7 +11092,7 @@
         <p:spPr>
           <a:xfrm>
             <a:off x="8610480" y="6356520"/>
-            <a:ext cx="2738160" cy="360000"/>
+            <a:ext cx="2737800" cy="359640"/>
           </a:xfrm>
           <a:prstGeom prst="rect">
             <a:avLst/>
@@ -11153,7 +11135,7 @@
                 <a:tab algn="l" pos="0"/>
               </a:tabLst>
             </a:pPr>
-            <a:fld id="{F414653B-7ADE-45D0-B996-E1104EAC93E3}" type="slidenum">
+            <a:fld id="{81E363E8-3B98-4223-BCC3-39E9C7DCC3AC}" type="slidenum">
               <a:rPr b="0" lang="en-US" sz="1200" spc="-1" strike="noStrike">
                 <a:solidFill>
                   <a:schemeClr val="dk1">
@@ -11186,7 +11168,7 @@
         <p:spPr>
           <a:xfrm>
             <a:off x="838080" y="6356520"/>
-            <a:ext cx="2738160" cy="360000"/>
+            <a:ext cx="2737800" cy="359640"/>
           </a:xfrm>
           <a:prstGeom prst="rect">
             <a:avLst/>
@@ -11275,9 +11257,9 @@
         <p:grpSpPr>
           <a:xfrm>
             <a:off x="6199200" y="6162840"/>
-            <a:ext cx="5987880" cy="690120"/>
+            <a:ext cx="5987520" cy="689760"/>
             <a:chOff x="6199200" y="6162840"/>
-            <a:chExt cx="5987880" cy="690120"/>
+            <a:chExt cx="5987520" cy="689760"/>
           </a:xfrm>
         </p:grpSpPr>
         <p:pic>
@@ -11293,7 +11275,7 @@
           <p:spPr>
             <a:xfrm>
               <a:off x="6199200" y="6162840"/>
-              <a:ext cx="4051440" cy="690120"/>
+              <a:ext cx="4051080" cy="689760"/>
             </a:xfrm>
             <a:prstGeom prst="rect">
               <a:avLst/>
@@ -11316,7 +11298,7 @@
           <p:spPr>
             <a:xfrm>
               <a:off x="10270080" y="6162840"/>
-              <a:ext cx="1917000" cy="606600"/>
+              <a:ext cx="1916640" cy="606240"/>
             </a:xfrm>
             <a:prstGeom prst="rect">
               <a:avLst/>
@@ -11614,7 +11596,7 @@
         <p:spPr>
           <a:xfrm>
             <a:off x="4038480" y="6356520"/>
-            <a:ext cx="4109760" cy="360000"/>
+            <a:ext cx="4109400" cy="359640"/>
           </a:xfrm>
           <a:prstGeom prst="rect">
             <a:avLst/>
@@ -11686,7 +11668,7 @@
         <p:spPr>
           <a:xfrm>
             <a:off x="8610480" y="6356520"/>
-            <a:ext cx="2738160" cy="360000"/>
+            <a:ext cx="2737800" cy="359640"/>
           </a:xfrm>
           <a:prstGeom prst="rect">
             <a:avLst/>
@@ -11729,7 +11711,7 @@
                 <a:tab algn="l" pos="0"/>
               </a:tabLst>
             </a:pPr>
-            <a:fld id="{F0078DBE-E2DE-4268-B73C-1C4A80BAAC30}" type="slidenum">
+            <a:fld id="{EF53C0D6-C28A-499C-AD47-ACE8FBC828F0}" type="slidenum">
               <a:rPr b="0" lang="en-US" sz="1200" spc="-1" strike="noStrike">
                 <a:solidFill>
                   <a:schemeClr val="dk1">
@@ -11762,7 +11744,7 @@
         <p:spPr>
           <a:xfrm>
             <a:off x="838080" y="6356520"/>
-            <a:ext cx="2738160" cy="360000"/>
+            <a:ext cx="2737800" cy="359640"/>
           </a:xfrm>
           <a:prstGeom prst="rect">
             <a:avLst/>
@@ -11844,7 +11826,7 @@
         <p:spPr>
           <a:xfrm flipH="1">
             <a:off x="0" y="3073320"/>
-            <a:ext cx="1833840" cy="5040"/>
+            <a:ext cx="1834200" cy="5400"/>
           </a:xfrm>
           <a:prstGeom prst="straightConnector1">
             <a:avLst/>
@@ -11867,7 +11849,7 @@
         <p:spPr>
           <a:xfrm>
             <a:off x="0" y="2489400"/>
-            <a:ext cx="1833840" cy="5040"/>
+            <a:ext cx="1834200" cy="5400"/>
           </a:xfrm>
           <a:prstGeom prst="straightConnector1">
             <a:avLst/>
@@ -11890,7 +11872,7 @@
         <p:spPr>
           <a:xfrm>
             <a:off x="0" y="2781360"/>
-            <a:ext cx="1833840" cy="5040"/>
+            <a:ext cx="1834200" cy="5400"/>
           </a:xfrm>
           <a:prstGeom prst="straightConnector1">
             <a:avLst/>
@@ -11913,7 +11895,7 @@
         <p:spPr>
           <a:xfrm flipH="1">
             <a:off x="0" y="3657600"/>
-            <a:ext cx="1833840" cy="5040"/>
+            <a:ext cx="1834200" cy="5400"/>
           </a:xfrm>
           <a:prstGeom prst="straightConnector1">
             <a:avLst/>
@@ -11935,7 +11917,7 @@
         <p:spPr>
           <a:xfrm>
             <a:off x="128520" y="6134040"/>
-            <a:ext cx="1566720" cy="382680"/>
+            <a:ext cx="1566360" cy="382320"/>
           </a:xfrm>
           <a:prstGeom prst="diamond">
             <a:avLst/>
@@ -12000,7 +11982,7 @@
         <p:spPr>
           <a:xfrm>
             <a:off x="302760" y="5454000"/>
-            <a:ext cx="1218240" cy="382680"/>
+            <a:ext cx="1217880" cy="382320"/>
           </a:xfrm>
           <a:prstGeom prst="ellipse">
             <a:avLst/>
@@ -12063,7 +12045,7 @@
         <p:spPr>
           <a:xfrm>
             <a:off x="101160" y="336240"/>
-            <a:ext cx="1621440" cy="303120"/>
+            <a:ext cx="1621080" cy="303120"/>
           </a:xfrm>
           <a:prstGeom prst="rect">
             <a:avLst/>
@@ -12120,7 +12102,7 @@
         <p:spPr>
           <a:xfrm>
             <a:off x="101160" y="597600"/>
-            <a:ext cx="1621440" cy="516600"/>
+            <a:ext cx="1621080" cy="516600"/>
           </a:xfrm>
           <a:prstGeom prst="rect">
             <a:avLst/>
@@ -12210,7 +12192,7 @@
         <p:spPr>
           <a:xfrm>
             <a:off x="101160" y="336240"/>
-            <a:ext cx="1621440" cy="303120"/>
+            <a:ext cx="1621080" cy="303120"/>
           </a:xfrm>
           <a:prstGeom prst="rect">
             <a:avLst/>
@@ -12267,7 +12249,7 @@
         <p:spPr>
           <a:xfrm>
             <a:off x="101160" y="597600"/>
-            <a:ext cx="1621440" cy="516600"/>
+            <a:ext cx="1621080" cy="516600"/>
           </a:xfrm>
           <a:prstGeom prst="rect">
             <a:avLst/>
@@ -12357,7 +12339,7 @@
         <p:spPr>
           <a:xfrm>
             <a:off x="2541600" y="228600"/>
-            <a:ext cx="1621440" cy="303120"/>
+            <a:ext cx="1621080" cy="303120"/>
           </a:xfrm>
           <a:prstGeom prst="rect">
             <a:avLst/>
@@ -12414,7 +12396,7 @@
         <p:spPr>
           <a:xfrm>
             <a:off x="2541600" y="489960"/>
-            <a:ext cx="1621440" cy="1584000"/>
+            <a:ext cx="1621080" cy="1584000"/>
           </a:xfrm>
           <a:prstGeom prst="rect">
             <a:avLst/>
@@ -12639,7 +12621,7 @@
         <p:spPr>
           <a:xfrm>
             <a:off x="6656400" y="228600"/>
-            <a:ext cx="1621440" cy="303120"/>
+            <a:ext cx="1621080" cy="303120"/>
           </a:xfrm>
           <a:prstGeom prst="rect">
             <a:avLst/>
@@ -12696,7 +12678,7 @@
         <p:spPr>
           <a:xfrm>
             <a:off x="6656400" y="489960"/>
-            <a:ext cx="1621440" cy="516600"/>
+            <a:ext cx="1621080" cy="516600"/>
           </a:xfrm>
           <a:prstGeom prst="rect">
             <a:avLst/>
@@ -12786,7 +12768,7 @@
         <p:spPr>
           <a:xfrm>
             <a:off x="6656400" y="228600"/>
-            <a:ext cx="1621440" cy="303120"/>
+            <a:ext cx="1621080" cy="303120"/>
           </a:xfrm>
           <a:prstGeom prst="rect">
             <a:avLst/>
@@ -12843,7 +12825,7 @@
         <p:spPr>
           <a:xfrm>
             <a:off x="6656400" y="489960"/>
-            <a:ext cx="1621440" cy="730080"/>
+            <a:ext cx="1621080" cy="730080"/>
           </a:xfrm>
           <a:prstGeom prst="rect">
             <a:avLst/>
@@ -12960,7 +12942,7 @@
         <p:spPr>
           <a:xfrm>
             <a:off x="128520" y="4629600"/>
-            <a:ext cx="1566720" cy="527400"/>
+            <a:ext cx="1566360" cy="527040"/>
           </a:xfrm>
           <a:prstGeom prst="diamond">
             <a:avLst/>
@@ -13048,7 +13030,7 @@
         <p:spPr>
           <a:xfrm>
             <a:off x="0" y="3365640"/>
-            <a:ext cx="1833840" cy="5040"/>
+            <a:ext cx="1834200" cy="5400"/>
           </a:xfrm>
           <a:prstGeom prst="straightConnector1">
             <a:avLst/>
@@ -13070,7 +13052,7 @@
         <p:spPr>
           <a:xfrm>
             <a:off x="673200" y="3949920"/>
-            <a:ext cx="477720" cy="382680"/>
+            <a:ext cx="477360" cy="382320"/>
           </a:xfrm>
           <a:prstGeom prst="triangle">
             <a:avLst>
@@ -13137,9 +13119,9 @@
         <p:grpSpPr>
           <a:xfrm>
             <a:off x="101160" y="1413000"/>
-            <a:ext cx="1621440" cy="777960"/>
+            <a:ext cx="1621080" cy="777960"/>
             <a:chOff x="101160" y="1413000"/>
-            <a:chExt cx="1621440" cy="777960"/>
+            <a:chExt cx="1621080" cy="777960"/>
           </a:xfrm>
         </p:grpSpPr>
         <p:sp>
@@ -13151,7 +13133,7 @@
           <p:spPr>
             <a:xfrm>
               <a:off x="101160" y="1413000"/>
-              <a:ext cx="1621440" cy="303120"/>
+              <a:ext cx="1621080" cy="303120"/>
             </a:xfrm>
             <a:prstGeom prst="rect">
               <a:avLst/>
@@ -13209,7 +13191,7 @@
           <p:spPr>
             <a:xfrm>
               <a:off x="101160" y="1674360"/>
-              <a:ext cx="1621440" cy="516600"/>
+              <a:ext cx="1621080" cy="516600"/>
             </a:xfrm>
             <a:prstGeom prst="rect">
               <a:avLst/>
@@ -13301,7 +13283,7 @@
         <p:spPr>
           <a:xfrm>
             <a:off x="4426920" y="914400"/>
-            <a:ext cx="1566720" cy="382680"/>
+            <a:ext cx="1566360" cy="382320"/>
           </a:xfrm>
           <a:prstGeom prst="diamond">
             <a:avLst/>
@@ -13368,8 +13350,8 @@
         </p:nvCxnSpPr>
         <p:spPr>
           <a:xfrm flipH="1">
-            <a:off x="5993640" y="855000"/>
-            <a:ext cx="663120" cy="251280"/>
+            <a:off x="5993280" y="855000"/>
+            <a:ext cx="663480" cy="250920"/>
           </a:xfrm>
           <a:prstGeom prst="straightConnector1">
             <a:avLst/>
@@ -13392,7 +13374,7 @@
         <p:spPr>
           <a:xfrm>
             <a:off x="6255720" y="1828800"/>
-            <a:ext cx="1795320" cy="382680"/>
+            <a:ext cx="1794960" cy="382320"/>
           </a:xfrm>
           <a:prstGeom prst="diamond">
             <a:avLst/>
@@ -13459,7 +13441,7 @@
         </p:nvCxnSpPr>
         <p:spPr>
           <a:xfrm flipV="1">
-            <a:off x="7153560" y="1220040"/>
+            <a:off x="7153200" y="1220040"/>
             <a:ext cx="313920" cy="609120"/>
           </a:xfrm>
           <a:prstGeom prst="straightConnector1">
@@ -13483,8 +13465,8 @@
         </p:nvCxnSpPr>
         <p:spPr>
           <a:xfrm flipH="1" flipV="1">
-            <a:off x="7153560" y="2211480"/>
-            <a:ext cx="457560" cy="534600"/>
+            <a:off x="7153200" y="2211120"/>
+            <a:ext cx="458280" cy="535320"/>
           </a:xfrm>
           <a:prstGeom prst="straightConnector1">
             <a:avLst/>
@@ -13507,7 +13489,7 @@
         <p:spPr>
           <a:xfrm>
             <a:off x="128520" y="6134400"/>
-            <a:ext cx="1566720" cy="382680"/>
+            <a:ext cx="1566360" cy="382320"/>
           </a:xfrm>
           <a:prstGeom prst="diamond">
             <a:avLst/>
@@ -13572,9 +13554,9 @@
         <p:grpSpPr>
           <a:xfrm>
             <a:off x="6681960" y="2743200"/>
-            <a:ext cx="1850040" cy="1216440"/>
+            <a:ext cx="1849680" cy="1216440"/>
             <a:chOff x="6681960" y="2743200"/>
-            <a:chExt cx="1850040" cy="1216440"/>
+            <a:chExt cx="1849680" cy="1216440"/>
           </a:xfrm>
         </p:grpSpPr>
         <p:sp>
@@ -13586,7 +13568,7 @@
           <p:spPr>
             <a:xfrm>
               <a:off x="6681960" y="2743200"/>
-              <a:ext cx="1850040" cy="303120"/>
+              <a:ext cx="1849680" cy="303120"/>
             </a:xfrm>
             <a:prstGeom prst="rect">
               <a:avLst/>
@@ -13643,7 +13625,7 @@
           <p:spPr>
             <a:xfrm>
               <a:off x="6681960" y="3016080"/>
-              <a:ext cx="1850040" cy="943560"/>
+              <a:ext cx="1849680" cy="943560"/>
             </a:xfrm>
             <a:prstGeom prst="rect">
               <a:avLst/>
@@ -13790,7 +13772,7 @@
         <p:spPr>
           <a:xfrm>
             <a:off x="9173520" y="3501000"/>
-            <a:ext cx="477720" cy="382680"/>
+            <a:ext cx="477360" cy="382320"/>
           </a:xfrm>
           <a:prstGeom prst="triangle">
             <a:avLst>
@@ -13857,7 +13839,7 @@
         <p:spPr>
           <a:xfrm>
             <a:off x="10569600" y="3126240"/>
-            <a:ext cx="1621440" cy="303120"/>
+            <a:ext cx="1621080" cy="303120"/>
           </a:xfrm>
           <a:prstGeom prst="rect">
             <a:avLst/>
@@ -13914,7 +13896,7 @@
         <p:spPr>
           <a:xfrm>
             <a:off x="10569600" y="3429360"/>
-            <a:ext cx="1621440" cy="1370520"/>
+            <a:ext cx="1621080" cy="1370520"/>
           </a:xfrm>
           <a:prstGeom prst="rect">
             <a:avLst/>
@@ -14072,8 +14054,8 @@
         </p:nvCxnSpPr>
         <p:spPr>
           <a:xfrm>
-            <a:off x="9532080" y="3692520"/>
-            <a:ext cx="1037880" cy="422280"/>
+            <a:off x="9531720" y="3692160"/>
+            <a:ext cx="1038240" cy="422640"/>
           </a:xfrm>
           <a:prstGeom prst="straightConnector1">
             <a:avLst/>
@@ -14097,8 +14079,8 @@
         </p:nvCxnSpPr>
         <p:spPr>
           <a:xfrm flipH="1" flipV="1">
-            <a:off x="8532000" y="3351240"/>
-            <a:ext cx="761400" cy="341640"/>
+            <a:off x="8531640" y="3351240"/>
+            <a:ext cx="761400" cy="341280"/>
           </a:xfrm>
           <a:prstGeom prst="straightConnector1">
             <a:avLst/>
@@ -14120,7 +14102,7 @@
         <p:spPr>
           <a:xfrm>
             <a:off x="2086200" y="3336840"/>
-            <a:ext cx="1621440" cy="303120"/>
+            <a:ext cx="1621080" cy="303120"/>
           </a:xfrm>
           <a:prstGeom prst="rect">
             <a:avLst/>
@@ -14177,7 +14159,7 @@
         <p:spPr>
           <a:xfrm>
             <a:off x="2086200" y="3598200"/>
-            <a:ext cx="1621440" cy="516600"/>
+            <a:ext cx="1621080" cy="516600"/>
           </a:xfrm>
           <a:prstGeom prst="rect">
             <a:avLst/>
@@ -14267,7 +14249,7 @@
         <p:spPr>
           <a:xfrm>
             <a:off x="2086200" y="3336840"/>
-            <a:ext cx="1621440" cy="303120"/>
+            <a:ext cx="1621080" cy="303120"/>
           </a:xfrm>
           <a:prstGeom prst="rect">
             <a:avLst/>
@@ -14324,7 +14306,7 @@
         <p:spPr>
           <a:xfrm>
             <a:off x="2086200" y="3598200"/>
-            <a:ext cx="1621440" cy="516600"/>
+            <a:ext cx="1621080" cy="516600"/>
           </a:xfrm>
           <a:prstGeom prst="rect">
             <a:avLst/>
@@ -14414,7 +14396,7 @@
         <p:spPr>
           <a:xfrm>
             <a:off x="1883160" y="2514600"/>
-            <a:ext cx="1824480" cy="382680"/>
+            <a:ext cx="1824120" cy="382320"/>
           </a:xfrm>
           <a:prstGeom prst="diamond">
             <a:avLst/>
@@ -14479,7 +14461,7 @@
         <p:spPr>
           <a:xfrm>
             <a:off x="3481560" y="2899800"/>
-            <a:ext cx="1595880" cy="382680"/>
+            <a:ext cx="1595520" cy="382320"/>
           </a:xfrm>
           <a:prstGeom prst="ellipse">
             <a:avLst/>
@@ -14544,8 +14526,8 @@
         </p:nvCxnSpPr>
         <p:spPr>
           <a:xfrm>
-            <a:off x="3707640" y="2706120"/>
-            <a:ext cx="572400" cy="194040"/>
+            <a:off x="3707280" y="2705760"/>
+            <a:ext cx="572400" cy="194400"/>
           </a:xfrm>
           <a:prstGeom prst="straightConnector1">
             <a:avLst/>
@@ -14569,8 +14551,8 @@
         </p:nvCxnSpPr>
         <p:spPr>
           <a:xfrm flipH="1" flipV="1">
-            <a:off x="2795400" y="2897280"/>
-            <a:ext cx="101880" cy="439920"/>
+            <a:off x="2795400" y="2896920"/>
+            <a:ext cx="101520" cy="440280"/>
           </a:xfrm>
           <a:prstGeom prst="straightConnector1">
             <a:avLst/>
@@ -14595,7 +14577,7 @@
         <p:spPr>
           <a:xfrm flipV="1">
             <a:off x="2795400" y="2073960"/>
-            <a:ext cx="557280" cy="441000"/>
+            <a:ext cx="556920" cy="441000"/>
           </a:xfrm>
           <a:prstGeom prst="straightConnector1">
             <a:avLst/>
@@ -14617,7 +14599,7 @@
         <p:spPr>
           <a:xfrm>
             <a:off x="10543680" y="457200"/>
-            <a:ext cx="1621440" cy="303120"/>
+            <a:ext cx="1621080" cy="303120"/>
           </a:xfrm>
           <a:prstGeom prst="rect">
             <a:avLst/>
@@ -14674,7 +14656,7 @@
         <p:spPr>
           <a:xfrm>
             <a:off x="10543680" y="718560"/>
-            <a:ext cx="1621440" cy="516600"/>
+            <a:ext cx="1621080" cy="516600"/>
           </a:xfrm>
           <a:prstGeom prst="rect">
             <a:avLst/>
@@ -14764,7 +14746,7 @@
         <p:spPr>
           <a:xfrm>
             <a:off x="10543680" y="457200"/>
-            <a:ext cx="1621440" cy="303120"/>
+            <a:ext cx="1621080" cy="303120"/>
           </a:xfrm>
           <a:prstGeom prst="rect">
             <a:avLst/>
@@ -14821,7 +14803,7 @@
         <p:spPr>
           <a:xfrm>
             <a:off x="10543680" y="718560"/>
-            <a:ext cx="1621440" cy="2224440"/>
+            <a:ext cx="1621080" cy="2224440"/>
           </a:xfrm>
           <a:prstGeom prst="rect">
             <a:avLst/>
@@ -15073,7 +15055,7 @@
         <p:spPr>
           <a:xfrm>
             <a:off x="8282160" y="1443600"/>
-            <a:ext cx="2053440" cy="382680"/>
+            <a:ext cx="2053080" cy="382320"/>
           </a:xfrm>
           <a:prstGeom prst="diamond">
             <a:avLst/>
@@ -15140,8 +15122,8 @@
         </p:nvCxnSpPr>
         <p:spPr>
           <a:xfrm>
-            <a:off x="9308880" y="1826280"/>
-            <a:ext cx="1261080" cy="2288520"/>
+            <a:off x="9308880" y="1825920"/>
+            <a:ext cx="1261080" cy="2288880"/>
           </a:xfrm>
           <a:prstGeom prst="straightConnector1">
             <a:avLst/>
@@ -15165,8 +15147,8 @@
         </p:nvCxnSpPr>
         <p:spPr>
           <a:xfrm flipH="1" flipV="1">
-            <a:off x="10335600" y="1635120"/>
-            <a:ext cx="208440" cy="195840"/>
+            <a:off x="10335240" y="1634760"/>
+            <a:ext cx="208800" cy="196200"/>
           </a:xfrm>
           <a:prstGeom prst="straightConnector1">
             <a:avLst/>
@@ -15190,8 +15172,8 @@
         </p:nvCxnSpPr>
         <p:spPr>
           <a:xfrm flipH="1" flipV="1">
-            <a:off x="7467120" y="1220040"/>
-            <a:ext cx="1842120" cy="223920"/>
+            <a:off x="7466760" y="1220040"/>
+            <a:ext cx="1842480" cy="223920"/>
           </a:xfrm>
           <a:prstGeom prst="straightConnector1">
             <a:avLst/>
@@ -15213,7 +15195,7 @@
         <p:spPr>
           <a:xfrm>
             <a:off x="5412240" y="5029200"/>
-            <a:ext cx="1621440" cy="303120"/>
+            <a:ext cx="1621080" cy="303120"/>
           </a:xfrm>
           <a:prstGeom prst="rect">
             <a:avLst/>
@@ -15270,7 +15252,7 @@
         <p:spPr>
           <a:xfrm>
             <a:off x="3710160" y="4343400"/>
-            <a:ext cx="1824840" cy="382680"/>
+            <a:ext cx="1824480" cy="382320"/>
           </a:xfrm>
           <a:prstGeom prst="diamond">
             <a:avLst/>
@@ -15337,8 +15319,8 @@
         </p:nvCxnSpPr>
         <p:spPr>
           <a:xfrm>
-            <a:off x="2896920" y="4114800"/>
-            <a:ext cx="813600" cy="420480"/>
+            <a:off x="2896560" y="4114800"/>
+            <a:ext cx="813960" cy="420120"/>
           </a:xfrm>
           <a:prstGeom prst="straightConnector1">
             <a:avLst/>
@@ -15363,8 +15345,8 @@
         </p:nvCxnSpPr>
         <p:spPr>
           <a:xfrm>
-            <a:off x="4622760" y="4726080"/>
-            <a:ext cx="789840" cy="455040"/>
+            <a:off x="4622400" y="4725720"/>
+            <a:ext cx="790200" cy="455400"/>
           </a:xfrm>
           <a:prstGeom prst="straightConnector1">
             <a:avLst/>
@@ -15388,7 +15370,7 @@
         </p:nvCxnSpPr>
         <p:spPr>
           <a:xfrm flipH="1" flipV="1">
-            <a:off x="3352320" y="2073960"/>
+            <a:off x="3351960" y="2073960"/>
             <a:ext cx="2187000" cy="1126800"/>
           </a:xfrm>
           <a:prstGeom prst="straightConnector1">
@@ -15411,7 +15393,7 @@
         <p:spPr>
           <a:xfrm>
             <a:off x="4626720" y="3200400"/>
-            <a:ext cx="1824120" cy="681840"/>
+            <a:ext cx="1823760" cy="681480"/>
           </a:xfrm>
           <a:prstGeom prst="diamond">
             <a:avLst/>
@@ -15478,8 +15460,8 @@
         </p:nvCxnSpPr>
         <p:spPr>
           <a:xfrm flipH="1" flipV="1">
-            <a:off x="5538960" y="3882240"/>
-            <a:ext cx="684360" cy="1147320"/>
+            <a:off x="5538600" y="3881880"/>
+            <a:ext cx="684360" cy="1147680"/>
           </a:xfrm>
           <a:prstGeom prst="straightConnector1">
             <a:avLst/>
@@ -15501,7 +15483,7 @@
         <p:spPr>
           <a:xfrm>
             <a:off x="2693880" y="4415400"/>
-            <a:ext cx="477720" cy="382680"/>
+            <a:ext cx="477360" cy="382320"/>
           </a:xfrm>
           <a:prstGeom prst="triangle">
             <a:avLst>
@@ -15570,7 +15552,7 @@
         </p:nvCxnSpPr>
         <p:spPr>
           <a:xfrm flipH="1" flipV="1">
-            <a:off x="2896920" y="4114800"/>
+            <a:off x="2896560" y="4114800"/>
             <a:ext cx="36360" cy="300960"/>
           </a:xfrm>
           <a:prstGeom prst="straightConnector1">
@@ -15593,7 +15575,7 @@
         <p:spPr>
           <a:xfrm>
             <a:off x="2109960" y="5163480"/>
-            <a:ext cx="1621440" cy="303120"/>
+            <a:ext cx="1621080" cy="303120"/>
           </a:xfrm>
           <a:prstGeom prst="rect">
             <a:avLst/>
@@ -15650,7 +15632,7 @@
         <p:spPr>
           <a:xfrm>
             <a:off x="2109960" y="5163480"/>
-            <a:ext cx="1621440" cy="303120"/>
+            <a:ext cx="1621080" cy="303120"/>
           </a:xfrm>
           <a:prstGeom prst="rect">
             <a:avLst/>
@@ -15707,7 +15689,7 @@
         <p:spPr>
           <a:xfrm>
             <a:off x="2109960" y="5424840"/>
-            <a:ext cx="1621440" cy="363960"/>
+            <a:ext cx="1621080" cy="363960"/>
           </a:xfrm>
           <a:prstGeom prst="rect">
             <a:avLst/>
@@ -15775,8 +15757,8 @@
         </p:nvCxnSpPr>
         <p:spPr>
           <a:xfrm flipH="1">
-            <a:off x="2920680" y="4798080"/>
-            <a:ext cx="12600" cy="365760"/>
+            <a:off x="2920320" y="4797720"/>
+            <a:ext cx="12600" cy="366120"/>
           </a:xfrm>
           <a:prstGeom prst="straightConnector1">
             <a:avLst/>
@@ -15798,7 +15780,7 @@
         <p:spPr>
           <a:xfrm>
             <a:off x="7627320" y="4800600"/>
-            <a:ext cx="1566720" cy="382680"/>
+            <a:ext cx="1566360" cy="382320"/>
           </a:xfrm>
           <a:prstGeom prst="diamond">
             <a:avLst/>
@@ -15863,7 +15845,7 @@
         <p:spPr>
           <a:xfrm>
             <a:off x="7627320" y="5329800"/>
-            <a:ext cx="1795320" cy="382680"/>
+            <a:ext cx="1794960" cy="382320"/>
           </a:xfrm>
           <a:prstGeom prst="diamond">
             <a:avLst/>
@@ -15930,8 +15912,8 @@
         </p:nvCxnSpPr>
         <p:spPr>
           <a:xfrm flipH="1">
-            <a:off x="9194040" y="4114440"/>
-            <a:ext cx="1375920" cy="878040"/>
+            <a:off x="9193680" y="4114440"/>
+            <a:ext cx="1376280" cy="877680"/>
           </a:xfrm>
           <a:prstGeom prst="straightConnector1">
             <a:avLst/>
@@ -15956,8 +15938,8 @@
         </p:nvCxnSpPr>
         <p:spPr>
           <a:xfrm flipH="1">
-            <a:off x="7033680" y="4992120"/>
-            <a:ext cx="594000" cy="189000"/>
+            <a:off x="7033320" y="4991760"/>
+            <a:ext cx="594360" cy="189360"/>
           </a:xfrm>
           <a:prstGeom prst="straightConnector1">
             <a:avLst/>
@@ -15981,8 +15963,8 @@
         </p:nvCxnSpPr>
         <p:spPr>
           <a:xfrm flipH="1" flipV="1">
-            <a:off x="7033680" y="5180760"/>
-            <a:ext cx="594000" cy="340920"/>
+            <a:off x="7033320" y="5180760"/>
+            <a:ext cx="594360" cy="340560"/>
           </a:xfrm>
           <a:prstGeom prst="straightConnector1">
             <a:avLst/>
@@ -16006,8 +15988,8 @@
         </p:nvCxnSpPr>
         <p:spPr>
           <a:xfrm flipH="1">
-            <a:off x="9422640" y="4114440"/>
-            <a:ext cx="1147320" cy="1407240"/>
+            <a:off x="9422280" y="4114440"/>
+            <a:ext cx="1147680" cy="1406880"/>
           </a:xfrm>
           <a:prstGeom prst="straightConnector1">
             <a:avLst/>
@@ -16032,8 +16014,8 @@
         </p:nvCxnSpPr>
         <p:spPr>
           <a:xfrm flipH="1">
-            <a:off x="4163040" y="1105920"/>
-            <a:ext cx="264240" cy="176400"/>
+            <a:off x="4162680" y="1105560"/>
+            <a:ext cx="264600" cy="176760"/>
           </a:xfrm>
           <a:prstGeom prst="straightConnector1">
             <a:avLst/>
@@ -16055,7 +16037,7 @@
         <p:spPr>
           <a:xfrm>
             <a:off x="8053560" y="2057400"/>
-            <a:ext cx="1218240" cy="382680"/>
+            <a:ext cx="1217880" cy="382320"/>
           </a:xfrm>
           <a:prstGeom prst="ellipse">
             <a:avLst/>
@@ -16120,8 +16102,146 @@
         </p:nvCxnSpPr>
         <p:spPr>
           <a:xfrm flipV="1">
-            <a:off x="8662680" y="1826280"/>
-            <a:ext cx="646560" cy="231480"/>
+            <a:off x="8662680" y="1825920"/>
+            <a:ext cx="646560" cy="231840"/>
+          </a:xfrm>
+          <a:prstGeom prst="straightConnector1">
+            <a:avLst/>
+          </a:prstGeom>
+          <a:ln w="25400">
+            <a:solidFill>
+              <a:srgbClr val="000000"/>
+            </a:solidFill>
+            <a:round/>
+          </a:ln>
+        </p:spPr>
+      </p:cxnSp>
+      <p:sp>
+        <p:nvSpPr>
+          <p:cNvPr id="211" name="Diamond 32"/>
+          <p:cNvSpPr/>
+          <p:nvPr/>
+        </p:nvSpPr>
+        <p:spPr>
+          <a:xfrm>
+            <a:off x="5115600" y="2514600"/>
+            <a:ext cx="1566360" cy="382320"/>
+          </a:xfrm>
+          <a:prstGeom prst="diamond">
+            <a:avLst/>
+          </a:prstGeom>
+          <a:solidFill>
+            <a:schemeClr val="bg1"/>
+          </a:solidFill>
+          <a:ln>
+            <a:solidFill>
+              <a:srgbClr val="000000"/>
+            </a:solidFill>
+          </a:ln>
+        </p:spPr>
+        <p:style>
+          <a:lnRef idx="2">
+            <a:schemeClr val="accent1">
+              <a:shade val="50000"/>
+            </a:schemeClr>
+          </a:lnRef>
+          <a:fillRef idx="1">
+            <a:schemeClr val="accent1"/>
+          </a:fillRef>
+          <a:effectRef idx="0">
+            <a:schemeClr val="accent1"/>
+          </a:effectRef>
+          <a:fontRef idx="minor"/>
+        </p:style>
+        <p:txBody>
+          <a:bodyPr lIns="90000" rIns="90000" tIns="45000" bIns="45000" anchor="ctr">
+            <a:noAutofit/>
+          </a:bodyPr>
+          <a:p>
+            <a:pPr algn="ctr" defTabSz="914400">
+              <a:lnSpc>
+                <a:spcPct val="100000"/>
+              </a:lnSpc>
+            </a:pPr>
+            <a:r>
+              <a:rPr b="0" lang="en-US" sz="1400" spc="-1" strike="noStrike">
+                <a:solidFill>
+                  <a:schemeClr val="dk1"/>
+                </a:solidFill>
+                <a:latin typeface="Calibri"/>
+              </a:rPr>
+              <a:t>Holds</a:t>
+            </a:r>
+            <a:endParaRPr b="0" lang="en-US" sz="1400" spc="-1" strike="noStrike">
+              <a:solidFill>
+                <a:srgbClr val="000000"/>
+              </a:solidFill>
+              <a:latin typeface="Arial"/>
+            </a:endParaRPr>
+          </a:p>
+        </p:txBody>
+      </p:sp>
+      <p:cxnSp>
+        <p:nvCxnSpPr>
+          <p:cNvPr id="212" name="Straight Arrow Connector 87"/>
+          <p:cNvCxnSpPr/>
+          <p:nvPr/>
+        </p:nvCxnSpPr>
+        <p:spPr>
+          <a:xfrm flipH="1">
+            <a:off x="0" y="3657600"/>
+            <a:ext cx="1834200" cy="5400"/>
+          </a:xfrm>
+          <a:prstGeom prst="straightConnector1">
+            <a:avLst/>
+          </a:prstGeom>
+          <a:ln w="25400">
+            <a:solidFill>
+              <a:srgbClr val="000000"/>
+            </a:solidFill>
+            <a:round/>
+          </a:ln>
+        </p:spPr>
+      </p:cxnSp>
+      <p:cxnSp>
+        <p:nvCxnSpPr>
+          <p:cNvPr id="213" name="Straight Arrow Connector 88"/>
+          <p:cNvCxnSpPr>
+            <a:stCxn id="147" idx="3"/>
+            <a:endCxn id="211" idx="0"/>
+          </p:cNvCxnSpPr>
+          <p:nvPr/>
+        </p:nvCxnSpPr>
+        <p:spPr>
+          <a:xfrm>
+            <a:off x="4162680" y="1281960"/>
+            <a:ext cx="1736640" cy="1233000"/>
+          </a:xfrm>
+          <a:prstGeom prst="straightConnector1">
+            <a:avLst/>
+          </a:prstGeom>
+          <a:ln cap="sq" w="76200">
+            <a:solidFill>
+              <a:srgbClr val="000000"/>
+            </a:solidFill>
+            <a:round/>
+            <a:tailEnd len="sm" type="triangle" w="sm"/>
+          </a:ln>
+        </p:spPr>
+      </p:cxnSp>
+      <p:cxnSp>
+        <p:nvCxnSpPr>
+          <p:cNvPr id="214" name="Straight Arrow Connector 89"/>
+          <p:cNvCxnSpPr>
+            <a:stCxn id="211" idx="2"/>
+            <a:endCxn id="189" idx="0"/>
+          </p:cNvCxnSpPr>
+          <p:nvPr/>
+        </p:nvCxnSpPr>
+        <p:spPr>
+          <a:xfrm>
+            <a:off x="5898960" y="2896920"/>
+            <a:ext cx="324000" cy="2132640"/>
           </a:xfrm>
           <a:prstGeom prst="straightConnector1">
             <a:avLst/>
@@ -16166,14 +16286,14 @@
       </p:grpSpPr>
       <p:cxnSp>
         <p:nvCxnSpPr>
-          <p:cNvPr id="211" name="Straight Arrow Connector 1"/>
+          <p:cNvPr id="215" name="Straight Arrow Connector 1"/>
           <p:cNvCxnSpPr/>
           <p:nvPr/>
         </p:nvCxnSpPr>
         <p:spPr>
           <a:xfrm flipH="1">
             <a:off x="0" y="3073320"/>
-            <a:ext cx="1833840" cy="5040"/>
+            <a:ext cx="1834200" cy="5400"/>
           </a:xfrm>
           <a:prstGeom prst="straightConnector1">
             <a:avLst/>
@@ -16189,14 +16309,14 @@
       </p:cxnSp>
       <p:cxnSp>
         <p:nvCxnSpPr>
-          <p:cNvPr id="212" name="Straight Arrow Connector 2"/>
+          <p:cNvPr id="216" name="Straight Arrow Connector 2"/>
           <p:cNvCxnSpPr/>
           <p:nvPr/>
         </p:nvCxnSpPr>
         <p:spPr>
           <a:xfrm>
             <a:off x="0" y="2489400"/>
-            <a:ext cx="1833840" cy="5040"/>
+            <a:ext cx="1834200" cy="5400"/>
           </a:xfrm>
           <a:prstGeom prst="straightConnector1">
             <a:avLst/>
@@ -16212,14 +16332,14 @@
       </p:cxnSp>
       <p:cxnSp>
         <p:nvCxnSpPr>
-          <p:cNvPr id="213" name="Straight Arrow Connector 3"/>
+          <p:cNvPr id="217" name="Straight Arrow Connector 3"/>
           <p:cNvCxnSpPr/>
           <p:nvPr/>
         </p:nvCxnSpPr>
         <p:spPr>
           <a:xfrm>
             <a:off x="0" y="2781360"/>
-            <a:ext cx="1833840" cy="5040"/>
+            <a:ext cx="1834200" cy="5400"/>
           </a:xfrm>
           <a:prstGeom prst="straightConnector1">
             <a:avLst/>
@@ -16235,14 +16355,14 @@
       </p:cxnSp>
       <p:cxnSp>
         <p:nvCxnSpPr>
-          <p:cNvPr id="214" name="Straight Arrow Connector 4"/>
+          <p:cNvPr id="218" name="Straight Arrow Connector 4"/>
           <p:cNvCxnSpPr/>
           <p:nvPr/>
         </p:nvCxnSpPr>
         <p:spPr>
           <a:xfrm flipH="1">
             <a:off x="0" y="3657600"/>
-            <a:ext cx="1833840" cy="5040"/>
+            <a:ext cx="1834200" cy="5400"/>
           </a:xfrm>
           <a:prstGeom prst="straightConnector1">
             <a:avLst/>
@@ -16257,14 +16377,14 @@
       </p:cxnSp>
       <p:sp>
         <p:nvSpPr>
-          <p:cNvPr id="215" name="Diamond 1"/>
+          <p:cNvPr id="219" name="Diamond 1"/>
           <p:cNvSpPr/>
           <p:nvPr/>
         </p:nvSpPr>
         <p:spPr>
           <a:xfrm>
             <a:off x="128520" y="6134040"/>
-            <a:ext cx="1566720" cy="382680"/>
+            <a:ext cx="1566360" cy="382320"/>
           </a:xfrm>
           <a:prstGeom prst="diamond">
             <a:avLst/>
@@ -16322,14 +16442,14 @@
       </p:sp>
       <p:sp>
         <p:nvSpPr>
-          <p:cNvPr id="216" name="Oval 1"/>
+          <p:cNvPr id="220" name="Oval 1"/>
           <p:cNvSpPr/>
           <p:nvPr/>
         </p:nvSpPr>
         <p:spPr>
           <a:xfrm>
             <a:off x="302760" y="5454000"/>
-            <a:ext cx="1218240" cy="382680"/>
+            <a:ext cx="1217880" cy="382320"/>
           </a:xfrm>
           <a:prstGeom prst="ellipse">
             <a:avLst/>
@@ -16385,28 +16505,28 @@
       </p:sp>
       <p:grpSp>
         <p:nvGrpSpPr>
-          <p:cNvPr id="217" name="Group 1"/>
+          <p:cNvPr id="221" name="Group 1"/>
           <p:cNvGrpSpPr/>
           <p:nvPr/>
         </p:nvGrpSpPr>
         <p:grpSpPr>
           <a:xfrm>
             <a:off x="101160" y="336240"/>
-            <a:ext cx="1621440" cy="777960"/>
+            <a:ext cx="1621080" cy="777960"/>
             <a:chOff x="101160" y="336240"/>
-            <a:chExt cx="1621440" cy="777960"/>
+            <a:chExt cx="1621080" cy="777960"/>
           </a:xfrm>
         </p:grpSpPr>
         <p:sp>
           <p:nvSpPr>
-            <p:cNvPr id="218" name="TextBox 1"/>
+            <p:cNvPr id="222" name="TextBox 1"/>
             <p:cNvSpPr/>
             <p:nvPr/>
           </p:nvSpPr>
           <p:spPr>
             <a:xfrm>
               <a:off x="101160" y="336240"/>
-              <a:ext cx="1621440" cy="303120"/>
+              <a:ext cx="1621080" cy="303120"/>
             </a:xfrm>
             <a:prstGeom prst="rect">
               <a:avLst/>
@@ -16456,14 +16576,14 @@
         </p:sp>
         <p:sp>
           <p:nvSpPr>
-            <p:cNvPr id="219" name="TextBox 2"/>
+            <p:cNvPr id="223" name="TextBox 2"/>
             <p:cNvSpPr/>
             <p:nvPr/>
           </p:nvSpPr>
           <p:spPr>
             <a:xfrm>
               <a:off x="101160" y="597600"/>
-              <a:ext cx="1621440" cy="516600"/>
+              <a:ext cx="1621080" cy="516600"/>
             </a:xfrm>
             <a:prstGeom prst="rect">
               <a:avLst/>
@@ -16547,14 +16667,14 @@
       </p:grpSp>
       <p:sp>
         <p:nvSpPr>
-          <p:cNvPr id="220" name="Diamond 2"/>
+          <p:cNvPr id="224" name="Diamond 2"/>
           <p:cNvSpPr/>
           <p:nvPr/>
         </p:nvSpPr>
         <p:spPr>
           <a:xfrm>
             <a:off x="128520" y="4629600"/>
-            <a:ext cx="1566720" cy="527400"/>
+            <a:ext cx="1566360" cy="527040"/>
           </a:xfrm>
           <a:prstGeom prst="diamond">
             <a:avLst/>
@@ -16635,14 +16755,14 @@
       </p:sp>
       <p:cxnSp>
         <p:nvCxnSpPr>
-          <p:cNvPr id="221" name="Straight Arrow Connector 5"/>
+          <p:cNvPr id="225" name="Straight Arrow Connector 5"/>
           <p:cNvCxnSpPr/>
           <p:nvPr/>
         </p:nvCxnSpPr>
         <p:spPr>
           <a:xfrm>
             <a:off x="0" y="3365640"/>
-            <a:ext cx="1833840" cy="5040"/>
+            <a:ext cx="1834200" cy="5400"/>
           </a:xfrm>
           <a:prstGeom prst="straightConnector1">
             <a:avLst/>
@@ -16657,14 +16777,14 @@
       </p:cxnSp>
       <p:sp>
         <p:nvSpPr>
-          <p:cNvPr id="222" name="Isosceles Triangle 1"/>
+          <p:cNvPr id="226" name="Isosceles Triangle 1"/>
           <p:cNvSpPr/>
           <p:nvPr/>
         </p:nvSpPr>
         <p:spPr>
           <a:xfrm>
             <a:off x="673200" y="3949920"/>
-            <a:ext cx="477720" cy="382680"/>
+            <a:ext cx="477360" cy="382320"/>
           </a:xfrm>
           <a:prstGeom prst="triangle">
             <a:avLst>
@@ -16724,28 +16844,28 @@
       </p:sp>
       <p:grpSp>
         <p:nvGrpSpPr>
-          <p:cNvPr id="223" name="Group 2"/>
+          <p:cNvPr id="227" name="Group 2"/>
           <p:cNvGrpSpPr/>
           <p:nvPr/>
         </p:nvGrpSpPr>
         <p:grpSpPr>
           <a:xfrm>
             <a:off x="101160" y="1413000"/>
-            <a:ext cx="1621440" cy="777960"/>
+            <a:ext cx="1621080" cy="777960"/>
             <a:chOff x="101160" y="1413000"/>
-            <a:chExt cx="1621440" cy="777960"/>
+            <a:chExt cx="1621080" cy="777960"/>
           </a:xfrm>
         </p:grpSpPr>
         <p:sp>
           <p:nvSpPr>
-            <p:cNvPr id="224" name="TextBox 3"/>
+            <p:cNvPr id="228" name="TextBox 3"/>
             <p:cNvSpPr/>
             <p:nvPr/>
           </p:nvSpPr>
           <p:spPr>
             <a:xfrm>
               <a:off x="101160" y="1413000"/>
-              <a:ext cx="1621440" cy="303120"/>
+              <a:ext cx="1621080" cy="303120"/>
             </a:xfrm>
             <a:prstGeom prst="rect">
               <a:avLst/>
@@ -16796,14 +16916,14 @@
         </p:sp>
         <p:sp>
           <p:nvSpPr>
-            <p:cNvPr id="225" name="TextBox 4"/>
+            <p:cNvPr id="229" name="TextBox 4"/>
             <p:cNvSpPr/>
             <p:nvPr/>
           </p:nvSpPr>
           <p:spPr>
             <a:xfrm>
               <a:off x="101160" y="1674360"/>
-              <a:ext cx="1621440" cy="516600"/>
+              <a:ext cx="1621080" cy="516600"/>
             </a:xfrm>
             <a:prstGeom prst="rect">
               <a:avLst/>
@@ -16888,14 +17008,14 @@
       </p:grpSp>
       <p:sp>
         <p:nvSpPr>
-          <p:cNvPr id="226" name="TextBox 19"/>
+          <p:cNvPr id="230" name="TextBox 19"/>
           <p:cNvSpPr/>
           <p:nvPr/>
         </p:nvSpPr>
         <p:spPr>
           <a:xfrm>
             <a:off x="4775040" y="457200"/>
-            <a:ext cx="1621440" cy="303120"/>
+            <a:ext cx="1621080" cy="303120"/>
           </a:xfrm>
           <a:prstGeom prst="rect">
             <a:avLst/>
@@ -16945,14 +17065,14 @@
       </p:sp>
       <p:sp>
         <p:nvSpPr>
-          <p:cNvPr id="227" name="TextBox 20"/>
+          <p:cNvPr id="231" name="TextBox 20"/>
           <p:cNvSpPr/>
           <p:nvPr/>
         </p:nvSpPr>
         <p:spPr>
           <a:xfrm>
             <a:off x="4775040" y="718560"/>
-            <a:ext cx="1621440" cy="730080"/>
+            <a:ext cx="1621080" cy="730080"/>
           </a:xfrm>
           <a:prstGeom prst="rect">
             <a:avLst/>
@@ -17062,28 +17182,28 @@
       </p:sp>
       <p:grpSp>
         <p:nvGrpSpPr>
-          <p:cNvPr id="228" name="Group 6"/>
+          <p:cNvPr id="232" name="Group 6"/>
           <p:cNvGrpSpPr/>
           <p:nvPr/>
         </p:nvGrpSpPr>
         <p:grpSpPr>
           <a:xfrm>
             <a:off x="4572000" y="4274280"/>
-            <a:ext cx="1621440" cy="991440"/>
+            <a:ext cx="1621080" cy="991440"/>
             <a:chOff x="4572000" y="4274280"/>
-            <a:chExt cx="1621440" cy="991440"/>
+            <a:chExt cx="1621080" cy="991440"/>
           </a:xfrm>
         </p:grpSpPr>
         <p:sp>
           <p:nvSpPr>
-            <p:cNvPr id="229" name="TextBox 21"/>
+            <p:cNvPr id="233" name="TextBox 21"/>
             <p:cNvSpPr/>
             <p:nvPr/>
           </p:nvSpPr>
           <p:spPr>
             <a:xfrm>
               <a:off x="4572000" y="4274280"/>
-              <a:ext cx="1621440" cy="303120"/>
+              <a:ext cx="1621080" cy="303120"/>
             </a:xfrm>
             <a:prstGeom prst="rect">
               <a:avLst/>
@@ -17133,14 +17253,14 @@
         </p:sp>
         <p:sp>
           <p:nvSpPr>
-            <p:cNvPr id="230" name="TextBox 30"/>
+            <p:cNvPr id="234" name="TextBox 30"/>
             <p:cNvSpPr/>
             <p:nvPr/>
           </p:nvSpPr>
           <p:spPr>
             <a:xfrm>
               <a:off x="4572000" y="4535640"/>
-              <a:ext cx="1621440" cy="730080"/>
+              <a:ext cx="1621080" cy="730080"/>
             </a:xfrm>
             <a:prstGeom prst="rect">
               <a:avLst/>
@@ -17251,14 +17371,14 @@
       </p:grpSp>
       <p:sp>
         <p:nvSpPr>
-          <p:cNvPr id="231" name="Diamond 9"/>
+          <p:cNvPr id="235" name="Diamond 9"/>
           <p:cNvSpPr/>
           <p:nvPr/>
         </p:nvSpPr>
         <p:spPr>
           <a:xfrm>
             <a:off x="3231360" y="2899800"/>
-            <a:ext cx="1566720" cy="382680"/>
+            <a:ext cx="1566360" cy="382320"/>
           </a:xfrm>
           <a:prstGeom prst="diamond">
             <a:avLst/>
@@ -17316,14 +17436,14 @@
       </p:sp>
       <p:sp>
         <p:nvSpPr>
-          <p:cNvPr id="232" name="Diamond 10"/>
+          <p:cNvPr id="236" name="Diamond 10"/>
           <p:cNvSpPr/>
           <p:nvPr/>
         </p:nvSpPr>
         <p:spPr>
           <a:xfrm>
             <a:off x="4602960" y="2585160"/>
-            <a:ext cx="1795320" cy="384120"/>
+            <a:ext cx="1794960" cy="383760"/>
           </a:xfrm>
           <a:prstGeom prst="diamond">
             <a:avLst/>
@@ -17381,17 +17501,17 @@
       </p:sp>
       <p:cxnSp>
         <p:nvCxnSpPr>
-          <p:cNvPr id="233" name="Straight Arrow Connector 24"/>
+          <p:cNvPr id="237" name="Straight Arrow Connector 24"/>
           <p:cNvCxnSpPr>
-            <a:stCxn id="228" idx="0"/>
-            <a:endCxn id="231" idx="2"/>
+            <a:stCxn id="232" idx="0"/>
+            <a:endCxn id="235" idx="2"/>
           </p:cNvCxnSpPr>
           <p:nvPr/>
         </p:nvCxnSpPr>
         <p:spPr>
           <a:xfrm flipH="1" flipV="1">
-            <a:off x="4014720" y="3282480"/>
-            <a:ext cx="1368360" cy="992160"/>
+            <a:off x="4014720" y="3282120"/>
+            <a:ext cx="1368000" cy="992520"/>
           </a:xfrm>
           <a:prstGeom prst="straightConnector1">
             <a:avLst/>
@@ -17407,16 +17527,16 @@
       </p:cxnSp>
       <p:cxnSp>
         <p:nvCxnSpPr>
-          <p:cNvPr id="234" name="Straight Arrow Connector 18"/>
+          <p:cNvPr id="238" name="Straight Arrow Connector 18"/>
           <p:cNvCxnSpPr>
-            <a:stCxn id="232" idx="0"/>
-            <a:endCxn id="227" idx="2"/>
+            <a:stCxn id="236" idx="0"/>
+            <a:endCxn id="231" idx="2"/>
           </p:cNvCxnSpPr>
           <p:nvPr/>
         </p:nvCxnSpPr>
         <p:spPr>
           <a:xfrm flipV="1">
-            <a:off x="5500800" y="1448640"/>
+            <a:off x="5500440" y="1448640"/>
             <a:ext cx="85320" cy="1136880"/>
           </a:xfrm>
           <a:prstGeom prst="straightConnector1">
@@ -17432,17 +17552,17 @@
       </p:cxnSp>
       <p:cxnSp>
         <p:nvCxnSpPr>
-          <p:cNvPr id="235" name="Straight Arrow Connector 17"/>
+          <p:cNvPr id="239" name="Straight Arrow Connector 17"/>
           <p:cNvCxnSpPr>
-            <a:stCxn id="228" idx="0"/>
-            <a:endCxn id="232" idx="2"/>
+            <a:stCxn id="232" idx="0"/>
+            <a:endCxn id="236" idx="2"/>
           </p:cNvCxnSpPr>
           <p:nvPr/>
         </p:nvCxnSpPr>
         <p:spPr>
           <a:xfrm flipV="1">
-            <a:off x="5382720" y="2969280"/>
-            <a:ext cx="118440" cy="1305360"/>
+            <a:off x="5382360" y="2968920"/>
+            <a:ext cx="118440" cy="1305720"/>
           </a:xfrm>
           <a:prstGeom prst="straightConnector1">
             <a:avLst/>
@@ -17457,17 +17577,17 @@
       </p:cxnSp>
       <p:cxnSp>
         <p:nvCxnSpPr>
-          <p:cNvPr id="236" name="Straight Arrow Connector 23"/>
+          <p:cNvPr id="240" name="Straight Arrow Connector 23"/>
           <p:cNvCxnSpPr>
-            <a:stCxn id="227" idx="2"/>
-            <a:endCxn id="231" idx="0"/>
+            <a:stCxn id="231" idx="2"/>
+            <a:endCxn id="235" idx="0"/>
           </p:cNvCxnSpPr>
           <p:nvPr/>
         </p:nvCxnSpPr>
         <p:spPr>
           <a:xfrm flipH="1">
             <a:off x="4014720" y="1448640"/>
-            <a:ext cx="1571400" cy="1451520"/>
+            <a:ext cx="1571040" cy="1451520"/>
           </a:xfrm>
           <a:prstGeom prst="straightConnector1">
             <a:avLst/>
@@ -17482,14 +17602,14 @@
       </p:cxnSp>
       <p:sp>
         <p:nvSpPr>
-          <p:cNvPr id="237" name="Diamond 11"/>
+          <p:cNvPr id="241" name="Diamond 11"/>
           <p:cNvSpPr/>
           <p:nvPr/>
         </p:nvSpPr>
         <p:spPr>
           <a:xfrm>
             <a:off x="2743200" y="457200"/>
-            <a:ext cx="1566720" cy="382680"/>
+            <a:ext cx="1566360" cy="382320"/>
           </a:xfrm>
           <a:prstGeom prst="diamond">
             <a:avLst/>
@@ -17547,17 +17667,17 @@
       </p:sp>
       <p:cxnSp>
         <p:nvCxnSpPr>
-          <p:cNvPr id="238" name="Straight Arrow Connector 25"/>
+          <p:cNvPr id="242" name="Straight Arrow Connector 25"/>
           <p:cNvCxnSpPr>
-            <a:stCxn id="227" idx="1"/>
-            <a:endCxn id="237" idx="3"/>
+            <a:stCxn id="231" idx="1"/>
+            <a:endCxn id="241" idx="3"/>
           </p:cNvCxnSpPr>
           <p:nvPr/>
         </p:nvCxnSpPr>
         <p:spPr>
           <a:xfrm flipH="1" flipV="1">
-            <a:off x="4309920" y="648720"/>
-            <a:ext cx="465480" cy="435240"/>
+            <a:off x="4309560" y="648360"/>
+            <a:ext cx="465840" cy="435600"/>
           </a:xfrm>
           <a:prstGeom prst="straightConnector1">
             <a:avLst/>
@@ -17572,17 +17692,17 @@
       </p:cxnSp>
       <p:cxnSp>
         <p:nvCxnSpPr>
-          <p:cNvPr id="239" name="Straight Arrow Connector 26"/>
+          <p:cNvPr id="243" name="Straight Arrow Connector 26"/>
           <p:cNvCxnSpPr>
-            <a:stCxn id="227" idx="1"/>
-            <a:endCxn id="237" idx="2"/>
+            <a:stCxn id="231" idx="1"/>
+            <a:endCxn id="241" idx="2"/>
           </p:cNvCxnSpPr>
           <p:nvPr/>
         </p:nvCxnSpPr>
         <p:spPr>
           <a:xfrm flipH="1" flipV="1">
-            <a:off x="3526560" y="839880"/>
-            <a:ext cx="1248840" cy="244080"/>
+            <a:off x="3526560" y="839520"/>
+            <a:ext cx="1248840" cy="244440"/>
           </a:xfrm>
           <a:prstGeom prst="straightConnector1">
             <a:avLst/>
@@ -17597,28 +17717,28 @@
       </p:cxnSp>
       <p:grpSp>
         <p:nvGrpSpPr>
-          <p:cNvPr id="240" name="Group 7"/>
+          <p:cNvPr id="244" name="Group 7"/>
           <p:cNvGrpSpPr/>
           <p:nvPr/>
         </p:nvGrpSpPr>
         <p:grpSpPr>
           <a:xfrm>
             <a:off x="8686800" y="837360"/>
-            <a:ext cx="1621440" cy="991440"/>
+            <a:ext cx="1621080" cy="991440"/>
             <a:chOff x="8686800" y="837360"/>
-            <a:chExt cx="1621440" cy="991440"/>
+            <a:chExt cx="1621080" cy="991440"/>
           </a:xfrm>
         </p:grpSpPr>
         <p:sp>
           <p:nvSpPr>
-            <p:cNvPr id="241" name="TextBox 31"/>
+            <p:cNvPr id="245" name="TextBox 31"/>
             <p:cNvSpPr/>
             <p:nvPr/>
           </p:nvSpPr>
           <p:spPr>
             <a:xfrm>
               <a:off x="8686800" y="837360"/>
-              <a:ext cx="1621440" cy="303120"/>
+              <a:ext cx="1621080" cy="303120"/>
             </a:xfrm>
             <a:prstGeom prst="rect">
               <a:avLst/>
@@ -17668,14 +17788,14 @@
         </p:sp>
         <p:sp>
           <p:nvSpPr>
-            <p:cNvPr id="242" name="TextBox 32"/>
+            <p:cNvPr id="246" name="TextBox 32"/>
             <p:cNvSpPr/>
             <p:nvPr/>
           </p:nvSpPr>
           <p:spPr>
             <a:xfrm>
               <a:off x="8686800" y="1098720"/>
-              <a:ext cx="1621440" cy="730080"/>
+              <a:ext cx="1621080" cy="730080"/>
             </a:xfrm>
             <a:prstGeom prst="rect">
               <a:avLst/>
@@ -17786,14 +17906,14 @@
       </p:grpSp>
       <p:sp>
         <p:nvSpPr>
-          <p:cNvPr id="243" name="Diamond 12"/>
+          <p:cNvPr id="247" name="Diamond 12"/>
           <p:cNvSpPr/>
           <p:nvPr/>
         </p:nvSpPr>
         <p:spPr>
           <a:xfrm>
             <a:off x="128880" y="6134040"/>
-            <a:ext cx="1566720" cy="382680"/>
+            <a:ext cx="1566360" cy="382320"/>
           </a:xfrm>
           <a:prstGeom prst="diamond">
             <a:avLst/>
@@ -17851,14 +17971,14 @@
       </p:sp>
       <p:sp>
         <p:nvSpPr>
-          <p:cNvPr id="244" name="Diamond 13"/>
+          <p:cNvPr id="248" name="Diamond 13"/>
           <p:cNvSpPr/>
           <p:nvPr/>
         </p:nvSpPr>
         <p:spPr>
           <a:xfrm>
             <a:off x="7315200" y="228600"/>
-            <a:ext cx="1566720" cy="382680"/>
+            <a:ext cx="1566360" cy="382320"/>
           </a:xfrm>
           <a:prstGeom prst="diamond">
             <a:avLst/>
@@ -17916,14 +18036,14 @@
       </p:sp>
       <p:cxnSp>
         <p:nvCxnSpPr>
-          <p:cNvPr id="245" name="Straight Arrow Connector 27"/>
+          <p:cNvPr id="249" name="Straight Arrow Connector 27"/>
           <p:cNvCxnSpPr/>
           <p:nvPr/>
         </p:nvCxnSpPr>
         <p:spPr>
           <a:xfrm>
             <a:off x="360" y="3366000"/>
-            <a:ext cx="1833840" cy="5040"/>
+            <a:ext cx="1834200" cy="5400"/>
           </a:xfrm>
           <a:prstGeom prst="straightConnector1">
             <a:avLst/>
@@ -17938,17 +18058,17 @@
       </p:cxnSp>
       <p:cxnSp>
         <p:nvCxnSpPr>
-          <p:cNvPr id="246" name="Straight Arrow Connector 28"/>
+          <p:cNvPr id="250" name="Straight Arrow Connector 28"/>
           <p:cNvCxnSpPr>
-            <a:stCxn id="244" idx="1"/>
-            <a:endCxn id="227" idx="3"/>
+            <a:stCxn id="248" idx="1"/>
+            <a:endCxn id="231" idx="3"/>
           </p:cNvCxnSpPr>
           <p:nvPr/>
         </p:nvCxnSpPr>
         <p:spPr>
           <a:xfrm flipH="1">
-            <a:off x="6396480" y="420120"/>
-            <a:ext cx="919080" cy="663840"/>
+            <a:off x="6396120" y="419760"/>
+            <a:ext cx="919440" cy="664200"/>
           </a:xfrm>
           <a:prstGeom prst="straightConnector1">
             <a:avLst/>
@@ -17963,14 +18083,14 @@
       </p:cxnSp>
       <p:sp>
         <p:nvSpPr>
-          <p:cNvPr id="247" name="Diamond 14"/>
+          <p:cNvPr id="251" name="Diamond 14"/>
           <p:cNvSpPr/>
           <p:nvPr/>
         </p:nvSpPr>
         <p:spPr>
           <a:xfrm>
             <a:off x="6629400" y="1442160"/>
-            <a:ext cx="1825920" cy="612360"/>
+            <a:ext cx="1825560" cy="612000"/>
           </a:xfrm>
           <a:prstGeom prst="diamond">
             <a:avLst/>
@@ -18028,17 +18148,17 @@
       </p:sp>
       <p:cxnSp>
         <p:nvCxnSpPr>
-          <p:cNvPr id="248" name="Straight Arrow Connector 30"/>
+          <p:cNvPr id="252" name="Straight Arrow Connector 30"/>
           <p:cNvCxnSpPr>
-            <a:stCxn id="240" idx="0"/>
-            <a:endCxn id="244" idx="3"/>
+            <a:stCxn id="244" idx="0"/>
+            <a:endCxn id="248" idx="3"/>
           </p:cNvCxnSpPr>
           <p:nvPr/>
         </p:nvCxnSpPr>
         <p:spPr>
           <a:xfrm flipH="1" flipV="1">
-            <a:off x="8881920" y="420120"/>
-            <a:ext cx="615960" cy="417600"/>
+            <a:off x="8881560" y="419760"/>
+            <a:ext cx="615960" cy="417960"/>
           </a:xfrm>
           <a:prstGeom prst="straightConnector1">
             <a:avLst/>
@@ -18054,14 +18174,14 @@
       </p:cxnSp>
       <p:sp>
         <p:nvSpPr>
-          <p:cNvPr id="249" name="Diamond 15"/>
+          <p:cNvPr id="253" name="Diamond 15"/>
           <p:cNvSpPr/>
           <p:nvPr/>
         </p:nvSpPr>
         <p:spPr>
           <a:xfrm>
             <a:off x="6629400" y="2514600"/>
-            <a:ext cx="1566720" cy="382680"/>
+            <a:ext cx="1566360" cy="382320"/>
           </a:xfrm>
           <a:prstGeom prst="diamond">
             <a:avLst/>
@@ -18119,17 +18239,17 @@
       </p:sp>
       <p:cxnSp>
         <p:nvCxnSpPr>
-          <p:cNvPr id="250" name="Straight Arrow Connector 32"/>
+          <p:cNvPr id="254" name="Straight Arrow Connector 32"/>
           <p:cNvCxnSpPr>
-            <a:stCxn id="240" idx="2"/>
-            <a:endCxn id="249" idx="3"/>
+            <a:stCxn id="244" idx="2"/>
+            <a:endCxn id="253" idx="3"/>
           </p:cNvCxnSpPr>
           <p:nvPr/>
         </p:nvCxnSpPr>
         <p:spPr>
           <a:xfrm flipH="1">
-            <a:off x="8196120" y="1828800"/>
-            <a:ext cx="1301760" cy="877680"/>
+            <a:off x="8195760" y="1828800"/>
+            <a:ext cx="1301760" cy="877320"/>
           </a:xfrm>
           <a:prstGeom prst="straightConnector1">
             <a:avLst/>
@@ -18144,17 +18264,17 @@
       </p:cxnSp>
       <p:cxnSp>
         <p:nvCxnSpPr>
-          <p:cNvPr id="251" name="Straight Arrow Connector 33"/>
+          <p:cNvPr id="255" name="Straight Arrow Connector 33"/>
           <p:cNvCxnSpPr>
-            <a:stCxn id="249" idx="1"/>
-            <a:endCxn id="228" idx="3"/>
+            <a:stCxn id="253" idx="1"/>
+            <a:endCxn id="232" idx="3"/>
           </p:cNvCxnSpPr>
           <p:nvPr/>
         </p:nvCxnSpPr>
         <p:spPr>
           <a:xfrm flipH="1">
-            <a:off x="6193440" y="2706120"/>
-            <a:ext cx="436320" cy="2064240"/>
+            <a:off x="6193080" y="2705760"/>
+            <a:ext cx="436680" cy="2064600"/>
           </a:xfrm>
           <a:prstGeom prst="straightConnector1">
             <a:avLst/>
@@ -18169,17 +18289,17 @@
       </p:cxnSp>
       <p:cxnSp>
         <p:nvCxnSpPr>
-          <p:cNvPr id="252" name="Straight Arrow Connector 34"/>
+          <p:cNvPr id="256" name="Straight Arrow Connector 34"/>
           <p:cNvCxnSpPr>
-            <a:stCxn id="240" idx="1"/>
-            <a:endCxn id="247" idx="3"/>
+            <a:stCxn id="244" idx="1"/>
+            <a:endCxn id="251" idx="3"/>
           </p:cNvCxnSpPr>
           <p:nvPr/>
         </p:nvCxnSpPr>
         <p:spPr>
           <a:xfrm flipH="1">
-            <a:off x="8455320" y="1333080"/>
-            <a:ext cx="231840" cy="415800"/>
+            <a:off x="8454960" y="1333080"/>
+            <a:ext cx="232200" cy="415440"/>
           </a:xfrm>
           <a:prstGeom prst="straightConnector1">
             <a:avLst/>
@@ -18194,17 +18314,17 @@
       </p:cxnSp>
       <p:cxnSp>
         <p:nvCxnSpPr>
-          <p:cNvPr id="253" name="Straight Arrow Connector 31"/>
+          <p:cNvPr id="257" name="Straight Arrow Connector 31"/>
           <p:cNvCxnSpPr>
-            <a:stCxn id="247" idx="1"/>
-            <a:endCxn id="227" idx="2"/>
+            <a:stCxn id="251" idx="1"/>
+            <a:endCxn id="231" idx="2"/>
           </p:cNvCxnSpPr>
           <p:nvPr/>
         </p:nvCxnSpPr>
         <p:spPr>
           <a:xfrm flipH="1" flipV="1">
-            <a:off x="5585760" y="1448640"/>
-            <a:ext cx="1044000" cy="300240"/>
+            <a:off x="5585400" y="1448640"/>
+            <a:ext cx="1044360" cy="299880"/>
           </a:xfrm>
           <a:prstGeom prst="straightConnector1">
             <a:avLst/>
@@ -18219,28 +18339,28 @@
       </p:cxnSp>
       <p:grpSp>
         <p:nvGrpSpPr>
-          <p:cNvPr id="254" name="Group 11"/>
+          <p:cNvPr id="258" name="Group 11"/>
           <p:cNvGrpSpPr/>
           <p:nvPr/>
         </p:nvGrpSpPr>
         <p:grpSpPr>
           <a:xfrm>
             <a:off x="101160" y="336240"/>
-            <a:ext cx="1621440" cy="777960"/>
+            <a:ext cx="1621080" cy="777960"/>
             <a:chOff x="101160" y="336240"/>
-            <a:chExt cx="1621440" cy="777960"/>
+            <a:chExt cx="1621080" cy="777960"/>
           </a:xfrm>
         </p:grpSpPr>
         <p:sp>
           <p:nvSpPr>
-            <p:cNvPr id="255" name="TextBox 51"/>
+            <p:cNvPr id="259" name="TextBox 51"/>
             <p:cNvSpPr/>
             <p:nvPr/>
           </p:nvSpPr>
           <p:spPr>
             <a:xfrm>
               <a:off x="101160" y="336240"/>
-              <a:ext cx="1621440" cy="303120"/>
+              <a:ext cx="1621080" cy="303120"/>
             </a:xfrm>
             <a:prstGeom prst="rect">
               <a:avLst/>
@@ -18290,14 +18410,14 @@
         </p:sp>
         <p:sp>
           <p:nvSpPr>
-            <p:cNvPr id="256" name="TextBox 52"/>
+            <p:cNvPr id="260" name="TextBox 52"/>
             <p:cNvSpPr/>
             <p:nvPr/>
           </p:nvSpPr>
           <p:spPr>
             <a:xfrm>
               <a:off x="101160" y="597600"/>
-              <a:ext cx="1621440" cy="516600"/>
+              <a:ext cx="1621080" cy="516600"/>
             </a:xfrm>
             <a:prstGeom prst="rect">
               <a:avLst/>
@@ -18381,28 +18501,28 @@
       </p:grpSp>
       <p:grpSp>
         <p:nvGrpSpPr>
-          <p:cNvPr id="257" name="Group 14"/>
+          <p:cNvPr id="261" name="Group 14"/>
           <p:cNvGrpSpPr/>
           <p:nvPr/>
         </p:nvGrpSpPr>
         <p:grpSpPr>
           <a:xfrm>
             <a:off x="6760440" y="4359960"/>
-            <a:ext cx="1621440" cy="561600"/>
+            <a:ext cx="1621080" cy="561240"/>
             <a:chOff x="6760440" y="4359960"/>
-            <a:chExt cx="1621440" cy="561600"/>
+            <a:chExt cx="1621080" cy="561240"/>
           </a:xfrm>
         </p:grpSpPr>
         <p:sp>
           <p:nvSpPr>
-            <p:cNvPr id="258" name="TextBox 55"/>
+            <p:cNvPr id="262" name="TextBox 55"/>
             <p:cNvSpPr/>
             <p:nvPr/>
           </p:nvSpPr>
           <p:spPr>
             <a:xfrm>
               <a:off x="6760440" y="4359960"/>
-              <a:ext cx="1621440" cy="303120"/>
+              <a:ext cx="1621080" cy="303120"/>
             </a:xfrm>
             <a:prstGeom prst="rect">
               <a:avLst/>
@@ -18452,14 +18572,14 @@
         </p:sp>
         <p:sp>
           <p:nvSpPr>
-            <p:cNvPr id="259" name="TextBox 56"/>
+            <p:cNvPr id="263" name="TextBox 56"/>
             <p:cNvSpPr/>
             <p:nvPr/>
           </p:nvSpPr>
           <p:spPr>
             <a:xfrm>
               <a:off x="6760440" y="4621320"/>
-              <a:ext cx="1621440" cy="300240"/>
+              <a:ext cx="1621080" cy="299880"/>
             </a:xfrm>
             <a:prstGeom prst="rect">
               <a:avLst/>
@@ -18501,14 +18621,14 @@
       </p:grpSp>
       <p:sp>
         <p:nvSpPr>
-          <p:cNvPr id="260" name="Isosceles Triangle 6"/>
+          <p:cNvPr id="264" name="Isosceles Triangle 6"/>
           <p:cNvSpPr/>
           <p:nvPr/>
         </p:nvSpPr>
         <p:spPr>
           <a:xfrm>
             <a:off x="9144000" y="2057400"/>
-            <a:ext cx="477720" cy="382680"/>
+            <a:ext cx="477360" cy="382320"/>
           </a:xfrm>
           <a:prstGeom prst="triangle">
             <a:avLst>
@@ -18568,16 +18688,16 @@
       </p:sp>
       <p:cxnSp>
         <p:nvCxnSpPr>
-          <p:cNvPr id="261" name="Straight Arrow Connector 51"/>
+          <p:cNvPr id="265" name="Straight Arrow Connector 51"/>
           <p:cNvCxnSpPr>
-            <a:stCxn id="262" idx="3"/>
+            <a:stCxn id="266" idx="3"/>
           </p:cNvCxnSpPr>
           <p:nvPr/>
         </p:nvCxnSpPr>
         <p:spPr>
           <a:xfrm flipH="1">
-            <a:off x="8026200" y="4111920"/>
-            <a:ext cx="1434600" cy="250920"/>
+            <a:off x="8026200" y="4111560"/>
+            <a:ext cx="1434240" cy="251640"/>
           </a:xfrm>
           <a:prstGeom prst="straightConnector1">
             <a:avLst/>
@@ -18592,16 +18712,16 @@
       </p:cxnSp>
       <p:cxnSp>
         <p:nvCxnSpPr>
-          <p:cNvPr id="263" name="Straight Arrow Connector 53"/>
+          <p:cNvPr id="267" name="Straight Arrow Connector 53"/>
           <p:cNvCxnSpPr>
-            <a:endCxn id="262" idx="3"/>
+            <a:endCxn id="266" idx="3"/>
           </p:cNvCxnSpPr>
           <p:nvPr/>
         </p:nvCxnSpPr>
         <p:spPr>
           <a:xfrm flipH="1" flipV="1">
-            <a:off x="9460440" y="4111920"/>
-            <a:ext cx="473760" cy="232560"/>
+            <a:off x="9460080" y="4111560"/>
+            <a:ext cx="474480" cy="233280"/>
           </a:xfrm>
           <a:prstGeom prst="straightConnector1">
             <a:avLst/>
@@ -18616,16 +18736,16 @@
       </p:cxnSp>
       <p:cxnSp>
         <p:nvCxnSpPr>
-          <p:cNvPr id="264" name="Straight Arrow Connector 54"/>
+          <p:cNvPr id="268" name="Straight Arrow Connector 54"/>
           <p:cNvCxnSpPr>
-            <a:stCxn id="260" idx="3"/>
+            <a:stCxn id="264" idx="3"/>
           </p:cNvCxnSpPr>
           <p:nvPr/>
         </p:nvCxnSpPr>
         <p:spPr>
           <a:xfrm flipH="1">
-            <a:off x="9346320" y="2440080"/>
-            <a:ext cx="37080" cy="442440"/>
+            <a:off x="9346320" y="2439720"/>
+            <a:ext cx="36720" cy="443160"/>
           </a:xfrm>
           <a:prstGeom prst="straightConnector1">
             <a:avLst/>
@@ -18640,16 +18760,16 @@
       </p:cxnSp>
       <p:cxnSp>
         <p:nvCxnSpPr>
-          <p:cNvPr id="265" name="Straight Arrow Connector 55"/>
+          <p:cNvPr id="269" name="Straight Arrow Connector 55"/>
           <p:cNvCxnSpPr>
-            <a:stCxn id="240" idx="2"/>
-            <a:endCxn id="260" idx="0"/>
+            <a:stCxn id="244" idx="2"/>
+            <a:endCxn id="264" idx="0"/>
           </p:cNvCxnSpPr>
           <p:nvPr/>
         </p:nvCxnSpPr>
         <p:spPr>
           <a:xfrm flipH="1">
-            <a:off x="9383040" y="1828800"/>
+            <a:off x="9382680" y="1828800"/>
             <a:ext cx="114840" cy="228960"/>
           </a:xfrm>
           <a:prstGeom prst="straightConnector1">
@@ -18665,14 +18785,14 @@
       </p:cxnSp>
       <p:sp>
         <p:nvSpPr>
-          <p:cNvPr id="266" name="TextBox 73"/>
+          <p:cNvPr id="270" name="TextBox 73"/>
           <p:cNvSpPr/>
           <p:nvPr/>
         </p:nvSpPr>
         <p:spPr>
           <a:xfrm>
             <a:off x="7089840" y="5715000"/>
-            <a:ext cx="1621440" cy="303120"/>
+            <a:ext cx="1621080" cy="303120"/>
           </a:xfrm>
           <a:prstGeom prst="rect">
             <a:avLst/>
@@ -18722,14 +18842,14 @@
       </p:sp>
       <p:sp>
         <p:nvSpPr>
-          <p:cNvPr id="267" name="Diamond 21"/>
+          <p:cNvPr id="271" name="Diamond 21"/>
           <p:cNvSpPr/>
           <p:nvPr/>
         </p:nvSpPr>
         <p:spPr>
           <a:xfrm>
             <a:off x="6760440" y="5183280"/>
-            <a:ext cx="1824840" cy="382680"/>
+            <a:ext cx="1824480" cy="382320"/>
           </a:xfrm>
           <a:prstGeom prst="diamond">
             <a:avLst/>
@@ -18787,14 +18907,14 @@
       </p:sp>
       <p:cxnSp>
         <p:nvCxnSpPr>
-          <p:cNvPr id="268" name="Straight Arrow Connector 56"/>
+          <p:cNvPr id="272" name="Straight Arrow Connector 56"/>
           <p:cNvCxnSpPr/>
           <p:nvPr/>
         </p:nvCxnSpPr>
         <p:spPr>
           <a:xfrm flipH="1">
             <a:off x="0" y="3657600"/>
-            <a:ext cx="1833840" cy="5040"/>
+            <a:ext cx="1834200" cy="5400"/>
           </a:xfrm>
           <a:prstGeom prst="straightConnector1">
             <a:avLst/>
@@ -18809,28 +18929,28 @@
       </p:cxnSp>
       <p:grpSp>
         <p:nvGrpSpPr>
-          <p:cNvPr id="269" name="Group 12"/>
+          <p:cNvPr id="273" name="Group 12"/>
           <p:cNvGrpSpPr/>
           <p:nvPr/>
         </p:nvGrpSpPr>
         <p:grpSpPr>
           <a:xfrm>
             <a:off x="8534520" y="2879640"/>
-            <a:ext cx="1621440" cy="562320"/>
+            <a:ext cx="1621080" cy="561960"/>
             <a:chOff x="8534520" y="2879640"/>
-            <a:chExt cx="1621440" cy="562320"/>
+            <a:chExt cx="1621080" cy="561960"/>
           </a:xfrm>
         </p:grpSpPr>
         <p:sp>
           <p:nvSpPr>
-            <p:cNvPr id="270" name="TextBox 23"/>
+            <p:cNvPr id="274" name="TextBox 23"/>
             <p:cNvSpPr/>
             <p:nvPr/>
           </p:nvSpPr>
           <p:spPr>
             <a:xfrm>
               <a:off x="8534520" y="2879640"/>
-              <a:ext cx="1621440" cy="303120"/>
+              <a:ext cx="1621080" cy="303120"/>
             </a:xfrm>
             <a:prstGeom prst="rect">
               <a:avLst/>
@@ -18880,14 +19000,14 @@
         </p:sp>
         <p:sp>
           <p:nvSpPr>
-            <p:cNvPr id="271" name="TextBox 24"/>
+            <p:cNvPr id="275" name="TextBox 24"/>
             <p:cNvSpPr/>
             <p:nvPr/>
           </p:nvSpPr>
           <p:spPr>
             <a:xfrm>
               <a:off x="8534520" y="3141000"/>
-              <a:ext cx="1621440" cy="300960"/>
+              <a:ext cx="1621080" cy="300600"/>
             </a:xfrm>
             <a:prstGeom prst="rect">
               <a:avLst/>
@@ -18929,28 +19049,28 @@
       </p:grpSp>
       <p:grpSp>
         <p:nvGrpSpPr>
-          <p:cNvPr id="272" name="Group 16"/>
+          <p:cNvPr id="276" name="Group 16"/>
           <p:cNvGrpSpPr/>
           <p:nvPr/>
         </p:nvGrpSpPr>
         <p:grpSpPr>
           <a:xfrm>
             <a:off x="8534520" y="2879640"/>
-            <a:ext cx="1621440" cy="564480"/>
+            <a:ext cx="1621080" cy="564480"/>
             <a:chOff x="8534520" y="2879640"/>
-            <a:chExt cx="1621440" cy="564480"/>
+            <a:chExt cx="1621080" cy="564480"/>
           </a:xfrm>
         </p:grpSpPr>
         <p:sp>
           <p:nvSpPr>
-            <p:cNvPr id="273" name="TextBox 40"/>
+            <p:cNvPr id="277" name="TextBox 40"/>
             <p:cNvSpPr/>
             <p:nvPr/>
           </p:nvSpPr>
           <p:spPr>
             <a:xfrm>
               <a:off x="8534520" y="2879640"/>
-              <a:ext cx="1621440" cy="303120"/>
+              <a:ext cx="1621080" cy="303120"/>
             </a:xfrm>
             <a:prstGeom prst="rect">
               <a:avLst/>
@@ -19000,14 +19120,14 @@
         </p:sp>
         <p:sp>
           <p:nvSpPr>
-            <p:cNvPr id="274" name="TextBox 59"/>
+            <p:cNvPr id="278" name="TextBox 59"/>
             <p:cNvSpPr/>
             <p:nvPr/>
           </p:nvSpPr>
           <p:spPr>
             <a:xfrm>
               <a:off x="8534520" y="3141000"/>
-              <a:ext cx="1621440" cy="303120"/>
+              <a:ext cx="1621080" cy="303120"/>
             </a:xfrm>
             <a:prstGeom prst="rect">
               <a:avLst/>
@@ -19063,14 +19183,14 @@
       </p:grpSp>
       <p:sp>
         <p:nvSpPr>
-          <p:cNvPr id="262" name="Isosceles Triangle 7"/>
+          <p:cNvPr id="266" name="Isosceles Triangle 7"/>
           <p:cNvSpPr/>
           <p:nvPr/>
         </p:nvSpPr>
         <p:spPr>
           <a:xfrm>
             <a:off x="9221400" y="3729240"/>
-            <a:ext cx="477720" cy="382680"/>
+            <a:ext cx="477360" cy="382320"/>
           </a:xfrm>
           <a:prstGeom prst="triangle">
             <a:avLst>
@@ -19130,16 +19250,16 @@
       </p:sp>
       <p:cxnSp>
         <p:nvCxnSpPr>
-          <p:cNvPr id="275" name="Straight Arrow Connector 80"/>
+          <p:cNvPr id="279" name="Straight Arrow Connector 80"/>
           <p:cNvCxnSpPr>
-            <a:stCxn id="272" idx="2"/>
-            <a:endCxn id="262" idx="0"/>
+            <a:stCxn id="276" idx="2"/>
+            <a:endCxn id="266" idx="0"/>
           </p:cNvCxnSpPr>
           <p:nvPr/>
         </p:nvCxnSpPr>
         <p:spPr>
           <a:xfrm>
-            <a:off x="9345240" y="3444120"/>
+            <a:off x="9344880" y="3444120"/>
             <a:ext cx="115560" cy="285480"/>
           </a:xfrm>
           <a:prstGeom prst="straightConnector1">
@@ -19155,14 +19275,14 @@
       </p:cxnSp>
       <p:cxnSp>
         <p:nvCxnSpPr>
-          <p:cNvPr id="276" name="Straight Arrow Connector 52"/>
+          <p:cNvPr id="280" name="Straight Arrow Connector 52"/>
           <p:cNvCxnSpPr/>
           <p:nvPr/>
         </p:nvCxnSpPr>
         <p:spPr>
           <a:xfrm>
             <a:off x="8556840" y="3657600"/>
-            <a:ext cx="1833840" cy="5040"/>
+            <a:ext cx="1834200" cy="5400"/>
           </a:xfrm>
           <a:prstGeom prst="straightConnector1">
             <a:avLst/>
@@ -19178,14 +19298,14 @@
       </p:cxnSp>
       <p:sp>
         <p:nvSpPr>
-          <p:cNvPr id="277" name=""/>
+          <p:cNvPr id="281" name=""/>
           <p:cNvSpPr/>
           <p:nvPr/>
         </p:nvSpPr>
         <p:spPr>
           <a:xfrm>
             <a:off x="9601200" y="3382920"/>
-            <a:ext cx="911520" cy="343440"/>
+            <a:ext cx="911160" cy="343080"/>
           </a:xfrm>
           <a:prstGeom prst="rect">
             <a:avLst/>
@@ -19231,14 +19351,14 @@
       </p:sp>
       <p:sp>
         <p:nvSpPr>
-          <p:cNvPr id="278" name="TextBox 49"/>
+          <p:cNvPr id="282" name="TextBox 49"/>
           <p:cNvSpPr/>
           <p:nvPr/>
         </p:nvSpPr>
         <p:spPr>
           <a:xfrm>
             <a:off x="2057400" y="2132280"/>
-            <a:ext cx="1621440" cy="303120"/>
+            <a:ext cx="1621080" cy="303120"/>
           </a:xfrm>
           <a:prstGeom prst="rect">
             <a:avLst/>
@@ -19288,14 +19408,14 @@
       </p:sp>
       <p:sp>
         <p:nvSpPr>
-          <p:cNvPr id="279" name="TextBox 50"/>
+          <p:cNvPr id="283" name="TextBox 50"/>
           <p:cNvSpPr/>
           <p:nvPr/>
         </p:nvSpPr>
         <p:spPr>
           <a:xfrm>
             <a:off x="2057400" y="2393640"/>
-            <a:ext cx="1621440" cy="192960"/>
+            <a:ext cx="1621080" cy="192600"/>
           </a:xfrm>
           <a:prstGeom prst="rect">
             <a:avLst/>
@@ -19336,14 +19456,14 @@
       </p:sp>
       <p:sp>
         <p:nvSpPr>
-          <p:cNvPr id="280" name="Isosceles Triangle 8"/>
+          <p:cNvPr id="284" name="Isosceles Triangle 8"/>
           <p:cNvSpPr/>
           <p:nvPr/>
         </p:nvSpPr>
         <p:spPr>
           <a:xfrm>
             <a:off x="2613960" y="1217880"/>
-            <a:ext cx="477720" cy="382680"/>
+            <a:ext cx="477360" cy="382320"/>
           </a:xfrm>
           <a:prstGeom prst="triangle">
             <a:avLst>
@@ -19403,17 +19523,17 @@
       </p:sp>
       <p:cxnSp>
         <p:nvCxnSpPr>
-          <p:cNvPr id="281" name="Straight Arrow Connector 81"/>
+          <p:cNvPr id="285" name="Straight Arrow Connector 81"/>
           <p:cNvCxnSpPr>
-            <a:stCxn id="280" idx="3"/>
-            <a:endCxn id="278" idx="0"/>
+            <a:stCxn id="284" idx="3"/>
+            <a:endCxn id="282" idx="0"/>
           </p:cNvCxnSpPr>
           <p:nvPr/>
         </p:nvCxnSpPr>
         <p:spPr>
           <a:xfrm>
-            <a:off x="2853000" y="1600560"/>
-            <a:ext cx="15480" cy="532080"/>
+            <a:off x="2852640" y="1600200"/>
+            <a:ext cx="15480" cy="532440"/>
           </a:xfrm>
           <a:prstGeom prst="straightConnector1">
             <a:avLst/>
@@ -19428,17 +19548,17 @@
       </p:cxnSp>
       <p:cxnSp>
         <p:nvCxnSpPr>
-          <p:cNvPr id="282" name="Straight Arrow Connector 82"/>
+          <p:cNvPr id="286" name="Straight Arrow Connector 82"/>
           <p:cNvCxnSpPr>
-            <a:stCxn id="280" idx="0"/>
-            <a:endCxn id="227" idx="1"/>
+            <a:stCxn id="284" idx="0"/>
+            <a:endCxn id="231" idx="1"/>
           </p:cNvCxnSpPr>
           <p:nvPr/>
         </p:nvCxnSpPr>
         <p:spPr>
           <a:xfrm flipV="1">
-            <a:off x="2853000" y="1083600"/>
-            <a:ext cx="1922400" cy="134640"/>
+            <a:off x="2852640" y="1083600"/>
+            <a:ext cx="1922760" cy="134640"/>
           </a:xfrm>
           <a:prstGeom prst="straightConnector1">
             <a:avLst/>
@@ -19453,17 +19573,17 @@
       </p:cxnSp>
       <p:cxnSp>
         <p:nvCxnSpPr>
-          <p:cNvPr id="283" name="Straight Arrow Connector 83"/>
+          <p:cNvPr id="287" name="Straight Arrow Connector 83"/>
           <p:cNvCxnSpPr>
-            <a:stCxn id="257" idx="2"/>
-            <a:endCxn id="267" idx="0"/>
+            <a:stCxn id="261" idx="2"/>
+            <a:endCxn id="271" idx="0"/>
           </p:cNvCxnSpPr>
           <p:nvPr/>
         </p:nvCxnSpPr>
         <p:spPr>
           <a:xfrm>
-            <a:off x="7571160" y="4921560"/>
-            <a:ext cx="102240" cy="262080"/>
+            <a:off x="7570800" y="4921200"/>
+            <a:ext cx="102240" cy="262440"/>
           </a:xfrm>
           <a:prstGeom prst="straightConnector1">
             <a:avLst/>
@@ -19479,17 +19599,17 @@
       </p:cxnSp>
       <p:cxnSp>
         <p:nvCxnSpPr>
-          <p:cNvPr id="284" name="Straight Arrow Connector 57"/>
+          <p:cNvPr id="288" name="Straight Arrow Connector 57"/>
           <p:cNvCxnSpPr>
-            <a:stCxn id="267" idx="2"/>
-            <a:endCxn id="266" idx="0"/>
+            <a:stCxn id="271" idx="2"/>
+            <a:endCxn id="270" idx="0"/>
           </p:cNvCxnSpPr>
           <p:nvPr/>
         </p:nvCxnSpPr>
         <p:spPr>
           <a:xfrm>
-            <a:off x="7673040" y="5565960"/>
-            <a:ext cx="227880" cy="149400"/>
+            <a:off x="7672680" y="5565600"/>
+            <a:ext cx="227880" cy="149760"/>
           </a:xfrm>
           <a:prstGeom prst="straightConnector1">
             <a:avLst/>
@@ -19504,28 +19624,28 @@
       </p:cxnSp>
       <p:grpSp>
         <p:nvGrpSpPr>
-          <p:cNvPr id="285" name="Group 5"/>
+          <p:cNvPr id="289" name="Group 5"/>
           <p:cNvGrpSpPr/>
           <p:nvPr/>
         </p:nvGrpSpPr>
         <p:grpSpPr>
           <a:xfrm>
             <a:off x="10265040" y="5029200"/>
-            <a:ext cx="1621440" cy="561960"/>
+            <a:ext cx="1621080" cy="561600"/>
             <a:chOff x="10265040" y="5029200"/>
-            <a:chExt cx="1621440" cy="561960"/>
+            <a:chExt cx="1621080" cy="561600"/>
           </a:xfrm>
         </p:grpSpPr>
         <p:sp>
           <p:nvSpPr>
-            <p:cNvPr id="286" name="TextBox 22"/>
+            <p:cNvPr id="290" name="TextBox 22"/>
             <p:cNvSpPr/>
             <p:nvPr/>
           </p:nvSpPr>
           <p:spPr>
             <a:xfrm>
               <a:off x="10265040" y="5029200"/>
-              <a:ext cx="1621440" cy="303120"/>
+              <a:ext cx="1621080" cy="303120"/>
             </a:xfrm>
             <a:prstGeom prst="rect">
               <a:avLst/>
@@ -19575,14 +19695,14 @@
         </p:sp>
         <p:sp>
           <p:nvSpPr>
-            <p:cNvPr id="287" name="TextBox 29"/>
+            <p:cNvPr id="291" name="TextBox 29"/>
             <p:cNvSpPr/>
             <p:nvPr/>
           </p:nvSpPr>
           <p:spPr>
             <a:xfrm>
               <a:off x="10265040" y="5290560"/>
-              <a:ext cx="1621440" cy="300600"/>
+              <a:ext cx="1621080" cy="300240"/>
             </a:xfrm>
             <a:prstGeom prst="rect">
               <a:avLst/>
@@ -19624,17 +19744,17 @@
       </p:grpSp>
       <p:cxnSp>
         <p:nvCxnSpPr>
-          <p:cNvPr id="288" name="Straight Arrow Connector 84"/>
+          <p:cNvPr id="292" name="Straight Arrow Connector 84"/>
           <p:cNvCxnSpPr>
-            <a:stCxn id="285" idx="0"/>
-            <a:endCxn id="262" idx="4"/>
+            <a:stCxn id="289" idx="0"/>
+            <a:endCxn id="266" idx="4"/>
           </p:cNvCxnSpPr>
           <p:nvPr/>
         </p:nvCxnSpPr>
         <p:spPr>
           <a:xfrm flipH="1" flipV="1">
-            <a:off x="9699120" y="4111920"/>
-            <a:ext cx="1377000" cy="917640"/>
+            <a:off x="9698760" y="4111560"/>
+            <a:ext cx="1377000" cy="918000"/>
           </a:xfrm>
           <a:prstGeom prst="straightConnector1">
             <a:avLst/>
@@ -19649,28 +19769,28 @@
       </p:cxnSp>
       <p:grpSp>
         <p:nvGrpSpPr>
-          <p:cNvPr id="289" name="Group 9"/>
+          <p:cNvPr id="293" name="Group 9"/>
           <p:cNvGrpSpPr/>
           <p:nvPr/>
         </p:nvGrpSpPr>
         <p:grpSpPr>
           <a:xfrm>
             <a:off x="9122040" y="4343400"/>
-            <a:ext cx="1621440" cy="561960"/>
+            <a:ext cx="1621080" cy="561600"/>
             <a:chOff x="9122040" y="4343400"/>
-            <a:chExt cx="1621440" cy="561960"/>
+            <a:chExt cx="1621080" cy="561600"/>
           </a:xfrm>
         </p:grpSpPr>
         <p:sp>
           <p:nvSpPr>
-            <p:cNvPr id="290" name="TextBox 47"/>
+            <p:cNvPr id="294" name="TextBox 47"/>
             <p:cNvSpPr/>
             <p:nvPr/>
           </p:nvSpPr>
           <p:spPr>
             <a:xfrm>
               <a:off x="9122040" y="4343400"/>
-              <a:ext cx="1621440" cy="303120"/>
+              <a:ext cx="1621080" cy="303120"/>
             </a:xfrm>
             <a:prstGeom prst="rect">
               <a:avLst/>
@@ -19720,14 +19840,14 @@
         </p:sp>
         <p:sp>
           <p:nvSpPr>
-            <p:cNvPr id="291" name="TextBox 48"/>
+            <p:cNvPr id="295" name="TextBox 48"/>
             <p:cNvSpPr/>
             <p:nvPr/>
           </p:nvSpPr>
           <p:spPr>
             <a:xfrm>
               <a:off x="9122040" y="4604760"/>
-              <a:ext cx="1621440" cy="300600"/>
+              <a:ext cx="1621080" cy="300240"/>
             </a:xfrm>
             <a:prstGeom prst="rect">
               <a:avLst/>
@@ -19769,14 +19889,14 @@
       </p:grpSp>
       <p:sp>
         <p:nvSpPr>
-          <p:cNvPr id="292" name="Isosceles Triangle 9"/>
+          <p:cNvPr id="296" name="Isosceles Triangle 9"/>
           <p:cNvSpPr/>
           <p:nvPr/>
         </p:nvSpPr>
         <p:spPr>
           <a:xfrm>
             <a:off x="10037520" y="2131560"/>
-            <a:ext cx="477720" cy="382680"/>
+            <a:ext cx="477360" cy="382320"/>
           </a:xfrm>
           <a:prstGeom prst="triangle">
             <a:avLst>
@@ -19836,16 +19956,16 @@
       </p:sp>
       <p:cxnSp>
         <p:nvCxnSpPr>
-          <p:cNvPr id="293" name="Straight Arrow Connector 85"/>
+          <p:cNvPr id="297" name="Straight Arrow Connector 85"/>
           <p:cNvCxnSpPr>
-            <a:stCxn id="240" idx="2"/>
-            <a:endCxn id="292" idx="0"/>
+            <a:stCxn id="244" idx="2"/>
+            <a:endCxn id="296" idx="0"/>
           </p:cNvCxnSpPr>
           <p:nvPr/>
         </p:nvCxnSpPr>
         <p:spPr>
           <a:xfrm>
-            <a:off x="9497520" y="1828800"/>
+            <a:off x="9497160" y="1828800"/>
             <a:ext cx="779400" cy="303120"/>
           </a:xfrm>
           <a:prstGeom prst="straightConnector1">
@@ -19861,28 +19981,28 @@
       </p:cxnSp>
       <p:grpSp>
         <p:nvGrpSpPr>
-          <p:cNvPr id="294" name="Group 10"/>
+          <p:cNvPr id="298" name="Group 10"/>
           <p:cNvGrpSpPr/>
           <p:nvPr/>
         </p:nvGrpSpPr>
         <p:grpSpPr>
           <a:xfrm>
             <a:off x="10494000" y="2866680"/>
-            <a:ext cx="1621440" cy="561960"/>
+            <a:ext cx="1621080" cy="561600"/>
             <a:chOff x="10494000" y="2866680"/>
-            <a:chExt cx="1621440" cy="561960"/>
+            <a:chExt cx="1621080" cy="561600"/>
           </a:xfrm>
         </p:grpSpPr>
         <p:sp>
           <p:nvSpPr>
-            <p:cNvPr id="295" name="TextBox 60"/>
+            <p:cNvPr id="299" name="TextBox 60"/>
             <p:cNvSpPr/>
             <p:nvPr/>
           </p:nvSpPr>
           <p:spPr>
             <a:xfrm>
               <a:off x="10494000" y="2866680"/>
-              <a:ext cx="1621440" cy="303120"/>
+              <a:ext cx="1621080" cy="303120"/>
             </a:xfrm>
             <a:prstGeom prst="rect">
               <a:avLst/>
@@ -19932,14 +20052,14 @@
         </p:sp>
         <p:sp>
           <p:nvSpPr>
-            <p:cNvPr id="296" name="TextBox 71"/>
+            <p:cNvPr id="300" name="TextBox 71"/>
             <p:cNvSpPr/>
             <p:nvPr/>
           </p:nvSpPr>
           <p:spPr>
             <a:xfrm>
               <a:off x="10494000" y="3128040"/>
-              <a:ext cx="1621440" cy="300600"/>
+              <a:ext cx="1621080" cy="300240"/>
             </a:xfrm>
             <a:prstGeom prst="rect">
               <a:avLst/>
@@ -19981,17 +20101,17 @@
       </p:grpSp>
       <p:cxnSp>
         <p:nvCxnSpPr>
-          <p:cNvPr id="297" name="Straight Arrow Connector 86"/>
+          <p:cNvPr id="301" name="Straight Arrow Connector 86"/>
           <p:cNvCxnSpPr>
-            <a:stCxn id="292" idx="3"/>
-            <a:endCxn id="294" idx="0"/>
+            <a:stCxn id="296" idx="3"/>
+            <a:endCxn id="298" idx="0"/>
           </p:cNvCxnSpPr>
           <p:nvPr/>
         </p:nvCxnSpPr>
         <p:spPr>
           <a:xfrm>
-            <a:off x="10276560" y="2514240"/>
-            <a:ext cx="1028520" cy="352800"/>
+            <a:off x="10276200" y="2513880"/>
+            <a:ext cx="1028520" cy="353160"/>
           </a:xfrm>
           <a:prstGeom prst="straightConnector1">
             <a:avLst/>
@@ -20036,14 +20156,14 @@
       </p:grpSpPr>
       <p:cxnSp>
         <p:nvCxnSpPr>
-          <p:cNvPr id="298" name="Straight Arrow Connector 44"/>
+          <p:cNvPr id="302" name="Straight Arrow Connector 44"/>
           <p:cNvCxnSpPr/>
           <p:nvPr/>
         </p:nvCxnSpPr>
         <p:spPr>
           <a:xfrm flipH="1">
             <a:off x="0" y="3073320"/>
-            <a:ext cx="1833840" cy="5040"/>
+            <a:ext cx="1834200" cy="5400"/>
           </a:xfrm>
           <a:prstGeom prst="straightConnector1">
             <a:avLst/>
@@ -20059,14 +20179,14 @@
       </p:cxnSp>
       <p:cxnSp>
         <p:nvCxnSpPr>
-          <p:cNvPr id="299" name="Straight Arrow Connector 45"/>
+          <p:cNvPr id="303" name="Straight Arrow Connector 45"/>
           <p:cNvCxnSpPr/>
           <p:nvPr/>
         </p:nvCxnSpPr>
         <p:spPr>
           <a:xfrm>
             <a:off x="0" y="2489400"/>
-            <a:ext cx="1833840" cy="5040"/>
+            <a:ext cx="1834200" cy="5400"/>
           </a:xfrm>
           <a:prstGeom prst="straightConnector1">
             <a:avLst/>
@@ -20082,14 +20202,14 @@
       </p:cxnSp>
       <p:cxnSp>
         <p:nvCxnSpPr>
-          <p:cNvPr id="300" name="Straight Arrow Connector 46"/>
+          <p:cNvPr id="304" name="Straight Arrow Connector 46"/>
           <p:cNvCxnSpPr/>
           <p:nvPr/>
         </p:nvCxnSpPr>
         <p:spPr>
           <a:xfrm>
             <a:off x="0" y="2781360"/>
-            <a:ext cx="1833840" cy="5040"/>
+            <a:ext cx="1834200" cy="5400"/>
           </a:xfrm>
           <a:prstGeom prst="straightConnector1">
             <a:avLst/>
@@ -20105,14 +20225,14 @@
       </p:cxnSp>
       <p:cxnSp>
         <p:nvCxnSpPr>
-          <p:cNvPr id="301" name="Straight Arrow Connector 47"/>
+          <p:cNvPr id="305" name="Straight Arrow Connector 47"/>
           <p:cNvCxnSpPr/>
           <p:nvPr/>
         </p:nvCxnSpPr>
         <p:spPr>
           <a:xfrm flipH="1">
             <a:off x="0" y="3657600"/>
-            <a:ext cx="1833840" cy="5040"/>
+            <a:ext cx="1834200" cy="5400"/>
           </a:xfrm>
           <a:prstGeom prst="straightConnector1">
             <a:avLst/>
@@ -20127,14 +20247,14 @@
       </p:cxnSp>
       <p:sp>
         <p:nvSpPr>
-          <p:cNvPr id="302" name="Diamond 17"/>
+          <p:cNvPr id="306" name="Diamond 17"/>
           <p:cNvSpPr/>
           <p:nvPr/>
         </p:nvSpPr>
         <p:spPr>
           <a:xfrm>
             <a:off x="128520" y="6134040"/>
-            <a:ext cx="1566720" cy="382680"/>
+            <a:ext cx="1566360" cy="382320"/>
           </a:xfrm>
           <a:prstGeom prst="diamond">
             <a:avLst/>
@@ -20192,14 +20312,14 @@
       </p:sp>
       <p:sp>
         <p:nvSpPr>
-          <p:cNvPr id="303" name="Oval 4"/>
+          <p:cNvPr id="307" name="Oval 4"/>
           <p:cNvSpPr/>
           <p:nvPr/>
         </p:nvSpPr>
         <p:spPr>
           <a:xfrm>
             <a:off x="302760" y="5454000"/>
-            <a:ext cx="1218240" cy="382680"/>
+            <a:ext cx="1217880" cy="382320"/>
           </a:xfrm>
           <a:prstGeom prst="ellipse">
             <a:avLst/>
@@ -20255,14 +20375,14 @@
       </p:sp>
       <p:sp>
         <p:nvSpPr>
-          <p:cNvPr id="304" name="TextBox 53"/>
+          <p:cNvPr id="308" name="TextBox 53"/>
           <p:cNvSpPr/>
           <p:nvPr/>
         </p:nvSpPr>
         <p:spPr>
           <a:xfrm>
             <a:off x="101160" y="336240"/>
-            <a:ext cx="1621440" cy="303120"/>
+            <a:ext cx="1621080" cy="303120"/>
           </a:xfrm>
           <a:prstGeom prst="rect">
             <a:avLst/>
@@ -20312,14 +20432,14 @@
       </p:sp>
       <p:sp>
         <p:nvSpPr>
-          <p:cNvPr id="305" name="TextBox 54"/>
+          <p:cNvPr id="309" name="TextBox 54"/>
           <p:cNvSpPr/>
           <p:nvPr/>
         </p:nvSpPr>
         <p:spPr>
           <a:xfrm>
             <a:off x="101160" y="597600"/>
-            <a:ext cx="1621440" cy="516600"/>
+            <a:ext cx="1621080" cy="516600"/>
           </a:xfrm>
           <a:prstGeom prst="rect">
             <a:avLst/>
@@ -20402,14 +20522,14 @@
       </p:sp>
       <p:sp>
         <p:nvSpPr>
-          <p:cNvPr id="306" name="TextBox 72"/>
+          <p:cNvPr id="310" name="TextBox 72"/>
           <p:cNvSpPr/>
           <p:nvPr/>
         </p:nvSpPr>
         <p:spPr>
           <a:xfrm>
             <a:off x="8458200" y="5486400"/>
-            <a:ext cx="1621440" cy="303120"/>
+            <a:ext cx="1621080" cy="303120"/>
           </a:xfrm>
           <a:prstGeom prst="rect">
             <a:avLst/>
@@ -20459,14 +20579,14 @@
       </p:sp>
       <p:sp>
         <p:nvSpPr>
-          <p:cNvPr id="307" name="Diamond 18"/>
+          <p:cNvPr id="311" name="Diamond 18"/>
           <p:cNvSpPr/>
           <p:nvPr/>
         </p:nvSpPr>
         <p:spPr>
           <a:xfrm>
             <a:off x="128520" y="4629600"/>
-            <a:ext cx="1566720" cy="527400"/>
+            <a:ext cx="1566360" cy="527040"/>
           </a:xfrm>
           <a:prstGeom prst="diamond">
             <a:avLst/>
@@ -20547,14 +20667,14 @@
       </p:sp>
       <p:cxnSp>
         <p:nvCxnSpPr>
-          <p:cNvPr id="308" name="Straight Arrow Connector 48"/>
+          <p:cNvPr id="312" name="Straight Arrow Connector 48"/>
           <p:cNvCxnSpPr/>
           <p:nvPr/>
         </p:nvCxnSpPr>
         <p:spPr>
           <a:xfrm>
             <a:off x="0" y="3365640"/>
-            <a:ext cx="1833840" cy="5040"/>
+            <a:ext cx="1834200" cy="5400"/>
           </a:xfrm>
           <a:prstGeom prst="straightConnector1">
             <a:avLst/>
@@ -20569,14 +20689,14 @@
       </p:cxnSp>
       <p:sp>
         <p:nvSpPr>
-          <p:cNvPr id="309" name="Isosceles Triangle 5"/>
+          <p:cNvPr id="313" name="Isosceles Triangle 5"/>
           <p:cNvSpPr/>
           <p:nvPr/>
         </p:nvSpPr>
         <p:spPr>
           <a:xfrm>
             <a:off x="673200" y="3949920"/>
-            <a:ext cx="477720" cy="382680"/>
+            <a:ext cx="477360" cy="382320"/>
           </a:xfrm>
           <a:prstGeom prst="triangle">
             <a:avLst>
@@ -20636,28 +20756,28 @@
       </p:sp>
       <p:grpSp>
         <p:nvGrpSpPr>
-          <p:cNvPr id="310" name="Group 15"/>
+          <p:cNvPr id="314" name="Group 15"/>
           <p:cNvGrpSpPr/>
           <p:nvPr/>
         </p:nvGrpSpPr>
         <p:grpSpPr>
           <a:xfrm>
             <a:off x="101160" y="1413000"/>
-            <a:ext cx="1621440" cy="777960"/>
+            <a:ext cx="1621080" cy="777960"/>
             <a:chOff x="101160" y="1413000"/>
-            <a:chExt cx="1621440" cy="777960"/>
+            <a:chExt cx="1621080" cy="777960"/>
           </a:xfrm>
         </p:grpSpPr>
         <p:sp>
           <p:nvSpPr>
-            <p:cNvPr id="311" name="TextBox 57"/>
+            <p:cNvPr id="315" name="TextBox 57"/>
             <p:cNvSpPr/>
             <p:nvPr/>
           </p:nvSpPr>
           <p:spPr>
             <a:xfrm>
               <a:off x="101160" y="1413000"/>
-              <a:ext cx="1621440" cy="303120"/>
+              <a:ext cx="1621080" cy="303120"/>
             </a:xfrm>
             <a:prstGeom prst="rect">
               <a:avLst/>
@@ -20708,14 +20828,14 @@
         </p:sp>
         <p:sp>
           <p:nvSpPr>
-            <p:cNvPr id="312" name="TextBox 58"/>
+            <p:cNvPr id="316" name="TextBox 58"/>
             <p:cNvSpPr/>
             <p:nvPr/>
           </p:nvSpPr>
           <p:spPr>
             <a:xfrm>
               <a:off x="101160" y="1674360"/>
-              <a:ext cx="1621440" cy="516600"/>
+              <a:ext cx="1621080" cy="516600"/>
             </a:xfrm>
             <a:prstGeom prst="rect">
               <a:avLst/>
@@ -20800,14 +20920,14 @@
       </p:grpSp>
       <p:sp>
         <p:nvSpPr>
-          <p:cNvPr id="313" name="TextBox 62"/>
+          <p:cNvPr id="317" name="TextBox 62"/>
           <p:cNvSpPr/>
           <p:nvPr/>
         </p:nvSpPr>
         <p:spPr>
           <a:xfrm>
             <a:off x="5463360" y="2131920"/>
-            <a:ext cx="1621440" cy="303120"/>
+            <a:ext cx="1621080" cy="303120"/>
           </a:xfrm>
           <a:prstGeom prst="rect">
             <a:avLst/>
@@ -20863,14 +20983,14 @@
       </p:sp>
       <p:sp>
         <p:nvSpPr>
-          <p:cNvPr id="314" name="TextBox 65"/>
+          <p:cNvPr id="318" name="TextBox 65"/>
           <p:cNvSpPr/>
           <p:nvPr/>
         </p:nvSpPr>
         <p:spPr>
           <a:xfrm>
             <a:off x="5463360" y="1828800"/>
-            <a:ext cx="1621440" cy="303120"/>
+            <a:ext cx="1621080" cy="303120"/>
           </a:xfrm>
           <a:prstGeom prst="rect">
             <a:avLst/>
@@ -20920,28 +21040,28 @@
       </p:sp>
       <p:grpSp>
         <p:nvGrpSpPr>
-          <p:cNvPr id="315" name="Group 17"/>
+          <p:cNvPr id="319" name="Group 17"/>
           <p:cNvGrpSpPr/>
           <p:nvPr/>
         </p:nvGrpSpPr>
         <p:grpSpPr>
           <a:xfrm>
             <a:off x="4296600" y="4022640"/>
-            <a:ext cx="1621440" cy="777960"/>
+            <a:ext cx="1621080" cy="777960"/>
             <a:chOff x="4296600" y="4022640"/>
-            <a:chExt cx="1621440" cy="777960"/>
+            <a:chExt cx="1621080" cy="777960"/>
           </a:xfrm>
         </p:grpSpPr>
         <p:sp>
           <p:nvSpPr>
-            <p:cNvPr id="316" name="TextBox 61"/>
+            <p:cNvPr id="320" name="TextBox 61"/>
             <p:cNvSpPr/>
             <p:nvPr/>
           </p:nvSpPr>
           <p:spPr>
             <a:xfrm>
               <a:off x="4296600" y="4022640"/>
-              <a:ext cx="1621440" cy="303120"/>
+              <a:ext cx="1621080" cy="303120"/>
             </a:xfrm>
             <a:prstGeom prst="rect">
               <a:avLst/>
@@ -20991,14 +21111,14 @@
         </p:sp>
         <p:sp>
           <p:nvSpPr>
-            <p:cNvPr id="317" name="TextBox 63"/>
+            <p:cNvPr id="321" name="TextBox 63"/>
             <p:cNvSpPr/>
             <p:nvPr/>
           </p:nvSpPr>
           <p:spPr>
             <a:xfrm>
               <a:off x="4296600" y="4284000"/>
-              <a:ext cx="1621440" cy="516600"/>
+              <a:ext cx="1621080" cy="516600"/>
             </a:xfrm>
             <a:prstGeom prst="rect">
               <a:avLst/>
@@ -21082,28 +21202,28 @@
       </p:grpSp>
       <p:grpSp>
         <p:nvGrpSpPr>
-          <p:cNvPr id="318" name="Group 18"/>
+          <p:cNvPr id="322" name="Group 18"/>
           <p:cNvGrpSpPr/>
           <p:nvPr/>
         </p:nvGrpSpPr>
         <p:grpSpPr>
           <a:xfrm>
             <a:off x="9348840" y="2254320"/>
-            <a:ext cx="1621440" cy="1631880"/>
+            <a:ext cx="1621080" cy="1631880"/>
             <a:chOff x="9348840" y="2254320"/>
-            <a:chExt cx="1621440" cy="1631880"/>
+            <a:chExt cx="1621080" cy="1631880"/>
           </a:xfrm>
         </p:grpSpPr>
         <p:sp>
           <p:nvSpPr>
-            <p:cNvPr id="319" name="TextBox 64"/>
+            <p:cNvPr id="323" name="TextBox 64"/>
             <p:cNvSpPr/>
             <p:nvPr/>
           </p:nvSpPr>
           <p:spPr>
             <a:xfrm>
               <a:off x="9348840" y="2254320"/>
-              <a:ext cx="1621440" cy="303120"/>
+              <a:ext cx="1621080" cy="303120"/>
             </a:xfrm>
             <a:prstGeom prst="rect">
               <a:avLst/>
@@ -21153,14 +21273,14 @@
         </p:sp>
         <p:sp>
           <p:nvSpPr>
-            <p:cNvPr id="320" name="TextBox 66"/>
+            <p:cNvPr id="324" name="TextBox 66"/>
             <p:cNvSpPr/>
             <p:nvPr/>
           </p:nvSpPr>
           <p:spPr>
             <a:xfrm>
               <a:off x="9348840" y="2515680"/>
-              <a:ext cx="1621440" cy="1370520"/>
+              <a:ext cx="1621080" cy="1370520"/>
             </a:xfrm>
             <a:prstGeom prst="rect">
               <a:avLst/>
@@ -21352,14 +21472,14 @@
       </p:grpSp>
       <p:sp>
         <p:nvSpPr>
-          <p:cNvPr id="321" name="Diamond 19"/>
+          <p:cNvPr id="325" name="Diamond 19"/>
           <p:cNvSpPr/>
           <p:nvPr/>
         </p:nvSpPr>
         <p:spPr>
           <a:xfrm>
             <a:off x="9402120" y="4572000"/>
-            <a:ext cx="1566720" cy="382680"/>
+            <a:ext cx="1566360" cy="382320"/>
           </a:xfrm>
           <a:prstGeom prst="diamond">
             <a:avLst/>
@@ -21417,14 +21537,14 @@
       </p:sp>
       <p:sp>
         <p:nvSpPr>
-          <p:cNvPr id="322" name="Oval 5"/>
+          <p:cNvPr id="326" name="Oval 5"/>
           <p:cNvSpPr/>
           <p:nvPr/>
         </p:nvSpPr>
         <p:spPr>
           <a:xfrm>
             <a:off x="7007400" y="4572000"/>
-            <a:ext cx="1675440" cy="382680"/>
+            <a:ext cx="1675080" cy="382320"/>
           </a:xfrm>
           <a:prstGeom prst="ellipse">
             <a:avLst/>
@@ -21480,28 +21600,28 @@
       </p:sp>
       <p:grpSp>
         <p:nvGrpSpPr>
-          <p:cNvPr id="323" name="Group 19"/>
+          <p:cNvPr id="327" name="Group 19"/>
           <p:cNvGrpSpPr/>
           <p:nvPr/>
         </p:nvGrpSpPr>
         <p:grpSpPr>
           <a:xfrm>
             <a:off x="9348840" y="2254320"/>
-            <a:ext cx="1621440" cy="1631880"/>
+            <a:ext cx="1621080" cy="1631880"/>
             <a:chOff x="9348840" y="2254320"/>
-            <a:chExt cx="1621440" cy="1631880"/>
+            <a:chExt cx="1621080" cy="1631880"/>
           </a:xfrm>
         </p:grpSpPr>
         <p:sp>
           <p:nvSpPr>
-            <p:cNvPr id="324" name="TextBox 67"/>
+            <p:cNvPr id="328" name="TextBox 67"/>
             <p:cNvSpPr/>
             <p:nvPr/>
           </p:nvSpPr>
           <p:spPr>
             <a:xfrm>
               <a:off x="9348840" y="2254320"/>
-              <a:ext cx="1621440" cy="303120"/>
+              <a:ext cx="1621080" cy="303120"/>
             </a:xfrm>
             <a:prstGeom prst="rect">
               <a:avLst/>
@@ -21551,14 +21671,14 @@
         </p:sp>
         <p:sp>
           <p:nvSpPr>
-            <p:cNvPr id="325" name="TextBox 68"/>
+            <p:cNvPr id="329" name="TextBox 68"/>
             <p:cNvSpPr/>
             <p:nvPr/>
           </p:nvSpPr>
           <p:spPr>
             <a:xfrm>
               <a:off x="9348840" y="2515680"/>
-              <a:ext cx="1621440" cy="1370520"/>
+              <a:ext cx="1621080" cy="1370520"/>
             </a:xfrm>
             <a:prstGeom prst="rect">
               <a:avLst/>
@@ -21750,28 +21870,28 @@
       </p:grpSp>
       <p:grpSp>
         <p:nvGrpSpPr>
-          <p:cNvPr id="326" name="Group 20"/>
+          <p:cNvPr id="330" name="Group 20"/>
           <p:cNvGrpSpPr/>
           <p:nvPr/>
         </p:nvGrpSpPr>
         <p:grpSpPr>
           <a:xfrm>
             <a:off x="9348840" y="2254320"/>
-            <a:ext cx="1621440" cy="1845360"/>
+            <a:ext cx="1621080" cy="1845360"/>
             <a:chOff x="9348840" y="2254320"/>
-            <a:chExt cx="1621440" cy="1845360"/>
+            <a:chExt cx="1621080" cy="1845360"/>
           </a:xfrm>
         </p:grpSpPr>
         <p:sp>
           <p:nvSpPr>
-            <p:cNvPr id="327" name="TextBox 69"/>
+            <p:cNvPr id="331" name="TextBox 69"/>
             <p:cNvSpPr/>
             <p:nvPr/>
           </p:nvSpPr>
           <p:spPr>
             <a:xfrm>
               <a:off x="9348840" y="2254320"/>
-              <a:ext cx="1621440" cy="303120"/>
+              <a:ext cx="1621080" cy="303120"/>
             </a:xfrm>
             <a:prstGeom prst="rect">
               <a:avLst/>
@@ -21821,14 +21941,14 @@
         </p:sp>
         <p:sp>
           <p:nvSpPr>
-            <p:cNvPr id="328" name="TextBox 70"/>
+            <p:cNvPr id="332" name="TextBox 70"/>
             <p:cNvSpPr/>
             <p:nvPr/>
           </p:nvSpPr>
           <p:spPr>
             <a:xfrm>
               <a:off x="9348840" y="2515680"/>
-              <a:ext cx="1621440" cy="1584000"/>
+              <a:ext cx="1621080" cy="1584000"/>
             </a:xfrm>
             <a:prstGeom prst="rect">
               <a:avLst/>
@@ -22047,14 +22167,14 @@
       </p:grpSp>
       <p:sp>
         <p:nvSpPr>
-          <p:cNvPr id="329" name="Diamond 25"/>
+          <p:cNvPr id="333" name="Diamond 25"/>
           <p:cNvSpPr/>
           <p:nvPr/>
         </p:nvSpPr>
         <p:spPr>
           <a:xfrm>
             <a:off x="7086600" y="3501720"/>
-            <a:ext cx="1824840" cy="382680"/>
+            <a:ext cx="1824480" cy="382320"/>
           </a:xfrm>
           <a:prstGeom prst="diamond">
             <a:avLst/>
@@ -22112,14 +22232,14 @@
       </p:sp>
       <p:sp>
         <p:nvSpPr>
-          <p:cNvPr id="330" name="Diamond 16"/>
+          <p:cNvPr id="334" name="Diamond 16"/>
           <p:cNvSpPr/>
           <p:nvPr/>
         </p:nvSpPr>
         <p:spPr>
           <a:xfrm>
             <a:off x="7543800" y="1869840"/>
-            <a:ext cx="1795320" cy="382680"/>
+            <a:ext cx="1794960" cy="382320"/>
           </a:xfrm>
           <a:prstGeom prst="diamond">
             <a:avLst/>
@@ -22177,17 +22297,17 @@
       </p:sp>
       <p:cxnSp>
         <p:nvCxnSpPr>
-          <p:cNvPr id="331" name="Straight Arrow Connector 65"/>
+          <p:cNvPr id="335" name="Straight Arrow Connector 65"/>
           <p:cNvCxnSpPr>
-            <a:stCxn id="313" idx="3"/>
-            <a:endCxn id="330" idx="1"/>
+            <a:stCxn id="317" idx="3"/>
+            <a:endCxn id="334" idx="1"/>
           </p:cNvCxnSpPr>
           <p:nvPr/>
         </p:nvCxnSpPr>
         <p:spPr>
           <a:xfrm flipV="1">
-            <a:off x="7084800" y="2061360"/>
-            <a:ext cx="459360" cy="222480"/>
+            <a:off x="7084440" y="2061000"/>
+            <a:ext cx="459720" cy="222840"/>
           </a:xfrm>
           <a:prstGeom prst="straightConnector1">
             <a:avLst/>
@@ -22203,17 +22323,17 @@
       </p:cxnSp>
       <p:cxnSp>
         <p:nvCxnSpPr>
-          <p:cNvPr id="332" name="Straight Arrow Connector 40"/>
+          <p:cNvPr id="336" name="Straight Arrow Connector 40"/>
           <p:cNvCxnSpPr>
-            <a:stCxn id="321" idx="2"/>
-            <a:endCxn id="306" idx="0"/>
+            <a:stCxn id="325" idx="2"/>
+            <a:endCxn id="310" idx="0"/>
           </p:cNvCxnSpPr>
           <p:nvPr/>
         </p:nvCxnSpPr>
         <p:spPr>
           <a:xfrm flipH="1">
-            <a:off x="9268920" y="4954680"/>
-            <a:ext cx="916920" cy="532080"/>
+            <a:off x="9268560" y="4954320"/>
+            <a:ext cx="917280" cy="532440"/>
           </a:xfrm>
           <a:prstGeom prst="straightConnector1">
             <a:avLst/>
@@ -22228,17 +22348,17 @@
       </p:cxnSp>
       <p:cxnSp>
         <p:nvCxnSpPr>
-          <p:cNvPr id="333" name="Straight Arrow Connector 41"/>
+          <p:cNvPr id="337" name="Straight Arrow Connector 41"/>
           <p:cNvCxnSpPr>
-            <a:stCxn id="326" idx="2"/>
-            <a:endCxn id="321" idx="0"/>
+            <a:stCxn id="330" idx="2"/>
+            <a:endCxn id="325" idx="0"/>
           </p:cNvCxnSpPr>
           <p:nvPr/>
         </p:nvCxnSpPr>
         <p:spPr>
           <a:xfrm>
-            <a:off x="10159560" y="4099680"/>
-            <a:ext cx="26280" cy="472680"/>
+            <a:off x="10159200" y="4099680"/>
+            <a:ext cx="26640" cy="472680"/>
           </a:xfrm>
           <a:prstGeom prst="straightConnector1">
             <a:avLst/>
@@ -22253,17 +22373,17 @@
       </p:cxnSp>
       <p:cxnSp>
         <p:nvCxnSpPr>
-          <p:cNvPr id="334" name="Straight Arrow Connector 42"/>
+          <p:cNvPr id="338" name="Straight Arrow Connector 42"/>
           <p:cNvCxnSpPr>
-            <a:stCxn id="321" idx="1"/>
-            <a:endCxn id="322" idx="6"/>
+            <a:stCxn id="325" idx="1"/>
+            <a:endCxn id="326" idx="6"/>
           </p:cNvCxnSpPr>
           <p:nvPr/>
         </p:nvCxnSpPr>
         <p:spPr>
           <a:xfrm flipH="1">
-            <a:off x="8682840" y="4763520"/>
-            <a:ext cx="719640" cy="360"/>
+            <a:off x="8682480" y="4763160"/>
+            <a:ext cx="720000" cy="360"/>
           </a:xfrm>
           <a:prstGeom prst="straightConnector1">
             <a:avLst/>
@@ -22278,14 +22398,14 @@
       </p:cxnSp>
       <p:sp>
         <p:nvSpPr>
-          <p:cNvPr id="335" name="Oval 7"/>
+          <p:cNvPr id="339" name="Oval 7"/>
           <p:cNvSpPr/>
           <p:nvPr/>
         </p:nvSpPr>
         <p:spPr>
           <a:xfrm>
             <a:off x="6629400" y="5099760"/>
-            <a:ext cx="1596240" cy="382680"/>
+            <a:ext cx="1595880" cy="382320"/>
           </a:xfrm>
           <a:prstGeom prst="ellipse">
             <a:avLst/>
@@ -22341,17 +22461,17 @@
       </p:sp>
       <p:cxnSp>
         <p:nvCxnSpPr>
-          <p:cNvPr id="336" name="Straight Arrow Connector 66"/>
+          <p:cNvPr id="340" name="Straight Arrow Connector 66"/>
           <p:cNvCxnSpPr>
-            <a:stCxn id="321" idx="1"/>
-            <a:endCxn id="335" idx="6"/>
+            <a:stCxn id="325" idx="1"/>
+            <a:endCxn id="339" idx="6"/>
           </p:cNvCxnSpPr>
           <p:nvPr/>
         </p:nvCxnSpPr>
         <p:spPr>
           <a:xfrm flipH="1">
-            <a:off x="8225640" y="4763520"/>
-            <a:ext cx="1176840" cy="528120"/>
+            <a:off x="8225280" y="4763160"/>
+            <a:ext cx="1177200" cy="528120"/>
           </a:xfrm>
           <a:prstGeom prst="straightConnector1">
             <a:avLst/>
@@ -22366,17 +22486,17 @@
       </p:cxnSp>
       <p:cxnSp>
         <p:nvCxnSpPr>
-          <p:cNvPr id="337" name="Straight Arrow Connector 67"/>
+          <p:cNvPr id="341" name="Straight Arrow Connector 67"/>
           <p:cNvCxnSpPr>
-            <a:stCxn id="338" idx="1"/>
-            <a:endCxn id="339" idx="6"/>
+            <a:stCxn id="342" idx="1"/>
+            <a:endCxn id="343" idx="6"/>
           </p:cNvCxnSpPr>
           <p:nvPr/>
         </p:nvCxnSpPr>
         <p:spPr>
           <a:xfrm flipH="1">
-            <a:off x="3630600" y="2549520"/>
-            <a:ext cx="4320" cy="457560"/>
+            <a:off x="3630240" y="2549160"/>
+            <a:ext cx="4680" cy="457560"/>
           </a:xfrm>
           <a:prstGeom prst="straightConnector1">
             <a:avLst/>
@@ -22391,14 +22511,14 @@
       </p:cxnSp>
       <p:sp>
         <p:nvSpPr>
-          <p:cNvPr id="340" name="Diamond 26"/>
+          <p:cNvPr id="344" name="Diamond 26"/>
           <p:cNvSpPr/>
           <p:nvPr/>
         </p:nvSpPr>
         <p:spPr>
           <a:xfrm>
             <a:off x="5234760" y="2815200"/>
-            <a:ext cx="1566720" cy="382680"/>
+            <a:ext cx="1566360" cy="382320"/>
           </a:xfrm>
           <a:prstGeom prst="diamond">
             <a:avLst/>
@@ -22456,14 +22576,14 @@
       </p:sp>
       <p:sp>
         <p:nvSpPr>
-          <p:cNvPr id="338" name="Diamond 27"/>
+          <p:cNvPr id="342" name="Diamond 27"/>
           <p:cNvSpPr/>
           <p:nvPr/>
         </p:nvSpPr>
         <p:spPr>
           <a:xfrm>
             <a:off x="3634560" y="2358000"/>
-            <a:ext cx="1566720" cy="382680"/>
+            <a:ext cx="1566360" cy="382320"/>
           </a:xfrm>
           <a:prstGeom prst="diamond">
             <a:avLst/>
@@ -22521,14 +22641,14 @@
       </p:sp>
       <p:sp>
         <p:nvSpPr>
-          <p:cNvPr id="339" name="Oval 8"/>
+          <p:cNvPr id="343" name="Oval 8"/>
           <p:cNvSpPr/>
           <p:nvPr/>
         </p:nvSpPr>
         <p:spPr>
           <a:xfrm>
             <a:off x="2034360" y="2815200"/>
-            <a:ext cx="1596240" cy="382680"/>
+            <a:ext cx="1595880" cy="382320"/>
           </a:xfrm>
           <a:prstGeom prst="ellipse">
             <a:avLst/>
@@ -22584,17 +22704,17 @@
       </p:sp>
       <p:cxnSp>
         <p:nvCxnSpPr>
-          <p:cNvPr id="341" name="Straight Arrow Connector 68"/>
+          <p:cNvPr id="345" name="Straight Arrow Connector 68"/>
           <p:cNvCxnSpPr>
-            <a:stCxn id="315" idx="0"/>
-            <a:endCxn id="338" idx="2"/>
+            <a:stCxn id="319" idx="0"/>
+            <a:endCxn id="342" idx="2"/>
           </p:cNvCxnSpPr>
           <p:nvPr/>
         </p:nvCxnSpPr>
         <p:spPr>
           <a:xfrm flipH="1" flipV="1">
-            <a:off x="4417920" y="2740680"/>
-            <a:ext cx="689760" cy="1282320"/>
+            <a:off x="4417920" y="2740320"/>
+            <a:ext cx="689400" cy="1282680"/>
           </a:xfrm>
           <a:prstGeom prst="straightConnector1">
             <a:avLst/>
@@ -22610,10 +22730,10 @@
       </p:cxnSp>
       <p:cxnSp>
         <p:nvCxnSpPr>
-          <p:cNvPr id="342" name="Straight Arrow Connector 69"/>
+          <p:cNvPr id="346" name="Straight Arrow Connector 69"/>
           <p:cNvCxnSpPr>
-            <a:stCxn id="314" idx="1"/>
-            <a:endCxn id="338" idx="0"/>
+            <a:stCxn id="318" idx="1"/>
+            <a:endCxn id="342" idx="0"/>
           </p:cNvCxnSpPr>
           <p:nvPr/>
         </p:nvCxnSpPr>
@@ -22635,17 +22755,17 @@
       </p:cxnSp>
       <p:cxnSp>
         <p:nvCxnSpPr>
-          <p:cNvPr id="343" name="Straight Arrow Connector 70"/>
+          <p:cNvPr id="347" name="Straight Arrow Connector 70"/>
           <p:cNvCxnSpPr>
-            <a:stCxn id="315" idx="0"/>
-            <a:endCxn id="340" idx="2"/>
+            <a:stCxn id="319" idx="0"/>
+            <a:endCxn id="344" idx="2"/>
           </p:cNvCxnSpPr>
           <p:nvPr/>
         </p:nvCxnSpPr>
         <p:spPr>
           <a:xfrm flipV="1">
-            <a:off x="5107320" y="3197880"/>
-            <a:ext cx="911160" cy="825120"/>
+            <a:off x="5106960" y="3197520"/>
+            <a:ext cx="911520" cy="825480"/>
           </a:xfrm>
           <a:prstGeom prst="straightConnector1">
             <a:avLst/>
@@ -22661,17 +22781,17 @@
       </p:cxnSp>
       <p:cxnSp>
         <p:nvCxnSpPr>
-          <p:cNvPr id="344" name="Straight Arrow Connector 71"/>
+          <p:cNvPr id="348" name="Straight Arrow Connector 71"/>
           <p:cNvCxnSpPr>
-            <a:stCxn id="340" idx="0"/>
-            <a:endCxn id="313" idx="2"/>
+            <a:stCxn id="344" idx="0"/>
+            <a:endCxn id="317" idx="2"/>
           </p:cNvCxnSpPr>
           <p:nvPr/>
         </p:nvCxnSpPr>
         <p:spPr>
           <a:xfrm flipV="1">
             <a:off x="6018120" y="2435040"/>
-            <a:ext cx="256320" cy="380520"/>
+            <a:ext cx="255960" cy="380520"/>
           </a:xfrm>
           <a:prstGeom prst="straightConnector1">
             <a:avLst/>
@@ -22686,17 +22806,17 @@
       </p:cxnSp>
       <p:cxnSp>
         <p:nvCxnSpPr>
-          <p:cNvPr id="345" name="Straight Arrow Connector 64"/>
+          <p:cNvPr id="349" name="Straight Arrow Connector 64"/>
           <p:cNvCxnSpPr>
-            <a:stCxn id="315" idx="3"/>
-            <a:endCxn id="329" idx="1"/>
+            <a:stCxn id="319" idx="3"/>
+            <a:endCxn id="333" idx="1"/>
           </p:cNvCxnSpPr>
           <p:nvPr/>
         </p:nvCxnSpPr>
         <p:spPr>
           <a:xfrm flipV="1">
-            <a:off x="5918040" y="3693240"/>
-            <a:ext cx="1168920" cy="718560"/>
+            <a:off x="5917680" y="3692880"/>
+            <a:ext cx="1169280" cy="718920"/>
           </a:xfrm>
           <a:prstGeom prst="straightConnector1">
             <a:avLst/>
@@ -22712,17 +22832,17 @@
       </p:cxnSp>
       <p:cxnSp>
         <p:nvCxnSpPr>
-          <p:cNvPr id="346" name="Straight Arrow Connector 63"/>
+          <p:cNvPr id="350" name="Straight Arrow Connector 63"/>
           <p:cNvCxnSpPr>
-            <a:stCxn id="326" idx="1"/>
-            <a:endCxn id="329" idx="3"/>
+            <a:stCxn id="330" idx="1"/>
+            <a:endCxn id="333" idx="3"/>
           </p:cNvCxnSpPr>
           <p:nvPr/>
         </p:nvCxnSpPr>
         <p:spPr>
           <a:xfrm flipH="1">
-            <a:off x="8911440" y="3177000"/>
-            <a:ext cx="437760" cy="516600"/>
+            <a:off x="8911080" y="3177000"/>
+            <a:ext cx="438120" cy="516240"/>
           </a:xfrm>
           <a:prstGeom prst="straightConnector1">
             <a:avLst/>
@@ -22737,17 +22857,17 @@
       </p:cxnSp>
       <p:cxnSp>
         <p:nvCxnSpPr>
-          <p:cNvPr id="347" name="Straight Arrow Connector 39"/>
+          <p:cNvPr id="351" name="Straight Arrow Connector 39"/>
           <p:cNvCxnSpPr>
-            <a:stCxn id="326" idx="0"/>
-            <a:endCxn id="330" idx="3"/>
+            <a:stCxn id="330" idx="0"/>
+            <a:endCxn id="334" idx="3"/>
           </p:cNvCxnSpPr>
           <p:nvPr/>
         </p:nvCxnSpPr>
         <p:spPr>
           <a:xfrm flipH="1" flipV="1">
-            <a:off x="9339120" y="2061360"/>
-            <a:ext cx="820800" cy="193320"/>
+            <a:off x="9338760" y="2061000"/>
+            <a:ext cx="820800" cy="193680"/>
           </a:xfrm>
           <a:prstGeom prst="straightConnector1">
             <a:avLst/>
@@ -22762,14 +22882,14 @@
       </p:cxnSp>
       <p:sp>
         <p:nvSpPr>
-          <p:cNvPr id="348" name="Diamond 29"/>
+          <p:cNvPr id="352" name="Diamond 29"/>
           <p:cNvSpPr/>
           <p:nvPr/>
         </p:nvSpPr>
         <p:spPr>
           <a:xfrm>
             <a:off x="2722320" y="5330520"/>
-            <a:ext cx="1824840" cy="382680"/>
+            <a:ext cx="1824480" cy="382320"/>
           </a:xfrm>
           <a:prstGeom prst="diamond">
             <a:avLst/>
@@ -22827,17 +22947,17 @@
       </p:sp>
       <p:cxnSp>
         <p:nvCxnSpPr>
-          <p:cNvPr id="349" name="Straight Arrow Connector 72"/>
+          <p:cNvPr id="353" name="Straight Arrow Connector 72"/>
           <p:cNvCxnSpPr>
-            <a:stCxn id="315" idx="1"/>
-            <a:endCxn id="348" idx="0"/>
+            <a:stCxn id="319" idx="1"/>
+            <a:endCxn id="352" idx="0"/>
           </p:cNvCxnSpPr>
           <p:nvPr/>
         </p:nvCxnSpPr>
         <p:spPr>
           <a:xfrm flipH="1">
-            <a:off x="3634920" y="4411440"/>
-            <a:ext cx="662040" cy="919440"/>
+            <a:off x="3634560" y="4411440"/>
+            <a:ext cx="662400" cy="919440"/>
           </a:xfrm>
           <a:prstGeom prst="straightConnector1">
             <a:avLst/>
@@ -22852,17 +22972,17 @@
       </p:cxnSp>
       <p:cxnSp>
         <p:nvCxnSpPr>
-          <p:cNvPr id="350" name="Straight Arrow Connector 73"/>
+          <p:cNvPr id="354" name="Straight Arrow Connector 73"/>
           <p:cNvCxnSpPr>
-            <a:stCxn id="315" idx="2"/>
-            <a:endCxn id="348" idx="3"/>
+            <a:stCxn id="319" idx="2"/>
+            <a:endCxn id="352" idx="3"/>
           </p:cNvCxnSpPr>
           <p:nvPr/>
         </p:nvCxnSpPr>
         <p:spPr>
           <a:xfrm flipH="1">
-            <a:off x="4547160" y="4800600"/>
-            <a:ext cx="560520" cy="721800"/>
+            <a:off x="4546800" y="4800600"/>
+            <a:ext cx="560520" cy="721440"/>
           </a:xfrm>
           <a:prstGeom prst="straightConnector1">
             <a:avLst/>
@@ -22877,14 +22997,14 @@
       </p:cxnSp>
       <p:sp>
         <p:nvSpPr>
-          <p:cNvPr id="351" name="Oval 9"/>
+          <p:cNvPr id="355" name="Oval 9"/>
           <p:cNvSpPr/>
           <p:nvPr/>
         </p:nvSpPr>
         <p:spPr>
           <a:xfrm>
             <a:off x="7315200" y="4114800"/>
-            <a:ext cx="1675440" cy="382680"/>
+            <a:ext cx="1675080" cy="382320"/>
           </a:xfrm>
           <a:prstGeom prst="ellipse">
             <a:avLst/>
@@ -22940,17 +23060,17 @@
       </p:sp>
       <p:cxnSp>
         <p:nvCxnSpPr>
-          <p:cNvPr id="352" name="Straight Arrow Connector 58"/>
+          <p:cNvPr id="356" name="Straight Arrow Connector 58"/>
           <p:cNvCxnSpPr>
-            <a:stCxn id="321" idx="1"/>
-            <a:endCxn id="351" idx="6"/>
+            <a:stCxn id="325" idx="1"/>
+            <a:endCxn id="355" idx="6"/>
           </p:cNvCxnSpPr>
           <p:nvPr/>
         </p:nvCxnSpPr>
         <p:spPr>
           <a:xfrm flipH="1" flipV="1">
-            <a:off x="8990640" y="4306320"/>
-            <a:ext cx="411840" cy="457560"/>
+            <a:off x="8990280" y="4305960"/>
+            <a:ext cx="412200" cy="457560"/>
           </a:xfrm>
           <a:prstGeom prst="straightConnector1">
             <a:avLst/>
@@ -22995,14 +23115,14 @@
       </p:grpSpPr>
       <p:cxnSp>
         <p:nvCxnSpPr>
-          <p:cNvPr id="353" name="Straight Arrow Connector 6"/>
+          <p:cNvPr id="357" name="Straight Arrow Connector 6"/>
           <p:cNvCxnSpPr/>
           <p:nvPr/>
         </p:nvCxnSpPr>
         <p:spPr>
           <a:xfrm flipH="1">
             <a:off x="0" y="3073320"/>
-            <a:ext cx="1833840" cy="5040"/>
+            <a:ext cx="1834200" cy="5400"/>
           </a:xfrm>
           <a:prstGeom prst="straightConnector1">
             <a:avLst/>
@@ -23018,14 +23138,14 @@
       </p:cxnSp>
       <p:cxnSp>
         <p:nvCxnSpPr>
-          <p:cNvPr id="354" name="Straight Arrow Connector 7"/>
+          <p:cNvPr id="358" name="Straight Arrow Connector 7"/>
           <p:cNvCxnSpPr/>
           <p:nvPr/>
         </p:nvCxnSpPr>
         <p:spPr>
           <a:xfrm>
             <a:off x="0" y="2489400"/>
-            <a:ext cx="1833840" cy="5040"/>
+            <a:ext cx="1834200" cy="5400"/>
           </a:xfrm>
           <a:prstGeom prst="straightConnector1">
             <a:avLst/>
@@ -23041,14 +23161,14 @@
       </p:cxnSp>
       <p:cxnSp>
         <p:nvCxnSpPr>
-          <p:cNvPr id="355" name="Straight Arrow Connector 8"/>
+          <p:cNvPr id="359" name="Straight Arrow Connector 8"/>
           <p:cNvCxnSpPr/>
           <p:nvPr/>
         </p:nvCxnSpPr>
         <p:spPr>
           <a:xfrm>
             <a:off x="0" y="2781360"/>
-            <a:ext cx="1833840" cy="5040"/>
+            <a:ext cx="1834200" cy="5400"/>
           </a:xfrm>
           <a:prstGeom prst="straightConnector1">
             <a:avLst/>
@@ -23064,14 +23184,14 @@
       </p:cxnSp>
       <p:cxnSp>
         <p:nvCxnSpPr>
-          <p:cNvPr id="356" name="Straight Arrow Connector 9"/>
+          <p:cNvPr id="360" name="Straight Arrow Connector 9"/>
           <p:cNvCxnSpPr/>
           <p:nvPr/>
         </p:nvCxnSpPr>
         <p:spPr>
           <a:xfrm flipH="1">
             <a:off x="0" y="3657600"/>
-            <a:ext cx="1833840" cy="5040"/>
+            <a:ext cx="1834200" cy="5400"/>
           </a:xfrm>
           <a:prstGeom prst="straightConnector1">
             <a:avLst/>
@@ -23086,14 +23206,14 @@
       </p:cxnSp>
       <p:sp>
         <p:nvSpPr>
-          <p:cNvPr id="357" name="Diamond 3"/>
+          <p:cNvPr id="361" name="Diamond 3"/>
           <p:cNvSpPr/>
           <p:nvPr/>
         </p:nvSpPr>
         <p:spPr>
           <a:xfrm>
             <a:off x="128520" y="6134040"/>
-            <a:ext cx="1566720" cy="382680"/>
+            <a:ext cx="1566360" cy="382320"/>
           </a:xfrm>
           <a:prstGeom prst="diamond">
             <a:avLst/>
@@ -23151,14 +23271,14 @@
       </p:sp>
       <p:sp>
         <p:nvSpPr>
-          <p:cNvPr id="358" name="Oval 2"/>
+          <p:cNvPr id="362" name="Oval 2"/>
           <p:cNvSpPr/>
           <p:nvPr/>
         </p:nvSpPr>
         <p:spPr>
           <a:xfrm>
             <a:off x="302760" y="5454000"/>
-            <a:ext cx="1218240" cy="382680"/>
+            <a:ext cx="1217880" cy="382320"/>
           </a:xfrm>
           <a:prstGeom prst="ellipse">
             <a:avLst/>
@@ -23214,28 +23334,28 @@
       </p:sp>
       <p:grpSp>
         <p:nvGrpSpPr>
-          <p:cNvPr id="359" name="Group 3"/>
+          <p:cNvPr id="363" name="Group 3"/>
           <p:cNvGrpSpPr/>
           <p:nvPr/>
         </p:nvGrpSpPr>
         <p:grpSpPr>
           <a:xfrm>
             <a:off x="101160" y="336240"/>
-            <a:ext cx="1621440" cy="777960"/>
+            <a:ext cx="1621080" cy="777960"/>
             <a:chOff x="101160" y="336240"/>
-            <a:chExt cx="1621440" cy="777960"/>
+            <a:chExt cx="1621080" cy="777960"/>
           </a:xfrm>
         </p:grpSpPr>
         <p:sp>
           <p:nvSpPr>
-            <p:cNvPr id="360" name="TextBox 5"/>
+            <p:cNvPr id="364" name="TextBox 5"/>
             <p:cNvSpPr/>
             <p:nvPr/>
           </p:nvSpPr>
           <p:spPr>
             <a:xfrm>
               <a:off x="101160" y="336240"/>
-              <a:ext cx="1621440" cy="303120"/>
+              <a:ext cx="1621080" cy="303120"/>
             </a:xfrm>
             <a:prstGeom prst="rect">
               <a:avLst/>
@@ -23285,14 +23405,14 @@
         </p:sp>
         <p:sp>
           <p:nvSpPr>
-            <p:cNvPr id="361" name="TextBox 6"/>
+            <p:cNvPr id="365" name="TextBox 6"/>
             <p:cNvSpPr/>
             <p:nvPr/>
           </p:nvSpPr>
           <p:spPr>
             <a:xfrm>
               <a:off x="101160" y="597600"/>
-              <a:ext cx="1621440" cy="516600"/>
+              <a:ext cx="1621080" cy="516600"/>
             </a:xfrm>
             <a:prstGeom prst="rect">
               <a:avLst/>
@@ -23376,14 +23496,14 @@
       </p:grpSp>
       <p:sp>
         <p:nvSpPr>
-          <p:cNvPr id="362" name="Diamond 4"/>
+          <p:cNvPr id="366" name="Diamond 4"/>
           <p:cNvSpPr/>
           <p:nvPr/>
         </p:nvSpPr>
         <p:spPr>
           <a:xfrm>
             <a:off x="128520" y="4629600"/>
-            <a:ext cx="1566720" cy="527400"/>
+            <a:ext cx="1566360" cy="527040"/>
           </a:xfrm>
           <a:prstGeom prst="diamond">
             <a:avLst/>
@@ -23464,14 +23584,14 @@
       </p:sp>
       <p:cxnSp>
         <p:nvCxnSpPr>
-          <p:cNvPr id="363" name="Straight Arrow Connector 10"/>
+          <p:cNvPr id="367" name="Straight Arrow Connector 10"/>
           <p:cNvCxnSpPr/>
           <p:nvPr/>
         </p:nvCxnSpPr>
         <p:spPr>
           <a:xfrm>
             <a:off x="0" y="3365640"/>
-            <a:ext cx="1833840" cy="5040"/>
+            <a:ext cx="1834200" cy="5400"/>
           </a:xfrm>
           <a:prstGeom prst="straightConnector1">
             <a:avLst/>
@@ -23486,14 +23606,14 @@
       </p:cxnSp>
       <p:sp>
         <p:nvSpPr>
-          <p:cNvPr id="364" name="Isosceles Triangle 2"/>
+          <p:cNvPr id="368" name="Isosceles Triangle 2"/>
           <p:cNvSpPr/>
           <p:nvPr/>
         </p:nvSpPr>
         <p:spPr>
           <a:xfrm>
             <a:off x="673200" y="3949920"/>
-            <a:ext cx="477720" cy="382680"/>
+            <a:ext cx="477360" cy="382320"/>
           </a:xfrm>
           <a:prstGeom prst="triangle">
             <a:avLst>
@@ -23553,28 +23673,28 @@
       </p:sp>
       <p:grpSp>
         <p:nvGrpSpPr>
-          <p:cNvPr id="365" name="Group 4"/>
+          <p:cNvPr id="369" name="Group 4"/>
           <p:cNvGrpSpPr/>
           <p:nvPr/>
         </p:nvGrpSpPr>
         <p:grpSpPr>
           <a:xfrm>
             <a:off x="101160" y="1413000"/>
-            <a:ext cx="1621440" cy="777960"/>
+            <a:ext cx="1621080" cy="777960"/>
             <a:chOff x="101160" y="1413000"/>
-            <a:chExt cx="1621440" cy="777960"/>
+            <a:chExt cx="1621080" cy="777960"/>
           </a:xfrm>
         </p:grpSpPr>
         <p:sp>
           <p:nvSpPr>
-            <p:cNvPr id="366" name="TextBox 7"/>
+            <p:cNvPr id="370" name="TextBox 7"/>
             <p:cNvSpPr/>
             <p:nvPr/>
           </p:nvSpPr>
           <p:spPr>
             <a:xfrm>
               <a:off x="101160" y="1413000"/>
-              <a:ext cx="1621440" cy="303120"/>
+              <a:ext cx="1621080" cy="303120"/>
             </a:xfrm>
             <a:prstGeom prst="rect">
               <a:avLst/>
@@ -23625,14 +23745,14 @@
         </p:sp>
         <p:sp>
           <p:nvSpPr>
-            <p:cNvPr id="367" name="TextBox 8"/>
+            <p:cNvPr id="371" name="TextBox 8"/>
             <p:cNvSpPr/>
             <p:nvPr/>
           </p:nvSpPr>
           <p:spPr>
             <a:xfrm>
               <a:off x="101160" y="1674360"/>
-              <a:ext cx="1621440" cy="516600"/>
+              <a:ext cx="1621080" cy="516600"/>
             </a:xfrm>
             <a:prstGeom prst="rect">
               <a:avLst/>

</xml_diff>

<commit_message>
reverted Holds relation since it was already implemented differently by myself -_-
</commit_message>
<xml_diff>
--- a/documentation/include/ER-Diagram.pptx
+++ b/documentation/include/ER-Diagram.pptx
@@ -353,7 +353,7 @@
             <a:pPr indent="0" algn="r">
               <a:buNone/>
             </a:pPr>
-            <a:fld id="{20A89845-BB4F-4A97-A66B-910B2E90FEA3}" type="slidenum">
+            <a:fld id="{35341DD4-D777-4BE5-A33D-8DD1B44B9B0C}" type="slidenum">
               <a:rPr b="0" lang="en-US" sz="1400" spc="-1" strike="noStrike">
                 <a:solidFill>
                   <a:srgbClr val="000000"/>
@@ -396,7 +396,7 @@
       </p:grpSpPr>
       <p:sp>
         <p:nvSpPr>
-          <p:cNvPr id="372" name="PlaceHolder 1"/>
+          <p:cNvPr id="369" name="PlaceHolder 1"/>
           <p:cNvSpPr>
             <a:spLocks noGrp="1"/>
           </p:cNvSpPr>
@@ -407,7 +407,7 @@
         <p:spPr>
           <a:xfrm>
             <a:off x="685800" y="1143000"/>
-            <a:ext cx="5481000" cy="3080880"/>
+            <a:ext cx="5480640" cy="3080520"/>
           </a:xfrm>
           <a:prstGeom prst="rect">
             <a:avLst/>
@@ -419,7 +419,7 @@
       </p:sp>
       <p:sp>
         <p:nvSpPr>
-          <p:cNvPr id="373" name="PlaceHolder 2"/>
+          <p:cNvPr id="370" name="PlaceHolder 2"/>
           <p:cNvSpPr>
             <a:spLocks noGrp="1"/>
           </p:cNvSpPr>
@@ -430,7 +430,7 @@
         <p:spPr>
           <a:xfrm>
             <a:off x="685800" y="4400640"/>
-            <a:ext cx="5481000" cy="3594960"/>
+            <a:ext cx="5480640" cy="3594600"/>
           </a:xfrm>
           <a:prstGeom prst="rect">
             <a:avLst/>
@@ -459,7 +459,7 @@
       </p:sp>
       <p:sp>
         <p:nvSpPr>
-          <p:cNvPr id="374" name="PlaceHolder 3"/>
+          <p:cNvPr id="371" name="PlaceHolder 3"/>
           <p:cNvSpPr>
             <a:spLocks noGrp="1"/>
           </p:cNvSpPr>
@@ -470,7 +470,7 @@
         <p:spPr>
           <a:xfrm>
             <a:off x="3884760" y="8685360"/>
-            <a:ext cx="2966400" cy="453240"/>
+            <a:ext cx="2966040" cy="452880"/>
           </a:xfrm>
           <a:prstGeom prst="rect">
             <a:avLst/>
@@ -512,7 +512,7 @@
                 <a:tab algn="l" pos="0"/>
               </a:tabLst>
             </a:pPr>
-            <a:fld id="{EC543CC8-45D4-437E-85AE-340A942CFF51}" type="slidenum">
+            <a:fld id="{CA25C9D6-16D0-4657-80F8-DE9263C137F2}" type="slidenum">
               <a:rPr b="0" lang="en-US" sz="1200" spc="-1" strike="noStrike">
                 <a:solidFill>
                   <a:schemeClr val="dk1"/>
@@ -555,7 +555,7 @@
       </p:grpSpPr>
       <p:sp>
         <p:nvSpPr>
-          <p:cNvPr id="375" name="PlaceHolder 1"/>
+          <p:cNvPr id="372" name="PlaceHolder 1"/>
           <p:cNvSpPr>
             <a:spLocks noGrp="1"/>
           </p:cNvSpPr>
@@ -566,7 +566,7 @@
         <p:spPr>
           <a:xfrm>
             <a:off x="685800" y="1143000"/>
-            <a:ext cx="5481000" cy="3080880"/>
+            <a:ext cx="5480640" cy="3080520"/>
           </a:xfrm>
           <a:prstGeom prst="rect">
             <a:avLst/>
@@ -578,7 +578,7 @@
       </p:sp>
       <p:sp>
         <p:nvSpPr>
-          <p:cNvPr id="376" name="PlaceHolder 2"/>
+          <p:cNvPr id="373" name="PlaceHolder 2"/>
           <p:cNvSpPr>
             <a:spLocks noGrp="1"/>
           </p:cNvSpPr>
@@ -589,7 +589,7 @@
         <p:spPr>
           <a:xfrm>
             <a:off x="685800" y="4400640"/>
-            <a:ext cx="5481000" cy="3594960"/>
+            <a:ext cx="5480640" cy="3594600"/>
           </a:xfrm>
           <a:prstGeom prst="rect">
             <a:avLst/>
@@ -618,7 +618,7 @@
       </p:sp>
       <p:sp>
         <p:nvSpPr>
-          <p:cNvPr id="377" name="PlaceHolder 3"/>
+          <p:cNvPr id="374" name="PlaceHolder 3"/>
           <p:cNvSpPr>
             <a:spLocks noGrp="1"/>
           </p:cNvSpPr>
@@ -629,7 +629,7 @@
         <p:spPr>
           <a:xfrm>
             <a:off x="3884760" y="8685360"/>
-            <a:ext cx="2966400" cy="453240"/>
+            <a:ext cx="2966040" cy="452880"/>
           </a:xfrm>
           <a:prstGeom prst="rect">
             <a:avLst/>
@@ -671,7 +671,7 @@
                 <a:tab algn="l" pos="0"/>
               </a:tabLst>
             </a:pPr>
-            <a:fld id="{B1A79A79-6151-4BCE-A413-EA94813692DF}" type="slidenum">
+            <a:fld id="{C282F6D8-0716-4896-8510-D91F63DA57C9}" type="slidenum">
               <a:rPr b="0" lang="en-US" sz="1200" spc="-1" strike="noStrike">
                 <a:solidFill>
                   <a:schemeClr val="dk1"/>
@@ -714,7 +714,7 @@
       </p:grpSpPr>
       <p:sp>
         <p:nvSpPr>
-          <p:cNvPr id="378" name="PlaceHolder 1"/>
+          <p:cNvPr id="375" name="PlaceHolder 1"/>
           <p:cNvSpPr>
             <a:spLocks noGrp="1"/>
           </p:cNvSpPr>
@@ -725,7 +725,7 @@
         <p:spPr>
           <a:xfrm>
             <a:off x="685800" y="1143000"/>
-            <a:ext cx="5481000" cy="3080880"/>
+            <a:ext cx="5480640" cy="3080520"/>
           </a:xfrm>
           <a:prstGeom prst="rect">
             <a:avLst/>
@@ -737,7 +737,7 @@
       </p:sp>
       <p:sp>
         <p:nvSpPr>
-          <p:cNvPr id="379" name="PlaceHolder 2"/>
+          <p:cNvPr id="376" name="PlaceHolder 2"/>
           <p:cNvSpPr>
             <a:spLocks noGrp="1"/>
           </p:cNvSpPr>
@@ -748,7 +748,7 @@
         <p:spPr>
           <a:xfrm>
             <a:off x="685800" y="4400640"/>
-            <a:ext cx="5481000" cy="3594960"/>
+            <a:ext cx="5480640" cy="3594600"/>
           </a:xfrm>
           <a:prstGeom prst="rect">
             <a:avLst/>
@@ -777,7 +777,7 @@
       </p:sp>
       <p:sp>
         <p:nvSpPr>
-          <p:cNvPr id="380" name="PlaceHolder 3"/>
+          <p:cNvPr id="377" name="PlaceHolder 3"/>
           <p:cNvSpPr>
             <a:spLocks noGrp="1"/>
           </p:cNvSpPr>
@@ -788,7 +788,7 @@
         <p:spPr>
           <a:xfrm>
             <a:off x="3884760" y="8685360"/>
-            <a:ext cx="2966400" cy="453240"/>
+            <a:ext cx="2966040" cy="452880"/>
           </a:xfrm>
           <a:prstGeom prst="rect">
             <a:avLst/>
@@ -830,7 +830,7 @@
                 <a:tab algn="l" pos="0"/>
               </a:tabLst>
             </a:pPr>
-            <a:fld id="{BFCF05B1-5329-4E1A-A340-C593D42E7145}" type="slidenum">
+            <a:fld id="{E0F1D271-18E2-436A-843A-05030E02C885}" type="slidenum">
               <a:rPr b="0" lang="en-US" sz="1200" spc="-1" strike="noStrike">
                 <a:solidFill>
                   <a:schemeClr val="dk1"/>
@@ -873,7 +873,7 @@
       </p:grpSpPr>
       <p:sp>
         <p:nvSpPr>
-          <p:cNvPr id="381" name="PlaceHolder 1"/>
+          <p:cNvPr id="378" name="PlaceHolder 1"/>
           <p:cNvSpPr>
             <a:spLocks noGrp="1"/>
           </p:cNvSpPr>
@@ -884,7 +884,7 @@
         <p:spPr>
           <a:xfrm>
             <a:off x="685800" y="1143000"/>
-            <a:ext cx="5481000" cy="3080880"/>
+            <a:ext cx="5480640" cy="3080520"/>
           </a:xfrm>
           <a:prstGeom prst="rect">
             <a:avLst/>
@@ -896,7 +896,7 @@
       </p:sp>
       <p:sp>
         <p:nvSpPr>
-          <p:cNvPr id="382" name="PlaceHolder 2"/>
+          <p:cNvPr id="379" name="PlaceHolder 2"/>
           <p:cNvSpPr>
             <a:spLocks noGrp="1"/>
           </p:cNvSpPr>
@@ -907,7 +907,7 @@
         <p:spPr>
           <a:xfrm>
             <a:off x="685800" y="4400640"/>
-            <a:ext cx="5481000" cy="3594960"/>
+            <a:ext cx="5480640" cy="3594600"/>
           </a:xfrm>
           <a:prstGeom prst="rect">
             <a:avLst/>
@@ -936,7 +936,7 @@
       </p:sp>
       <p:sp>
         <p:nvSpPr>
-          <p:cNvPr id="383" name="PlaceHolder 3"/>
+          <p:cNvPr id="380" name="PlaceHolder 3"/>
           <p:cNvSpPr>
             <a:spLocks noGrp="1"/>
           </p:cNvSpPr>
@@ -947,7 +947,7 @@
         <p:spPr>
           <a:xfrm>
             <a:off x="3884760" y="8685360"/>
-            <a:ext cx="2966400" cy="453240"/>
+            <a:ext cx="2966040" cy="452880"/>
           </a:xfrm>
           <a:prstGeom prst="rect">
             <a:avLst/>
@@ -989,7 +989,7 @@
                 <a:tab algn="l" pos="0"/>
               </a:tabLst>
             </a:pPr>
-            <a:fld id="{D8FB95D1-8457-4C57-9BFB-7061C22390BE}" type="slidenum">
+            <a:fld id="{98EBB5AF-31BF-48E2-9BB2-191F8669B587}" type="slidenum">
               <a:rPr b="0" lang="en-US" sz="1200" spc="-1" strike="noStrike">
                 <a:solidFill>
                   <a:schemeClr val="dk1"/>
@@ -1233,7 +1233,7 @@
         <p:txBody>
           <a:bodyPr/>
           <a:p>
-            <a:fld id="{20B9E24D-3FF9-48EB-8A03-FDAE94D5A53F}" type="slidenum">
+            <a:fld id="{4271D7C4-2EDD-428B-A84A-5BCA735A9B53}" type="slidenum">
               <a:t>&lt;#&gt;</a:t>
             </a:fld>
           </a:p>
@@ -1442,7 +1442,7 @@
         <p:txBody>
           <a:bodyPr/>
           <a:p>
-            <a:fld id="{0060AC9E-D0ED-4232-90CC-F4BDFC18CB44}" type="slidenum">
+            <a:fld id="{75C2A82D-F67B-43AE-951B-53547A102D1A}" type="slidenum">
               <a:t>&lt;#&gt;</a:t>
             </a:fld>
           </a:p>
@@ -1565,7 +1565,7 @@
         <p:txBody>
           <a:bodyPr/>
           <a:p>
-            <a:fld id="{F6B30C64-3554-4513-83C5-4EEAF8CF7D97}" type="slidenum">
+            <a:fld id="{0B22D69B-9C36-4314-8870-06B67FA8C635}" type="slidenum">
               <a:t>&lt;#&gt;</a:t>
             </a:fld>
           </a:p>
@@ -1648,7 +1648,7 @@
         <p:txBody>
           <a:bodyPr/>
           <a:p>
-            <a:fld id="{0E8FB3E5-E250-4FEC-A966-4C0B9F6B7BE2}" type="slidenum">
+            <a:fld id="{4C85A174-6AFD-41F1-B204-55B1D10AF700}" type="slidenum">
               <a:t>&lt;#&gt;</a:t>
             </a:fld>
           </a:p>
@@ -1900,7 +1900,7 @@
         <p:txBody>
           <a:bodyPr/>
           <a:p>
-            <a:fld id="{3C4B34D2-D7AE-47AE-9325-2A42AA519B0A}" type="slidenum">
+            <a:fld id="{5E70D0AF-047A-48C6-BDE4-1E73CA055D34}" type="slidenum">
               <a:t>&lt;#&gt;</a:t>
             </a:fld>
           </a:p>
@@ -2152,7 +2152,7 @@
         <p:txBody>
           <a:bodyPr/>
           <a:p>
-            <a:fld id="{BF393C90-0660-42E2-B3D8-6F31DB06F02B}" type="slidenum">
+            <a:fld id="{B36C2409-53F0-4C79-8BE1-7D03E7B2C8DB}" type="slidenum">
               <a:t>&lt;#&gt;</a:t>
             </a:fld>
           </a:p>
@@ -2361,7 +2361,7 @@
         <p:txBody>
           <a:bodyPr/>
           <a:p>
-            <a:fld id="{AECFBD01-1D60-4F28-99DB-9AB88DE34DE7}" type="slidenum">
+            <a:fld id="{114E470F-9CD2-4270-B826-FD918F0A099D}" type="slidenum">
               <a:t>&lt;#&gt;</a:t>
             </a:fld>
           </a:p>
@@ -2656,7 +2656,7 @@
         <p:txBody>
           <a:bodyPr/>
           <a:p>
-            <a:fld id="{83F33FC5-041F-46C5-8B32-A9D25587B0E1}" type="slidenum">
+            <a:fld id="{72027EDC-BBDB-4B89-A397-DAED3B99F706}" type="slidenum">
               <a:t>&lt;#&gt;</a:t>
             </a:fld>
           </a:p>
@@ -2739,7 +2739,7 @@
         <p:txBody>
           <a:bodyPr/>
           <a:p>
-            <a:fld id="{FA9DF45C-3B6E-460E-9BEA-A8BE67B28301}" type="slidenum">
+            <a:fld id="{C6ABA3FD-F908-42A0-8A20-0F548322E958}" type="slidenum">
               <a:t>&lt;#&gt;</a:t>
             </a:fld>
           </a:p>
@@ -2822,7 +2822,7 @@
         <p:txBody>
           <a:bodyPr/>
           <a:p>
-            <a:fld id="{3F7313A9-6F29-4D68-BDE6-2A9E919F09F7}" type="slidenum">
+            <a:fld id="{007A184D-36FE-4881-AC7B-3FBE9B6CD6AF}" type="slidenum">
               <a:t>&lt;#&gt;</a:t>
             </a:fld>
           </a:p>
@@ -2988,7 +2988,7 @@
         <p:txBody>
           <a:bodyPr/>
           <a:p>
-            <a:fld id="{62B7D3B3-58DF-4ADC-9831-B826A56E5F7E}" type="slidenum">
+            <a:fld id="{FB90BA6A-2C98-492B-9ADA-3F73981F823F}" type="slidenum">
               <a:t>&lt;#&gt;</a:t>
             </a:fld>
           </a:p>
@@ -3154,7 +3154,7 @@
         <p:txBody>
           <a:bodyPr/>
           <a:p>
-            <a:fld id="{E423620C-3EE9-4F89-9F00-D171580AA560}" type="slidenum">
+            <a:fld id="{5362D8C5-A16C-47AE-AB13-7AB7542C1A90}" type="slidenum">
               <a:t>&lt;#&gt;</a:t>
             </a:fld>
           </a:p>
@@ -3219,9 +3219,9 @@
         <p:grpSpPr>
           <a:xfrm>
             <a:off x="6199200" y="6162840"/>
-            <a:ext cx="5987520" cy="689760"/>
+            <a:ext cx="5987160" cy="689400"/>
             <a:chOff x="6199200" y="6162840"/>
-            <a:chExt cx="5987520" cy="689760"/>
+            <a:chExt cx="5987160" cy="689400"/>
           </a:xfrm>
         </p:grpSpPr>
         <p:pic>
@@ -3237,7 +3237,7 @@
           <p:spPr>
             <a:xfrm>
               <a:off x="6199200" y="6162840"/>
-              <a:ext cx="4051080" cy="689760"/>
+              <a:ext cx="4050720" cy="689400"/>
             </a:xfrm>
             <a:prstGeom prst="rect">
               <a:avLst/>
@@ -3260,7 +3260,7 @@
           <p:spPr>
             <a:xfrm>
               <a:off x="10270080" y="6162840"/>
-              <a:ext cx="1916640" cy="606240"/>
+              <a:ext cx="1916280" cy="605880"/>
             </a:xfrm>
             <a:prstGeom prst="rect">
               <a:avLst/>
@@ -4008,7 +4008,7 @@
         <p:spPr>
           <a:xfrm>
             <a:off x="4038480" y="6356520"/>
-            <a:ext cx="4109400" cy="359640"/>
+            <a:ext cx="4109040" cy="359280"/>
           </a:xfrm>
           <a:prstGeom prst="rect">
             <a:avLst/>
@@ -4080,7 +4080,7 @@
         <p:spPr>
           <a:xfrm>
             <a:off x="8610480" y="6356520"/>
-            <a:ext cx="2737800" cy="359640"/>
+            <a:ext cx="2737440" cy="359280"/>
           </a:xfrm>
           <a:prstGeom prst="rect">
             <a:avLst/>
@@ -4123,7 +4123,7 @@
                 <a:tab algn="l" pos="0"/>
               </a:tabLst>
             </a:pPr>
-            <a:fld id="{C78C7F19-49CF-415E-9894-5247E27A1295}" type="slidenum">
+            <a:fld id="{EF6640D3-B3F1-4078-89D2-8D1D2AB55749}" type="slidenum">
               <a:rPr b="0" lang="en-US" sz="1200" spc="-1" strike="noStrike">
                 <a:solidFill>
                   <a:schemeClr val="dk1">
@@ -4156,7 +4156,7 @@
         <p:spPr>
           <a:xfrm>
             <a:off x="838080" y="6356520"/>
-            <a:ext cx="2737800" cy="359640"/>
+            <a:ext cx="2737440" cy="359280"/>
           </a:xfrm>
           <a:prstGeom prst="rect">
             <a:avLst/>
@@ -4245,9 +4245,9 @@
         <p:grpSpPr>
           <a:xfrm>
             <a:off x="6199200" y="6162840"/>
-            <a:ext cx="5987520" cy="689760"/>
+            <a:ext cx="5987160" cy="689400"/>
             <a:chOff x="6199200" y="6162840"/>
-            <a:chExt cx="5987520" cy="689760"/>
+            <a:chExt cx="5987160" cy="689400"/>
           </a:xfrm>
         </p:grpSpPr>
         <p:pic>
@@ -4263,7 +4263,7 @@
           <p:spPr>
             <a:xfrm>
               <a:off x="6199200" y="6162840"/>
-              <a:ext cx="4051080" cy="689760"/>
+              <a:ext cx="4050720" cy="689400"/>
             </a:xfrm>
             <a:prstGeom prst="rect">
               <a:avLst/>
@@ -4286,7 +4286,7 @@
           <p:spPr>
             <a:xfrm>
               <a:off x="10270080" y="6162840"/>
-              <a:ext cx="1916640" cy="606240"/>
+              <a:ext cx="1916280" cy="605880"/>
             </a:xfrm>
             <a:prstGeom prst="rect">
               <a:avLst/>
@@ -4809,7 +4809,7 @@
         <p:spPr>
           <a:xfrm>
             <a:off x="4038480" y="6356520"/>
-            <a:ext cx="4109400" cy="359640"/>
+            <a:ext cx="4109040" cy="359280"/>
           </a:xfrm>
           <a:prstGeom prst="rect">
             <a:avLst/>
@@ -4881,7 +4881,7 @@
         <p:spPr>
           <a:xfrm>
             <a:off x="8610480" y="6356520"/>
-            <a:ext cx="2737800" cy="359640"/>
+            <a:ext cx="2737440" cy="359280"/>
           </a:xfrm>
           <a:prstGeom prst="rect">
             <a:avLst/>
@@ -4924,7 +4924,7 @@
                 <a:tab algn="l" pos="0"/>
               </a:tabLst>
             </a:pPr>
-            <a:fld id="{5AD42DE4-BC29-44B2-851D-02355F9DD6A5}" type="slidenum">
+            <a:fld id="{EF8ABD1E-B5BD-4655-922A-BAEDB1181125}" type="slidenum">
               <a:rPr b="0" lang="en-US" sz="1200" spc="-1" strike="noStrike">
                 <a:solidFill>
                   <a:schemeClr val="dk1">
@@ -4957,7 +4957,7 @@
         <p:spPr>
           <a:xfrm>
             <a:off x="838080" y="6356520"/>
-            <a:ext cx="2737800" cy="359640"/>
+            <a:ext cx="2737440" cy="359280"/>
           </a:xfrm>
           <a:prstGeom prst="rect">
             <a:avLst/>
@@ -5046,9 +5046,9 @@
         <p:grpSpPr>
           <a:xfrm>
             <a:off x="6199200" y="6162840"/>
-            <a:ext cx="5987520" cy="689760"/>
+            <a:ext cx="5987160" cy="689400"/>
             <a:chOff x="6199200" y="6162840"/>
-            <a:chExt cx="5987520" cy="689760"/>
+            <a:chExt cx="5987160" cy="689400"/>
           </a:xfrm>
         </p:grpSpPr>
         <p:pic>
@@ -5064,7 +5064,7 @@
           <p:spPr>
             <a:xfrm>
               <a:off x="6199200" y="6162840"/>
-              <a:ext cx="4051080" cy="689760"/>
+              <a:ext cx="4050720" cy="689400"/>
             </a:xfrm>
             <a:prstGeom prst="rect">
               <a:avLst/>
@@ -5087,7 +5087,7 @@
           <p:spPr>
             <a:xfrm>
               <a:off x="10270080" y="6162840"/>
-              <a:ext cx="1916640" cy="606240"/>
+              <a:ext cx="1916280" cy="605880"/>
             </a:xfrm>
             <a:prstGeom prst="rect">
               <a:avLst/>
@@ -5160,7 +5160,7 @@
         <p:spPr>
           <a:xfrm>
             <a:off x="4038480" y="6356520"/>
-            <a:ext cx="4109400" cy="359640"/>
+            <a:ext cx="4109040" cy="359280"/>
           </a:xfrm>
           <a:prstGeom prst="rect">
             <a:avLst/>
@@ -5232,7 +5232,7 @@
         <p:spPr>
           <a:xfrm>
             <a:off x="8610480" y="6356520"/>
-            <a:ext cx="2737800" cy="359640"/>
+            <a:ext cx="2737440" cy="359280"/>
           </a:xfrm>
           <a:prstGeom prst="rect">
             <a:avLst/>
@@ -5275,7 +5275,7 @@
                 <a:tab algn="l" pos="0"/>
               </a:tabLst>
             </a:pPr>
-            <a:fld id="{9120996A-5015-49F0-8217-B26701AF27A9}" type="slidenum">
+            <a:fld id="{5C83FCDA-1282-47AD-8747-DCC6D9B7A471}" type="slidenum">
               <a:rPr b="0" lang="en-US" sz="1200" spc="-1" strike="noStrike">
                 <a:solidFill>
                   <a:schemeClr val="dk1">
@@ -5308,7 +5308,7 @@
         <p:spPr>
           <a:xfrm>
             <a:off x="838080" y="6356520"/>
-            <a:ext cx="2737800" cy="359640"/>
+            <a:ext cx="2737440" cy="359280"/>
           </a:xfrm>
           <a:prstGeom prst="rect">
             <a:avLst/>
@@ -5397,9 +5397,9 @@
         <p:grpSpPr>
           <a:xfrm>
             <a:off x="6199200" y="6162840"/>
-            <a:ext cx="5987520" cy="689760"/>
+            <a:ext cx="5987160" cy="689400"/>
             <a:chOff x="6199200" y="6162840"/>
-            <a:chExt cx="5987520" cy="689760"/>
+            <a:chExt cx="5987160" cy="689400"/>
           </a:xfrm>
         </p:grpSpPr>
         <p:pic>
@@ -5415,7 +5415,7 @@
           <p:spPr>
             <a:xfrm>
               <a:off x="6199200" y="6162840"/>
-              <a:ext cx="4051080" cy="689760"/>
+              <a:ext cx="4050720" cy="689400"/>
             </a:xfrm>
             <a:prstGeom prst="rect">
               <a:avLst/>
@@ -5438,7 +5438,7 @@
           <p:spPr>
             <a:xfrm>
               <a:off x="10270080" y="6162840"/>
-              <a:ext cx="1916640" cy="606240"/>
+              <a:ext cx="1916280" cy="605880"/>
             </a:xfrm>
             <a:prstGeom prst="rect">
               <a:avLst/>
@@ -5462,7 +5462,7 @@
         <p:spPr>
           <a:xfrm>
             <a:off x="4038480" y="6356520"/>
-            <a:ext cx="4109400" cy="359640"/>
+            <a:ext cx="4109040" cy="359280"/>
           </a:xfrm>
           <a:prstGeom prst="rect">
             <a:avLst/>
@@ -5534,7 +5534,7 @@
         <p:spPr>
           <a:xfrm>
             <a:off x="8610480" y="6356520"/>
-            <a:ext cx="2737800" cy="359640"/>
+            <a:ext cx="2737440" cy="359280"/>
           </a:xfrm>
           <a:prstGeom prst="rect">
             <a:avLst/>
@@ -5577,7 +5577,7 @@
                 <a:tab algn="l" pos="0"/>
               </a:tabLst>
             </a:pPr>
-            <a:fld id="{ADA1F0DC-B44C-4D34-BCFC-CA7480EA5231}" type="slidenum">
+            <a:fld id="{32F563C9-F38A-4015-B2FF-0ADA90F5D121}" type="slidenum">
               <a:rPr b="0" lang="en-US" sz="1200" spc="-1" strike="noStrike">
                 <a:solidFill>
                   <a:schemeClr val="dk1">
@@ -5610,7 +5610,7 @@
         <p:spPr>
           <a:xfrm>
             <a:off x="838080" y="6356520"/>
-            <a:ext cx="2737800" cy="359640"/>
+            <a:ext cx="2737440" cy="359280"/>
           </a:xfrm>
           <a:prstGeom prst="rect">
             <a:avLst/>
@@ -5699,9 +5699,9 @@
         <p:grpSpPr>
           <a:xfrm>
             <a:off x="6199200" y="6162840"/>
-            <a:ext cx="5987520" cy="689760"/>
+            <a:ext cx="5987160" cy="689400"/>
             <a:chOff x="6199200" y="6162840"/>
-            <a:chExt cx="5987520" cy="689760"/>
+            <a:chExt cx="5987160" cy="689400"/>
           </a:xfrm>
         </p:grpSpPr>
         <p:pic>
@@ -5717,7 +5717,7 @@
           <p:spPr>
             <a:xfrm>
               <a:off x="6199200" y="6162840"/>
-              <a:ext cx="4051080" cy="689760"/>
+              <a:ext cx="4050720" cy="689400"/>
             </a:xfrm>
             <a:prstGeom prst="rect">
               <a:avLst/>
@@ -5740,7 +5740,7 @@
           <p:spPr>
             <a:xfrm>
               <a:off x="10270080" y="6162840"/>
-              <a:ext cx="1916640" cy="606240"/>
+              <a:ext cx="1916280" cy="605880"/>
             </a:xfrm>
             <a:prstGeom prst="rect">
               <a:avLst/>
@@ -6488,7 +6488,7 @@
         <p:spPr>
           <a:xfrm>
             <a:off x="4038480" y="6356520"/>
-            <a:ext cx="4109400" cy="359640"/>
+            <a:ext cx="4109040" cy="359280"/>
           </a:xfrm>
           <a:prstGeom prst="rect">
             <a:avLst/>
@@ -6560,7 +6560,7 @@
         <p:spPr>
           <a:xfrm>
             <a:off x="8610480" y="6356520"/>
-            <a:ext cx="2737800" cy="359640"/>
+            <a:ext cx="2737440" cy="359280"/>
           </a:xfrm>
           <a:prstGeom prst="rect">
             <a:avLst/>
@@ -6603,7 +6603,7 @@
                 <a:tab algn="l" pos="0"/>
               </a:tabLst>
             </a:pPr>
-            <a:fld id="{295C09DD-95F6-45C5-98A9-ECB9FCE5FADE}" type="slidenum">
+            <a:fld id="{7817CF47-9A8F-463A-A36C-DF623A67FA7E}" type="slidenum">
               <a:rPr b="0" lang="en-US" sz="1200" spc="-1" strike="noStrike">
                 <a:solidFill>
                   <a:schemeClr val="dk1">
@@ -6636,7 +6636,7 @@
         <p:spPr>
           <a:xfrm>
             <a:off x="838080" y="6356520"/>
-            <a:ext cx="2737800" cy="359640"/>
+            <a:ext cx="2737440" cy="359280"/>
           </a:xfrm>
           <a:prstGeom prst="rect">
             <a:avLst/>
@@ -6725,9 +6725,9 @@
         <p:grpSpPr>
           <a:xfrm>
             <a:off x="6199200" y="6162840"/>
-            <a:ext cx="5987520" cy="689760"/>
+            <a:ext cx="5987160" cy="689400"/>
             <a:chOff x="6199200" y="6162840"/>
-            <a:chExt cx="5987520" cy="689760"/>
+            <a:chExt cx="5987160" cy="689400"/>
           </a:xfrm>
         </p:grpSpPr>
         <p:pic>
@@ -6743,7 +6743,7 @@
           <p:spPr>
             <a:xfrm>
               <a:off x="6199200" y="6162840"/>
-              <a:ext cx="4051080" cy="689760"/>
+              <a:ext cx="4050720" cy="689400"/>
             </a:xfrm>
             <a:prstGeom prst="rect">
               <a:avLst/>
@@ -6766,7 +6766,7 @@
           <p:spPr>
             <a:xfrm>
               <a:off x="10270080" y="6162840"/>
-              <a:ext cx="1916640" cy="606240"/>
+              <a:ext cx="1916280" cy="605880"/>
             </a:xfrm>
             <a:prstGeom prst="rect">
               <a:avLst/>
@@ -7514,7 +7514,7 @@
         <p:spPr>
           <a:xfrm>
             <a:off x="4038480" y="6356520"/>
-            <a:ext cx="4109400" cy="359640"/>
+            <a:ext cx="4109040" cy="359280"/>
           </a:xfrm>
           <a:prstGeom prst="rect">
             <a:avLst/>
@@ -7586,7 +7586,7 @@
         <p:spPr>
           <a:xfrm>
             <a:off x="8610480" y="6356520"/>
-            <a:ext cx="2737800" cy="359640"/>
+            <a:ext cx="2737440" cy="359280"/>
           </a:xfrm>
           <a:prstGeom prst="rect">
             <a:avLst/>
@@ -7629,7 +7629,7 @@
                 <a:tab algn="l" pos="0"/>
               </a:tabLst>
             </a:pPr>
-            <a:fld id="{DA525C46-8ADB-4332-BC07-980D2DA49B45}" type="slidenum">
+            <a:fld id="{F6BD3FB9-5DA6-4100-9B9A-37D472CFEBE6}" type="slidenum">
               <a:rPr b="0" lang="en-US" sz="1200" spc="-1" strike="noStrike">
                 <a:solidFill>
                   <a:schemeClr val="dk1">
@@ -7662,7 +7662,7 @@
         <p:spPr>
           <a:xfrm>
             <a:off x="838080" y="6356520"/>
-            <a:ext cx="2737800" cy="359640"/>
+            <a:ext cx="2737440" cy="359280"/>
           </a:xfrm>
           <a:prstGeom prst="rect">
             <a:avLst/>
@@ -7751,9 +7751,9 @@
         <p:grpSpPr>
           <a:xfrm>
             <a:off x="6199200" y="6162840"/>
-            <a:ext cx="5987520" cy="689760"/>
+            <a:ext cx="5987160" cy="689400"/>
             <a:chOff x="6199200" y="6162840"/>
-            <a:chExt cx="5987520" cy="689760"/>
+            <a:chExt cx="5987160" cy="689400"/>
           </a:xfrm>
         </p:grpSpPr>
         <p:pic>
@@ -7769,7 +7769,7 @@
           <p:spPr>
             <a:xfrm>
               <a:off x="6199200" y="6162840"/>
-              <a:ext cx="4051080" cy="689760"/>
+              <a:ext cx="4050720" cy="689400"/>
             </a:xfrm>
             <a:prstGeom prst="rect">
               <a:avLst/>
@@ -7792,7 +7792,7 @@
           <p:spPr>
             <a:xfrm>
               <a:off x="10270080" y="6162840"/>
-              <a:ext cx="1916640" cy="606240"/>
+              <a:ext cx="1916280" cy="605880"/>
             </a:xfrm>
             <a:prstGeom prst="rect">
               <a:avLst/>
@@ -8315,7 +8315,7 @@
         <p:spPr>
           <a:xfrm>
             <a:off x="4038480" y="6356520"/>
-            <a:ext cx="4109400" cy="359640"/>
+            <a:ext cx="4109040" cy="359280"/>
           </a:xfrm>
           <a:prstGeom prst="rect">
             <a:avLst/>
@@ -8387,7 +8387,7 @@
         <p:spPr>
           <a:xfrm>
             <a:off x="8610480" y="6356520"/>
-            <a:ext cx="2737800" cy="359640"/>
+            <a:ext cx="2737440" cy="359280"/>
           </a:xfrm>
           <a:prstGeom prst="rect">
             <a:avLst/>
@@ -8430,7 +8430,7 @@
                 <a:tab algn="l" pos="0"/>
               </a:tabLst>
             </a:pPr>
-            <a:fld id="{26D81466-476B-40EE-BC2D-376E8BB30145}" type="slidenum">
+            <a:fld id="{81CF6319-6743-4EAF-A440-8DAE454A9E31}" type="slidenum">
               <a:rPr b="0" lang="en-US" sz="1200" spc="-1" strike="noStrike">
                 <a:solidFill>
                   <a:schemeClr val="dk1">
@@ -8463,7 +8463,7 @@
         <p:spPr>
           <a:xfrm>
             <a:off x="838080" y="6356520"/>
-            <a:ext cx="2737800" cy="359640"/>
+            <a:ext cx="2737440" cy="359280"/>
           </a:xfrm>
           <a:prstGeom prst="rect">
             <a:avLst/>
@@ -8552,9 +8552,9 @@
         <p:grpSpPr>
           <a:xfrm>
             <a:off x="6199200" y="6162840"/>
-            <a:ext cx="5987520" cy="689760"/>
+            <a:ext cx="5987160" cy="689400"/>
             <a:chOff x="6199200" y="6162840"/>
-            <a:chExt cx="5987520" cy="689760"/>
+            <a:chExt cx="5987160" cy="689400"/>
           </a:xfrm>
         </p:grpSpPr>
         <p:pic>
@@ -8570,7 +8570,7 @@
           <p:spPr>
             <a:xfrm>
               <a:off x="6199200" y="6162840"/>
-              <a:ext cx="4051080" cy="689760"/>
+              <a:ext cx="4050720" cy="689400"/>
             </a:xfrm>
             <a:prstGeom prst="rect">
               <a:avLst/>
@@ -8593,7 +8593,7 @@
           <p:spPr>
             <a:xfrm>
               <a:off x="10270080" y="6162840"/>
-              <a:ext cx="1916640" cy="606240"/>
+              <a:ext cx="1916280" cy="605880"/>
             </a:xfrm>
             <a:prstGeom prst="rect">
               <a:avLst/>
@@ -9566,7 +9566,7 @@
         <p:spPr>
           <a:xfrm>
             <a:off x="4038480" y="6356520"/>
-            <a:ext cx="4109400" cy="359640"/>
+            <a:ext cx="4109040" cy="359280"/>
           </a:xfrm>
           <a:prstGeom prst="rect">
             <a:avLst/>
@@ -9638,7 +9638,7 @@
         <p:spPr>
           <a:xfrm>
             <a:off x="8610480" y="6356520"/>
-            <a:ext cx="2737800" cy="359640"/>
+            <a:ext cx="2737440" cy="359280"/>
           </a:xfrm>
           <a:prstGeom prst="rect">
             <a:avLst/>
@@ -9681,7 +9681,7 @@
                 <a:tab algn="l" pos="0"/>
               </a:tabLst>
             </a:pPr>
-            <a:fld id="{23538FB1-E99F-4F37-A746-E9FE9C53414D}" type="slidenum">
+            <a:fld id="{2651874F-B1CD-43C0-8605-F4B79470769B}" type="slidenum">
               <a:rPr b="0" lang="en-US" sz="1200" spc="-1" strike="noStrike">
                 <a:solidFill>
                   <a:schemeClr val="dk1">
@@ -9714,7 +9714,7 @@
         <p:spPr>
           <a:xfrm>
             <a:off x="838080" y="6356520"/>
-            <a:ext cx="2737800" cy="359640"/>
+            <a:ext cx="2737440" cy="359280"/>
           </a:xfrm>
           <a:prstGeom prst="rect">
             <a:avLst/>
@@ -9803,9 +9803,9 @@
         <p:grpSpPr>
           <a:xfrm>
             <a:off x="6199200" y="6162840"/>
-            <a:ext cx="5987520" cy="689760"/>
+            <a:ext cx="5987160" cy="689400"/>
             <a:chOff x="6199200" y="6162840"/>
-            <a:chExt cx="5987520" cy="689760"/>
+            <a:chExt cx="5987160" cy="689400"/>
           </a:xfrm>
         </p:grpSpPr>
         <p:pic>
@@ -9821,7 +9821,7 @@
           <p:spPr>
             <a:xfrm>
               <a:off x="6199200" y="6162840"/>
-              <a:ext cx="4051080" cy="689760"/>
+              <a:ext cx="4050720" cy="689400"/>
             </a:xfrm>
             <a:prstGeom prst="rect">
               <a:avLst/>
@@ -9844,7 +9844,7 @@
           <p:spPr>
             <a:xfrm>
               <a:off x="10270080" y="6162840"/>
-              <a:ext cx="1916640" cy="606240"/>
+              <a:ext cx="1916280" cy="605880"/>
             </a:xfrm>
             <a:prstGeom prst="rect">
               <a:avLst/>
@@ -9868,7 +9868,7 @@
         <p:spPr>
           <a:xfrm>
             <a:off x="4038480" y="6356520"/>
-            <a:ext cx="4109400" cy="359640"/>
+            <a:ext cx="4109040" cy="359280"/>
           </a:xfrm>
           <a:prstGeom prst="rect">
             <a:avLst/>
@@ -9940,7 +9940,7 @@
         <p:spPr>
           <a:xfrm>
             <a:off x="8610480" y="6356520"/>
-            <a:ext cx="2737800" cy="359640"/>
+            <a:ext cx="2737440" cy="359280"/>
           </a:xfrm>
           <a:prstGeom prst="rect">
             <a:avLst/>
@@ -9983,7 +9983,7 @@
                 <a:tab algn="l" pos="0"/>
               </a:tabLst>
             </a:pPr>
-            <a:fld id="{351389BF-C595-49DB-B037-B2A37892A513}" type="slidenum">
+            <a:fld id="{AEC6C37B-E4FC-4563-BE38-9AADCE8B9669}" type="slidenum">
               <a:rPr b="0" lang="en-US" sz="1200" spc="-1" strike="noStrike">
                 <a:solidFill>
                   <a:schemeClr val="dk1">
@@ -10016,7 +10016,7 @@
         <p:spPr>
           <a:xfrm>
             <a:off x="838080" y="6356520"/>
-            <a:ext cx="2737800" cy="359640"/>
+            <a:ext cx="2737440" cy="359280"/>
           </a:xfrm>
           <a:prstGeom prst="rect">
             <a:avLst/>
@@ -10105,9 +10105,9 @@
         <p:grpSpPr>
           <a:xfrm>
             <a:off x="6199200" y="6162840"/>
-            <a:ext cx="5987520" cy="689760"/>
+            <a:ext cx="5987160" cy="689400"/>
             <a:chOff x="6199200" y="6162840"/>
-            <a:chExt cx="5987520" cy="689760"/>
+            <a:chExt cx="5987160" cy="689400"/>
           </a:xfrm>
         </p:grpSpPr>
         <p:pic>
@@ -10123,7 +10123,7 @@
           <p:spPr>
             <a:xfrm>
               <a:off x="6199200" y="6162840"/>
-              <a:ext cx="4051080" cy="689760"/>
+              <a:ext cx="4050720" cy="689400"/>
             </a:xfrm>
             <a:prstGeom prst="rect">
               <a:avLst/>
@@ -10146,7 +10146,7 @@
           <p:spPr>
             <a:xfrm>
               <a:off x="10270080" y="6162840"/>
-              <a:ext cx="1916640" cy="606240"/>
+              <a:ext cx="1916280" cy="605880"/>
             </a:xfrm>
             <a:prstGeom prst="rect">
               <a:avLst/>
@@ -10170,7 +10170,7 @@
         <p:spPr>
           <a:xfrm>
             <a:off x="4038480" y="6356520"/>
-            <a:ext cx="4109400" cy="359640"/>
+            <a:ext cx="4109040" cy="359280"/>
           </a:xfrm>
           <a:prstGeom prst="rect">
             <a:avLst/>
@@ -10242,7 +10242,7 @@
         <p:spPr>
           <a:xfrm>
             <a:off x="8610480" y="6356520"/>
-            <a:ext cx="2737800" cy="359640"/>
+            <a:ext cx="2737440" cy="359280"/>
           </a:xfrm>
           <a:prstGeom prst="rect">
             <a:avLst/>
@@ -10285,7 +10285,7 @@
                 <a:tab algn="l" pos="0"/>
               </a:tabLst>
             </a:pPr>
-            <a:fld id="{45B47D6C-2B77-4289-B5C1-9C50EB0C1CC8}" type="slidenum">
+            <a:fld id="{4A083E96-C025-4B20-B6AF-577C954C66B6}" type="slidenum">
               <a:rPr b="0" lang="en-US" sz="1200" spc="-1" strike="noStrike">
                 <a:solidFill>
                   <a:schemeClr val="dk1">
@@ -10318,7 +10318,7 @@
         <p:spPr>
           <a:xfrm>
             <a:off x="838080" y="6356520"/>
-            <a:ext cx="2737800" cy="359640"/>
+            <a:ext cx="2737440" cy="359280"/>
           </a:xfrm>
           <a:prstGeom prst="rect">
             <a:avLst/>
@@ -10681,9 +10681,9 @@
         <p:grpSpPr>
           <a:xfrm>
             <a:off x="6199200" y="6162840"/>
-            <a:ext cx="5987520" cy="689760"/>
+            <a:ext cx="5987160" cy="689400"/>
             <a:chOff x="6199200" y="6162840"/>
-            <a:chExt cx="5987520" cy="689760"/>
+            <a:chExt cx="5987160" cy="689400"/>
           </a:xfrm>
         </p:grpSpPr>
         <p:pic>
@@ -10699,7 +10699,7 @@
           <p:spPr>
             <a:xfrm>
               <a:off x="6199200" y="6162840"/>
-              <a:ext cx="4051080" cy="689760"/>
+              <a:ext cx="4050720" cy="689400"/>
             </a:xfrm>
             <a:prstGeom prst="rect">
               <a:avLst/>
@@ -10722,7 +10722,7 @@
           <p:spPr>
             <a:xfrm>
               <a:off x="10270080" y="6162840"/>
-              <a:ext cx="1916640" cy="606240"/>
+              <a:ext cx="1916280" cy="605880"/>
             </a:xfrm>
             <a:prstGeom prst="rect">
               <a:avLst/>
@@ -11020,7 +11020,7 @@
         <p:spPr>
           <a:xfrm>
             <a:off x="4038480" y="6356520"/>
-            <a:ext cx="4109400" cy="359640"/>
+            <a:ext cx="4109040" cy="359280"/>
           </a:xfrm>
           <a:prstGeom prst="rect">
             <a:avLst/>
@@ -11092,7 +11092,7 @@
         <p:spPr>
           <a:xfrm>
             <a:off x="8610480" y="6356520"/>
-            <a:ext cx="2737800" cy="359640"/>
+            <a:ext cx="2737440" cy="359280"/>
           </a:xfrm>
           <a:prstGeom prst="rect">
             <a:avLst/>
@@ -11135,7 +11135,7 @@
                 <a:tab algn="l" pos="0"/>
               </a:tabLst>
             </a:pPr>
-            <a:fld id="{81E363E8-3B98-4223-BCC3-39E9C7DCC3AC}" type="slidenum">
+            <a:fld id="{93C6E08A-DABB-4FC5-954E-50C565F4994A}" type="slidenum">
               <a:rPr b="0" lang="en-US" sz="1200" spc="-1" strike="noStrike">
                 <a:solidFill>
                   <a:schemeClr val="dk1">
@@ -11168,7 +11168,7 @@
         <p:spPr>
           <a:xfrm>
             <a:off x="838080" y="6356520"/>
-            <a:ext cx="2737800" cy="359640"/>
+            <a:ext cx="2737440" cy="359280"/>
           </a:xfrm>
           <a:prstGeom prst="rect">
             <a:avLst/>
@@ -11257,9 +11257,9 @@
         <p:grpSpPr>
           <a:xfrm>
             <a:off x="6199200" y="6162840"/>
-            <a:ext cx="5987520" cy="689760"/>
+            <a:ext cx="5987160" cy="689400"/>
             <a:chOff x="6199200" y="6162840"/>
-            <a:chExt cx="5987520" cy="689760"/>
+            <a:chExt cx="5987160" cy="689400"/>
           </a:xfrm>
         </p:grpSpPr>
         <p:pic>
@@ -11275,7 +11275,7 @@
           <p:spPr>
             <a:xfrm>
               <a:off x="6199200" y="6162840"/>
-              <a:ext cx="4051080" cy="689760"/>
+              <a:ext cx="4050720" cy="689400"/>
             </a:xfrm>
             <a:prstGeom prst="rect">
               <a:avLst/>
@@ -11298,7 +11298,7 @@
           <p:spPr>
             <a:xfrm>
               <a:off x="10270080" y="6162840"/>
-              <a:ext cx="1916640" cy="606240"/>
+              <a:ext cx="1916280" cy="605880"/>
             </a:xfrm>
             <a:prstGeom prst="rect">
               <a:avLst/>
@@ -11596,7 +11596,7 @@
         <p:spPr>
           <a:xfrm>
             <a:off x="4038480" y="6356520"/>
-            <a:ext cx="4109400" cy="359640"/>
+            <a:ext cx="4109040" cy="359280"/>
           </a:xfrm>
           <a:prstGeom prst="rect">
             <a:avLst/>
@@ -11668,7 +11668,7 @@
         <p:spPr>
           <a:xfrm>
             <a:off x="8610480" y="6356520"/>
-            <a:ext cx="2737800" cy="359640"/>
+            <a:ext cx="2737440" cy="359280"/>
           </a:xfrm>
           <a:prstGeom prst="rect">
             <a:avLst/>
@@ -11711,7 +11711,7 @@
                 <a:tab algn="l" pos="0"/>
               </a:tabLst>
             </a:pPr>
-            <a:fld id="{EF53C0D6-C28A-499C-AD47-ACE8FBC828F0}" type="slidenum">
+            <a:fld id="{93130F2B-830E-4B1A-B099-2CFB7A38C8C3}" type="slidenum">
               <a:rPr b="0" lang="en-US" sz="1200" spc="-1" strike="noStrike">
                 <a:solidFill>
                   <a:schemeClr val="dk1">
@@ -11744,7 +11744,7 @@
         <p:spPr>
           <a:xfrm>
             <a:off x="838080" y="6356520"/>
-            <a:ext cx="2737800" cy="359640"/>
+            <a:ext cx="2737440" cy="359280"/>
           </a:xfrm>
           <a:prstGeom prst="rect">
             <a:avLst/>
@@ -11826,7 +11826,7 @@
         <p:spPr>
           <a:xfrm flipH="1">
             <a:off x="0" y="3073320"/>
-            <a:ext cx="1834200" cy="5400"/>
+            <a:ext cx="1834560" cy="5760"/>
           </a:xfrm>
           <a:prstGeom prst="straightConnector1">
             <a:avLst/>
@@ -11849,7 +11849,7 @@
         <p:spPr>
           <a:xfrm>
             <a:off x="0" y="2489400"/>
-            <a:ext cx="1834200" cy="5400"/>
+            <a:ext cx="1834560" cy="5760"/>
           </a:xfrm>
           <a:prstGeom prst="straightConnector1">
             <a:avLst/>
@@ -11872,7 +11872,7 @@
         <p:spPr>
           <a:xfrm>
             <a:off x="0" y="2781360"/>
-            <a:ext cx="1834200" cy="5400"/>
+            <a:ext cx="1834560" cy="5760"/>
           </a:xfrm>
           <a:prstGeom prst="straightConnector1">
             <a:avLst/>
@@ -11895,7 +11895,7 @@
         <p:spPr>
           <a:xfrm flipH="1">
             <a:off x="0" y="3657600"/>
-            <a:ext cx="1834200" cy="5400"/>
+            <a:ext cx="1834560" cy="5760"/>
           </a:xfrm>
           <a:prstGeom prst="straightConnector1">
             <a:avLst/>
@@ -11917,7 +11917,7 @@
         <p:spPr>
           <a:xfrm>
             <a:off x="128520" y="6134040"/>
-            <a:ext cx="1566360" cy="382320"/>
+            <a:ext cx="1566000" cy="381960"/>
           </a:xfrm>
           <a:prstGeom prst="diamond">
             <a:avLst/>
@@ -11982,7 +11982,7 @@
         <p:spPr>
           <a:xfrm>
             <a:off x="302760" y="5454000"/>
-            <a:ext cx="1217880" cy="382320"/>
+            <a:ext cx="1217520" cy="381960"/>
           </a:xfrm>
           <a:prstGeom prst="ellipse">
             <a:avLst/>
@@ -12045,7 +12045,7 @@
         <p:spPr>
           <a:xfrm>
             <a:off x="101160" y="336240"/>
-            <a:ext cx="1621080" cy="303120"/>
+            <a:ext cx="1620720" cy="303120"/>
           </a:xfrm>
           <a:prstGeom prst="rect">
             <a:avLst/>
@@ -12102,7 +12102,7 @@
         <p:spPr>
           <a:xfrm>
             <a:off x="101160" y="597600"/>
-            <a:ext cx="1621080" cy="516600"/>
+            <a:ext cx="1620720" cy="516600"/>
           </a:xfrm>
           <a:prstGeom prst="rect">
             <a:avLst/>
@@ -12192,7 +12192,7 @@
         <p:spPr>
           <a:xfrm>
             <a:off x="101160" y="336240"/>
-            <a:ext cx="1621080" cy="303120"/>
+            <a:ext cx="1620720" cy="303120"/>
           </a:xfrm>
           <a:prstGeom prst="rect">
             <a:avLst/>
@@ -12249,7 +12249,7 @@
         <p:spPr>
           <a:xfrm>
             <a:off x="101160" y="597600"/>
-            <a:ext cx="1621080" cy="516600"/>
+            <a:ext cx="1620720" cy="516600"/>
           </a:xfrm>
           <a:prstGeom prst="rect">
             <a:avLst/>
@@ -12339,7 +12339,7 @@
         <p:spPr>
           <a:xfrm>
             <a:off x="2541600" y="228600"/>
-            <a:ext cx="1621080" cy="303120"/>
+            <a:ext cx="1620720" cy="303120"/>
           </a:xfrm>
           <a:prstGeom prst="rect">
             <a:avLst/>
@@ -12396,7 +12396,7 @@
         <p:spPr>
           <a:xfrm>
             <a:off x="2541600" y="489960"/>
-            <a:ext cx="1621080" cy="1584000"/>
+            <a:ext cx="1620720" cy="1584000"/>
           </a:xfrm>
           <a:prstGeom prst="rect">
             <a:avLst/>
@@ -12621,7 +12621,7 @@
         <p:spPr>
           <a:xfrm>
             <a:off x="6656400" y="228600"/>
-            <a:ext cx="1621080" cy="303120"/>
+            <a:ext cx="1620720" cy="303120"/>
           </a:xfrm>
           <a:prstGeom prst="rect">
             <a:avLst/>
@@ -12678,7 +12678,7 @@
         <p:spPr>
           <a:xfrm>
             <a:off x="6656400" y="489960"/>
-            <a:ext cx="1621080" cy="516600"/>
+            <a:ext cx="1620720" cy="516600"/>
           </a:xfrm>
           <a:prstGeom prst="rect">
             <a:avLst/>
@@ -12768,7 +12768,7 @@
         <p:spPr>
           <a:xfrm>
             <a:off x="6656400" y="228600"/>
-            <a:ext cx="1621080" cy="303120"/>
+            <a:ext cx="1620720" cy="303120"/>
           </a:xfrm>
           <a:prstGeom prst="rect">
             <a:avLst/>
@@ -12825,7 +12825,7 @@
         <p:spPr>
           <a:xfrm>
             <a:off x="6656400" y="489960"/>
-            <a:ext cx="1621080" cy="730080"/>
+            <a:ext cx="1620720" cy="730080"/>
           </a:xfrm>
           <a:prstGeom prst="rect">
             <a:avLst/>
@@ -12942,7 +12942,7 @@
         <p:spPr>
           <a:xfrm>
             <a:off x="128520" y="4629600"/>
-            <a:ext cx="1566360" cy="527040"/>
+            <a:ext cx="1566000" cy="526680"/>
           </a:xfrm>
           <a:prstGeom prst="diamond">
             <a:avLst/>
@@ -13030,7 +13030,7 @@
         <p:spPr>
           <a:xfrm>
             <a:off x="0" y="3365640"/>
-            <a:ext cx="1834200" cy="5400"/>
+            <a:ext cx="1834560" cy="5760"/>
           </a:xfrm>
           <a:prstGeom prst="straightConnector1">
             <a:avLst/>
@@ -13052,7 +13052,7 @@
         <p:spPr>
           <a:xfrm>
             <a:off x="673200" y="3949920"/>
-            <a:ext cx="477360" cy="382320"/>
+            <a:ext cx="477000" cy="381960"/>
           </a:xfrm>
           <a:prstGeom prst="triangle">
             <a:avLst>
@@ -13119,9 +13119,9 @@
         <p:grpSpPr>
           <a:xfrm>
             <a:off x="101160" y="1413000"/>
-            <a:ext cx="1621080" cy="777960"/>
+            <a:ext cx="1620720" cy="777960"/>
             <a:chOff x="101160" y="1413000"/>
-            <a:chExt cx="1621080" cy="777960"/>
+            <a:chExt cx="1620720" cy="777960"/>
           </a:xfrm>
         </p:grpSpPr>
         <p:sp>
@@ -13133,7 +13133,7 @@
           <p:spPr>
             <a:xfrm>
               <a:off x="101160" y="1413000"/>
-              <a:ext cx="1621080" cy="303120"/>
+              <a:ext cx="1620720" cy="303120"/>
             </a:xfrm>
             <a:prstGeom prst="rect">
               <a:avLst/>
@@ -13191,7 +13191,7 @@
           <p:spPr>
             <a:xfrm>
               <a:off x="101160" y="1674360"/>
-              <a:ext cx="1621080" cy="516600"/>
+              <a:ext cx="1620720" cy="516600"/>
             </a:xfrm>
             <a:prstGeom prst="rect">
               <a:avLst/>
@@ -13283,7 +13283,7 @@
         <p:spPr>
           <a:xfrm>
             <a:off x="4426920" y="914400"/>
-            <a:ext cx="1566360" cy="382320"/>
+            <a:ext cx="1566000" cy="381960"/>
           </a:xfrm>
           <a:prstGeom prst="diamond">
             <a:avLst/>
@@ -13350,8 +13350,8 @@
         </p:nvCxnSpPr>
         <p:spPr>
           <a:xfrm flipH="1">
-            <a:off x="5993280" y="855000"/>
-            <a:ext cx="663480" cy="250920"/>
+            <a:off x="5992920" y="855000"/>
+            <a:ext cx="663840" cy="250920"/>
           </a:xfrm>
           <a:prstGeom prst="straightConnector1">
             <a:avLst/>
@@ -13374,7 +13374,7 @@
         <p:spPr>
           <a:xfrm>
             <a:off x="6255720" y="1828800"/>
-            <a:ext cx="1794960" cy="382320"/>
+            <a:ext cx="1794600" cy="381960"/>
           </a:xfrm>
           <a:prstGeom prst="diamond">
             <a:avLst/>
@@ -13465,8 +13465,8 @@
         </p:nvCxnSpPr>
         <p:spPr>
           <a:xfrm flipH="1" flipV="1">
-            <a:off x="7153200" y="2211120"/>
-            <a:ext cx="458280" cy="535320"/>
+            <a:off x="7153200" y="2210760"/>
+            <a:ext cx="458640" cy="536040"/>
           </a:xfrm>
           <a:prstGeom prst="straightConnector1">
             <a:avLst/>
@@ -13489,7 +13489,7 @@
         <p:spPr>
           <a:xfrm>
             <a:off x="128520" y="6134400"/>
-            <a:ext cx="1566360" cy="382320"/>
+            <a:ext cx="1566000" cy="381960"/>
           </a:xfrm>
           <a:prstGeom prst="diamond">
             <a:avLst/>
@@ -13554,9 +13554,9 @@
         <p:grpSpPr>
           <a:xfrm>
             <a:off x="6681960" y="2743200"/>
-            <a:ext cx="1849680" cy="1216440"/>
+            <a:ext cx="1849320" cy="1216440"/>
             <a:chOff x="6681960" y="2743200"/>
-            <a:chExt cx="1849680" cy="1216440"/>
+            <a:chExt cx="1849320" cy="1216440"/>
           </a:xfrm>
         </p:grpSpPr>
         <p:sp>
@@ -13568,7 +13568,7 @@
           <p:spPr>
             <a:xfrm>
               <a:off x="6681960" y="2743200"/>
-              <a:ext cx="1849680" cy="303120"/>
+              <a:ext cx="1849320" cy="303120"/>
             </a:xfrm>
             <a:prstGeom prst="rect">
               <a:avLst/>
@@ -13625,7 +13625,7 @@
           <p:spPr>
             <a:xfrm>
               <a:off x="6681960" y="3016080"/>
-              <a:ext cx="1849680" cy="943560"/>
+              <a:ext cx="1849320" cy="943560"/>
             </a:xfrm>
             <a:prstGeom prst="rect">
               <a:avLst/>
@@ -13772,7 +13772,7 @@
         <p:spPr>
           <a:xfrm>
             <a:off x="9173520" y="3501000"/>
-            <a:ext cx="477360" cy="382320"/>
+            <a:ext cx="477000" cy="381960"/>
           </a:xfrm>
           <a:prstGeom prst="triangle">
             <a:avLst>
@@ -13839,7 +13839,7 @@
         <p:spPr>
           <a:xfrm>
             <a:off x="10569600" y="3126240"/>
-            <a:ext cx="1621080" cy="303120"/>
+            <a:ext cx="1620720" cy="303120"/>
           </a:xfrm>
           <a:prstGeom prst="rect">
             <a:avLst/>
@@ -13896,7 +13896,7 @@
         <p:spPr>
           <a:xfrm>
             <a:off x="10569600" y="3429360"/>
-            <a:ext cx="1621080" cy="1370520"/>
+            <a:ext cx="1620720" cy="1370520"/>
           </a:xfrm>
           <a:prstGeom prst="rect">
             <a:avLst/>
@@ -14054,8 +14054,8 @@
         </p:nvCxnSpPr>
         <p:spPr>
           <a:xfrm>
-            <a:off x="9531720" y="3692160"/>
-            <a:ext cx="1038240" cy="422640"/>
+            <a:off x="9531360" y="3692160"/>
+            <a:ext cx="1038600" cy="422640"/>
           </a:xfrm>
           <a:prstGeom prst="straightConnector1">
             <a:avLst/>
@@ -14079,8 +14079,8 @@
         </p:nvCxnSpPr>
         <p:spPr>
           <a:xfrm flipH="1" flipV="1">
-            <a:off x="8531640" y="3351240"/>
-            <a:ext cx="761400" cy="341280"/>
+            <a:off x="8531280" y="3351240"/>
+            <a:ext cx="761760" cy="341280"/>
           </a:xfrm>
           <a:prstGeom prst="straightConnector1">
             <a:avLst/>
@@ -14102,7 +14102,7 @@
         <p:spPr>
           <a:xfrm>
             <a:off x="2086200" y="3336840"/>
-            <a:ext cx="1621080" cy="303120"/>
+            <a:ext cx="1620720" cy="303120"/>
           </a:xfrm>
           <a:prstGeom prst="rect">
             <a:avLst/>
@@ -14159,7 +14159,7 @@
         <p:spPr>
           <a:xfrm>
             <a:off x="2086200" y="3598200"/>
-            <a:ext cx="1621080" cy="516600"/>
+            <a:ext cx="1620720" cy="516600"/>
           </a:xfrm>
           <a:prstGeom prst="rect">
             <a:avLst/>
@@ -14249,7 +14249,7 @@
         <p:spPr>
           <a:xfrm>
             <a:off x="2086200" y="3336840"/>
-            <a:ext cx="1621080" cy="303120"/>
+            <a:ext cx="1620720" cy="303120"/>
           </a:xfrm>
           <a:prstGeom prst="rect">
             <a:avLst/>
@@ -14306,7 +14306,7 @@
         <p:spPr>
           <a:xfrm>
             <a:off x="2086200" y="3598200"/>
-            <a:ext cx="1621080" cy="516600"/>
+            <a:ext cx="1620720" cy="516600"/>
           </a:xfrm>
           <a:prstGeom prst="rect">
             <a:avLst/>
@@ -14396,7 +14396,7 @@
         <p:spPr>
           <a:xfrm>
             <a:off x="1883160" y="2514600"/>
-            <a:ext cx="1824120" cy="382320"/>
+            <a:ext cx="1823760" cy="381960"/>
           </a:xfrm>
           <a:prstGeom prst="diamond">
             <a:avLst/>
@@ -14461,7 +14461,7 @@
         <p:spPr>
           <a:xfrm>
             <a:off x="3481560" y="2899800"/>
-            <a:ext cx="1595520" cy="382320"/>
+            <a:ext cx="1595160" cy="381960"/>
           </a:xfrm>
           <a:prstGeom prst="ellipse">
             <a:avLst/>
@@ -14526,8 +14526,8 @@
         </p:nvCxnSpPr>
         <p:spPr>
           <a:xfrm>
-            <a:off x="3707280" y="2705760"/>
-            <a:ext cx="572400" cy="194400"/>
+            <a:off x="3706920" y="2705760"/>
+            <a:ext cx="572760" cy="194400"/>
           </a:xfrm>
           <a:prstGeom prst="straightConnector1">
             <a:avLst/>
@@ -14551,8 +14551,8 @@
         </p:nvCxnSpPr>
         <p:spPr>
           <a:xfrm flipH="1" flipV="1">
-            <a:off x="2795400" y="2896920"/>
-            <a:ext cx="101520" cy="440280"/>
+            <a:off x="2795040" y="2896560"/>
+            <a:ext cx="101880" cy="440640"/>
           </a:xfrm>
           <a:prstGeom prst="straightConnector1">
             <a:avLst/>
@@ -14576,8 +14576,8 @@
         </p:nvCxnSpPr>
         <p:spPr>
           <a:xfrm flipV="1">
-            <a:off x="2795400" y="2073960"/>
-            <a:ext cx="556920" cy="441000"/>
+            <a:off x="2795040" y="2073960"/>
+            <a:ext cx="557280" cy="441000"/>
           </a:xfrm>
           <a:prstGeom prst="straightConnector1">
             <a:avLst/>
@@ -14599,7 +14599,7 @@
         <p:spPr>
           <a:xfrm>
             <a:off x="10543680" y="457200"/>
-            <a:ext cx="1621080" cy="303120"/>
+            <a:ext cx="1620720" cy="303120"/>
           </a:xfrm>
           <a:prstGeom prst="rect">
             <a:avLst/>
@@ -14656,7 +14656,7 @@
         <p:spPr>
           <a:xfrm>
             <a:off x="10543680" y="718560"/>
-            <a:ext cx="1621080" cy="516600"/>
+            <a:ext cx="1620720" cy="516600"/>
           </a:xfrm>
           <a:prstGeom prst="rect">
             <a:avLst/>
@@ -14746,7 +14746,7 @@
         <p:spPr>
           <a:xfrm>
             <a:off x="10543680" y="457200"/>
-            <a:ext cx="1621080" cy="303120"/>
+            <a:ext cx="1620720" cy="303120"/>
           </a:xfrm>
           <a:prstGeom prst="rect">
             <a:avLst/>
@@ -14803,7 +14803,7 @@
         <p:spPr>
           <a:xfrm>
             <a:off x="10543680" y="718560"/>
-            <a:ext cx="1621080" cy="2224440"/>
+            <a:ext cx="1620720" cy="2224440"/>
           </a:xfrm>
           <a:prstGeom prst="rect">
             <a:avLst/>
@@ -15055,7 +15055,7 @@
         <p:spPr>
           <a:xfrm>
             <a:off x="8282160" y="1443600"/>
-            <a:ext cx="2053080" cy="382320"/>
+            <a:ext cx="2052720" cy="381960"/>
           </a:xfrm>
           <a:prstGeom prst="diamond">
             <a:avLst/>
@@ -15122,8 +15122,8 @@
         </p:nvCxnSpPr>
         <p:spPr>
           <a:xfrm>
-            <a:off x="9308880" y="1825920"/>
-            <a:ext cx="1261080" cy="2288880"/>
+            <a:off x="9308520" y="1825560"/>
+            <a:ext cx="1261440" cy="2289240"/>
           </a:xfrm>
           <a:prstGeom prst="straightConnector1">
             <a:avLst/>
@@ -15147,8 +15147,8 @@
         </p:nvCxnSpPr>
         <p:spPr>
           <a:xfrm flipH="1" flipV="1">
-            <a:off x="10335240" y="1634760"/>
-            <a:ext cx="208800" cy="196200"/>
+            <a:off x="10334880" y="1634760"/>
+            <a:ext cx="209160" cy="196200"/>
           </a:xfrm>
           <a:prstGeom prst="straightConnector1">
             <a:avLst/>
@@ -15173,7 +15173,7 @@
         <p:spPr>
           <a:xfrm flipH="1" flipV="1">
             <a:off x="7466760" y="1220040"/>
-            <a:ext cx="1842480" cy="223920"/>
+            <a:ext cx="1842120" cy="223920"/>
           </a:xfrm>
           <a:prstGeom prst="straightConnector1">
             <a:avLst/>
@@ -15195,7 +15195,7 @@
         <p:spPr>
           <a:xfrm>
             <a:off x="5412240" y="5029200"/>
-            <a:ext cx="1621080" cy="303120"/>
+            <a:ext cx="1620720" cy="303120"/>
           </a:xfrm>
           <a:prstGeom prst="rect">
             <a:avLst/>
@@ -15252,7 +15252,7 @@
         <p:spPr>
           <a:xfrm>
             <a:off x="3710160" y="4343400"/>
-            <a:ext cx="1824480" cy="382320"/>
+            <a:ext cx="1824120" cy="381960"/>
           </a:xfrm>
           <a:prstGeom prst="diamond">
             <a:avLst/>
@@ -15345,8 +15345,8 @@
         </p:nvCxnSpPr>
         <p:spPr>
           <a:xfrm>
-            <a:off x="4622400" y="4725720"/>
-            <a:ext cx="790200" cy="455400"/>
+            <a:off x="4622400" y="4725360"/>
+            <a:ext cx="790200" cy="455760"/>
           </a:xfrm>
           <a:prstGeom prst="straightConnector1">
             <a:avLst/>
@@ -15393,7 +15393,7 @@
         <p:spPr>
           <a:xfrm>
             <a:off x="4626720" y="3200400"/>
-            <a:ext cx="1823760" cy="681480"/>
+            <a:ext cx="1823400" cy="681120"/>
           </a:xfrm>
           <a:prstGeom prst="diamond">
             <a:avLst/>
@@ -15460,8 +15460,8 @@
         </p:nvCxnSpPr>
         <p:spPr>
           <a:xfrm flipH="1" flipV="1">
-            <a:off x="5538600" y="3881880"/>
-            <a:ext cx="684360" cy="1147680"/>
+            <a:off x="5538600" y="3881520"/>
+            <a:ext cx="684360" cy="1148040"/>
           </a:xfrm>
           <a:prstGeom prst="straightConnector1">
             <a:avLst/>
@@ -15483,7 +15483,7 @@
         <p:spPr>
           <a:xfrm>
             <a:off x="2693880" y="4415400"/>
-            <a:ext cx="477360" cy="382320"/>
+            <a:ext cx="477000" cy="381960"/>
           </a:xfrm>
           <a:prstGeom prst="triangle">
             <a:avLst>
@@ -15575,7 +15575,7 @@
         <p:spPr>
           <a:xfrm>
             <a:off x="2109960" y="5163480"/>
-            <a:ext cx="1621080" cy="303120"/>
+            <a:ext cx="1620720" cy="303120"/>
           </a:xfrm>
           <a:prstGeom prst="rect">
             <a:avLst/>
@@ -15632,7 +15632,7 @@
         <p:spPr>
           <a:xfrm>
             <a:off x="2109960" y="5163480"/>
-            <a:ext cx="1621080" cy="303120"/>
+            <a:ext cx="1620720" cy="303120"/>
           </a:xfrm>
           <a:prstGeom prst="rect">
             <a:avLst/>
@@ -15689,7 +15689,7 @@
         <p:spPr>
           <a:xfrm>
             <a:off x="2109960" y="5424840"/>
-            <a:ext cx="1621080" cy="363960"/>
+            <a:ext cx="1620720" cy="363960"/>
           </a:xfrm>
           <a:prstGeom prst="rect">
             <a:avLst/>
@@ -15757,8 +15757,8 @@
         </p:nvCxnSpPr>
         <p:spPr>
           <a:xfrm flipH="1">
-            <a:off x="2920320" y="4797720"/>
-            <a:ext cx="12600" cy="366120"/>
+            <a:off x="2920320" y="4797360"/>
+            <a:ext cx="12600" cy="366480"/>
           </a:xfrm>
           <a:prstGeom prst="straightConnector1">
             <a:avLst/>
@@ -15780,7 +15780,7 @@
         <p:spPr>
           <a:xfrm>
             <a:off x="7627320" y="4800600"/>
-            <a:ext cx="1566360" cy="382320"/>
+            <a:ext cx="1566000" cy="381960"/>
           </a:xfrm>
           <a:prstGeom prst="diamond">
             <a:avLst/>
@@ -15845,7 +15845,7 @@
         <p:spPr>
           <a:xfrm>
             <a:off x="7627320" y="5329800"/>
-            <a:ext cx="1794960" cy="382320"/>
+            <a:ext cx="1794600" cy="381960"/>
           </a:xfrm>
           <a:prstGeom prst="diamond">
             <a:avLst/>
@@ -15912,8 +15912,8 @@
         </p:nvCxnSpPr>
         <p:spPr>
           <a:xfrm flipH="1">
-            <a:off x="9193680" y="4114440"/>
-            <a:ext cx="1376280" cy="877680"/>
+            <a:off x="9193320" y="4114440"/>
+            <a:ext cx="1376640" cy="877680"/>
           </a:xfrm>
           <a:prstGeom prst="straightConnector1">
             <a:avLst/>
@@ -15938,8 +15938,8 @@
         </p:nvCxnSpPr>
         <p:spPr>
           <a:xfrm flipH="1">
-            <a:off x="7033320" y="4991760"/>
-            <a:ext cx="594360" cy="189360"/>
+            <a:off x="7032960" y="4991760"/>
+            <a:ext cx="594720" cy="189360"/>
           </a:xfrm>
           <a:prstGeom prst="straightConnector1">
             <a:avLst/>
@@ -15963,8 +15963,8 @@
         </p:nvCxnSpPr>
         <p:spPr>
           <a:xfrm flipH="1" flipV="1">
-            <a:off x="7033320" y="5180760"/>
-            <a:ext cx="594360" cy="340560"/>
+            <a:off x="7032960" y="5180760"/>
+            <a:ext cx="594720" cy="340560"/>
           </a:xfrm>
           <a:prstGeom prst="straightConnector1">
             <a:avLst/>
@@ -15988,8 +15988,8 @@
         </p:nvCxnSpPr>
         <p:spPr>
           <a:xfrm flipH="1">
-            <a:off x="9422280" y="4114440"/>
-            <a:ext cx="1147680" cy="1406880"/>
+            <a:off x="9421920" y="4114440"/>
+            <a:ext cx="1148040" cy="1406880"/>
           </a:xfrm>
           <a:prstGeom prst="straightConnector1">
             <a:avLst/>
@@ -16014,8 +16014,8 @@
         </p:nvCxnSpPr>
         <p:spPr>
           <a:xfrm flipH="1">
-            <a:off x="4162680" y="1105560"/>
-            <a:ext cx="264600" cy="176760"/>
+            <a:off x="4162320" y="1105560"/>
+            <a:ext cx="264960" cy="176760"/>
           </a:xfrm>
           <a:prstGeom prst="straightConnector1">
             <a:avLst/>
@@ -16037,7 +16037,7 @@
         <p:spPr>
           <a:xfrm>
             <a:off x="8053560" y="2057400"/>
-            <a:ext cx="1217880" cy="382320"/>
+            <a:ext cx="1217520" cy="381960"/>
           </a:xfrm>
           <a:prstGeom prst="ellipse">
             <a:avLst/>
@@ -16102,8 +16102,8 @@
         </p:nvCxnSpPr>
         <p:spPr>
           <a:xfrm flipV="1">
-            <a:off x="8662680" y="1825920"/>
-            <a:ext cx="646560" cy="231840"/>
+            <a:off x="8662320" y="1825560"/>
+            <a:ext cx="646560" cy="232200"/>
           </a:xfrm>
           <a:prstGeom prst="straightConnector1">
             <a:avLst/>
@@ -16116,132 +16116,16 @@
           </a:ln>
         </p:spPr>
       </p:cxnSp>
-      <p:sp>
-        <p:nvSpPr>
-          <p:cNvPr id="211" name="Diamond 32"/>
-          <p:cNvSpPr/>
-          <p:nvPr/>
-        </p:nvSpPr>
-        <p:spPr>
-          <a:xfrm>
-            <a:off x="5115600" y="2514600"/>
-            <a:ext cx="1566360" cy="382320"/>
-          </a:xfrm>
-          <a:prstGeom prst="diamond">
-            <a:avLst/>
-          </a:prstGeom>
-          <a:solidFill>
-            <a:schemeClr val="bg1"/>
-          </a:solidFill>
-          <a:ln>
-            <a:solidFill>
-              <a:srgbClr val="000000"/>
-            </a:solidFill>
-          </a:ln>
-        </p:spPr>
-        <p:style>
-          <a:lnRef idx="2">
-            <a:schemeClr val="accent1">
-              <a:shade val="50000"/>
-            </a:schemeClr>
-          </a:lnRef>
-          <a:fillRef idx="1">
-            <a:schemeClr val="accent1"/>
-          </a:fillRef>
-          <a:effectRef idx="0">
-            <a:schemeClr val="accent1"/>
-          </a:effectRef>
-          <a:fontRef idx="minor"/>
-        </p:style>
-        <p:txBody>
-          <a:bodyPr lIns="90000" rIns="90000" tIns="45000" bIns="45000" anchor="ctr">
-            <a:noAutofit/>
-          </a:bodyPr>
-          <a:p>
-            <a:pPr algn="ctr" defTabSz="914400">
-              <a:lnSpc>
-                <a:spcPct val="100000"/>
-              </a:lnSpc>
-            </a:pPr>
-            <a:r>
-              <a:rPr b="0" lang="en-US" sz="1400" spc="-1" strike="noStrike">
-                <a:solidFill>
-                  <a:schemeClr val="dk1"/>
-                </a:solidFill>
-                <a:latin typeface="Calibri"/>
-              </a:rPr>
-              <a:t>Holds</a:t>
-            </a:r>
-            <a:endParaRPr b="0" lang="en-US" sz="1400" spc="-1" strike="noStrike">
-              <a:solidFill>
-                <a:srgbClr val="000000"/>
-              </a:solidFill>
-              <a:latin typeface="Arial"/>
-            </a:endParaRPr>
-          </a:p>
-        </p:txBody>
-      </p:sp>
       <p:cxnSp>
         <p:nvCxnSpPr>
-          <p:cNvPr id="212" name="Straight Arrow Connector 87"/>
+          <p:cNvPr id="211" name="Straight Arrow Connector 87"/>
           <p:cNvCxnSpPr/>
           <p:nvPr/>
         </p:nvCxnSpPr>
         <p:spPr>
           <a:xfrm flipH="1">
             <a:off x="0" y="3657600"/>
-            <a:ext cx="1834200" cy="5400"/>
-          </a:xfrm>
-          <a:prstGeom prst="straightConnector1">
-            <a:avLst/>
-          </a:prstGeom>
-          <a:ln w="25400">
-            <a:solidFill>
-              <a:srgbClr val="000000"/>
-            </a:solidFill>
-            <a:round/>
-          </a:ln>
-        </p:spPr>
-      </p:cxnSp>
-      <p:cxnSp>
-        <p:nvCxnSpPr>
-          <p:cNvPr id="213" name="Straight Arrow Connector 88"/>
-          <p:cNvCxnSpPr>
-            <a:stCxn id="147" idx="3"/>
-            <a:endCxn id="211" idx="0"/>
-          </p:cNvCxnSpPr>
-          <p:nvPr/>
-        </p:nvCxnSpPr>
-        <p:spPr>
-          <a:xfrm>
-            <a:off x="4162680" y="1281960"/>
-            <a:ext cx="1736640" cy="1233000"/>
-          </a:xfrm>
-          <a:prstGeom prst="straightConnector1">
-            <a:avLst/>
-          </a:prstGeom>
-          <a:ln cap="sq" w="76200">
-            <a:solidFill>
-              <a:srgbClr val="000000"/>
-            </a:solidFill>
-            <a:round/>
-            <a:tailEnd len="sm" type="triangle" w="sm"/>
-          </a:ln>
-        </p:spPr>
-      </p:cxnSp>
-      <p:cxnSp>
-        <p:nvCxnSpPr>
-          <p:cNvPr id="214" name="Straight Arrow Connector 89"/>
-          <p:cNvCxnSpPr>
-            <a:stCxn id="211" idx="2"/>
-            <a:endCxn id="189" idx="0"/>
-          </p:cNvCxnSpPr>
-          <p:nvPr/>
-        </p:nvCxnSpPr>
-        <p:spPr>
-          <a:xfrm>
-            <a:off x="5898960" y="2896920"/>
-            <a:ext cx="324000" cy="2132640"/>
+            <a:ext cx="1834560" cy="5760"/>
           </a:xfrm>
           <a:prstGeom prst="straightConnector1">
             <a:avLst/>
@@ -16286,14 +16170,14 @@
       </p:grpSpPr>
       <p:cxnSp>
         <p:nvCxnSpPr>
-          <p:cNvPr id="215" name="Straight Arrow Connector 1"/>
+          <p:cNvPr id="212" name="Straight Arrow Connector 1"/>
           <p:cNvCxnSpPr/>
           <p:nvPr/>
         </p:nvCxnSpPr>
         <p:spPr>
           <a:xfrm flipH="1">
             <a:off x="0" y="3073320"/>
-            <a:ext cx="1834200" cy="5400"/>
+            <a:ext cx="1834560" cy="5760"/>
           </a:xfrm>
           <a:prstGeom prst="straightConnector1">
             <a:avLst/>
@@ -16309,14 +16193,14 @@
       </p:cxnSp>
       <p:cxnSp>
         <p:nvCxnSpPr>
-          <p:cNvPr id="216" name="Straight Arrow Connector 2"/>
+          <p:cNvPr id="213" name="Straight Arrow Connector 2"/>
           <p:cNvCxnSpPr/>
           <p:nvPr/>
         </p:nvCxnSpPr>
         <p:spPr>
           <a:xfrm>
             <a:off x="0" y="2489400"/>
-            <a:ext cx="1834200" cy="5400"/>
+            <a:ext cx="1834560" cy="5760"/>
           </a:xfrm>
           <a:prstGeom prst="straightConnector1">
             <a:avLst/>
@@ -16332,14 +16216,14 @@
       </p:cxnSp>
       <p:cxnSp>
         <p:nvCxnSpPr>
-          <p:cNvPr id="217" name="Straight Arrow Connector 3"/>
+          <p:cNvPr id="214" name="Straight Arrow Connector 3"/>
           <p:cNvCxnSpPr/>
           <p:nvPr/>
         </p:nvCxnSpPr>
         <p:spPr>
           <a:xfrm>
             <a:off x="0" y="2781360"/>
-            <a:ext cx="1834200" cy="5400"/>
+            <a:ext cx="1834560" cy="5760"/>
           </a:xfrm>
           <a:prstGeom prst="straightConnector1">
             <a:avLst/>
@@ -16355,14 +16239,14 @@
       </p:cxnSp>
       <p:cxnSp>
         <p:nvCxnSpPr>
-          <p:cNvPr id="218" name="Straight Arrow Connector 4"/>
+          <p:cNvPr id="215" name="Straight Arrow Connector 4"/>
           <p:cNvCxnSpPr/>
           <p:nvPr/>
         </p:nvCxnSpPr>
         <p:spPr>
           <a:xfrm flipH="1">
             <a:off x="0" y="3657600"/>
-            <a:ext cx="1834200" cy="5400"/>
+            <a:ext cx="1834560" cy="5760"/>
           </a:xfrm>
           <a:prstGeom prst="straightConnector1">
             <a:avLst/>
@@ -16377,14 +16261,14 @@
       </p:cxnSp>
       <p:sp>
         <p:nvSpPr>
-          <p:cNvPr id="219" name="Diamond 1"/>
+          <p:cNvPr id="216" name="Diamond 1"/>
           <p:cNvSpPr/>
           <p:nvPr/>
         </p:nvSpPr>
         <p:spPr>
           <a:xfrm>
             <a:off x="128520" y="6134040"/>
-            <a:ext cx="1566360" cy="382320"/>
+            <a:ext cx="1566000" cy="381960"/>
           </a:xfrm>
           <a:prstGeom prst="diamond">
             <a:avLst/>
@@ -16442,14 +16326,14 @@
       </p:sp>
       <p:sp>
         <p:nvSpPr>
-          <p:cNvPr id="220" name="Oval 1"/>
+          <p:cNvPr id="217" name="Oval 1"/>
           <p:cNvSpPr/>
           <p:nvPr/>
         </p:nvSpPr>
         <p:spPr>
           <a:xfrm>
             <a:off x="302760" y="5454000"/>
-            <a:ext cx="1217880" cy="382320"/>
+            <a:ext cx="1217520" cy="381960"/>
           </a:xfrm>
           <a:prstGeom prst="ellipse">
             <a:avLst/>
@@ -16505,28 +16389,28 @@
       </p:sp>
       <p:grpSp>
         <p:nvGrpSpPr>
-          <p:cNvPr id="221" name="Group 1"/>
+          <p:cNvPr id="218" name="Group 1"/>
           <p:cNvGrpSpPr/>
           <p:nvPr/>
         </p:nvGrpSpPr>
         <p:grpSpPr>
           <a:xfrm>
             <a:off x="101160" y="336240"/>
-            <a:ext cx="1621080" cy="777960"/>
+            <a:ext cx="1620720" cy="777960"/>
             <a:chOff x="101160" y="336240"/>
-            <a:chExt cx="1621080" cy="777960"/>
+            <a:chExt cx="1620720" cy="777960"/>
           </a:xfrm>
         </p:grpSpPr>
         <p:sp>
           <p:nvSpPr>
-            <p:cNvPr id="222" name="TextBox 1"/>
+            <p:cNvPr id="219" name="TextBox 1"/>
             <p:cNvSpPr/>
             <p:nvPr/>
           </p:nvSpPr>
           <p:spPr>
             <a:xfrm>
               <a:off x="101160" y="336240"/>
-              <a:ext cx="1621080" cy="303120"/>
+              <a:ext cx="1620720" cy="303120"/>
             </a:xfrm>
             <a:prstGeom prst="rect">
               <a:avLst/>
@@ -16576,14 +16460,14 @@
         </p:sp>
         <p:sp>
           <p:nvSpPr>
-            <p:cNvPr id="223" name="TextBox 2"/>
+            <p:cNvPr id="220" name="TextBox 2"/>
             <p:cNvSpPr/>
             <p:nvPr/>
           </p:nvSpPr>
           <p:spPr>
             <a:xfrm>
               <a:off x="101160" y="597600"/>
-              <a:ext cx="1621080" cy="516600"/>
+              <a:ext cx="1620720" cy="516600"/>
             </a:xfrm>
             <a:prstGeom prst="rect">
               <a:avLst/>
@@ -16667,14 +16551,14 @@
       </p:grpSp>
       <p:sp>
         <p:nvSpPr>
-          <p:cNvPr id="224" name="Diamond 2"/>
+          <p:cNvPr id="221" name="Diamond 2"/>
           <p:cNvSpPr/>
           <p:nvPr/>
         </p:nvSpPr>
         <p:spPr>
           <a:xfrm>
             <a:off x="128520" y="4629600"/>
-            <a:ext cx="1566360" cy="527040"/>
+            <a:ext cx="1566000" cy="526680"/>
           </a:xfrm>
           <a:prstGeom prst="diamond">
             <a:avLst/>
@@ -16755,14 +16639,14 @@
       </p:sp>
       <p:cxnSp>
         <p:nvCxnSpPr>
-          <p:cNvPr id="225" name="Straight Arrow Connector 5"/>
+          <p:cNvPr id="222" name="Straight Arrow Connector 5"/>
           <p:cNvCxnSpPr/>
           <p:nvPr/>
         </p:nvCxnSpPr>
         <p:spPr>
           <a:xfrm>
             <a:off x="0" y="3365640"/>
-            <a:ext cx="1834200" cy="5400"/>
+            <a:ext cx="1834560" cy="5760"/>
           </a:xfrm>
           <a:prstGeom prst="straightConnector1">
             <a:avLst/>
@@ -16777,14 +16661,14 @@
       </p:cxnSp>
       <p:sp>
         <p:nvSpPr>
-          <p:cNvPr id="226" name="Isosceles Triangle 1"/>
+          <p:cNvPr id="223" name="Isosceles Triangle 1"/>
           <p:cNvSpPr/>
           <p:nvPr/>
         </p:nvSpPr>
         <p:spPr>
           <a:xfrm>
             <a:off x="673200" y="3949920"/>
-            <a:ext cx="477360" cy="382320"/>
+            <a:ext cx="477000" cy="381960"/>
           </a:xfrm>
           <a:prstGeom prst="triangle">
             <a:avLst>
@@ -16844,28 +16728,28 @@
       </p:sp>
       <p:grpSp>
         <p:nvGrpSpPr>
-          <p:cNvPr id="227" name="Group 2"/>
+          <p:cNvPr id="224" name="Group 2"/>
           <p:cNvGrpSpPr/>
           <p:nvPr/>
         </p:nvGrpSpPr>
         <p:grpSpPr>
           <a:xfrm>
             <a:off x="101160" y="1413000"/>
-            <a:ext cx="1621080" cy="777960"/>
+            <a:ext cx="1620720" cy="777960"/>
             <a:chOff x="101160" y="1413000"/>
-            <a:chExt cx="1621080" cy="777960"/>
+            <a:chExt cx="1620720" cy="777960"/>
           </a:xfrm>
         </p:grpSpPr>
         <p:sp>
           <p:nvSpPr>
-            <p:cNvPr id="228" name="TextBox 3"/>
+            <p:cNvPr id="225" name="TextBox 3"/>
             <p:cNvSpPr/>
             <p:nvPr/>
           </p:nvSpPr>
           <p:spPr>
             <a:xfrm>
               <a:off x="101160" y="1413000"/>
-              <a:ext cx="1621080" cy="303120"/>
+              <a:ext cx="1620720" cy="303120"/>
             </a:xfrm>
             <a:prstGeom prst="rect">
               <a:avLst/>
@@ -16916,14 +16800,14 @@
         </p:sp>
         <p:sp>
           <p:nvSpPr>
-            <p:cNvPr id="229" name="TextBox 4"/>
+            <p:cNvPr id="226" name="TextBox 4"/>
             <p:cNvSpPr/>
             <p:nvPr/>
           </p:nvSpPr>
           <p:spPr>
             <a:xfrm>
               <a:off x="101160" y="1674360"/>
-              <a:ext cx="1621080" cy="516600"/>
+              <a:ext cx="1620720" cy="516600"/>
             </a:xfrm>
             <a:prstGeom prst="rect">
               <a:avLst/>
@@ -17008,14 +16892,14 @@
       </p:grpSp>
       <p:sp>
         <p:nvSpPr>
-          <p:cNvPr id="230" name="TextBox 19"/>
+          <p:cNvPr id="227" name="TextBox 19"/>
           <p:cNvSpPr/>
           <p:nvPr/>
         </p:nvSpPr>
         <p:spPr>
           <a:xfrm>
             <a:off x="4775040" y="457200"/>
-            <a:ext cx="1621080" cy="303120"/>
+            <a:ext cx="1620720" cy="303120"/>
           </a:xfrm>
           <a:prstGeom prst="rect">
             <a:avLst/>
@@ -17065,14 +16949,14 @@
       </p:sp>
       <p:sp>
         <p:nvSpPr>
-          <p:cNvPr id="231" name="TextBox 20"/>
+          <p:cNvPr id="228" name="TextBox 20"/>
           <p:cNvSpPr/>
           <p:nvPr/>
         </p:nvSpPr>
         <p:spPr>
           <a:xfrm>
             <a:off x="4775040" y="718560"/>
-            <a:ext cx="1621080" cy="730080"/>
+            <a:ext cx="1620720" cy="730080"/>
           </a:xfrm>
           <a:prstGeom prst="rect">
             <a:avLst/>
@@ -17182,28 +17066,28 @@
       </p:sp>
       <p:grpSp>
         <p:nvGrpSpPr>
-          <p:cNvPr id="232" name="Group 6"/>
+          <p:cNvPr id="229" name="Group 6"/>
           <p:cNvGrpSpPr/>
           <p:nvPr/>
         </p:nvGrpSpPr>
         <p:grpSpPr>
           <a:xfrm>
             <a:off x="4572000" y="4274280"/>
-            <a:ext cx="1621080" cy="991440"/>
+            <a:ext cx="1620720" cy="991440"/>
             <a:chOff x="4572000" y="4274280"/>
-            <a:chExt cx="1621080" cy="991440"/>
+            <a:chExt cx="1620720" cy="991440"/>
           </a:xfrm>
         </p:grpSpPr>
         <p:sp>
           <p:nvSpPr>
-            <p:cNvPr id="233" name="TextBox 21"/>
+            <p:cNvPr id="230" name="TextBox 21"/>
             <p:cNvSpPr/>
             <p:nvPr/>
           </p:nvSpPr>
           <p:spPr>
             <a:xfrm>
               <a:off x="4572000" y="4274280"/>
-              <a:ext cx="1621080" cy="303120"/>
+              <a:ext cx="1620720" cy="303120"/>
             </a:xfrm>
             <a:prstGeom prst="rect">
               <a:avLst/>
@@ -17253,14 +17137,14 @@
         </p:sp>
         <p:sp>
           <p:nvSpPr>
-            <p:cNvPr id="234" name="TextBox 30"/>
+            <p:cNvPr id="231" name="TextBox 30"/>
             <p:cNvSpPr/>
             <p:nvPr/>
           </p:nvSpPr>
           <p:spPr>
             <a:xfrm>
               <a:off x="4572000" y="4535640"/>
-              <a:ext cx="1621080" cy="730080"/>
+              <a:ext cx="1620720" cy="730080"/>
             </a:xfrm>
             <a:prstGeom prst="rect">
               <a:avLst/>
@@ -17371,14 +17255,14 @@
       </p:grpSp>
       <p:sp>
         <p:nvSpPr>
-          <p:cNvPr id="235" name="Diamond 9"/>
+          <p:cNvPr id="232" name="Diamond 9"/>
           <p:cNvSpPr/>
           <p:nvPr/>
         </p:nvSpPr>
         <p:spPr>
           <a:xfrm>
             <a:off x="3231360" y="2899800"/>
-            <a:ext cx="1566360" cy="382320"/>
+            <a:ext cx="1566000" cy="381960"/>
           </a:xfrm>
           <a:prstGeom prst="diamond">
             <a:avLst/>
@@ -17436,14 +17320,14 @@
       </p:sp>
       <p:sp>
         <p:nvSpPr>
-          <p:cNvPr id="236" name="Diamond 10"/>
+          <p:cNvPr id="233" name="Diamond 10"/>
           <p:cNvSpPr/>
           <p:nvPr/>
         </p:nvSpPr>
         <p:spPr>
           <a:xfrm>
             <a:off x="4602960" y="2585160"/>
-            <a:ext cx="1794960" cy="383760"/>
+            <a:ext cx="1794600" cy="383400"/>
           </a:xfrm>
           <a:prstGeom prst="diamond">
             <a:avLst/>
@@ -17501,17 +17385,17 @@
       </p:sp>
       <p:cxnSp>
         <p:nvCxnSpPr>
-          <p:cNvPr id="237" name="Straight Arrow Connector 24"/>
+          <p:cNvPr id="234" name="Straight Arrow Connector 24"/>
           <p:cNvCxnSpPr>
-            <a:stCxn id="232" idx="0"/>
-            <a:endCxn id="235" idx="2"/>
+            <a:stCxn id="229" idx="0"/>
+            <a:endCxn id="232" idx="2"/>
           </p:cNvCxnSpPr>
           <p:nvPr/>
         </p:nvCxnSpPr>
         <p:spPr>
           <a:xfrm flipH="1" flipV="1">
-            <a:off x="4014720" y="3282120"/>
-            <a:ext cx="1368000" cy="992520"/>
+            <a:off x="4014360" y="3281760"/>
+            <a:ext cx="1368360" cy="992880"/>
           </a:xfrm>
           <a:prstGeom prst="straightConnector1">
             <a:avLst/>
@@ -17527,10 +17411,10 @@
       </p:cxnSp>
       <p:cxnSp>
         <p:nvCxnSpPr>
-          <p:cNvPr id="238" name="Straight Arrow Connector 18"/>
+          <p:cNvPr id="235" name="Straight Arrow Connector 18"/>
           <p:cNvCxnSpPr>
-            <a:stCxn id="236" idx="0"/>
-            <a:endCxn id="231" idx="2"/>
+            <a:stCxn id="233" idx="0"/>
+            <a:endCxn id="228" idx="2"/>
           </p:cNvCxnSpPr>
           <p:nvPr/>
         </p:nvCxnSpPr>
@@ -17552,17 +17436,17 @@
       </p:cxnSp>
       <p:cxnSp>
         <p:nvCxnSpPr>
-          <p:cNvPr id="239" name="Straight Arrow Connector 17"/>
+          <p:cNvPr id="236" name="Straight Arrow Connector 17"/>
           <p:cNvCxnSpPr>
-            <a:stCxn id="232" idx="0"/>
-            <a:endCxn id="236" idx="2"/>
+            <a:stCxn id="229" idx="0"/>
+            <a:endCxn id="233" idx="2"/>
           </p:cNvCxnSpPr>
           <p:nvPr/>
         </p:nvCxnSpPr>
         <p:spPr>
           <a:xfrm flipV="1">
-            <a:off x="5382360" y="2968920"/>
-            <a:ext cx="118440" cy="1305720"/>
+            <a:off x="5382360" y="2968560"/>
+            <a:ext cx="118440" cy="1306080"/>
           </a:xfrm>
           <a:prstGeom prst="straightConnector1">
             <a:avLst/>
@@ -17577,17 +17461,17 @@
       </p:cxnSp>
       <p:cxnSp>
         <p:nvCxnSpPr>
-          <p:cNvPr id="240" name="Straight Arrow Connector 23"/>
+          <p:cNvPr id="237" name="Straight Arrow Connector 23"/>
           <p:cNvCxnSpPr>
-            <a:stCxn id="231" idx="2"/>
-            <a:endCxn id="235" idx="0"/>
+            <a:stCxn id="228" idx="2"/>
+            <a:endCxn id="232" idx="0"/>
           </p:cNvCxnSpPr>
           <p:nvPr/>
         </p:nvCxnSpPr>
         <p:spPr>
           <a:xfrm flipH="1">
-            <a:off x="4014720" y="1448640"/>
-            <a:ext cx="1571040" cy="1451520"/>
+            <a:off x="4014360" y="1448640"/>
+            <a:ext cx="1571400" cy="1451520"/>
           </a:xfrm>
           <a:prstGeom prst="straightConnector1">
             <a:avLst/>
@@ -17602,14 +17486,14 @@
       </p:cxnSp>
       <p:sp>
         <p:nvSpPr>
-          <p:cNvPr id="241" name="Diamond 11"/>
+          <p:cNvPr id="238" name="Diamond 11"/>
           <p:cNvSpPr/>
           <p:nvPr/>
         </p:nvSpPr>
         <p:spPr>
           <a:xfrm>
             <a:off x="2743200" y="457200"/>
-            <a:ext cx="1566360" cy="382320"/>
+            <a:ext cx="1566000" cy="381960"/>
           </a:xfrm>
           <a:prstGeom prst="diamond">
             <a:avLst/>
@@ -17667,17 +17551,17 @@
       </p:sp>
       <p:cxnSp>
         <p:nvCxnSpPr>
-          <p:cNvPr id="242" name="Straight Arrow Connector 25"/>
+          <p:cNvPr id="239" name="Straight Arrow Connector 25"/>
           <p:cNvCxnSpPr>
-            <a:stCxn id="231" idx="1"/>
-            <a:endCxn id="241" idx="3"/>
+            <a:stCxn id="228" idx="1"/>
+            <a:endCxn id="238" idx="3"/>
           </p:cNvCxnSpPr>
           <p:nvPr/>
         </p:nvCxnSpPr>
         <p:spPr>
           <a:xfrm flipH="1" flipV="1">
-            <a:off x="4309560" y="648360"/>
-            <a:ext cx="465840" cy="435600"/>
+            <a:off x="4309200" y="648360"/>
+            <a:ext cx="466200" cy="435600"/>
           </a:xfrm>
           <a:prstGeom prst="straightConnector1">
             <a:avLst/>
@@ -17692,17 +17576,17 @@
       </p:cxnSp>
       <p:cxnSp>
         <p:nvCxnSpPr>
-          <p:cNvPr id="243" name="Straight Arrow Connector 26"/>
+          <p:cNvPr id="240" name="Straight Arrow Connector 26"/>
           <p:cNvCxnSpPr>
-            <a:stCxn id="231" idx="1"/>
-            <a:endCxn id="241" idx="2"/>
+            <a:stCxn id="228" idx="1"/>
+            <a:endCxn id="238" idx="2"/>
           </p:cNvCxnSpPr>
           <p:nvPr/>
         </p:nvCxnSpPr>
         <p:spPr>
           <a:xfrm flipH="1" flipV="1">
-            <a:off x="3526560" y="839520"/>
-            <a:ext cx="1248840" cy="244440"/>
+            <a:off x="3526200" y="839160"/>
+            <a:ext cx="1249200" cy="244800"/>
           </a:xfrm>
           <a:prstGeom prst="straightConnector1">
             <a:avLst/>
@@ -17717,28 +17601,28 @@
       </p:cxnSp>
       <p:grpSp>
         <p:nvGrpSpPr>
-          <p:cNvPr id="244" name="Group 7"/>
+          <p:cNvPr id="241" name="Group 7"/>
           <p:cNvGrpSpPr/>
           <p:nvPr/>
         </p:nvGrpSpPr>
         <p:grpSpPr>
           <a:xfrm>
             <a:off x="8686800" y="837360"/>
-            <a:ext cx="1621080" cy="991440"/>
+            <a:ext cx="1620720" cy="991440"/>
             <a:chOff x="8686800" y="837360"/>
-            <a:chExt cx="1621080" cy="991440"/>
+            <a:chExt cx="1620720" cy="991440"/>
           </a:xfrm>
         </p:grpSpPr>
         <p:sp>
           <p:nvSpPr>
-            <p:cNvPr id="245" name="TextBox 31"/>
+            <p:cNvPr id="242" name="TextBox 31"/>
             <p:cNvSpPr/>
             <p:nvPr/>
           </p:nvSpPr>
           <p:spPr>
             <a:xfrm>
               <a:off x="8686800" y="837360"/>
-              <a:ext cx="1621080" cy="303120"/>
+              <a:ext cx="1620720" cy="303120"/>
             </a:xfrm>
             <a:prstGeom prst="rect">
               <a:avLst/>
@@ -17788,14 +17672,14 @@
         </p:sp>
         <p:sp>
           <p:nvSpPr>
-            <p:cNvPr id="246" name="TextBox 32"/>
+            <p:cNvPr id="243" name="TextBox 32"/>
             <p:cNvSpPr/>
             <p:nvPr/>
           </p:nvSpPr>
           <p:spPr>
             <a:xfrm>
               <a:off x="8686800" y="1098720"/>
-              <a:ext cx="1621080" cy="730080"/>
+              <a:ext cx="1620720" cy="730080"/>
             </a:xfrm>
             <a:prstGeom prst="rect">
               <a:avLst/>
@@ -17906,14 +17790,14 @@
       </p:grpSp>
       <p:sp>
         <p:nvSpPr>
-          <p:cNvPr id="247" name="Diamond 12"/>
+          <p:cNvPr id="244" name="Diamond 12"/>
           <p:cNvSpPr/>
           <p:nvPr/>
         </p:nvSpPr>
         <p:spPr>
           <a:xfrm>
             <a:off x="128880" y="6134040"/>
-            <a:ext cx="1566360" cy="382320"/>
+            <a:ext cx="1566000" cy="381960"/>
           </a:xfrm>
           <a:prstGeom prst="diamond">
             <a:avLst/>
@@ -17971,14 +17855,14 @@
       </p:sp>
       <p:sp>
         <p:nvSpPr>
-          <p:cNvPr id="248" name="Diamond 13"/>
+          <p:cNvPr id="245" name="Diamond 13"/>
           <p:cNvSpPr/>
           <p:nvPr/>
         </p:nvSpPr>
         <p:spPr>
           <a:xfrm>
             <a:off x="7315200" y="228600"/>
-            <a:ext cx="1566360" cy="382320"/>
+            <a:ext cx="1566000" cy="381960"/>
           </a:xfrm>
           <a:prstGeom prst="diamond">
             <a:avLst/>
@@ -18036,14 +17920,14 @@
       </p:sp>
       <p:cxnSp>
         <p:nvCxnSpPr>
-          <p:cNvPr id="249" name="Straight Arrow Connector 27"/>
+          <p:cNvPr id="246" name="Straight Arrow Connector 27"/>
           <p:cNvCxnSpPr/>
           <p:nvPr/>
         </p:nvCxnSpPr>
         <p:spPr>
           <a:xfrm>
             <a:off x="360" y="3366000"/>
-            <a:ext cx="1834200" cy="5400"/>
+            <a:ext cx="1834560" cy="5760"/>
           </a:xfrm>
           <a:prstGeom prst="straightConnector1">
             <a:avLst/>
@@ -18058,17 +17942,17 @@
       </p:cxnSp>
       <p:cxnSp>
         <p:nvCxnSpPr>
-          <p:cNvPr id="250" name="Straight Arrow Connector 28"/>
+          <p:cNvPr id="247" name="Straight Arrow Connector 28"/>
           <p:cNvCxnSpPr>
-            <a:stCxn id="248" idx="1"/>
-            <a:endCxn id="231" idx="3"/>
+            <a:stCxn id="245" idx="1"/>
+            <a:endCxn id="228" idx="3"/>
           </p:cNvCxnSpPr>
           <p:nvPr/>
         </p:nvCxnSpPr>
         <p:spPr>
           <a:xfrm flipH="1">
-            <a:off x="6396120" y="419760"/>
-            <a:ext cx="919440" cy="664200"/>
+            <a:off x="6395760" y="419760"/>
+            <a:ext cx="919800" cy="664200"/>
           </a:xfrm>
           <a:prstGeom prst="straightConnector1">
             <a:avLst/>
@@ -18083,14 +17967,14 @@
       </p:cxnSp>
       <p:sp>
         <p:nvSpPr>
-          <p:cNvPr id="251" name="Diamond 14"/>
+          <p:cNvPr id="248" name="Diamond 14"/>
           <p:cNvSpPr/>
           <p:nvPr/>
         </p:nvSpPr>
         <p:spPr>
           <a:xfrm>
             <a:off x="6629400" y="1442160"/>
-            <a:ext cx="1825560" cy="612000"/>
+            <a:ext cx="1825200" cy="611640"/>
           </a:xfrm>
           <a:prstGeom prst="diamond">
             <a:avLst/>
@@ -18148,17 +18032,17 @@
       </p:sp>
       <p:cxnSp>
         <p:nvCxnSpPr>
-          <p:cNvPr id="252" name="Straight Arrow Connector 30"/>
+          <p:cNvPr id="249" name="Straight Arrow Connector 30"/>
           <p:cNvCxnSpPr>
-            <a:stCxn id="244" idx="0"/>
-            <a:endCxn id="248" idx="3"/>
+            <a:stCxn id="241" idx="0"/>
+            <a:endCxn id="245" idx="3"/>
           </p:cNvCxnSpPr>
           <p:nvPr/>
         </p:nvCxnSpPr>
         <p:spPr>
           <a:xfrm flipH="1" flipV="1">
-            <a:off x="8881560" y="419760"/>
-            <a:ext cx="615960" cy="417960"/>
+            <a:off x="8881200" y="419760"/>
+            <a:ext cx="616320" cy="417960"/>
           </a:xfrm>
           <a:prstGeom prst="straightConnector1">
             <a:avLst/>
@@ -18174,14 +18058,14 @@
       </p:cxnSp>
       <p:sp>
         <p:nvSpPr>
-          <p:cNvPr id="253" name="Diamond 15"/>
+          <p:cNvPr id="250" name="Diamond 15"/>
           <p:cNvSpPr/>
           <p:nvPr/>
         </p:nvSpPr>
         <p:spPr>
           <a:xfrm>
             <a:off x="6629400" y="2514600"/>
-            <a:ext cx="1566360" cy="382320"/>
+            <a:ext cx="1566000" cy="381960"/>
           </a:xfrm>
           <a:prstGeom prst="diamond">
             <a:avLst/>
@@ -18239,17 +18123,17 @@
       </p:sp>
       <p:cxnSp>
         <p:nvCxnSpPr>
-          <p:cNvPr id="254" name="Straight Arrow Connector 32"/>
+          <p:cNvPr id="251" name="Straight Arrow Connector 32"/>
           <p:cNvCxnSpPr>
-            <a:stCxn id="244" idx="2"/>
-            <a:endCxn id="253" idx="3"/>
+            <a:stCxn id="241" idx="2"/>
+            <a:endCxn id="250" idx="3"/>
           </p:cNvCxnSpPr>
           <p:nvPr/>
         </p:nvCxnSpPr>
         <p:spPr>
           <a:xfrm flipH="1">
-            <a:off x="8195760" y="1828800"/>
-            <a:ext cx="1301760" cy="877320"/>
+            <a:off x="8195400" y="1828800"/>
+            <a:ext cx="1302120" cy="877320"/>
           </a:xfrm>
           <a:prstGeom prst="straightConnector1">
             <a:avLst/>
@@ -18264,17 +18148,17 @@
       </p:cxnSp>
       <p:cxnSp>
         <p:nvCxnSpPr>
-          <p:cNvPr id="255" name="Straight Arrow Connector 33"/>
+          <p:cNvPr id="252" name="Straight Arrow Connector 33"/>
           <p:cNvCxnSpPr>
-            <a:stCxn id="253" idx="1"/>
-            <a:endCxn id="232" idx="3"/>
+            <a:stCxn id="250" idx="1"/>
+            <a:endCxn id="229" idx="3"/>
           </p:cNvCxnSpPr>
           <p:nvPr/>
         </p:nvCxnSpPr>
         <p:spPr>
           <a:xfrm flipH="1">
-            <a:off x="6193080" y="2705760"/>
-            <a:ext cx="436680" cy="2064600"/>
+            <a:off x="6192720" y="2705760"/>
+            <a:ext cx="437040" cy="2064600"/>
           </a:xfrm>
           <a:prstGeom prst="straightConnector1">
             <a:avLst/>
@@ -18289,17 +18173,17 @@
       </p:cxnSp>
       <p:cxnSp>
         <p:nvCxnSpPr>
-          <p:cNvPr id="256" name="Straight Arrow Connector 34"/>
+          <p:cNvPr id="253" name="Straight Arrow Connector 34"/>
           <p:cNvCxnSpPr>
-            <a:stCxn id="244" idx="1"/>
-            <a:endCxn id="251" idx="3"/>
+            <a:stCxn id="241" idx="1"/>
+            <a:endCxn id="248" idx="3"/>
           </p:cNvCxnSpPr>
           <p:nvPr/>
         </p:nvCxnSpPr>
         <p:spPr>
           <a:xfrm flipH="1">
-            <a:off x="8454960" y="1333080"/>
-            <a:ext cx="232200" cy="415440"/>
+            <a:off x="8454600" y="1333080"/>
+            <a:ext cx="232560" cy="415440"/>
           </a:xfrm>
           <a:prstGeom prst="straightConnector1">
             <a:avLst/>
@@ -18314,10 +18198,10 @@
       </p:cxnSp>
       <p:cxnSp>
         <p:nvCxnSpPr>
-          <p:cNvPr id="257" name="Straight Arrow Connector 31"/>
+          <p:cNvPr id="254" name="Straight Arrow Connector 31"/>
           <p:cNvCxnSpPr>
-            <a:stCxn id="251" idx="1"/>
-            <a:endCxn id="231" idx="2"/>
+            <a:stCxn id="248" idx="1"/>
+            <a:endCxn id="228" idx="2"/>
           </p:cNvCxnSpPr>
           <p:nvPr/>
         </p:nvCxnSpPr>
@@ -18339,28 +18223,28 @@
       </p:cxnSp>
       <p:grpSp>
         <p:nvGrpSpPr>
-          <p:cNvPr id="258" name="Group 11"/>
+          <p:cNvPr id="255" name="Group 11"/>
           <p:cNvGrpSpPr/>
           <p:nvPr/>
         </p:nvGrpSpPr>
         <p:grpSpPr>
           <a:xfrm>
             <a:off x="101160" y="336240"/>
-            <a:ext cx="1621080" cy="777960"/>
+            <a:ext cx="1620720" cy="777960"/>
             <a:chOff x="101160" y="336240"/>
-            <a:chExt cx="1621080" cy="777960"/>
+            <a:chExt cx="1620720" cy="777960"/>
           </a:xfrm>
         </p:grpSpPr>
         <p:sp>
           <p:nvSpPr>
-            <p:cNvPr id="259" name="TextBox 51"/>
+            <p:cNvPr id="256" name="TextBox 51"/>
             <p:cNvSpPr/>
             <p:nvPr/>
           </p:nvSpPr>
           <p:spPr>
             <a:xfrm>
               <a:off x="101160" y="336240"/>
-              <a:ext cx="1621080" cy="303120"/>
+              <a:ext cx="1620720" cy="303120"/>
             </a:xfrm>
             <a:prstGeom prst="rect">
               <a:avLst/>
@@ -18410,14 +18294,14 @@
         </p:sp>
         <p:sp>
           <p:nvSpPr>
-            <p:cNvPr id="260" name="TextBox 52"/>
+            <p:cNvPr id="257" name="TextBox 52"/>
             <p:cNvSpPr/>
             <p:nvPr/>
           </p:nvSpPr>
           <p:spPr>
             <a:xfrm>
               <a:off x="101160" y="597600"/>
-              <a:ext cx="1621080" cy="516600"/>
+              <a:ext cx="1620720" cy="516600"/>
             </a:xfrm>
             <a:prstGeom prst="rect">
               <a:avLst/>
@@ -18501,28 +18385,28 @@
       </p:grpSp>
       <p:grpSp>
         <p:nvGrpSpPr>
-          <p:cNvPr id="261" name="Group 14"/>
+          <p:cNvPr id="258" name="Group 14"/>
           <p:cNvGrpSpPr/>
           <p:nvPr/>
         </p:nvGrpSpPr>
         <p:grpSpPr>
           <a:xfrm>
             <a:off x="6760440" y="4359960"/>
-            <a:ext cx="1621080" cy="561240"/>
+            <a:ext cx="1620720" cy="560880"/>
             <a:chOff x="6760440" y="4359960"/>
-            <a:chExt cx="1621080" cy="561240"/>
+            <a:chExt cx="1620720" cy="560880"/>
           </a:xfrm>
         </p:grpSpPr>
         <p:sp>
           <p:nvSpPr>
-            <p:cNvPr id="262" name="TextBox 55"/>
+            <p:cNvPr id="259" name="TextBox 55"/>
             <p:cNvSpPr/>
             <p:nvPr/>
           </p:nvSpPr>
           <p:spPr>
             <a:xfrm>
               <a:off x="6760440" y="4359960"/>
-              <a:ext cx="1621080" cy="303120"/>
+              <a:ext cx="1620720" cy="303120"/>
             </a:xfrm>
             <a:prstGeom prst="rect">
               <a:avLst/>
@@ -18572,14 +18456,14 @@
         </p:sp>
         <p:sp>
           <p:nvSpPr>
-            <p:cNvPr id="263" name="TextBox 56"/>
+            <p:cNvPr id="260" name="TextBox 56"/>
             <p:cNvSpPr/>
             <p:nvPr/>
           </p:nvSpPr>
           <p:spPr>
             <a:xfrm>
               <a:off x="6760440" y="4621320"/>
-              <a:ext cx="1621080" cy="299880"/>
+              <a:ext cx="1620720" cy="299520"/>
             </a:xfrm>
             <a:prstGeom prst="rect">
               <a:avLst/>
@@ -18621,14 +18505,14 @@
       </p:grpSp>
       <p:sp>
         <p:nvSpPr>
-          <p:cNvPr id="264" name="Isosceles Triangle 6"/>
+          <p:cNvPr id="261" name="Isosceles Triangle 6"/>
           <p:cNvSpPr/>
           <p:nvPr/>
         </p:nvSpPr>
         <p:spPr>
           <a:xfrm>
             <a:off x="9144000" y="2057400"/>
-            <a:ext cx="477360" cy="382320"/>
+            <a:ext cx="477000" cy="381960"/>
           </a:xfrm>
           <a:prstGeom prst="triangle">
             <a:avLst>
@@ -18688,16 +18572,16 @@
       </p:sp>
       <p:cxnSp>
         <p:nvCxnSpPr>
-          <p:cNvPr id="265" name="Straight Arrow Connector 51"/>
+          <p:cNvPr id="262" name="Straight Arrow Connector 51"/>
           <p:cNvCxnSpPr>
-            <a:stCxn id="266" idx="3"/>
+            <a:stCxn id="263" idx="3"/>
           </p:cNvCxnSpPr>
           <p:nvPr/>
         </p:nvCxnSpPr>
         <p:spPr>
           <a:xfrm flipH="1">
-            <a:off x="8026200" y="4111560"/>
-            <a:ext cx="1434240" cy="251640"/>
+            <a:off x="8026200" y="4111200"/>
+            <a:ext cx="1434240" cy="252360"/>
           </a:xfrm>
           <a:prstGeom prst="straightConnector1">
             <a:avLst/>
@@ -18712,16 +18596,16 @@
       </p:cxnSp>
       <p:cxnSp>
         <p:nvCxnSpPr>
-          <p:cNvPr id="267" name="Straight Arrow Connector 53"/>
+          <p:cNvPr id="264" name="Straight Arrow Connector 53"/>
           <p:cNvCxnSpPr>
-            <a:endCxn id="266" idx="3"/>
+            <a:endCxn id="263" idx="3"/>
           </p:cNvCxnSpPr>
           <p:nvPr/>
         </p:nvCxnSpPr>
         <p:spPr>
           <a:xfrm flipH="1" flipV="1">
-            <a:off x="9460080" y="4111560"/>
-            <a:ext cx="474480" cy="233280"/>
+            <a:off x="9460080" y="4111200"/>
+            <a:ext cx="474840" cy="234000"/>
           </a:xfrm>
           <a:prstGeom prst="straightConnector1">
             <a:avLst/>
@@ -18736,16 +18620,16 @@
       </p:cxnSp>
       <p:cxnSp>
         <p:nvCxnSpPr>
-          <p:cNvPr id="268" name="Straight Arrow Connector 54"/>
+          <p:cNvPr id="265" name="Straight Arrow Connector 54"/>
           <p:cNvCxnSpPr>
-            <a:stCxn id="264" idx="3"/>
+            <a:stCxn id="261" idx="3"/>
           </p:cNvCxnSpPr>
           <p:nvPr/>
         </p:nvCxnSpPr>
         <p:spPr>
           <a:xfrm flipH="1">
-            <a:off x="9346320" y="2439720"/>
-            <a:ext cx="36720" cy="443160"/>
+            <a:off x="9346320" y="2439360"/>
+            <a:ext cx="36720" cy="443880"/>
           </a:xfrm>
           <a:prstGeom prst="straightConnector1">
             <a:avLst/>
@@ -18760,10 +18644,10 @@
       </p:cxnSp>
       <p:cxnSp>
         <p:nvCxnSpPr>
-          <p:cNvPr id="269" name="Straight Arrow Connector 55"/>
+          <p:cNvPr id="266" name="Straight Arrow Connector 55"/>
           <p:cNvCxnSpPr>
-            <a:stCxn id="244" idx="2"/>
-            <a:endCxn id="264" idx="0"/>
+            <a:stCxn id="241" idx="2"/>
+            <a:endCxn id="261" idx="0"/>
           </p:cNvCxnSpPr>
           <p:nvPr/>
         </p:nvCxnSpPr>
@@ -18785,14 +18669,14 @@
       </p:cxnSp>
       <p:sp>
         <p:nvSpPr>
-          <p:cNvPr id="270" name="TextBox 73"/>
+          <p:cNvPr id="267" name="TextBox 73"/>
           <p:cNvSpPr/>
           <p:nvPr/>
         </p:nvSpPr>
         <p:spPr>
           <a:xfrm>
             <a:off x="7089840" y="5715000"/>
-            <a:ext cx="1621080" cy="303120"/>
+            <a:ext cx="1620720" cy="303120"/>
           </a:xfrm>
           <a:prstGeom prst="rect">
             <a:avLst/>
@@ -18842,14 +18726,14 @@
       </p:sp>
       <p:sp>
         <p:nvSpPr>
-          <p:cNvPr id="271" name="Diamond 21"/>
+          <p:cNvPr id="268" name="Diamond 21"/>
           <p:cNvSpPr/>
           <p:nvPr/>
         </p:nvSpPr>
         <p:spPr>
           <a:xfrm>
             <a:off x="6760440" y="5183280"/>
-            <a:ext cx="1824480" cy="382320"/>
+            <a:ext cx="1824120" cy="381960"/>
           </a:xfrm>
           <a:prstGeom prst="diamond">
             <a:avLst/>
@@ -18907,14 +18791,14 @@
       </p:sp>
       <p:cxnSp>
         <p:nvCxnSpPr>
-          <p:cNvPr id="272" name="Straight Arrow Connector 56"/>
+          <p:cNvPr id="269" name="Straight Arrow Connector 56"/>
           <p:cNvCxnSpPr/>
           <p:nvPr/>
         </p:nvCxnSpPr>
         <p:spPr>
           <a:xfrm flipH="1">
             <a:off x="0" y="3657600"/>
-            <a:ext cx="1834200" cy="5400"/>
+            <a:ext cx="1834560" cy="5760"/>
           </a:xfrm>
           <a:prstGeom prst="straightConnector1">
             <a:avLst/>
@@ -18929,28 +18813,28 @@
       </p:cxnSp>
       <p:grpSp>
         <p:nvGrpSpPr>
-          <p:cNvPr id="273" name="Group 12"/>
+          <p:cNvPr id="270" name="Group 12"/>
           <p:cNvGrpSpPr/>
           <p:nvPr/>
         </p:nvGrpSpPr>
         <p:grpSpPr>
           <a:xfrm>
             <a:off x="8534520" y="2879640"/>
-            <a:ext cx="1621080" cy="561960"/>
+            <a:ext cx="1620720" cy="561600"/>
             <a:chOff x="8534520" y="2879640"/>
-            <a:chExt cx="1621080" cy="561960"/>
+            <a:chExt cx="1620720" cy="561600"/>
           </a:xfrm>
         </p:grpSpPr>
         <p:sp>
           <p:nvSpPr>
-            <p:cNvPr id="274" name="TextBox 23"/>
+            <p:cNvPr id="271" name="TextBox 23"/>
             <p:cNvSpPr/>
             <p:nvPr/>
           </p:nvSpPr>
           <p:spPr>
             <a:xfrm>
               <a:off x="8534520" y="2879640"/>
-              <a:ext cx="1621080" cy="303120"/>
+              <a:ext cx="1620720" cy="303120"/>
             </a:xfrm>
             <a:prstGeom prst="rect">
               <a:avLst/>
@@ -19000,14 +18884,14 @@
         </p:sp>
         <p:sp>
           <p:nvSpPr>
-            <p:cNvPr id="275" name="TextBox 24"/>
+            <p:cNvPr id="272" name="TextBox 24"/>
             <p:cNvSpPr/>
             <p:nvPr/>
           </p:nvSpPr>
           <p:spPr>
             <a:xfrm>
               <a:off x="8534520" y="3141000"/>
-              <a:ext cx="1621080" cy="300600"/>
+              <a:ext cx="1620720" cy="300240"/>
             </a:xfrm>
             <a:prstGeom prst="rect">
               <a:avLst/>
@@ -19049,28 +18933,28 @@
       </p:grpSp>
       <p:grpSp>
         <p:nvGrpSpPr>
-          <p:cNvPr id="276" name="Group 16"/>
+          <p:cNvPr id="273" name="Group 16"/>
           <p:cNvGrpSpPr/>
           <p:nvPr/>
         </p:nvGrpSpPr>
         <p:grpSpPr>
           <a:xfrm>
             <a:off x="8534520" y="2879640"/>
-            <a:ext cx="1621080" cy="564480"/>
+            <a:ext cx="1620720" cy="564480"/>
             <a:chOff x="8534520" y="2879640"/>
-            <a:chExt cx="1621080" cy="564480"/>
+            <a:chExt cx="1620720" cy="564480"/>
           </a:xfrm>
         </p:grpSpPr>
         <p:sp>
           <p:nvSpPr>
-            <p:cNvPr id="277" name="TextBox 40"/>
+            <p:cNvPr id="274" name="TextBox 40"/>
             <p:cNvSpPr/>
             <p:nvPr/>
           </p:nvSpPr>
           <p:spPr>
             <a:xfrm>
               <a:off x="8534520" y="2879640"/>
-              <a:ext cx="1621080" cy="303120"/>
+              <a:ext cx="1620720" cy="303120"/>
             </a:xfrm>
             <a:prstGeom prst="rect">
               <a:avLst/>
@@ -19120,14 +19004,14 @@
         </p:sp>
         <p:sp>
           <p:nvSpPr>
-            <p:cNvPr id="278" name="TextBox 59"/>
+            <p:cNvPr id="275" name="TextBox 59"/>
             <p:cNvSpPr/>
             <p:nvPr/>
           </p:nvSpPr>
           <p:spPr>
             <a:xfrm>
               <a:off x="8534520" y="3141000"/>
-              <a:ext cx="1621080" cy="303120"/>
+              <a:ext cx="1620720" cy="303120"/>
             </a:xfrm>
             <a:prstGeom prst="rect">
               <a:avLst/>
@@ -19183,14 +19067,14 @@
       </p:grpSp>
       <p:sp>
         <p:nvSpPr>
-          <p:cNvPr id="266" name="Isosceles Triangle 7"/>
+          <p:cNvPr id="263" name="Isosceles Triangle 7"/>
           <p:cNvSpPr/>
           <p:nvPr/>
         </p:nvSpPr>
         <p:spPr>
           <a:xfrm>
             <a:off x="9221400" y="3729240"/>
-            <a:ext cx="477360" cy="382320"/>
+            <a:ext cx="477000" cy="381960"/>
           </a:xfrm>
           <a:prstGeom prst="triangle">
             <a:avLst>
@@ -19250,10 +19134,10 @@
       </p:sp>
       <p:cxnSp>
         <p:nvCxnSpPr>
-          <p:cNvPr id="279" name="Straight Arrow Connector 80"/>
+          <p:cNvPr id="276" name="Straight Arrow Connector 80"/>
           <p:cNvCxnSpPr>
-            <a:stCxn id="276" idx="2"/>
-            <a:endCxn id="266" idx="0"/>
+            <a:stCxn id="273" idx="2"/>
+            <a:endCxn id="263" idx="0"/>
           </p:cNvCxnSpPr>
           <p:nvPr/>
         </p:nvCxnSpPr>
@@ -19275,14 +19159,14 @@
       </p:cxnSp>
       <p:cxnSp>
         <p:nvCxnSpPr>
-          <p:cNvPr id="280" name="Straight Arrow Connector 52"/>
+          <p:cNvPr id="277" name="Straight Arrow Connector 52"/>
           <p:cNvCxnSpPr/>
           <p:nvPr/>
         </p:nvCxnSpPr>
         <p:spPr>
           <a:xfrm>
             <a:off x="8556840" y="3657600"/>
-            <a:ext cx="1834200" cy="5400"/>
+            <a:ext cx="1834560" cy="5760"/>
           </a:xfrm>
           <a:prstGeom prst="straightConnector1">
             <a:avLst/>
@@ -19298,14 +19182,14 @@
       </p:cxnSp>
       <p:sp>
         <p:nvSpPr>
-          <p:cNvPr id="281" name=""/>
+          <p:cNvPr id="278" name=""/>
           <p:cNvSpPr/>
           <p:nvPr/>
         </p:nvSpPr>
         <p:spPr>
           <a:xfrm>
             <a:off x="9601200" y="3382920"/>
-            <a:ext cx="911160" cy="343080"/>
+            <a:ext cx="910800" cy="342720"/>
           </a:xfrm>
           <a:prstGeom prst="rect">
             <a:avLst/>
@@ -19351,14 +19235,14 @@
       </p:sp>
       <p:sp>
         <p:nvSpPr>
-          <p:cNvPr id="282" name="TextBox 49"/>
+          <p:cNvPr id="279" name="TextBox 49"/>
           <p:cNvSpPr/>
           <p:nvPr/>
         </p:nvSpPr>
         <p:spPr>
           <a:xfrm>
             <a:off x="2057400" y="2132280"/>
-            <a:ext cx="1621080" cy="303120"/>
+            <a:ext cx="1620720" cy="303120"/>
           </a:xfrm>
           <a:prstGeom prst="rect">
             <a:avLst/>
@@ -19408,14 +19292,14 @@
       </p:sp>
       <p:sp>
         <p:nvSpPr>
-          <p:cNvPr id="283" name="TextBox 50"/>
+          <p:cNvPr id="280" name="TextBox 50"/>
           <p:cNvSpPr/>
           <p:nvPr/>
         </p:nvSpPr>
         <p:spPr>
           <a:xfrm>
             <a:off x="2057400" y="2393640"/>
-            <a:ext cx="1621080" cy="192600"/>
+            <a:ext cx="1620720" cy="192240"/>
           </a:xfrm>
           <a:prstGeom prst="rect">
             <a:avLst/>
@@ -19456,14 +19340,14 @@
       </p:sp>
       <p:sp>
         <p:nvSpPr>
-          <p:cNvPr id="284" name="Isosceles Triangle 8"/>
+          <p:cNvPr id="281" name="Isosceles Triangle 8"/>
           <p:cNvSpPr/>
           <p:nvPr/>
         </p:nvSpPr>
         <p:spPr>
           <a:xfrm>
             <a:off x="2613960" y="1217880"/>
-            <a:ext cx="477360" cy="382320"/>
+            <a:ext cx="477000" cy="381960"/>
           </a:xfrm>
           <a:prstGeom prst="triangle">
             <a:avLst>
@@ -19523,17 +19407,17 @@
       </p:sp>
       <p:cxnSp>
         <p:nvCxnSpPr>
-          <p:cNvPr id="285" name="Straight Arrow Connector 81"/>
+          <p:cNvPr id="282" name="Straight Arrow Connector 81"/>
           <p:cNvCxnSpPr>
-            <a:stCxn id="284" idx="3"/>
-            <a:endCxn id="282" idx="0"/>
+            <a:stCxn id="281" idx="3"/>
+            <a:endCxn id="279" idx="0"/>
           </p:cNvCxnSpPr>
           <p:nvPr/>
         </p:nvCxnSpPr>
         <p:spPr>
           <a:xfrm>
-            <a:off x="2852640" y="1600200"/>
-            <a:ext cx="15480" cy="532440"/>
+            <a:off x="2852640" y="1599840"/>
+            <a:ext cx="15480" cy="532800"/>
           </a:xfrm>
           <a:prstGeom prst="straightConnector1">
             <a:avLst/>
@@ -19548,10 +19432,10 @@
       </p:cxnSp>
       <p:cxnSp>
         <p:nvCxnSpPr>
-          <p:cNvPr id="286" name="Straight Arrow Connector 82"/>
+          <p:cNvPr id="283" name="Straight Arrow Connector 82"/>
           <p:cNvCxnSpPr>
-            <a:stCxn id="284" idx="0"/>
-            <a:endCxn id="231" idx="1"/>
+            <a:stCxn id="281" idx="0"/>
+            <a:endCxn id="228" idx="1"/>
           </p:cNvCxnSpPr>
           <p:nvPr/>
         </p:nvCxnSpPr>
@@ -19573,17 +19457,17 @@
       </p:cxnSp>
       <p:cxnSp>
         <p:nvCxnSpPr>
-          <p:cNvPr id="287" name="Straight Arrow Connector 83"/>
+          <p:cNvPr id="284" name="Straight Arrow Connector 83"/>
           <p:cNvCxnSpPr>
-            <a:stCxn id="261" idx="2"/>
-            <a:endCxn id="271" idx="0"/>
+            <a:stCxn id="258" idx="2"/>
+            <a:endCxn id="268" idx="0"/>
           </p:cNvCxnSpPr>
           <p:nvPr/>
         </p:nvCxnSpPr>
         <p:spPr>
           <a:xfrm>
-            <a:off x="7570800" y="4921200"/>
-            <a:ext cx="102240" cy="262440"/>
+            <a:off x="7570800" y="4920840"/>
+            <a:ext cx="102240" cy="262800"/>
           </a:xfrm>
           <a:prstGeom prst="straightConnector1">
             <a:avLst/>
@@ -19599,17 +19483,17 @@
       </p:cxnSp>
       <p:cxnSp>
         <p:nvCxnSpPr>
-          <p:cNvPr id="288" name="Straight Arrow Connector 57"/>
+          <p:cNvPr id="285" name="Straight Arrow Connector 57"/>
           <p:cNvCxnSpPr>
-            <a:stCxn id="271" idx="2"/>
-            <a:endCxn id="270" idx="0"/>
+            <a:stCxn id="268" idx="2"/>
+            <a:endCxn id="267" idx="0"/>
           </p:cNvCxnSpPr>
           <p:nvPr/>
         </p:nvCxnSpPr>
         <p:spPr>
           <a:xfrm>
-            <a:off x="7672680" y="5565600"/>
-            <a:ext cx="227880" cy="149760"/>
+            <a:off x="7672680" y="5565240"/>
+            <a:ext cx="227880" cy="150120"/>
           </a:xfrm>
           <a:prstGeom prst="straightConnector1">
             <a:avLst/>
@@ -19624,28 +19508,28 @@
       </p:cxnSp>
       <p:grpSp>
         <p:nvGrpSpPr>
-          <p:cNvPr id="289" name="Group 5"/>
+          <p:cNvPr id="286" name="Group 5"/>
           <p:cNvGrpSpPr/>
           <p:nvPr/>
         </p:nvGrpSpPr>
         <p:grpSpPr>
           <a:xfrm>
             <a:off x="10265040" y="5029200"/>
-            <a:ext cx="1621080" cy="561600"/>
+            <a:ext cx="1620720" cy="561240"/>
             <a:chOff x="10265040" y="5029200"/>
-            <a:chExt cx="1621080" cy="561600"/>
+            <a:chExt cx="1620720" cy="561240"/>
           </a:xfrm>
         </p:grpSpPr>
         <p:sp>
           <p:nvSpPr>
-            <p:cNvPr id="290" name="TextBox 22"/>
+            <p:cNvPr id="287" name="TextBox 22"/>
             <p:cNvSpPr/>
             <p:nvPr/>
           </p:nvSpPr>
           <p:spPr>
             <a:xfrm>
               <a:off x="10265040" y="5029200"/>
-              <a:ext cx="1621080" cy="303120"/>
+              <a:ext cx="1620720" cy="303120"/>
             </a:xfrm>
             <a:prstGeom prst="rect">
               <a:avLst/>
@@ -19695,14 +19579,14 @@
         </p:sp>
         <p:sp>
           <p:nvSpPr>
-            <p:cNvPr id="291" name="TextBox 29"/>
+            <p:cNvPr id="288" name="TextBox 29"/>
             <p:cNvSpPr/>
             <p:nvPr/>
           </p:nvSpPr>
           <p:spPr>
             <a:xfrm>
               <a:off x="10265040" y="5290560"/>
-              <a:ext cx="1621080" cy="300240"/>
+              <a:ext cx="1620720" cy="299880"/>
             </a:xfrm>
             <a:prstGeom prst="rect">
               <a:avLst/>
@@ -19744,17 +19628,17 @@
       </p:grpSp>
       <p:cxnSp>
         <p:nvCxnSpPr>
-          <p:cNvPr id="292" name="Straight Arrow Connector 84"/>
+          <p:cNvPr id="289" name="Straight Arrow Connector 84"/>
           <p:cNvCxnSpPr>
-            <a:stCxn id="289" idx="0"/>
-            <a:endCxn id="266" idx="4"/>
+            <a:stCxn id="286" idx="0"/>
+            <a:endCxn id="263" idx="4"/>
           </p:cNvCxnSpPr>
           <p:nvPr/>
         </p:nvCxnSpPr>
         <p:spPr>
           <a:xfrm flipH="1" flipV="1">
-            <a:off x="9698760" y="4111560"/>
-            <a:ext cx="1377000" cy="918000"/>
+            <a:off x="9698400" y="4111200"/>
+            <a:ext cx="1377360" cy="918360"/>
           </a:xfrm>
           <a:prstGeom prst="straightConnector1">
             <a:avLst/>
@@ -19769,28 +19653,28 @@
       </p:cxnSp>
       <p:grpSp>
         <p:nvGrpSpPr>
-          <p:cNvPr id="293" name="Group 9"/>
+          <p:cNvPr id="290" name="Group 9"/>
           <p:cNvGrpSpPr/>
           <p:nvPr/>
         </p:nvGrpSpPr>
         <p:grpSpPr>
           <a:xfrm>
             <a:off x="9122040" y="4343400"/>
-            <a:ext cx="1621080" cy="561600"/>
+            <a:ext cx="1620720" cy="561240"/>
             <a:chOff x="9122040" y="4343400"/>
-            <a:chExt cx="1621080" cy="561600"/>
+            <a:chExt cx="1620720" cy="561240"/>
           </a:xfrm>
         </p:grpSpPr>
         <p:sp>
           <p:nvSpPr>
-            <p:cNvPr id="294" name="TextBox 47"/>
+            <p:cNvPr id="291" name="TextBox 47"/>
             <p:cNvSpPr/>
             <p:nvPr/>
           </p:nvSpPr>
           <p:spPr>
             <a:xfrm>
               <a:off x="9122040" y="4343400"/>
-              <a:ext cx="1621080" cy="303120"/>
+              <a:ext cx="1620720" cy="303120"/>
             </a:xfrm>
             <a:prstGeom prst="rect">
               <a:avLst/>
@@ -19840,14 +19724,14 @@
         </p:sp>
         <p:sp>
           <p:nvSpPr>
-            <p:cNvPr id="295" name="TextBox 48"/>
+            <p:cNvPr id="292" name="TextBox 48"/>
             <p:cNvSpPr/>
             <p:nvPr/>
           </p:nvSpPr>
           <p:spPr>
             <a:xfrm>
               <a:off x="9122040" y="4604760"/>
-              <a:ext cx="1621080" cy="300240"/>
+              <a:ext cx="1620720" cy="299880"/>
             </a:xfrm>
             <a:prstGeom prst="rect">
               <a:avLst/>
@@ -19889,14 +19773,14 @@
       </p:grpSp>
       <p:sp>
         <p:nvSpPr>
-          <p:cNvPr id="296" name="Isosceles Triangle 9"/>
+          <p:cNvPr id="293" name="Isosceles Triangle 9"/>
           <p:cNvSpPr/>
           <p:nvPr/>
         </p:nvSpPr>
         <p:spPr>
           <a:xfrm>
             <a:off x="10037520" y="2131560"/>
-            <a:ext cx="477360" cy="382320"/>
+            <a:ext cx="477000" cy="381960"/>
           </a:xfrm>
           <a:prstGeom prst="triangle">
             <a:avLst>
@@ -19956,10 +19840,10 @@
       </p:sp>
       <p:cxnSp>
         <p:nvCxnSpPr>
-          <p:cNvPr id="297" name="Straight Arrow Connector 85"/>
+          <p:cNvPr id="294" name="Straight Arrow Connector 85"/>
           <p:cNvCxnSpPr>
-            <a:stCxn id="244" idx="2"/>
-            <a:endCxn id="296" idx="0"/>
+            <a:stCxn id="241" idx="2"/>
+            <a:endCxn id="293" idx="0"/>
           </p:cNvCxnSpPr>
           <p:nvPr/>
         </p:nvCxnSpPr>
@@ -19981,28 +19865,28 @@
       </p:cxnSp>
       <p:grpSp>
         <p:nvGrpSpPr>
-          <p:cNvPr id="298" name="Group 10"/>
+          <p:cNvPr id="295" name="Group 10"/>
           <p:cNvGrpSpPr/>
           <p:nvPr/>
         </p:nvGrpSpPr>
         <p:grpSpPr>
           <a:xfrm>
             <a:off x="10494000" y="2866680"/>
-            <a:ext cx="1621080" cy="561600"/>
+            <a:ext cx="1620720" cy="561240"/>
             <a:chOff x="10494000" y="2866680"/>
-            <a:chExt cx="1621080" cy="561600"/>
+            <a:chExt cx="1620720" cy="561240"/>
           </a:xfrm>
         </p:grpSpPr>
         <p:sp>
           <p:nvSpPr>
-            <p:cNvPr id="299" name="TextBox 60"/>
+            <p:cNvPr id="296" name="TextBox 60"/>
             <p:cNvSpPr/>
             <p:nvPr/>
           </p:nvSpPr>
           <p:spPr>
             <a:xfrm>
               <a:off x="10494000" y="2866680"/>
-              <a:ext cx="1621080" cy="303120"/>
+              <a:ext cx="1620720" cy="303120"/>
             </a:xfrm>
             <a:prstGeom prst="rect">
               <a:avLst/>
@@ -20052,14 +19936,14 @@
         </p:sp>
         <p:sp>
           <p:nvSpPr>
-            <p:cNvPr id="300" name="TextBox 71"/>
+            <p:cNvPr id="297" name="TextBox 71"/>
             <p:cNvSpPr/>
             <p:nvPr/>
           </p:nvSpPr>
           <p:spPr>
             <a:xfrm>
               <a:off x="10494000" y="3128040"/>
-              <a:ext cx="1621080" cy="300240"/>
+              <a:ext cx="1620720" cy="299880"/>
             </a:xfrm>
             <a:prstGeom prst="rect">
               <a:avLst/>
@@ -20101,17 +19985,17 @@
       </p:grpSp>
       <p:cxnSp>
         <p:nvCxnSpPr>
-          <p:cNvPr id="301" name="Straight Arrow Connector 86"/>
+          <p:cNvPr id="298" name="Straight Arrow Connector 86"/>
           <p:cNvCxnSpPr>
-            <a:stCxn id="296" idx="3"/>
-            <a:endCxn id="298" idx="0"/>
+            <a:stCxn id="293" idx="3"/>
+            <a:endCxn id="295" idx="0"/>
           </p:cNvCxnSpPr>
           <p:nvPr/>
         </p:nvCxnSpPr>
         <p:spPr>
           <a:xfrm>
-            <a:off x="10276200" y="2513880"/>
-            <a:ext cx="1028520" cy="353160"/>
+            <a:off x="10276200" y="2513520"/>
+            <a:ext cx="1028520" cy="353520"/>
           </a:xfrm>
           <a:prstGeom prst="straightConnector1">
             <a:avLst/>
@@ -20156,14 +20040,14 @@
       </p:grpSpPr>
       <p:cxnSp>
         <p:nvCxnSpPr>
-          <p:cNvPr id="302" name="Straight Arrow Connector 44"/>
+          <p:cNvPr id="299" name="Straight Arrow Connector 44"/>
           <p:cNvCxnSpPr/>
           <p:nvPr/>
         </p:nvCxnSpPr>
         <p:spPr>
           <a:xfrm flipH="1">
             <a:off x="0" y="3073320"/>
-            <a:ext cx="1834200" cy="5400"/>
+            <a:ext cx="1834560" cy="5760"/>
           </a:xfrm>
           <a:prstGeom prst="straightConnector1">
             <a:avLst/>
@@ -20179,14 +20063,14 @@
       </p:cxnSp>
       <p:cxnSp>
         <p:nvCxnSpPr>
-          <p:cNvPr id="303" name="Straight Arrow Connector 45"/>
+          <p:cNvPr id="300" name="Straight Arrow Connector 45"/>
           <p:cNvCxnSpPr/>
           <p:nvPr/>
         </p:nvCxnSpPr>
         <p:spPr>
           <a:xfrm>
             <a:off x="0" y="2489400"/>
-            <a:ext cx="1834200" cy="5400"/>
+            <a:ext cx="1834560" cy="5760"/>
           </a:xfrm>
           <a:prstGeom prst="straightConnector1">
             <a:avLst/>
@@ -20202,14 +20086,14 @@
       </p:cxnSp>
       <p:cxnSp>
         <p:nvCxnSpPr>
-          <p:cNvPr id="304" name="Straight Arrow Connector 46"/>
+          <p:cNvPr id="301" name="Straight Arrow Connector 46"/>
           <p:cNvCxnSpPr/>
           <p:nvPr/>
         </p:nvCxnSpPr>
         <p:spPr>
           <a:xfrm>
             <a:off x="0" y="2781360"/>
-            <a:ext cx="1834200" cy="5400"/>
+            <a:ext cx="1834560" cy="5760"/>
           </a:xfrm>
           <a:prstGeom prst="straightConnector1">
             <a:avLst/>
@@ -20225,14 +20109,14 @@
       </p:cxnSp>
       <p:cxnSp>
         <p:nvCxnSpPr>
-          <p:cNvPr id="305" name="Straight Arrow Connector 47"/>
+          <p:cNvPr id="302" name="Straight Arrow Connector 47"/>
           <p:cNvCxnSpPr/>
           <p:nvPr/>
         </p:nvCxnSpPr>
         <p:spPr>
           <a:xfrm flipH="1">
             <a:off x="0" y="3657600"/>
-            <a:ext cx="1834200" cy="5400"/>
+            <a:ext cx="1834560" cy="5760"/>
           </a:xfrm>
           <a:prstGeom prst="straightConnector1">
             <a:avLst/>
@@ -20247,14 +20131,14 @@
       </p:cxnSp>
       <p:sp>
         <p:nvSpPr>
-          <p:cNvPr id="306" name="Diamond 17"/>
+          <p:cNvPr id="303" name="Diamond 17"/>
           <p:cNvSpPr/>
           <p:nvPr/>
         </p:nvSpPr>
         <p:spPr>
           <a:xfrm>
             <a:off x="128520" y="6134040"/>
-            <a:ext cx="1566360" cy="382320"/>
+            <a:ext cx="1566000" cy="381960"/>
           </a:xfrm>
           <a:prstGeom prst="diamond">
             <a:avLst/>
@@ -20312,14 +20196,14 @@
       </p:sp>
       <p:sp>
         <p:nvSpPr>
-          <p:cNvPr id="307" name="Oval 4"/>
+          <p:cNvPr id="304" name="Oval 4"/>
           <p:cNvSpPr/>
           <p:nvPr/>
         </p:nvSpPr>
         <p:spPr>
           <a:xfrm>
             <a:off x="302760" y="5454000"/>
-            <a:ext cx="1217880" cy="382320"/>
+            <a:ext cx="1217520" cy="381960"/>
           </a:xfrm>
           <a:prstGeom prst="ellipse">
             <a:avLst/>
@@ -20375,14 +20259,14 @@
       </p:sp>
       <p:sp>
         <p:nvSpPr>
-          <p:cNvPr id="308" name="TextBox 53"/>
+          <p:cNvPr id="305" name="TextBox 53"/>
           <p:cNvSpPr/>
           <p:nvPr/>
         </p:nvSpPr>
         <p:spPr>
           <a:xfrm>
             <a:off x="101160" y="336240"/>
-            <a:ext cx="1621080" cy="303120"/>
+            <a:ext cx="1620720" cy="303120"/>
           </a:xfrm>
           <a:prstGeom prst="rect">
             <a:avLst/>
@@ -20432,14 +20316,14 @@
       </p:sp>
       <p:sp>
         <p:nvSpPr>
-          <p:cNvPr id="309" name="TextBox 54"/>
+          <p:cNvPr id="306" name="TextBox 54"/>
           <p:cNvSpPr/>
           <p:nvPr/>
         </p:nvSpPr>
         <p:spPr>
           <a:xfrm>
             <a:off x="101160" y="597600"/>
-            <a:ext cx="1621080" cy="516600"/>
+            <a:ext cx="1620720" cy="516600"/>
           </a:xfrm>
           <a:prstGeom prst="rect">
             <a:avLst/>
@@ -20522,14 +20406,14 @@
       </p:sp>
       <p:sp>
         <p:nvSpPr>
-          <p:cNvPr id="310" name="TextBox 72"/>
+          <p:cNvPr id="307" name="TextBox 72"/>
           <p:cNvSpPr/>
           <p:nvPr/>
         </p:nvSpPr>
         <p:spPr>
           <a:xfrm>
             <a:off x="8458200" y="5486400"/>
-            <a:ext cx="1621080" cy="303120"/>
+            <a:ext cx="1620720" cy="303120"/>
           </a:xfrm>
           <a:prstGeom prst="rect">
             <a:avLst/>
@@ -20579,14 +20463,14 @@
       </p:sp>
       <p:sp>
         <p:nvSpPr>
-          <p:cNvPr id="311" name="Diamond 18"/>
+          <p:cNvPr id="308" name="Diamond 18"/>
           <p:cNvSpPr/>
           <p:nvPr/>
         </p:nvSpPr>
         <p:spPr>
           <a:xfrm>
             <a:off x="128520" y="4629600"/>
-            <a:ext cx="1566360" cy="527040"/>
+            <a:ext cx="1566000" cy="526680"/>
           </a:xfrm>
           <a:prstGeom prst="diamond">
             <a:avLst/>
@@ -20667,14 +20551,14 @@
       </p:sp>
       <p:cxnSp>
         <p:nvCxnSpPr>
-          <p:cNvPr id="312" name="Straight Arrow Connector 48"/>
+          <p:cNvPr id="309" name="Straight Arrow Connector 48"/>
           <p:cNvCxnSpPr/>
           <p:nvPr/>
         </p:nvCxnSpPr>
         <p:spPr>
           <a:xfrm>
             <a:off x="0" y="3365640"/>
-            <a:ext cx="1834200" cy="5400"/>
+            <a:ext cx="1834560" cy="5760"/>
           </a:xfrm>
           <a:prstGeom prst="straightConnector1">
             <a:avLst/>
@@ -20689,14 +20573,14 @@
       </p:cxnSp>
       <p:sp>
         <p:nvSpPr>
-          <p:cNvPr id="313" name="Isosceles Triangle 5"/>
+          <p:cNvPr id="310" name="Isosceles Triangle 5"/>
           <p:cNvSpPr/>
           <p:nvPr/>
         </p:nvSpPr>
         <p:spPr>
           <a:xfrm>
             <a:off x="673200" y="3949920"/>
-            <a:ext cx="477360" cy="382320"/>
+            <a:ext cx="477000" cy="381960"/>
           </a:xfrm>
           <a:prstGeom prst="triangle">
             <a:avLst>
@@ -20756,28 +20640,28 @@
       </p:sp>
       <p:grpSp>
         <p:nvGrpSpPr>
-          <p:cNvPr id="314" name="Group 15"/>
+          <p:cNvPr id="311" name="Group 15"/>
           <p:cNvGrpSpPr/>
           <p:nvPr/>
         </p:nvGrpSpPr>
         <p:grpSpPr>
           <a:xfrm>
             <a:off x="101160" y="1413000"/>
-            <a:ext cx="1621080" cy="777960"/>
+            <a:ext cx="1620720" cy="777960"/>
             <a:chOff x="101160" y="1413000"/>
-            <a:chExt cx="1621080" cy="777960"/>
+            <a:chExt cx="1620720" cy="777960"/>
           </a:xfrm>
         </p:grpSpPr>
         <p:sp>
           <p:nvSpPr>
-            <p:cNvPr id="315" name="TextBox 57"/>
+            <p:cNvPr id="312" name="TextBox 57"/>
             <p:cNvSpPr/>
             <p:nvPr/>
           </p:nvSpPr>
           <p:spPr>
             <a:xfrm>
               <a:off x="101160" y="1413000"/>
-              <a:ext cx="1621080" cy="303120"/>
+              <a:ext cx="1620720" cy="303120"/>
             </a:xfrm>
             <a:prstGeom prst="rect">
               <a:avLst/>
@@ -20828,14 +20712,14 @@
         </p:sp>
         <p:sp>
           <p:nvSpPr>
-            <p:cNvPr id="316" name="TextBox 58"/>
+            <p:cNvPr id="313" name="TextBox 58"/>
             <p:cNvSpPr/>
             <p:nvPr/>
           </p:nvSpPr>
           <p:spPr>
             <a:xfrm>
               <a:off x="101160" y="1674360"/>
-              <a:ext cx="1621080" cy="516600"/>
+              <a:ext cx="1620720" cy="516600"/>
             </a:xfrm>
             <a:prstGeom prst="rect">
               <a:avLst/>
@@ -20920,14 +20804,14 @@
       </p:grpSp>
       <p:sp>
         <p:nvSpPr>
-          <p:cNvPr id="317" name="TextBox 62"/>
+          <p:cNvPr id="314" name="TextBox 62"/>
           <p:cNvSpPr/>
           <p:nvPr/>
         </p:nvSpPr>
         <p:spPr>
           <a:xfrm>
             <a:off x="5463360" y="2131920"/>
-            <a:ext cx="1621080" cy="303120"/>
+            <a:ext cx="1620720" cy="303120"/>
           </a:xfrm>
           <a:prstGeom prst="rect">
             <a:avLst/>
@@ -20983,14 +20867,14 @@
       </p:sp>
       <p:sp>
         <p:nvSpPr>
-          <p:cNvPr id="318" name="TextBox 65"/>
+          <p:cNvPr id="315" name="TextBox 65"/>
           <p:cNvSpPr/>
           <p:nvPr/>
         </p:nvSpPr>
         <p:spPr>
           <a:xfrm>
             <a:off x="5463360" y="1828800"/>
-            <a:ext cx="1621080" cy="303120"/>
+            <a:ext cx="1620720" cy="303120"/>
           </a:xfrm>
           <a:prstGeom prst="rect">
             <a:avLst/>
@@ -21040,28 +20924,28 @@
       </p:sp>
       <p:grpSp>
         <p:nvGrpSpPr>
-          <p:cNvPr id="319" name="Group 17"/>
+          <p:cNvPr id="316" name="Group 17"/>
           <p:cNvGrpSpPr/>
           <p:nvPr/>
         </p:nvGrpSpPr>
         <p:grpSpPr>
           <a:xfrm>
             <a:off x="4296600" y="4022640"/>
-            <a:ext cx="1621080" cy="777960"/>
+            <a:ext cx="1620720" cy="777960"/>
             <a:chOff x="4296600" y="4022640"/>
-            <a:chExt cx="1621080" cy="777960"/>
+            <a:chExt cx="1620720" cy="777960"/>
           </a:xfrm>
         </p:grpSpPr>
         <p:sp>
           <p:nvSpPr>
-            <p:cNvPr id="320" name="TextBox 61"/>
+            <p:cNvPr id="317" name="TextBox 61"/>
             <p:cNvSpPr/>
             <p:nvPr/>
           </p:nvSpPr>
           <p:spPr>
             <a:xfrm>
               <a:off x="4296600" y="4022640"/>
-              <a:ext cx="1621080" cy="303120"/>
+              <a:ext cx="1620720" cy="303120"/>
             </a:xfrm>
             <a:prstGeom prst="rect">
               <a:avLst/>
@@ -21111,14 +20995,14 @@
         </p:sp>
         <p:sp>
           <p:nvSpPr>
-            <p:cNvPr id="321" name="TextBox 63"/>
+            <p:cNvPr id="318" name="TextBox 63"/>
             <p:cNvSpPr/>
             <p:nvPr/>
           </p:nvSpPr>
           <p:spPr>
             <a:xfrm>
               <a:off x="4296600" y="4284000"/>
-              <a:ext cx="1621080" cy="516600"/>
+              <a:ext cx="1620720" cy="516600"/>
             </a:xfrm>
             <a:prstGeom prst="rect">
               <a:avLst/>
@@ -21202,28 +21086,28 @@
       </p:grpSp>
       <p:grpSp>
         <p:nvGrpSpPr>
-          <p:cNvPr id="322" name="Group 18"/>
+          <p:cNvPr id="319" name="Group 18"/>
           <p:cNvGrpSpPr/>
           <p:nvPr/>
         </p:nvGrpSpPr>
         <p:grpSpPr>
           <a:xfrm>
             <a:off x="9348840" y="2254320"/>
-            <a:ext cx="1621080" cy="1631880"/>
+            <a:ext cx="1620720" cy="1631880"/>
             <a:chOff x="9348840" y="2254320"/>
-            <a:chExt cx="1621080" cy="1631880"/>
+            <a:chExt cx="1620720" cy="1631880"/>
           </a:xfrm>
         </p:grpSpPr>
         <p:sp>
           <p:nvSpPr>
-            <p:cNvPr id="323" name="TextBox 64"/>
+            <p:cNvPr id="320" name="TextBox 64"/>
             <p:cNvSpPr/>
             <p:nvPr/>
           </p:nvSpPr>
           <p:spPr>
             <a:xfrm>
               <a:off x="9348840" y="2254320"/>
-              <a:ext cx="1621080" cy="303120"/>
+              <a:ext cx="1620720" cy="303120"/>
             </a:xfrm>
             <a:prstGeom prst="rect">
               <a:avLst/>
@@ -21273,14 +21157,14 @@
         </p:sp>
         <p:sp>
           <p:nvSpPr>
-            <p:cNvPr id="324" name="TextBox 66"/>
+            <p:cNvPr id="321" name="TextBox 66"/>
             <p:cNvSpPr/>
             <p:nvPr/>
           </p:nvSpPr>
           <p:spPr>
             <a:xfrm>
               <a:off x="9348840" y="2515680"/>
-              <a:ext cx="1621080" cy="1370520"/>
+              <a:ext cx="1620720" cy="1370520"/>
             </a:xfrm>
             <a:prstGeom prst="rect">
               <a:avLst/>
@@ -21472,14 +21356,14 @@
       </p:grpSp>
       <p:sp>
         <p:nvSpPr>
-          <p:cNvPr id="325" name="Diamond 19"/>
+          <p:cNvPr id="322" name="Diamond 19"/>
           <p:cNvSpPr/>
           <p:nvPr/>
         </p:nvSpPr>
         <p:spPr>
           <a:xfrm>
             <a:off x="9402120" y="4572000"/>
-            <a:ext cx="1566360" cy="382320"/>
+            <a:ext cx="1566000" cy="381960"/>
           </a:xfrm>
           <a:prstGeom prst="diamond">
             <a:avLst/>
@@ -21537,14 +21421,14 @@
       </p:sp>
       <p:sp>
         <p:nvSpPr>
-          <p:cNvPr id="326" name="Oval 5"/>
+          <p:cNvPr id="323" name="Oval 5"/>
           <p:cNvSpPr/>
           <p:nvPr/>
         </p:nvSpPr>
         <p:spPr>
           <a:xfrm>
             <a:off x="7007400" y="4572000"/>
-            <a:ext cx="1675080" cy="382320"/>
+            <a:ext cx="1674720" cy="381960"/>
           </a:xfrm>
           <a:prstGeom prst="ellipse">
             <a:avLst/>
@@ -21600,28 +21484,28 @@
       </p:sp>
       <p:grpSp>
         <p:nvGrpSpPr>
-          <p:cNvPr id="327" name="Group 19"/>
+          <p:cNvPr id="324" name="Group 19"/>
           <p:cNvGrpSpPr/>
           <p:nvPr/>
         </p:nvGrpSpPr>
         <p:grpSpPr>
           <a:xfrm>
             <a:off x="9348840" y="2254320"/>
-            <a:ext cx="1621080" cy="1631880"/>
+            <a:ext cx="1620720" cy="1631880"/>
             <a:chOff x="9348840" y="2254320"/>
-            <a:chExt cx="1621080" cy="1631880"/>
+            <a:chExt cx="1620720" cy="1631880"/>
           </a:xfrm>
         </p:grpSpPr>
         <p:sp>
           <p:nvSpPr>
-            <p:cNvPr id="328" name="TextBox 67"/>
+            <p:cNvPr id="325" name="TextBox 67"/>
             <p:cNvSpPr/>
             <p:nvPr/>
           </p:nvSpPr>
           <p:spPr>
             <a:xfrm>
               <a:off x="9348840" y="2254320"/>
-              <a:ext cx="1621080" cy="303120"/>
+              <a:ext cx="1620720" cy="303120"/>
             </a:xfrm>
             <a:prstGeom prst="rect">
               <a:avLst/>
@@ -21671,14 +21555,14 @@
         </p:sp>
         <p:sp>
           <p:nvSpPr>
-            <p:cNvPr id="329" name="TextBox 68"/>
+            <p:cNvPr id="326" name="TextBox 68"/>
             <p:cNvSpPr/>
             <p:nvPr/>
           </p:nvSpPr>
           <p:spPr>
             <a:xfrm>
               <a:off x="9348840" y="2515680"/>
-              <a:ext cx="1621080" cy="1370520"/>
+              <a:ext cx="1620720" cy="1370520"/>
             </a:xfrm>
             <a:prstGeom prst="rect">
               <a:avLst/>
@@ -21870,28 +21754,28 @@
       </p:grpSp>
       <p:grpSp>
         <p:nvGrpSpPr>
-          <p:cNvPr id="330" name="Group 20"/>
+          <p:cNvPr id="327" name="Group 20"/>
           <p:cNvGrpSpPr/>
           <p:nvPr/>
         </p:nvGrpSpPr>
         <p:grpSpPr>
           <a:xfrm>
             <a:off x="9348840" y="2254320"/>
-            <a:ext cx="1621080" cy="1845360"/>
+            <a:ext cx="1620720" cy="1845360"/>
             <a:chOff x="9348840" y="2254320"/>
-            <a:chExt cx="1621080" cy="1845360"/>
+            <a:chExt cx="1620720" cy="1845360"/>
           </a:xfrm>
         </p:grpSpPr>
         <p:sp>
           <p:nvSpPr>
-            <p:cNvPr id="331" name="TextBox 69"/>
+            <p:cNvPr id="328" name="TextBox 69"/>
             <p:cNvSpPr/>
             <p:nvPr/>
           </p:nvSpPr>
           <p:spPr>
             <a:xfrm>
               <a:off x="9348840" y="2254320"/>
-              <a:ext cx="1621080" cy="303120"/>
+              <a:ext cx="1620720" cy="303120"/>
             </a:xfrm>
             <a:prstGeom prst="rect">
               <a:avLst/>
@@ -21941,14 +21825,14 @@
         </p:sp>
         <p:sp>
           <p:nvSpPr>
-            <p:cNvPr id="332" name="TextBox 70"/>
+            <p:cNvPr id="329" name="TextBox 70"/>
             <p:cNvSpPr/>
             <p:nvPr/>
           </p:nvSpPr>
           <p:spPr>
             <a:xfrm>
               <a:off x="9348840" y="2515680"/>
-              <a:ext cx="1621080" cy="1584000"/>
+              <a:ext cx="1620720" cy="1584000"/>
             </a:xfrm>
             <a:prstGeom prst="rect">
               <a:avLst/>
@@ -22167,14 +22051,14 @@
       </p:grpSp>
       <p:sp>
         <p:nvSpPr>
-          <p:cNvPr id="333" name="Diamond 25"/>
+          <p:cNvPr id="330" name="Diamond 25"/>
           <p:cNvSpPr/>
           <p:nvPr/>
         </p:nvSpPr>
         <p:spPr>
           <a:xfrm>
             <a:off x="7086600" y="3501720"/>
-            <a:ext cx="1824480" cy="382320"/>
+            <a:ext cx="1824120" cy="381960"/>
           </a:xfrm>
           <a:prstGeom prst="diamond">
             <a:avLst/>
@@ -22232,14 +22116,14 @@
       </p:sp>
       <p:sp>
         <p:nvSpPr>
-          <p:cNvPr id="334" name="Diamond 16"/>
+          <p:cNvPr id="331" name="Diamond 16"/>
           <p:cNvSpPr/>
           <p:nvPr/>
         </p:nvSpPr>
         <p:spPr>
           <a:xfrm>
             <a:off x="7543800" y="1869840"/>
-            <a:ext cx="1794960" cy="382320"/>
+            <a:ext cx="1794600" cy="381960"/>
           </a:xfrm>
           <a:prstGeom prst="diamond">
             <a:avLst/>
@@ -22297,17 +22181,17 @@
       </p:sp>
       <p:cxnSp>
         <p:nvCxnSpPr>
-          <p:cNvPr id="335" name="Straight Arrow Connector 65"/>
+          <p:cNvPr id="332" name="Straight Arrow Connector 65"/>
           <p:cNvCxnSpPr>
-            <a:stCxn id="317" idx="3"/>
-            <a:endCxn id="334" idx="1"/>
+            <a:stCxn id="314" idx="3"/>
+            <a:endCxn id="331" idx="1"/>
           </p:cNvCxnSpPr>
           <p:nvPr/>
         </p:nvCxnSpPr>
         <p:spPr>
           <a:xfrm flipV="1">
-            <a:off x="7084440" y="2061000"/>
-            <a:ext cx="459720" cy="222840"/>
+            <a:off x="7084080" y="2061000"/>
+            <a:ext cx="460080" cy="222840"/>
           </a:xfrm>
           <a:prstGeom prst="straightConnector1">
             <a:avLst/>
@@ -22323,17 +22207,17 @@
       </p:cxnSp>
       <p:cxnSp>
         <p:nvCxnSpPr>
-          <p:cNvPr id="336" name="Straight Arrow Connector 40"/>
+          <p:cNvPr id="333" name="Straight Arrow Connector 40"/>
           <p:cNvCxnSpPr>
-            <a:stCxn id="325" idx="2"/>
-            <a:endCxn id="310" idx="0"/>
+            <a:stCxn id="322" idx="2"/>
+            <a:endCxn id="307" idx="0"/>
           </p:cNvCxnSpPr>
           <p:nvPr/>
         </p:nvCxnSpPr>
         <p:spPr>
           <a:xfrm flipH="1">
-            <a:off x="9268560" y="4954320"/>
-            <a:ext cx="917280" cy="532440"/>
+            <a:off x="9268560" y="4953960"/>
+            <a:ext cx="916920" cy="532800"/>
           </a:xfrm>
           <a:prstGeom prst="straightConnector1">
             <a:avLst/>
@@ -22348,17 +22232,17 @@
       </p:cxnSp>
       <p:cxnSp>
         <p:nvCxnSpPr>
-          <p:cNvPr id="337" name="Straight Arrow Connector 41"/>
+          <p:cNvPr id="334" name="Straight Arrow Connector 41"/>
           <p:cNvCxnSpPr>
-            <a:stCxn id="330" idx="2"/>
-            <a:endCxn id="325" idx="0"/>
+            <a:stCxn id="327" idx="2"/>
+            <a:endCxn id="322" idx="0"/>
           </p:cNvCxnSpPr>
           <p:nvPr/>
         </p:nvCxnSpPr>
         <p:spPr>
           <a:xfrm>
             <a:off x="10159200" y="4099680"/>
-            <a:ext cx="26640" cy="472680"/>
+            <a:ext cx="26280" cy="472680"/>
           </a:xfrm>
           <a:prstGeom prst="straightConnector1">
             <a:avLst/>
@@ -22373,17 +22257,17 @@
       </p:cxnSp>
       <p:cxnSp>
         <p:nvCxnSpPr>
-          <p:cNvPr id="338" name="Straight Arrow Connector 42"/>
+          <p:cNvPr id="335" name="Straight Arrow Connector 42"/>
           <p:cNvCxnSpPr>
-            <a:stCxn id="325" idx="1"/>
-            <a:endCxn id="326" idx="6"/>
+            <a:stCxn id="322" idx="1"/>
+            <a:endCxn id="323" idx="6"/>
           </p:cNvCxnSpPr>
           <p:nvPr/>
         </p:nvCxnSpPr>
         <p:spPr>
           <a:xfrm flipH="1">
-            <a:off x="8682480" y="4763160"/>
-            <a:ext cx="720000" cy="360"/>
+            <a:off x="8682120" y="4763160"/>
+            <a:ext cx="720360" cy="360"/>
           </a:xfrm>
           <a:prstGeom prst="straightConnector1">
             <a:avLst/>
@@ -22398,14 +22282,14 @@
       </p:cxnSp>
       <p:sp>
         <p:nvSpPr>
-          <p:cNvPr id="339" name="Oval 7"/>
+          <p:cNvPr id="336" name="Oval 7"/>
           <p:cNvSpPr/>
           <p:nvPr/>
         </p:nvSpPr>
         <p:spPr>
           <a:xfrm>
             <a:off x="6629400" y="5099760"/>
-            <a:ext cx="1595880" cy="382320"/>
+            <a:ext cx="1595520" cy="381960"/>
           </a:xfrm>
           <a:prstGeom prst="ellipse">
             <a:avLst/>
@@ -22461,17 +22345,17 @@
       </p:sp>
       <p:cxnSp>
         <p:nvCxnSpPr>
-          <p:cNvPr id="340" name="Straight Arrow Connector 66"/>
+          <p:cNvPr id="337" name="Straight Arrow Connector 66"/>
           <p:cNvCxnSpPr>
-            <a:stCxn id="325" idx="1"/>
-            <a:endCxn id="339" idx="6"/>
+            <a:stCxn id="322" idx="1"/>
+            <a:endCxn id="336" idx="6"/>
           </p:cNvCxnSpPr>
           <p:nvPr/>
         </p:nvCxnSpPr>
         <p:spPr>
           <a:xfrm flipH="1">
-            <a:off x="8225280" y="4763160"/>
-            <a:ext cx="1177200" cy="528120"/>
+            <a:off x="8224920" y="4763160"/>
+            <a:ext cx="1177560" cy="528120"/>
           </a:xfrm>
           <a:prstGeom prst="straightConnector1">
             <a:avLst/>
@@ -22486,17 +22370,17 @@
       </p:cxnSp>
       <p:cxnSp>
         <p:nvCxnSpPr>
-          <p:cNvPr id="341" name="Straight Arrow Connector 67"/>
+          <p:cNvPr id="338" name="Straight Arrow Connector 67"/>
           <p:cNvCxnSpPr>
-            <a:stCxn id="342" idx="1"/>
-            <a:endCxn id="343" idx="6"/>
+            <a:stCxn id="339" idx="1"/>
+            <a:endCxn id="340" idx="6"/>
           </p:cNvCxnSpPr>
           <p:nvPr/>
         </p:nvCxnSpPr>
         <p:spPr>
           <a:xfrm flipH="1">
-            <a:off x="3630240" y="2549160"/>
-            <a:ext cx="4680" cy="457560"/>
+            <a:off x="3629880" y="2549160"/>
+            <a:ext cx="5040" cy="457560"/>
           </a:xfrm>
           <a:prstGeom prst="straightConnector1">
             <a:avLst/>
@@ -22511,14 +22395,14 @@
       </p:cxnSp>
       <p:sp>
         <p:nvSpPr>
-          <p:cNvPr id="344" name="Diamond 26"/>
+          <p:cNvPr id="341" name="Diamond 26"/>
           <p:cNvSpPr/>
           <p:nvPr/>
         </p:nvSpPr>
         <p:spPr>
           <a:xfrm>
             <a:off x="5234760" y="2815200"/>
-            <a:ext cx="1566360" cy="382320"/>
+            <a:ext cx="1566000" cy="381960"/>
           </a:xfrm>
           <a:prstGeom prst="diamond">
             <a:avLst/>
@@ -22576,14 +22460,14 @@
       </p:sp>
       <p:sp>
         <p:nvSpPr>
-          <p:cNvPr id="342" name="Diamond 27"/>
+          <p:cNvPr id="339" name="Diamond 27"/>
           <p:cNvSpPr/>
           <p:nvPr/>
         </p:nvSpPr>
         <p:spPr>
           <a:xfrm>
             <a:off x="3634560" y="2358000"/>
-            <a:ext cx="1566360" cy="382320"/>
+            <a:ext cx="1566000" cy="381960"/>
           </a:xfrm>
           <a:prstGeom prst="diamond">
             <a:avLst/>
@@ -22641,14 +22525,14 @@
       </p:sp>
       <p:sp>
         <p:nvSpPr>
-          <p:cNvPr id="343" name="Oval 8"/>
+          <p:cNvPr id="340" name="Oval 8"/>
           <p:cNvSpPr/>
           <p:nvPr/>
         </p:nvSpPr>
         <p:spPr>
           <a:xfrm>
             <a:off x="2034360" y="2815200"/>
-            <a:ext cx="1595880" cy="382320"/>
+            <a:ext cx="1595520" cy="381960"/>
           </a:xfrm>
           <a:prstGeom prst="ellipse">
             <a:avLst/>
@@ -22704,17 +22588,17 @@
       </p:sp>
       <p:cxnSp>
         <p:nvCxnSpPr>
-          <p:cNvPr id="345" name="Straight Arrow Connector 68"/>
+          <p:cNvPr id="342" name="Straight Arrow Connector 68"/>
           <p:cNvCxnSpPr>
-            <a:stCxn id="319" idx="0"/>
-            <a:endCxn id="342" idx="2"/>
+            <a:stCxn id="316" idx="0"/>
+            <a:endCxn id="339" idx="2"/>
           </p:cNvCxnSpPr>
           <p:nvPr/>
         </p:nvCxnSpPr>
         <p:spPr>
           <a:xfrm flipH="1" flipV="1">
-            <a:off x="4417920" y="2740320"/>
-            <a:ext cx="689400" cy="1282680"/>
+            <a:off x="4417560" y="2739960"/>
+            <a:ext cx="689760" cy="1283040"/>
           </a:xfrm>
           <a:prstGeom prst="straightConnector1">
             <a:avLst/>
@@ -22730,17 +22614,17 @@
       </p:cxnSp>
       <p:cxnSp>
         <p:nvCxnSpPr>
-          <p:cNvPr id="346" name="Straight Arrow Connector 69"/>
+          <p:cNvPr id="343" name="Straight Arrow Connector 69"/>
           <p:cNvCxnSpPr>
-            <a:stCxn id="318" idx="1"/>
-            <a:endCxn id="342" idx="0"/>
+            <a:stCxn id="315" idx="1"/>
+            <a:endCxn id="339" idx="0"/>
           </p:cNvCxnSpPr>
           <p:nvPr/>
         </p:nvCxnSpPr>
         <p:spPr>
           <a:xfrm flipH="1">
-            <a:off x="4417920" y="1980360"/>
-            <a:ext cx="1045800" cy="378000"/>
+            <a:off x="4417560" y="1980360"/>
+            <a:ext cx="1046160" cy="378000"/>
           </a:xfrm>
           <a:prstGeom prst="straightConnector1">
             <a:avLst/>
@@ -22755,17 +22639,17 @@
       </p:cxnSp>
       <p:cxnSp>
         <p:nvCxnSpPr>
-          <p:cNvPr id="347" name="Straight Arrow Connector 70"/>
+          <p:cNvPr id="344" name="Straight Arrow Connector 70"/>
           <p:cNvCxnSpPr>
-            <a:stCxn id="319" idx="0"/>
-            <a:endCxn id="344" idx="2"/>
+            <a:stCxn id="316" idx="0"/>
+            <a:endCxn id="341" idx="2"/>
           </p:cNvCxnSpPr>
           <p:nvPr/>
         </p:nvCxnSpPr>
         <p:spPr>
           <a:xfrm flipV="1">
-            <a:off x="5106960" y="3197520"/>
-            <a:ext cx="911520" cy="825480"/>
+            <a:off x="5106960" y="3197160"/>
+            <a:ext cx="911160" cy="825840"/>
           </a:xfrm>
           <a:prstGeom prst="straightConnector1">
             <a:avLst/>
@@ -22781,17 +22665,17 @@
       </p:cxnSp>
       <p:cxnSp>
         <p:nvCxnSpPr>
-          <p:cNvPr id="348" name="Straight Arrow Connector 71"/>
+          <p:cNvPr id="345" name="Straight Arrow Connector 71"/>
           <p:cNvCxnSpPr>
-            <a:stCxn id="344" idx="0"/>
-            <a:endCxn id="317" idx="2"/>
+            <a:stCxn id="341" idx="0"/>
+            <a:endCxn id="314" idx="2"/>
           </p:cNvCxnSpPr>
           <p:nvPr/>
         </p:nvCxnSpPr>
         <p:spPr>
           <a:xfrm flipV="1">
-            <a:off x="6018120" y="2435040"/>
-            <a:ext cx="255960" cy="380520"/>
+            <a:off x="6017760" y="2435040"/>
+            <a:ext cx="256320" cy="380520"/>
           </a:xfrm>
           <a:prstGeom prst="straightConnector1">
             <a:avLst/>
@@ -22806,17 +22690,17 @@
       </p:cxnSp>
       <p:cxnSp>
         <p:nvCxnSpPr>
-          <p:cNvPr id="349" name="Straight Arrow Connector 64"/>
+          <p:cNvPr id="346" name="Straight Arrow Connector 64"/>
           <p:cNvCxnSpPr>
-            <a:stCxn id="319" idx="3"/>
-            <a:endCxn id="333" idx="1"/>
+            <a:stCxn id="316" idx="3"/>
+            <a:endCxn id="330" idx="1"/>
           </p:cNvCxnSpPr>
           <p:nvPr/>
         </p:nvCxnSpPr>
         <p:spPr>
           <a:xfrm flipV="1">
-            <a:off x="5917680" y="3692880"/>
-            <a:ext cx="1169280" cy="718920"/>
+            <a:off x="5917320" y="3692880"/>
+            <a:ext cx="1169640" cy="718920"/>
           </a:xfrm>
           <a:prstGeom prst="straightConnector1">
             <a:avLst/>
@@ -22832,17 +22716,17 @@
       </p:cxnSp>
       <p:cxnSp>
         <p:nvCxnSpPr>
-          <p:cNvPr id="350" name="Straight Arrow Connector 63"/>
+          <p:cNvPr id="347" name="Straight Arrow Connector 63"/>
           <p:cNvCxnSpPr>
-            <a:stCxn id="330" idx="1"/>
-            <a:endCxn id="333" idx="3"/>
+            <a:stCxn id="327" idx="1"/>
+            <a:endCxn id="330" idx="3"/>
           </p:cNvCxnSpPr>
           <p:nvPr/>
         </p:nvCxnSpPr>
         <p:spPr>
           <a:xfrm flipH="1">
-            <a:off x="8911080" y="3177000"/>
-            <a:ext cx="438120" cy="516240"/>
+            <a:off x="8910720" y="3177000"/>
+            <a:ext cx="438480" cy="516240"/>
           </a:xfrm>
           <a:prstGeom prst="straightConnector1">
             <a:avLst/>
@@ -22857,17 +22741,17 @@
       </p:cxnSp>
       <p:cxnSp>
         <p:nvCxnSpPr>
-          <p:cNvPr id="351" name="Straight Arrow Connector 39"/>
+          <p:cNvPr id="348" name="Straight Arrow Connector 39"/>
           <p:cNvCxnSpPr>
-            <a:stCxn id="330" idx="0"/>
-            <a:endCxn id="334" idx="3"/>
+            <a:stCxn id="327" idx="0"/>
+            <a:endCxn id="331" idx="3"/>
           </p:cNvCxnSpPr>
           <p:nvPr/>
         </p:nvCxnSpPr>
         <p:spPr>
           <a:xfrm flipH="1" flipV="1">
-            <a:off x="9338760" y="2061000"/>
-            <a:ext cx="820800" cy="193680"/>
+            <a:off x="9338400" y="2061000"/>
+            <a:ext cx="821160" cy="193680"/>
           </a:xfrm>
           <a:prstGeom prst="straightConnector1">
             <a:avLst/>
@@ -22882,14 +22766,14 @@
       </p:cxnSp>
       <p:sp>
         <p:nvSpPr>
-          <p:cNvPr id="352" name="Diamond 29"/>
+          <p:cNvPr id="349" name="Diamond 29"/>
           <p:cNvSpPr/>
           <p:nvPr/>
         </p:nvSpPr>
         <p:spPr>
           <a:xfrm>
             <a:off x="2722320" y="5330520"/>
-            <a:ext cx="1824480" cy="382320"/>
+            <a:ext cx="1824120" cy="381960"/>
           </a:xfrm>
           <a:prstGeom prst="diamond">
             <a:avLst/>
@@ -22947,10 +22831,10 @@
       </p:sp>
       <p:cxnSp>
         <p:nvCxnSpPr>
-          <p:cNvPr id="353" name="Straight Arrow Connector 72"/>
+          <p:cNvPr id="350" name="Straight Arrow Connector 72"/>
           <p:cNvCxnSpPr>
-            <a:stCxn id="319" idx="1"/>
-            <a:endCxn id="352" idx="0"/>
+            <a:stCxn id="316" idx="1"/>
+            <a:endCxn id="349" idx="0"/>
           </p:cNvCxnSpPr>
           <p:nvPr/>
         </p:nvCxnSpPr>
@@ -22972,17 +22856,17 @@
       </p:cxnSp>
       <p:cxnSp>
         <p:nvCxnSpPr>
-          <p:cNvPr id="354" name="Straight Arrow Connector 73"/>
+          <p:cNvPr id="351" name="Straight Arrow Connector 73"/>
           <p:cNvCxnSpPr>
-            <a:stCxn id="319" idx="2"/>
-            <a:endCxn id="352" idx="3"/>
+            <a:stCxn id="316" idx="2"/>
+            <a:endCxn id="349" idx="3"/>
           </p:cNvCxnSpPr>
           <p:nvPr/>
         </p:nvCxnSpPr>
         <p:spPr>
           <a:xfrm flipH="1">
-            <a:off x="4546800" y="4800600"/>
-            <a:ext cx="560520" cy="721440"/>
+            <a:off x="4546440" y="4800600"/>
+            <a:ext cx="560880" cy="721440"/>
           </a:xfrm>
           <a:prstGeom prst="straightConnector1">
             <a:avLst/>
@@ -22997,14 +22881,14 @@
       </p:cxnSp>
       <p:sp>
         <p:nvSpPr>
-          <p:cNvPr id="355" name="Oval 9"/>
+          <p:cNvPr id="352" name="Oval 9"/>
           <p:cNvSpPr/>
           <p:nvPr/>
         </p:nvSpPr>
         <p:spPr>
           <a:xfrm>
             <a:off x="7315200" y="4114800"/>
-            <a:ext cx="1675080" cy="382320"/>
+            <a:ext cx="1674720" cy="381960"/>
           </a:xfrm>
           <a:prstGeom prst="ellipse">
             <a:avLst/>
@@ -23060,17 +22944,17 @@
       </p:sp>
       <p:cxnSp>
         <p:nvCxnSpPr>
-          <p:cNvPr id="356" name="Straight Arrow Connector 58"/>
+          <p:cNvPr id="353" name="Straight Arrow Connector 58"/>
           <p:cNvCxnSpPr>
-            <a:stCxn id="325" idx="1"/>
-            <a:endCxn id="355" idx="6"/>
+            <a:stCxn id="322" idx="1"/>
+            <a:endCxn id="352" idx="6"/>
           </p:cNvCxnSpPr>
           <p:nvPr/>
         </p:nvCxnSpPr>
         <p:spPr>
           <a:xfrm flipH="1" flipV="1">
-            <a:off x="8990280" y="4305960"/>
-            <a:ext cx="412200" cy="457560"/>
+            <a:off x="8989920" y="4305960"/>
+            <a:ext cx="412560" cy="457560"/>
           </a:xfrm>
           <a:prstGeom prst="straightConnector1">
             <a:avLst/>
@@ -23115,14 +22999,14 @@
       </p:grpSpPr>
       <p:cxnSp>
         <p:nvCxnSpPr>
-          <p:cNvPr id="357" name="Straight Arrow Connector 6"/>
+          <p:cNvPr id="354" name="Straight Arrow Connector 6"/>
           <p:cNvCxnSpPr/>
           <p:nvPr/>
         </p:nvCxnSpPr>
         <p:spPr>
           <a:xfrm flipH="1">
             <a:off x="0" y="3073320"/>
-            <a:ext cx="1834200" cy="5400"/>
+            <a:ext cx="1834560" cy="5760"/>
           </a:xfrm>
           <a:prstGeom prst="straightConnector1">
             <a:avLst/>
@@ -23138,14 +23022,14 @@
       </p:cxnSp>
       <p:cxnSp>
         <p:nvCxnSpPr>
-          <p:cNvPr id="358" name="Straight Arrow Connector 7"/>
+          <p:cNvPr id="355" name="Straight Arrow Connector 7"/>
           <p:cNvCxnSpPr/>
           <p:nvPr/>
         </p:nvCxnSpPr>
         <p:spPr>
           <a:xfrm>
             <a:off x="0" y="2489400"/>
-            <a:ext cx="1834200" cy="5400"/>
+            <a:ext cx="1834560" cy="5760"/>
           </a:xfrm>
           <a:prstGeom prst="straightConnector1">
             <a:avLst/>
@@ -23161,14 +23045,14 @@
       </p:cxnSp>
       <p:cxnSp>
         <p:nvCxnSpPr>
-          <p:cNvPr id="359" name="Straight Arrow Connector 8"/>
+          <p:cNvPr id="356" name="Straight Arrow Connector 8"/>
           <p:cNvCxnSpPr/>
           <p:nvPr/>
         </p:nvCxnSpPr>
         <p:spPr>
           <a:xfrm>
             <a:off x="0" y="2781360"/>
-            <a:ext cx="1834200" cy="5400"/>
+            <a:ext cx="1834560" cy="5760"/>
           </a:xfrm>
           <a:prstGeom prst="straightConnector1">
             <a:avLst/>
@@ -23184,14 +23068,14 @@
       </p:cxnSp>
       <p:cxnSp>
         <p:nvCxnSpPr>
-          <p:cNvPr id="360" name="Straight Arrow Connector 9"/>
+          <p:cNvPr id="357" name="Straight Arrow Connector 9"/>
           <p:cNvCxnSpPr/>
           <p:nvPr/>
         </p:nvCxnSpPr>
         <p:spPr>
           <a:xfrm flipH="1">
             <a:off x="0" y="3657600"/>
-            <a:ext cx="1834200" cy="5400"/>
+            <a:ext cx="1834560" cy="5760"/>
           </a:xfrm>
           <a:prstGeom prst="straightConnector1">
             <a:avLst/>
@@ -23206,14 +23090,14 @@
       </p:cxnSp>
       <p:sp>
         <p:nvSpPr>
-          <p:cNvPr id="361" name="Diamond 3"/>
+          <p:cNvPr id="358" name="Diamond 3"/>
           <p:cNvSpPr/>
           <p:nvPr/>
         </p:nvSpPr>
         <p:spPr>
           <a:xfrm>
             <a:off x="128520" y="6134040"/>
-            <a:ext cx="1566360" cy="382320"/>
+            <a:ext cx="1566000" cy="381960"/>
           </a:xfrm>
           <a:prstGeom prst="diamond">
             <a:avLst/>
@@ -23271,14 +23155,14 @@
       </p:sp>
       <p:sp>
         <p:nvSpPr>
-          <p:cNvPr id="362" name="Oval 2"/>
+          <p:cNvPr id="359" name="Oval 2"/>
           <p:cNvSpPr/>
           <p:nvPr/>
         </p:nvSpPr>
         <p:spPr>
           <a:xfrm>
             <a:off x="302760" y="5454000"/>
-            <a:ext cx="1217880" cy="382320"/>
+            <a:ext cx="1217520" cy="381960"/>
           </a:xfrm>
           <a:prstGeom prst="ellipse">
             <a:avLst/>
@@ -23334,28 +23218,28 @@
       </p:sp>
       <p:grpSp>
         <p:nvGrpSpPr>
-          <p:cNvPr id="363" name="Group 3"/>
+          <p:cNvPr id="360" name="Group 3"/>
           <p:cNvGrpSpPr/>
           <p:nvPr/>
         </p:nvGrpSpPr>
         <p:grpSpPr>
           <a:xfrm>
             <a:off x="101160" y="336240"/>
-            <a:ext cx="1621080" cy="777960"/>
+            <a:ext cx="1620720" cy="777960"/>
             <a:chOff x="101160" y="336240"/>
-            <a:chExt cx="1621080" cy="777960"/>
+            <a:chExt cx="1620720" cy="777960"/>
           </a:xfrm>
         </p:grpSpPr>
         <p:sp>
           <p:nvSpPr>
-            <p:cNvPr id="364" name="TextBox 5"/>
+            <p:cNvPr id="361" name="TextBox 5"/>
             <p:cNvSpPr/>
             <p:nvPr/>
           </p:nvSpPr>
           <p:spPr>
             <a:xfrm>
               <a:off x="101160" y="336240"/>
-              <a:ext cx="1621080" cy="303120"/>
+              <a:ext cx="1620720" cy="303120"/>
             </a:xfrm>
             <a:prstGeom prst="rect">
               <a:avLst/>
@@ -23405,14 +23289,14 @@
         </p:sp>
         <p:sp>
           <p:nvSpPr>
-            <p:cNvPr id="365" name="TextBox 6"/>
+            <p:cNvPr id="362" name="TextBox 6"/>
             <p:cNvSpPr/>
             <p:nvPr/>
           </p:nvSpPr>
           <p:spPr>
             <a:xfrm>
               <a:off x="101160" y="597600"/>
-              <a:ext cx="1621080" cy="516600"/>
+              <a:ext cx="1620720" cy="516600"/>
             </a:xfrm>
             <a:prstGeom prst="rect">
               <a:avLst/>
@@ -23496,14 +23380,14 @@
       </p:grpSp>
       <p:sp>
         <p:nvSpPr>
-          <p:cNvPr id="366" name="Diamond 4"/>
+          <p:cNvPr id="363" name="Diamond 4"/>
           <p:cNvSpPr/>
           <p:nvPr/>
         </p:nvSpPr>
         <p:spPr>
           <a:xfrm>
             <a:off x="128520" y="4629600"/>
-            <a:ext cx="1566360" cy="527040"/>
+            <a:ext cx="1566000" cy="526680"/>
           </a:xfrm>
           <a:prstGeom prst="diamond">
             <a:avLst/>
@@ -23584,14 +23468,14 @@
       </p:sp>
       <p:cxnSp>
         <p:nvCxnSpPr>
-          <p:cNvPr id="367" name="Straight Arrow Connector 10"/>
+          <p:cNvPr id="364" name="Straight Arrow Connector 10"/>
           <p:cNvCxnSpPr/>
           <p:nvPr/>
         </p:nvCxnSpPr>
         <p:spPr>
           <a:xfrm>
             <a:off x="0" y="3365640"/>
-            <a:ext cx="1834200" cy="5400"/>
+            <a:ext cx="1834560" cy="5760"/>
           </a:xfrm>
           <a:prstGeom prst="straightConnector1">
             <a:avLst/>
@@ -23606,14 +23490,14 @@
       </p:cxnSp>
       <p:sp>
         <p:nvSpPr>
-          <p:cNvPr id="368" name="Isosceles Triangle 2"/>
+          <p:cNvPr id="365" name="Isosceles Triangle 2"/>
           <p:cNvSpPr/>
           <p:nvPr/>
         </p:nvSpPr>
         <p:spPr>
           <a:xfrm>
             <a:off x="673200" y="3949920"/>
-            <a:ext cx="477360" cy="382320"/>
+            <a:ext cx="477000" cy="381960"/>
           </a:xfrm>
           <a:prstGeom prst="triangle">
             <a:avLst>
@@ -23673,28 +23557,28 @@
       </p:sp>
       <p:grpSp>
         <p:nvGrpSpPr>
-          <p:cNvPr id="369" name="Group 4"/>
+          <p:cNvPr id="366" name="Group 4"/>
           <p:cNvGrpSpPr/>
           <p:nvPr/>
         </p:nvGrpSpPr>
         <p:grpSpPr>
           <a:xfrm>
             <a:off x="101160" y="1413000"/>
-            <a:ext cx="1621080" cy="777960"/>
+            <a:ext cx="1620720" cy="777960"/>
             <a:chOff x="101160" y="1413000"/>
-            <a:chExt cx="1621080" cy="777960"/>
+            <a:chExt cx="1620720" cy="777960"/>
           </a:xfrm>
         </p:grpSpPr>
         <p:sp>
           <p:nvSpPr>
-            <p:cNvPr id="370" name="TextBox 7"/>
+            <p:cNvPr id="367" name="TextBox 7"/>
             <p:cNvSpPr/>
             <p:nvPr/>
           </p:nvSpPr>
           <p:spPr>
             <a:xfrm>
               <a:off x="101160" y="1413000"/>
-              <a:ext cx="1621080" cy="303120"/>
+              <a:ext cx="1620720" cy="303120"/>
             </a:xfrm>
             <a:prstGeom prst="rect">
               <a:avLst/>
@@ -23745,14 +23629,14 @@
         </p:sp>
         <p:sp>
           <p:nvSpPr>
-            <p:cNvPr id="371" name="TextBox 8"/>
+            <p:cNvPr id="368" name="TextBox 8"/>
             <p:cNvSpPr/>
             <p:nvPr/>
           </p:nvSpPr>
           <p:spPr>
             <a:xfrm>
               <a:off x="101160" y="1674360"/>
-              <a:ext cx="1621080" cy="516600"/>
+              <a:ext cx="1620720" cy="516600"/>
             </a:xfrm>
             <a:prstGeom prst="rect">
               <a:avLst/>

</xml_diff>